<commit_message>
Managing catalog and items
</commit_message>
<xml_diff>
--- a/iu-spec-backend.pptx
+++ b/iu-spec-backend.pptx
@@ -4276,19 +4276,8 @@
                 <a:latin typeface="Arial" panose="020B0604020202020204" pitchFamily="34" charset="0"/>
                 <a:cs typeface="Arial" panose="020B0604020202020204" pitchFamily="34" charset="0"/>
               </a:rPr>
-              <a:t>PATCH method w/ params «user_id» will update last_login, and if the new last_login is on a different day, increases login_days by 1 and returns json with «new_day»: true, otherwise returns «new_day</a:t>
-            </a:r>
-            <a:r>
-              <a:rPr lang="nb-NO">
-                <a:latin typeface="Arial" panose="020B0604020202020204" pitchFamily="34" charset="0"/>
-                <a:cs typeface="Arial" panose="020B0604020202020204" pitchFamily="34" charset="0"/>
-              </a:rPr>
-              <a:t>»: false, and regardless also returns login_days</a:t>
-            </a:r>
-            <a:endParaRPr lang="nb-NO" dirty="0">
-              <a:latin typeface="Arial" panose="020B0604020202020204" pitchFamily="34" charset="0"/>
-              <a:cs typeface="Arial" panose="020B0604020202020204" pitchFamily="34" charset="0"/>
-            </a:endParaRPr>
+              <a:t>PATCH method w/ params «user_id» will update last_login, and if the new last_login is on a different day, increases login_days by 1 and returns json with «new_day»: true, otherwise returns «new_day»: false, and regardless also returns login_days</a:t>
+            </a:r>
           </a:p>
         </p:txBody>
       </p:sp>
@@ -5617,7 +5606,7 @@
         <p:spPr/>
         <p:txBody>
           <a:bodyPr>
-            <a:normAutofit fontScale="55000" lnSpcReduction="20000"/>
+            <a:normAutofit fontScale="47500" lnSpcReduction="20000"/>
           </a:bodyPr>
           <a:lstStyle/>
           <a:p>
@@ -5781,6 +5770,19 @@
               </a:rPr>
               <a:t>POST method with json «name», «image», «event_specific», «available», «cost1», «cost2», and «cost3» will create a planet</a:t>
             </a:r>
+          </a:p>
+          <a:p>
+            <a:r>
+              <a:rPr lang="nb-NO">
+                <a:latin typeface="Arial" panose="020B0604020202020204" pitchFamily="34" charset="0"/>
+                <a:cs typeface="Arial" panose="020B0604020202020204" pitchFamily="34" charset="0"/>
+              </a:rPr>
+              <a:t>PATCH method with the param «catalog_id» flips the value of the available variable</a:t>
+            </a:r>
+            <a:endParaRPr lang="nb-NO" dirty="0">
+              <a:latin typeface="Arial" panose="020B0604020202020204" pitchFamily="34" charset="0"/>
+              <a:cs typeface="Arial" panose="020B0604020202020204" pitchFamily="34" charset="0"/>
+            </a:endParaRPr>
           </a:p>
         </p:txBody>
       </p:sp>
@@ -5862,7 +5864,7 @@
         </p:spPr>
         <p:txBody>
           <a:bodyPr>
-            <a:normAutofit fontScale="55000" lnSpcReduction="20000"/>
+            <a:normAutofit fontScale="47500" lnSpcReduction="20000"/>
           </a:bodyPr>
           <a:lstStyle/>
           <a:p>
@@ -6049,6 +6051,15 @@
                 <a:cs typeface="Arial" panose="020B0604020202020204" pitchFamily="34" charset="0"/>
               </a:rPr>
               <a:t>POST method with json «user_id» «catalog_id», «x» and «y» adds a new item to a user’s list of PlanetItems, returning the new «id» and «image»</a:t>
+            </a:r>
+          </a:p>
+          <a:p>
+            <a:r>
+              <a:rPr lang="nb-NO" dirty="0">
+                <a:latin typeface="Arial" panose="020B0604020202020204" pitchFamily="34" charset="0"/>
+                <a:cs typeface="Arial" panose="020B0604020202020204" pitchFamily="34" charset="0"/>
+              </a:rPr>
+              <a:t>DELETE method with params «item_id» will remove that item from the database</a:t>
             </a:r>
           </a:p>
           <a:p>

</xml_diff>

<commit_message>
Package & Initializing Socket-IO
</commit_message>
<xml_diff>
--- a/iu-spec-backend.pptx
+++ b/iu-spec-backend.pptx
@@ -5100,7 +5100,7 @@
         </p:spPr>
         <p:txBody>
           <a:bodyPr>
-            <a:normAutofit fontScale="92500" lnSpcReduction="10000"/>
+            <a:normAutofit fontScale="92500" lnSpcReduction="20000"/>
           </a:bodyPr>
           <a:lstStyle/>
           <a:p>
@@ -5109,27 +5109,93 @@
                 <a:latin typeface="Arial" panose="020B0604020202020204" pitchFamily="34" charset="0"/>
                 <a:cs typeface="Arial" panose="020B0604020202020204" pitchFamily="34" charset="0"/>
               </a:rPr>
-              <a:t>You’ll have to </a:t>
+              <a:t>You’ll have to install all of these except </a:t>
             </a:r>
             <a:r>
               <a:rPr lang="en-US" dirty="0" err="1">
                 <a:latin typeface="Arial" panose="020B0604020202020204" pitchFamily="34" charset="0"/>
                 <a:cs typeface="Arial" panose="020B0604020202020204" pitchFamily="34" charset="0"/>
               </a:rPr>
-              <a:t>npm</a:t>
+              <a:t>Flask_Cors</a:t>
             </a:r>
             <a:r>
               <a:rPr lang="en-US" dirty="0">
                 <a:latin typeface="Arial" panose="020B0604020202020204" pitchFamily="34" charset="0"/>
                 <a:cs typeface="Arial" panose="020B0604020202020204" pitchFamily="34" charset="0"/>
               </a:rPr>
-              <a:t> install all of these except </a:t>
+              <a:t> (which is just a python module). For more info, look up their installation instructions.</a:t>
+            </a:r>
+          </a:p>
+          <a:p>
+            <a:r>
+              <a:rPr lang="en-US" dirty="0">
+                <a:latin typeface="Arial" panose="020B0604020202020204" pitchFamily="34" charset="0"/>
+                <a:cs typeface="Arial" panose="020B0604020202020204" pitchFamily="34" charset="0"/>
+              </a:rPr>
+              <a:t>Flask – a Python web dev framework</a:t>
+            </a:r>
+          </a:p>
+          <a:p>
+            <a:r>
+              <a:rPr lang="en-US" dirty="0">
+                <a:latin typeface="Arial" panose="020B0604020202020204" pitchFamily="34" charset="0"/>
+                <a:cs typeface="Arial" panose="020B0604020202020204" pitchFamily="34" charset="0"/>
+              </a:rPr>
+              <a:t>SQLite – a fairly reliable, lightweight, easy-to-use database that works for websites at least up to 100k users</a:t>
+            </a:r>
+          </a:p>
+          <a:p>
+            <a:r>
+              <a:rPr lang="en-US" dirty="0">
+                <a:latin typeface="Arial" panose="020B0604020202020204" pitchFamily="34" charset="0"/>
+                <a:cs typeface="Arial" panose="020B0604020202020204" pitchFamily="34" charset="0"/>
+              </a:rPr>
+              <a:t>Flask-</a:t>
             </a:r>
             <a:r>
               <a:rPr lang="en-US" dirty="0" err="1">
                 <a:latin typeface="Arial" panose="020B0604020202020204" pitchFamily="34" charset="0"/>
                 <a:cs typeface="Arial" panose="020B0604020202020204" pitchFamily="34" charset="0"/>
               </a:rPr>
+              <a:t>SQLAlchemy</a:t>
+            </a:r>
+            <a:r>
+              <a:rPr lang="en-US" dirty="0">
+                <a:latin typeface="Arial" panose="020B0604020202020204" pitchFamily="34" charset="0"/>
+                <a:cs typeface="Arial" panose="020B0604020202020204" pitchFamily="34" charset="0"/>
+              </a:rPr>
+              <a:t> – a Flask wrapper for </a:t>
+            </a:r>
+            <a:r>
+              <a:rPr lang="en-US" dirty="0" err="1">
+                <a:latin typeface="Arial" panose="020B0604020202020204" pitchFamily="34" charset="0"/>
+                <a:cs typeface="Arial" panose="020B0604020202020204" pitchFamily="34" charset="0"/>
+              </a:rPr>
+              <a:t>SQLAlchemy</a:t>
+            </a:r>
+            <a:r>
+              <a:rPr lang="en-US" dirty="0">
+                <a:latin typeface="Arial" panose="020B0604020202020204" pitchFamily="34" charset="0"/>
+                <a:cs typeface="Arial" panose="020B0604020202020204" pitchFamily="34" charset="0"/>
+              </a:rPr>
+              <a:t>, which is an Object Relational Mapper (ORM) that lets us use high-level classes, objects, and methods instead of dealing with tables and SQL</a:t>
+            </a:r>
+          </a:p>
+          <a:p>
+            <a:r>
+              <a:rPr lang="en-US" dirty="0">
+                <a:latin typeface="Arial" panose="020B0604020202020204" pitchFamily="34" charset="0"/>
+                <a:cs typeface="Arial" panose="020B0604020202020204" pitchFamily="34" charset="0"/>
+              </a:rPr>
+              <a:t>Flask-Migrate – a Flask wrapper for Alembic, a database migration framework for SQL-Alchemy that makes it easy to update the database when changed and have version control</a:t>
+            </a:r>
+          </a:p>
+          <a:p>
+            <a:r>
+              <a:rPr lang="en-US" dirty="0" err="1">
+                <a:latin typeface="Arial" panose="020B0604020202020204" pitchFamily="34" charset="0"/>
+                <a:cs typeface="Arial" panose="020B0604020202020204" pitchFamily="34" charset="0"/>
+              </a:rPr>
               <a:t>Flask_Cors</a:t>
             </a:r>
             <a:r>
@@ -5137,33 +5203,57 @@
                 <a:latin typeface="Arial" panose="020B0604020202020204" pitchFamily="34" charset="0"/>
                 <a:cs typeface="Arial" panose="020B0604020202020204" pitchFamily="34" charset="0"/>
               </a:rPr>
-              <a:t> (which is just a python module). For more info, look up their installation instructions.</a:t>
-            </a:r>
-          </a:p>
-          <a:p>
+              <a:t> – allows HTTP requests from a different </a:t>
+            </a:r>
+            <a:r>
+              <a:rPr lang="en-US" dirty="0" err="1">
+                <a:latin typeface="Arial" panose="020B0604020202020204" pitchFamily="34" charset="0"/>
+                <a:cs typeface="Arial" panose="020B0604020202020204" pitchFamily="34" charset="0"/>
+              </a:rPr>
+              <a:t>url</a:t>
+            </a:r>
             <a:r>
               <a:rPr lang="en-US" dirty="0">
                 <a:latin typeface="Arial" panose="020B0604020202020204" pitchFamily="34" charset="0"/>
                 <a:cs typeface="Arial" panose="020B0604020202020204" pitchFamily="34" charset="0"/>
               </a:rPr>
-              <a:t>Flask – a Python web dev framework</a:t>
-            </a:r>
-          </a:p>
-          <a:p>
+              <a:t>, PLEASE </a:t>
+            </a:r>
+            <a:r>
+              <a:rPr lang="en-US" dirty="0" err="1">
+                <a:latin typeface="Arial" panose="020B0604020202020204" pitchFamily="34" charset="0"/>
+                <a:cs typeface="Arial" panose="020B0604020202020204" pitchFamily="34" charset="0"/>
+              </a:rPr>
+              <a:t>PLEASE</a:t>
+            </a:r>
             <a:r>
               <a:rPr lang="en-US" dirty="0">
                 <a:latin typeface="Arial" panose="020B0604020202020204" pitchFamily="34" charset="0"/>
                 <a:cs typeface="Arial" panose="020B0604020202020204" pitchFamily="34" charset="0"/>
               </a:rPr>
-              <a:t>SQLite – a fairly reliable, lightweight, easy-to-use database that works for websites at least up to 100k users</a:t>
-            </a:r>
-          </a:p>
-          <a:p>
+              <a:t> </a:t>
+            </a:r>
+            <a:r>
+              <a:rPr lang="en-US" dirty="0" err="1">
+                <a:latin typeface="Arial" panose="020B0604020202020204" pitchFamily="34" charset="0"/>
+                <a:cs typeface="Arial" panose="020B0604020202020204" pitchFamily="34" charset="0"/>
+              </a:rPr>
+              <a:t>PLEASE</a:t>
+            </a:r>
             <a:r>
               <a:rPr lang="en-US" dirty="0">
                 <a:latin typeface="Arial" panose="020B0604020202020204" pitchFamily="34" charset="0"/>
                 <a:cs typeface="Arial" panose="020B0604020202020204" pitchFamily="34" charset="0"/>
               </a:rPr>
+              <a:t> disable before putting the app live unless we want people</a:t>
+            </a:r>
+          </a:p>
+          <a:p>
+            <a:r>
+              <a:rPr lang="en-US" dirty="0">
+                <a:latin typeface="Arial" panose="020B0604020202020204" pitchFamily="34" charset="0"/>
+                <a:cs typeface="Arial" panose="020B0604020202020204" pitchFamily="34" charset="0"/>
+              </a:rPr>
               <a:t>Flask-</a:t>
             </a:r>
             <a:r>
@@ -5171,96 +5261,26 @@
                 <a:latin typeface="Arial" panose="020B0604020202020204" pitchFamily="34" charset="0"/>
                 <a:cs typeface="Arial" panose="020B0604020202020204" pitchFamily="34" charset="0"/>
               </a:rPr>
-              <a:t>SQLAlchemy</a:t>
+              <a:t>SocketIO</a:t>
             </a:r>
             <a:r>
               <a:rPr lang="en-US" dirty="0">
                 <a:latin typeface="Arial" panose="020B0604020202020204" pitchFamily="34" charset="0"/>
                 <a:cs typeface="Arial" panose="020B0604020202020204" pitchFamily="34" charset="0"/>
               </a:rPr>
-              <a:t> – a Flask wrapper for </a:t>
+              <a:t> – allows for bilateral communication with rapid updates, useful for </a:t>
             </a:r>
             <a:r>
               <a:rPr lang="en-US" dirty="0" err="1">
                 <a:latin typeface="Arial" panose="020B0604020202020204" pitchFamily="34" charset="0"/>
                 <a:cs typeface="Arial" panose="020B0604020202020204" pitchFamily="34" charset="0"/>
               </a:rPr>
-              <a:t>SQLAlchemy</a:t>
-            </a:r>
-            <a:r>
-              <a:rPr lang="en-US" dirty="0">
-                <a:latin typeface="Arial" panose="020B0604020202020204" pitchFamily="34" charset="0"/>
-                <a:cs typeface="Arial" panose="020B0604020202020204" pitchFamily="34" charset="0"/>
-              </a:rPr>
-              <a:t>, which is an Object Relational Mapper (ORM) that lets us use high-level classes, objects, and methods instead of dealing with tables and SQL</a:t>
-            </a:r>
-          </a:p>
-          <a:p>
-            <a:r>
-              <a:rPr lang="en-US" dirty="0">
-                <a:latin typeface="Arial" panose="020B0604020202020204" pitchFamily="34" charset="0"/>
-                <a:cs typeface="Arial" panose="020B0604020202020204" pitchFamily="34" charset="0"/>
-              </a:rPr>
-              <a:t>Flask-Migrate – a Flask wrapper for Alembic, a database migration framework for SQL-Alchemy that makes it easy to update the database when changed and have version control</a:t>
-            </a:r>
-          </a:p>
-          <a:p>
-            <a:r>
-              <a:rPr lang="en-US" dirty="0" err="1">
-                <a:latin typeface="Arial" panose="020B0604020202020204" pitchFamily="34" charset="0"/>
-                <a:cs typeface="Arial" panose="020B0604020202020204" pitchFamily="34" charset="0"/>
-              </a:rPr>
-              <a:t>Flask_Cors</a:t>
-            </a:r>
-            <a:r>
-              <a:rPr lang="en-US" dirty="0">
-                <a:latin typeface="Arial" panose="020B0604020202020204" pitchFamily="34" charset="0"/>
-                <a:cs typeface="Arial" panose="020B0604020202020204" pitchFamily="34" charset="0"/>
-              </a:rPr>
-              <a:t> – allows HTTP requests from a different </a:t>
-            </a:r>
-            <a:r>
-              <a:rPr lang="en-US" dirty="0" err="1">
-                <a:latin typeface="Arial" panose="020B0604020202020204" pitchFamily="34" charset="0"/>
-                <a:cs typeface="Arial" panose="020B0604020202020204" pitchFamily="34" charset="0"/>
-              </a:rPr>
-              <a:t>url</a:t>
-            </a:r>
-            <a:r>
-              <a:rPr lang="en-US" dirty="0">
-                <a:latin typeface="Arial" panose="020B0604020202020204" pitchFamily="34" charset="0"/>
-                <a:cs typeface="Arial" panose="020B0604020202020204" pitchFamily="34" charset="0"/>
-              </a:rPr>
-              <a:t>, PLEASE </a:t>
-            </a:r>
-            <a:r>
-              <a:rPr lang="en-US" dirty="0" err="1">
-                <a:latin typeface="Arial" panose="020B0604020202020204" pitchFamily="34" charset="0"/>
-                <a:cs typeface="Arial" panose="020B0604020202020204" pitchFamily="34" charset="0"/>
-              </a:rPr>
-              <a:t>PLEASE</a:t>
-            </a:r>
-            <a:r>
-              <a:rPr lang="en-US" dirty="0">
-                <a:latin typeface="Arial" panose="020B0604020202020204" pitchFamily="34" charset="0"/>
-                <a:cs typeface="Arial" panose="020B0604020202020204" pitchFamily="34" charset="0"/>
-              </a:rPr>
-              <a:t> </a:t>
-            </a:r>
-            <a:r>
-              <a:rPr lang="en-US" dirty="0" err="1">
-                <a:latin typeface="Arial" panose="020B0604020202020204" pitchFamily="34" charset="0"/>
-                <a:cs typeface="Arial" panose="020B0604020202020204" pitchFamily="34" charset="0"/>
-              </a:rPr>
-              <a:t>PLEASE</a:t>
-            </a:r>
-            <a:r>
-              <a:rPr lang="en-US" dirty="0">
-                <a:latin typeface="Arial" panose="020B0604020202020204" pitchFamily="34" charset="0"/>
-                <a:cs typeface="Arial" panose="020B0604020202020204" pitchFamily="34" charset="0"/>
-              </a:rPr>
-              <a:t> disable before putting the app live unless we want people</a:t>
-            </a:r>
+              <a:t>chatbox</a:t>
+            </a:r>
+            <a:endParaRPr lang="en-US" dirty="0">
+              <a:latin typeface="Arial" panose="020B0604020202020204" pitchFamily="34" charset="0"/>
+              <a:cs typeface="Arial" panose="020B0604020202020204" pitchFamily="34" charset="0"/>
+            </a:endParaRPr>
           </a:p>
         </p:txBody>
       </p:sp>
@@ -5773,16 +5793,12 @@
           </a:p>
           <a:p>
             <a:r>
-              <a:rPr lang="nb-NO">
+              <a:rPr lang="nb-NO" dirty="0">
                 <a:latin typeface="Arial" panose="020B0604020202020204" pitchFamily="34" charset="0"/>
                 <a:cs typeface="Arial" panose="020B0604020202020204" pitchFamily="34" charset="0"/>
               </a:rPr>
               <a:t>PATCH method with the param «catalog_id» flips the value of the available variable</a:t>
             </a:r>
-            <a:endParaRPr lang="nb-NO" dirty="0">
-              <a:latin typeface="Arial" panose="020B0604020202020204" pitchFamily="34" charset="0"/>
-              <a:cs typeface="Arial" panose="020B0604020202020204" pitchFamily="34" charset="0"/>
-            </a:endParaRPr>
           </a:p>
         </p:txBody>
       </p:sp>

</xml_diff>

<commit_message>
Update documentation and server
</commit_message>
<xml_diff>
--- a/iu-spec-backend.pptx
+++ b/iu-spec-backend.pptx
@@ -7,29 +7,30 @@
   <p:sldIdLst>
     <p:sldId id="257" r:id="rId2"/>
     <p:sldId id="258" r:id="rId3"/>
-    <p:sldId id="259" r:id="rId4"/>
-    <p:sldId id="260" r:id="rId5"/>
-    <p:sldId id="262" r:id="rId6"/>
-    <p:sldId id="261" r:id="rId7"/>
-    <p:sldId id="263" r:id="rId8"/>
-    <p:sldId id="264" r:id="rId9"/>
-    <p:sldId id="265" r:id="rId10"/>
-    <p:sldId id="267" r:id="rId11"/>
-    <p:sldId id="266" r:id="rId12"/>
-    <p:sldId id="268" r:id="rId13"/>
-    <p:sldId id="269" r:id="rId14"/>
-    <p:sldId id="270" r:id="rId15"/>
-    <p:sldId id="271" r:id="rId16"/>
-    <p:sldId id="277" r:id="rId17"/>
-    <p:sldId id="279" r:id="rId18"/>
-    <p:sldId id="272" r:id="rId19"/>
-    <p:sldId id="273" r:id="rId20"/>
-    <p:sldId id="274" r:id="rId21"/>
-    <p:sldId id="275" r:id="rId22"/>
-    <p:sldId id="276" r:id="rId23"/>
-    <p:sldId id="278" r:id="rId24"/>
-    <p:sldId id="281" r:id="rId25"/>
-    <p:sldId id="280" r:id="rId26"/>
+    <p:sldId id="282" r:id="rId4"/>
+    <p:sldId id="259" r:id="rId5"/>
+    <p:sldId id="260" r:id="rId6"/>
+    <p:sldId id="262" r:id="rId7"/>
+    <p:sldId id="261" r:id="rId8"/>
+    <p:sldId id="263" r:id="rId9"/>
+    <p:sldId id="264" r:id="rId10"/>
+    <p:sldId id="265" r:id="rId11"/>
+    <p:sldId id="267" r:id="rId12"/>
+    <p:sldId id="266" r:id="rId13"/>
+    <p:sldId id="268" r:id="rId14"/>
+    <p:sldId id="269" r:id="rId15"/>
+    <p:sldId id="270" r:id="rId16"/>
+    <p:sldId id="271" r:id="rId17"/>
+    <p:sldId id="277" r:id="rId18"/>
+    <p:sldId id="279" r:id="rId19"/>
+    <p:sldId id="272" r:id="rId20"/>
+    <p:sldId id="273" r:id="rId21"/>
+    <p:sldId id="274" r:id="rId22"/>
+    <p:sldId id="275" r:id="rId23"/>
+    <p:sldId id="276" r:id="rId24"/>
+    <p:sldId id="278" r:id="rId25"/>
+    <p:sldId id="281" r:id="rId26"/>
+    <p:sldId id="280" r:id="rId27"/>
   </p:sldIdLst>
   <p:sldSz cx="12192000" cy="6858000"/>
   <p:notesSz cx="6858000" cy="9144000"/>
@@ -3461,7 +3462,7 @@
                 <a:latin typeface="Arial" panose="020B0604020202020204" pitchFamily="34" charset="0"/>
                 <a:cs typeface="Arial" panose="020B0604020202020204" pitchFamily="34" charset="0"/>
               </a:rPr>
-              <a:t>System</a:t>
+              <a:t>Galaxy</a:t>
             </a:r>
           </a:p>
         </p:txBody>
@@ -3488,16 +3489,16 @@
                 <a:latin typeface="Arial" panose="020B0604020202020204" pitchFamily="34" charset="0"/>
                 <a:cs typeface="Arial" panose="020B0604020202020204" pitchFamily="34" charset="0"/>
               </a:rPr>
-              <a:t>galaxy: links to Galaxy from Galaxy-System relation</a:t>
-            </a:r>
-          </a:p>
-          <a:p>
-            <a:r>
-              <a:rPr lang="nb-NO" dirty="0">
-                <a:latin typeface="Arial" panose="020B0604020202020204" pitchFamily="34" charset="0"/>
-                <a:cs typeface="Arial" panose="020B0604020202020204" pitchFamily="34" charset="0"/>
-              </a:rPr>
-              <a:t>galaxy_id: foreign key for keeping track of galaxy, reference galaxy instead</a:t>
+              <a:t>name: String(64), index = True, unique = True</a:t>
+            </a:r>
+          </a:p>
+          <a:p>
+            <a:r>
+              <a:rPr lang="nb-NO" dirty="0">
+                <a:latin typeface="Arial" panose="020B0604020202020204" pitchFamily="34" charset="0"/>
+                <a:cs typeface="Arial" panose="020B0604020202020204" pitchFamily="34" charset="0"/>
+              </a:rPr>
+              <a:t>description: String(128)</a:t>
             </a:r>
           </a:p>
           <a:p>
@@ -3515,24 +3516,6 @@
                 <a:latin typeface="Arial" panose="020B0604020202020204" pitchFamily="34" charset="0"/>
                 <a:cs typeface="Arial" panose="020B0604020202020204" pitchFamily="34" charset="0"/>
               </a:rPr>
-              <a:t>name: String(64), index = True, unique = True</a:t>
-            </a:r>
-          </a:p>
-          <a:p>
-            <a:r>
-              <a:rPr lang="nb-NO" dirty="0">
-                <a:latin typeface="Arial" panose="020B0604020202020204" pitchFamily="34" charset="0"/>
-                <a:cs typeface="Arial" panose="020B0604020202020204" pitchFamily="34" charset="0"/>
-              </a:rPr>
-              <a:t>quadrant: Integer</a:t>
-            </a:r>
-          </a:p>
-          <a:p>
-            <a:r>
-              <a:rPr lang="nb-NO" dirty="0">
-                <a:latin typeface="Arial" panose="020B0604020202020204" pitchFamily="34" charset="0"/>
-                <a:cs typeface="Arial" panose="020B0604020202020204" pitchFamily="34" charset="0"/>
-              </a:rPr>
               <a:t>image: String(128)</a:t>
             </a:r>
           </a:p>
@@ -3542,7 +3525,7 @@
                 <a:latin typeface="Arial" panose="020B0604020202020204" pitchFamily="34" charset="0"/>
                 <a:cs typeface="Arial" panose="020B0604020202020204" pitchFamily="34" charset="0"/>
               </a:rPr>
-              <a:t>planets: a one-to-many relationship between System and Planets, giving system variable to Planet</a:t>
+              <a:t>systems: a one-to-many relationship between Galaxy and System, giving galaxy variable to System</a:t>
             </a:r>
           </a:p>
           <a:p>
@@ -3551,12 +3534,18 @@
               <a:cs typeface="Arial" panose="020B0604020202020204" pitchFamily="34" charset="0"/>
             </a:endParaRPr>
           </a:p>
+          <a:p>
+            <a:endParaRPr lang="nb-NO" dirty="0">
+              <a:latin typeface="Arial" panose="020B0604020202020204" pitchFamily="34" charset="0"/>
+              <a:cs typeface="Arial" panose="020B0604020202020204" pitchFamily="34" charset="0"/>
+            </a:endParaRPr>
+          </a:p>
         </p:txBody>
       </p:sp>
     </p:spTree>
     <p:extLst>
       <p:ext uri="{BB962C8B-B14F-4D97-AF65-F5344CB8AC3E}">
-        <p14:creationId xmlns:p14="http://schemas.microsoft.com/office/powerpoint/2010/main" val="2823911284"/>
+        <p14:creationId xmlns:p14="http://schemas.microsoft.com/office/powerpoint/2010/main" val="1213547390"/>
       </p:ext>
     </p:extLst>
   </p:cSld>
@@ -3608,7 +3597,7 @@
                 <a:latin typeface="Arial" panose="020B0604020202020204" pitchFamily="34" charset="0"/>
                 <a:cs typeface="Arial" panose="020B0604020202020204" pitchFamily="34" charset="0"/>
               </a:rPr>
-              <a:t>Planet</a:t>
+              <a:t>System</a:t>
             </a:r>
           </a:p>
         </p:txBody>
@@ -3626,7 +3615,7 @@
         <p:spPr/>
         <p:txBody>
           <a:bodyPr>
-            <a:normAutofit fontScale="92500" lnSpcReduction="20000"/>
+            <a:normAutofit/>
           </a:bodyPr>
           <a:lstStyle/>
           <a:p>
@@ -3635,61 +3624,43 @@
                 <a:latin typeface="Arial" panose="020B0604020202020204" pitchFamily="34" charset="0"/>
                 <a:cs typeface="Arial" panose="020B0604020202020204" pitchFamily="34" charset="0"/>
               </a:rPr>
-              <a:t>owner: links to User from User-Planet relation</a:t>
-            </a:r>
-          </a:p>
-          <a:p>
-            <a:r>
-              <a:rPr lang="nb-NO" dirty="0">
-                <a:latin typeface="Arial" panose="020B0604020202020204" pitchFamily="34" charset="0"/>
-                <a:cs typeface="Arial" panose="020B0604020202020204" pitchFamily="34" charset="0"/>
-              </a:rPr>
-              <a:t>system: links to System from System-Planet relation</a:t>
-            </a:r>
-          </a:p>
-          <a:p>
-            <a:r>
-              <a:rPr lang="nb-NO" dirty="0">
-                <a:latin typeface="Arial" panose="020B0604020202020204" pitchFamily="34" charset="0"/>
-                <a:cs typeface="Arial" panose="020B0604020202020204" pitchFamily="34" charset="0"/>
-              </a:rPr>
-              <a:t>owner_id: foreign key for keeping track of owner, reference owner instead</a:t>
-            </a:r>
-          </a:p>
-          <a:p>
-            <a:r>
-              <a:rPr lang="nb-NO" dirty="0">
-                <a:latin typeface="Arial" panose="020B0604020202020204" pitchFamily="34" charset="0"/>
-                <a:cs typeface="Arial" panose="020B0604020202020204" pitchFamily="34" charset="0"/>
-              </a:rPr>
-              <a:t>system_id: foreign key for keeping track of system, reference system instead</a:t>
-            </a:r>
-          </a:p>
-          <a:p>
-            <a:r>
-              <a:rPr lang="nb-NO" dirty="0">
-                <a:latin typeface="Arial" panose="020B0604020202020204" pitchFamily="34" charset="0"/>
-                <a:cs typeface="Arial" panose="020B0604020202020204" pitchFamily="34" charset="0"/>
-              </a:rPr>
-              <a:t>name: String(64), index = True, unique = True </a:t>
-            </a:r>
-          </a:p>
-          <a:p>
-            <a:r>
-              <a:rPr lang="nb-NO" dirty="0">
-                <a:latin typeface="Arial" panose="020B0604020202020204" pitchFamily="34" charset="0"/>
-                <a:cs typeface="Arial" panose="020B0604020202020204" pitchFamily="34" charset="0"/>
-              </a:rPr>
-              <a:t>order: Integer</a:t>
-            </a:r>
-          </a:p>
-          <a:p>
-            <a:r>
-              <a:rPr lang="nb-NO" dirty="0">
-                <a:latin typeface="Arial" panose="020B0604020202020204" pitchFamily="34" charset="0"/>
-                <a:cs typeface="Arial" panose="020B0604020202020204" pitchFamily="34" charset="0"/>
-              </a:rPr>
-              <a:t>size: Integer</a:t>
+              <a:t>galaxy: links to Galaxy from Galaxy-System relation</a:t>
+            </a:r>
+          </a:p>
+          <a:p>
+            <a:r>
+              <a:rPr lang="nb-NO" dirty="0">
+                <a:latin typeface="Arial" panose="020B0604020202020204" pitchFamily="34" charset="0"/>
+                <a:cs typeface="Arial" panose="020B0604020202020204" pitchFamily="34" charset="0"/>
+              </a:rPr>
+              <a:t>galaxy_id: foreign key for keeping track of galaxy, reference galaxy instead</a:t>
+            </a:r>
+          </a:p>
+          <a:p>
+            <a:r>
+              <a:rPr lang="nb-NO" dirty="0">
+                <a:latin typeface="Arial" panose="020B0604020202020204" pitchFamily="34" charset="0"/>
+                <a:cs typeface="Arial" panose="020B0604020202020204" pitchFamily="34" charset="0"/>
+              </a:rPr>
+              <a:t>x, y: Integers</a:t>
+            </a:r>
+          </a:p>
+          <a:p>
+            <a:r>
+              <a:rPr lang="nb-NO" dirty="0">
+                <a:latin typeface="Arial" panose="020B0604020202020204" pitchFamily="34" charset="0"/>
+                <a:cs typeface="Arial" panose="020B0604020202020204" pitchFamily="34" charset="0"/>
+              </a:rPr>
+              <a:t>name: String(64), index = True, unique = True</a:t>
+            </a:r>
+          </a:p>
+          <a:p>
+            <a:r>
+              <a:rPr lang="nb-NO" dirty="0">
+                <a:latin typeface="Arial" panose="020B0604020202020204" pitchFamily="34" charset="0"/>
+                <a:cs typeface="Arial" panose="020B0604020202020204" pitchFamily="34" charset="0"/>
+              </a:rPr>
+              <a:t>quadrant: Integer</a:t>
             </a:r>
           </a:p>
           <a:p>
@@ -3707,7 +3678,7 @@
                 <a:latin typeface="Arial" panose="020B0604020202020204" pitchFamily="34" charset="0"/>
                 <a:cs typeface="Arial" panose="020B0604020202020204" pitchFamily="34" charset="0"/>
               </a:rPr>
-              <a:t>surface: String(128)</a:t>
+              <a:t>planets: a one-to-many relationship between System and Planets, giving system variable to Planet</a:t>
             </a:r>
           </a:p>
           <a:p>
@@ -3721,7 +3692,7 @@
     </p:spTree>
     <p:extLst>
       <p:ext uri="{BB962C8B-B14F-4D97-AF65-F5344CB8AC3E}">
-        <p14:creationId xmlns:p14="http://schemas.microsoft.com/office/powerpoint/2010/main" val="1764528039"/>
+        <p14:creationId xmlns:p14="http://schemas.microsoft.com/office/powerpoint/2010/main" val="2823911284"/>
       </p:ext>
     </p:extLst>
   </p:cSld>
@@ -3769,16 +3740,12 @@
           <a:lstStyle/>
           <a:p>
             <a:r>
-              <a:rPr lang="en-US" dirty="0" err="1">
-                <a:latin typeface="Arial" panose="020B0604020202020204" pitchFamily="34" charset="0"/>
-                <a:cs typeface="Arial" panose="020B0604020202020204" pitchFamily="34" charset="0"/>
-              </a:rPr>
-              <a:t>CatalogItem</a:t>
-            </a:r>
-            <a:endParaRPr lang="en-US" dirty="0">
-              <a:latin typeface="Arial" panose="020B0604020202020204" pitchFamily="34" charset="0"/>
-              <a:cs typeface="Arial" panose="020B0604020202020204" pitchFamily="34" charset="0"/>
-            </a:endParaRPr>
+              <a:rPr lang="en-US" dirty="0">
+                <a:latin typeface="Arial" panose="020B0604020202020204" pitchFamily="34" charset="0"/>
+                <a:cs typeface="Arial" panose="020B0604020202020204" pitchFamily="34" charset="0"/>
+              </a:rPr>
+              <a:t>Planet</a:t>
+            </a:r>
           </a:p>
         </p:txBody>
       </p:sp>
@@ -3795,7 +3762,7 @@
         <p:spPr/>
         <p:txBody>
           <a:bodyPr>
-            <a:normAutofit/>
+            <a:normAutofit fontScale="92500" lnSpcReduction="20000"/>
           </a:bodyPr>
           <a:lstStyle/>
           <a:p>
@@ -3804,6 +3771,42 @@
                 <a:latin typeface="Arial" panose="020B0604020202020204" pitchFamily="34" charset="0"/>
                 <a:cs typeface="Arial" panose="020B0604020202020204" pitchFamily="34" charset="0"/>
               </a:rPr>
+              <a:t>owner: links to User from User-Planet relation</a:t>
+            </a:r>
+          </a:p>
+          <a:p>
+            <a:r>
+              <a:rPr lang="nb-NO" dirty="0">
+                <a:latin typeface="Arial" panose="020B0604020202020204" pitchFamily="34" charset="0"/>
+                <a:cs typeface="Arial" panose="020B0604020202020204" pitchFamily="34" charset="0"/>
+              </a:rPr>
+              <a:t>system: links to System from System-Planet relation</a:t>
+            </a:r>
+          </a:p>
+          <a:p>
+            <a:r>
+              <a:rPr lang="nb-NO" dirty="0">
+                <a:latin typeface="Arial" panose="020B0604020202020204" pitchFamily="34" charset="0"/>
+                <a:cs typeface="Arial" panose="020B0604020202020204" pitchFamily="34" charset="0"/>
+              </a:rPr>
+              <a:t>owner_id: foreign key for keeping track of owner, reference owner instead</a:t>
+            </a:r>
+          </a:p>
+          <a:p>
+            <a:r>
+              <a:rPr lang="nb-NO" dirty="0">
+                <a:latin typeface="Arial" panose="020B0604020202020204" pitchFamily="34" charset="0"/>
+                <a:cs typeface="Arial" panose="020B0604020202020204" pitchFamily="34" charset="0"/>
+              </a:rPr>
+              <a:t>system_id: foreign key for keeping track of system, reference system instead</a:t>
+            </a:r>
+          </a:p>
+          <a:p>
+            <a:r>
+              <a:rPr lang="nb-NO" dirty="0">
+                <a:latin typeface="Arial" panose="020B0604020202020204" pitchFamily="34" charset="0"/>
+                <a:cs typeface="Arial" panose="020B0604020202020204" pitchFamily="34" charset="0"/>
+              </a:rPr>
               <a:t>name: String(64), index = True, unique = True </a:t>
             </a:r>
           </a:p>
@@ -3813,7 +3816,16 @@
                 <a:latin typeface="Arial" panose="020B0604020202020204" pitchFamily="34" charset="0"/>
                 <a:cs typeface="Arial" panose="020B0604020202020204" pitchFamily="34" charset="0"/>
               </a:rPr>
-              <a:t>cost1, cost2, cost3 are all Integers</a:t>
+              <a:t>order: Integer</a:t>
+            </a:r>
+          </a:p>
+          <a:p>
+            <a:r>
+              <a:rPr lang="nb-NO" dirty="0">
+                <a:latin typeface="Arial" panose="020B0604020202020204" pitchFamily="34" charset="0"/>
+                <a:cs typeface="Arial" panose="020B0604020202020204" pitchFamily="34" charset="0"/>
+              </a:rPr>
+              <a:t>size: Integer</a:t>
             </a:r>
           </a:p>
           <a:p>
@@ -3831,25 +3843,7 @@
                 <a:latin typeface="Arial" panose="020B0604020202020204" pitchFamily="34" charset="0"/>
                 <a:cs typeface="Arial" panose="020B0604020202020204" pitchFamily="34" charset="0"/>
               </a:rPr>
-              <a:t>event_specific: Boolean</a:t>
-            </a:r>
-          </a:p>
-          <a:p>
-            <a:r>
-              <a:rPr lang="nb-NO" dirty="0">
-                <a:latin typeface="Arial" panose="020B0604020202020204" pitchFamily="34" charset="0"/>
-                <a:cs typeface="Arial" panose="020B0604020202020204" pitchFamily="34" charset="0"/>
-              </a:rPr>
-              <a:t>available: Boolean</a:t>
-            </a:r>
-          </a:p>
-          <a:p>
-            <a:r>
-              <a:rPr lang="nb-NO" dirty="0">
-                <a:latin typeface="Arial" panose="020B0604020202020204" pitchFamily="34" charset="0"/>
-                <a:cs typeface="Arial" panose="020B0604020202020204" pitchFamily="34" charset="0"/>
-              </a:rPr>
-              <a:t>planet_items: a one-to-many relationship between CatalogItem and PlanetItems, giving catalog_parent variable to PlanetItem</a:t>
+              <a:t>surface: String(128)</a:t>
             </a:r>
           </a:p>
           <a:p>
@@ -3858,18 +3852,12 @@
               <a:cs typeface="Arial" panose="020B0604020202020204" pitchFamily="34" charset="0"/>
             </a:endParaRPr>
           </a:p>
-          <a:p>
-            <a:endParaRPr lang="nb-NO" dirty="0">
-              <a:latin typeface="Arial" panose="020B0604020202020204" pitchFamily="34" charset="0"/>
-              <a:cs typeface="Arial" panose="020B0604020202020204" pitchFamily="34" charset="0"/>
-            </a:endParaRPr>
-          </a:p>
         </p:txBody>
       </p:sp>
     </p:spTree>
     <p:extLst>
       <p:ext uri="{BB962C8B-B14F-4D97-AF65-F5344CB8AC3E}">
-        <p14:creationId xmlns:p14="http://schemas.microsoft.com/office/powerpoint/2010/main" val="2511124853"/>
+        <p14:creationId xmlns:p14="http://schemas.microsoft.com/office/powerpoint/2010/main" val="1764528039"/>
       </p:ext>
     </p:extLst>
   </p:cSld>
@@ -3917,12 +3905,16 @@
           <a:lstStyle/>
           <a:p>
             <a:r>
-              <a:rPr lang="en-US" dirty="0">
-                <a:latin typeface="Arial" panose="020B0604020202020204" pitchFamily="34" charset="0"/>
-                <a:cs typeface="Arial" panose="020B0604020202020204" pitchFamily="34" charset="0"/>
-              </a:rPr>
-              <a:t>Status</a:t>
-            </a:r>
+              <a:rPr lang="en-US" dirty="0" err="1">
+                <a:latin typeface="Arial" panose="020B0604020202020204" pitchFamily="34" charset="0"/>
+                <a:cs typeface="Arial" panose="020B0604020202020204" pitchFamily="34" charset="0"/>
+              </a:rPr>
+              <a:t>CatalogItem</a:t>
+            </a:r>
+            <a:endParaRPr lang="en-US" dirty="0">
+              <a:latin typeface="Arial" panose="020B0604020202020204" pitchFamily="34" charset="0"/>
+              <a:cs typeface="Arial" panose="020B0604020202020204" pitchFamily="34" charset="0"/>
+            </a:endParaRPr>
           </a:p>
         </p:txBody>
       </p:sp>
@@ -3948,24 +3940,72 @@
                 <a:latin typeface="Arial" panose="020B0604020202020204" pitchFamily="34" charset="0"/>
                 <a:cs typeface="Arial" panose="020B0604020202020204" pitchFamily="34" charset="0"/>
               </a:rPr>
-              <a:t>event: Boolean that keeps track of whether or not an event is taking place</a:t>
-            </a:r>
-          </a:p>
-          <a:p>
-            <a:r>
-              <a:rPr lang="nb-NO" dirty="0">
-                <a:latin typeface="Arial" panose="020B0604020202020204" pitchFamily="34" charset="0"/>
-                <a:cs typeface="Arial" panose="020B0604020202020204" pitchFamily="34" charset="0"/>
-              </a:rPr>
-              <a:t>news: String(256) that displays on login</a:t>
-            </a:r>
+              <a:t>name: String(64), index = True, unique = True </a:t>
+            </a:r>
+          </a:p>
+          <a:p>
+            <a:r>
+              <a:rPr lang="nb-NO" dirty="0">
+                <a:latin typeface="Arial" panose="020B0604020202020204" pitchFamily="34" charset="0"/>
+                <a:cs typeface="Arial" panose="020B0604020202020204" pitchFamily="34" charset="0"/>
+              </a:rPr>
+              <a:t>cost1, cost2, cost3 are all Integers</a:t>
+            </a:r>
+          </a:p>
+          <a:p>
+            <a:r>
+              <a:rPr lang="nb-NO" dirty="0">
+                <a:latin typeface="Arial" panose="020B0604020202020204" pitchFamily="34" charset="0"/>
+                <a:cs typeface="Arial" panose="020B0604020202020204" pitchFamily="34" charset="0"/>
+              </a:rPr>
+              <a:t>image: String(128)</a:t>
+            </a:r>
+          </a:p>
+          <a:p>
+            <a:r>
+              <a:rPr lang="nb-NO" dirty="0">
+                <a:latin typeface="Arial" panose="020B0604020202020204" pitchFamily="34" charset="0"/>
+                <a:cs typeface="Arial" panose="020B0604020202020204" pitchFamily="34" charset="0"/>
+              </a:rPr>
+              <a:t>event_specific: Boolean</a:t>
+            </a:r>
+          </a:p>
+          <a:p>
+            <a:r>
+              <a:rPr lang="nb-NO" dirty="0">
+                <a:latin typeface="Arial" panose="020B0604020202020204" pitchFamily="34" charset="0"/>
+                <a:cs typeface="Arial" panose="020B0604020202020204" pitchFamily="34" charset="0"/>
+              </a:rPr>
+              <a:t>available: Boolean</a:t>
+            </a:r>
+          </a:p>
+          <a:p>
+            <a:r>
+              <a:rPr lang="nb-NO" dirty="0">
+                <a:latin typeface="Arial" panose="020B0604020202020204" pitchFamily="34" charset="0"/>
+                <a:cs typeface="Arial" panose="020B0604020202020204" pitchFamily="34" charset="0"/>
+              </a:rPr>
+              <a:t>planet_items: a one-to-many relationship between CatalogItem and PlanetItems, giving catalog_parent variable to PlanetItem</a:t>
+            </a:r>
+          </a:p>
+          <a:p>
+            <a:endParaRPr lang="nb-NO" dirty="0">
+              <a:latin typeface="Arial" panose="020B0604020202020204" pitchFamily="34" charset="0"/>
+              <a:cs typeface="Arial" panose="020B0604020202020204" pitchFamily="34" charset="0"/>
+            </a:endParaRPr>
+          </a:p>
+          <a:p>
+            <a:endParaRPr lang="nb-NO" dirty="0">
+              <a:latin typeface="Arial" panose="020B0604020202020204" pitchFamily="34" charset="0"/>
+              <a:cs typeface="Arial" panose="020B0604020202020204" pitchFamily="34" charset="0"/>
+            </a:endParaRPr>
           </a:p>
         </p:txBody>
       </p:sp>
     </p:spTree>
     <p:extLst>
       <p:ext uri="{BB962C8B-B14F-4D97-AF65-F5344CB8AC3E}">
-        <p14:creationId xmlns:p14="http://schemas.microsoft.com/office/powerpoint/2010/main" val="2941787461"/>
+        <p14:creationId xmlns:p14="http://schemas.microsoft.com/office/powerpoint/2010/main" val="2511124853"/>
       </p:ext>
     </p:extLst>
   </p:cSld>
@@ -4004,7 +4044,7 @@
         </p:nvSpPr>
         <p:spPr>
           <a:xfrm>
-            <a:off x="900087" y="1734160"/>
+            <a:off x="838200" y="365125"/>
             <a:ext cx="10515600" cy="1325563"/>
           </a:xfrm>
         </p:spPr>
@@ -4012,30 +4052,19 @@
           <a:bodyPr/>
           <a:lstStyle/>
           <a:p>
-            <a:pPr algn="ctr"/>
-            <a:r>
-              <a:rPr lang="en-US" sz="8000" dirty="0">
-                <a:latin typeface="Arial" panose="020B0604020202020204" pitchFamily="34" charset="0"/>
-                <a:cs typeface="Arial" panose="020B0604020202020204" pitchFamily="34" charset="0"/>
-              </a:rPr>
-              <a:t>HTTP Methods</a:t>
-            </a:r>
-            <a:endParaRPr lang="en-US" dirty="0">
-              <a:latin typeface="Arial" panose="020B0604020202020204" pitchFamily="34" charset="0"/>
-              <a:cs typeface="Arial" panose="020B0604020202020204" pitchFamily="34" charset="0"/>
-            </a:endParaRPr>
-          </a:p>
-        </p:txBody>
-      </p:sp>
-      <p:sp>
-        <p:nvSpPr>
-          <p:cNvPr id="3" name="Content Placeholder 2">
-            <a:extLst>
-              <a:ext uri="{FF2B5EF4-FFF2-40B4-BE49-F238E27FC236}">
-                <a16:creationId xmlns:a16="http://schemas.microsoft.com/office/drawing/2014/main" id="{BE3FB728-F36C-4A19-84C0-7B717486095B}"/>
-              </a:ext>
-            </a:extLst>
-          </p:cNvPr>
+            <a:r>
+              <a:rPr lang="en-US" dirty="0">
+                <a:latin typeface="Arial" panose="020B0604020202020204" pitchFamily="34" charset="0"/>
+                <a:cs typeface="Arial" panose="020B0604020202020204" pitchFamily="34" charset="0"/>
+              </a:rPr>
+              <a:t>Status</a:t>
+            </a:r>
+          </a:p>
+        </p:txBody>
+      </p:sp>
+      <p:sp>
+        <p:nvSpPr>
+          <p:cNvPr id="3" name="Content Placeholder 2"/>
           <p:cNvSpPr>
             <a:spLocks noGrp="1"/>
           </p:cNvSpPr>
@@ -4043,42 +4072,28 @@
             <p:ph idx="1"/>
           </p:nvPr>
         </p:nvSpPr>
-        <p:spPr>
-          <a:xfrm>
-            <a:off x="838200" y="3798277"/>
-            <a:ext cx="10515600" cy="2378686"/>
-          </a:xfrm>
-        </p:spPr>
+        <p:spPr/>
         <p:txBody>
           <a:bodyPr>
             <a:normAutofit/>
           </a:bodyPr>
           <a:lstStyle/>
           <a:p>
-            <a:pPr marL="0" indent="0" algn="ctr">
-              <a:buNone/>
-            </a:pPr>
-            <a:r>
-              <a:rPr lang="nb-NO" dirty="0">
-                <a:latin typeface="Arial" panose="020B0604020202020204" pitchFamily="34" charset="0"/>
-                <a:cs typeface="Arial" panose="020B0604020202020204" pitchFamily="34" charset="0"/>
-              </a:rPr>
-              <a:t>Small note: if an HTTP method requires JSON data to be passed in, a request should have a Content-Type: application/json header. See </a:t>
-            </a:r>
-            <a:r>
-              <a:rPr lang="nb-NO" dirty="0">
-                <a:latin typeface="Arial" panose="020B0604020202020204" pitchFamily="34" charset="0"/>
-                <a:cs typeface="Arial" panose="020B0604020202020204" pitchFamily="34" charset="0"/>
-                <a:hlinkClick r:id="rId2"/>
-              </a:rPr>
-              <a:t>https://stackoverflow.com/questions/44959749/fetch-with-headers</a:t>
-            </a:r>
-            <a:r>
-              <a:rPr lang="nb-NO" dirty="0">
-                <a:latin typeface="Arial" panose="020B0604020202020204" pitchFamily="34" charset="0"/>
-                <a:cs typeface="Arial" panose="020B0604020202020204" pitchFamily="34" charset="0"/>
-              </a:rPr>
-              <a:t> for an example.</a:t>
+            <a:r>
+              <a:rPr lang="nb-NO" dirty="0">
+                <a:latin typeface="Arial" panose="020B0604020202020204" pitchFamily="34" charset="0"/>
+                <a:cs typeface="Arial" panose="020B0604020202020204" pitchFamily="34" charset="0"/>
+              </a:rPr>
+              <a:t>event: Boolean that keeps track of whether or not an event is taking place</a:t>
+            </a:r>
+          </a:p>
+          <a:p>
+            <a:r>
+              <a:rPr lang="nb-NO" dirty="0">
+                <a:latin typeface="Arial" panose="020B0604020202020204" pitchFamily="34" charset="0"/>
+                <a:cs typeface="Arial" panose="020B0604020202020204" pitchFamily="34" charset="0"/>
+              </a:rPr>
+              <a:t>news: String(256) that displays on login</a:t>
             </a:r>
           </a:p>
         </p:txBody>
@@ -4086,7 +4101,7 @@
     </p:spTree>
     <p:extLst>
       <p:ext uri="{BB962C8B-B14F-4D97-AF65-F5344CB8AC3E}">
-        <p14:creationId xmlns:p14="http://schemas.microsoft.com/office/powerpoint/2010/main" val="4062299613"/>
+        <p14:creationId xmlns:p14="http://schemas.microsoft.com/office/powerpoint/2010/main" val="2941787461"/>
       </p:ext>
     </p:extLst>
   </p:cSld>
@@ -4125,7 +4140,7 @@
         </p:nvSpPr>
         <p:spPr>
           <a:xfrm>
-            <a:off x="838200" y="365125"/>
+            <a:off x="900087" y="1734160"/>
             <a:ext cx="10515600" cy="1325563"/>
           </a:xfrm>
         </p:spPr>
@@ -4133,19 +4148,30 @@
           <a:bodyPr/>
           <a:lstStyle/>
           <a:p>
-            <a:r>
-              <a:rPr lang="en-US" dirty="0">
-                <a:latin typeface="Arial" panose="020B0604020202020204" pitchFamily="34" charset="0"/>
-                <a:cs typeface="Arial" panose="020B0604020202020204" pitchFamily="34" charset="0"/>
-              </a:rPr>
-              <a:t>/login</a:t>
-            </a:r>
-          </a:p>
-        </p:txBody>
-      </p:sp>
-      <p:sp>
-        <p:nvSpPr>
-          <p:cNvPr id="3" name="Content Placeholder 2"/>
+            <a:pPr algn="ctr"/>
+            <a:r>
+              <a:rPr lang="en-US" sz="8000" dirty="0">
+                <a:latin typeface="Arial" panose="020B0604020202020204" pitchFamily="34" charset="0"/>
+                <a:cs typeface="Arial" panose="020B0604020202020204" pitchFamily="34" charset="0"/>
+              </a:rPr>
+              <a:t>HTTP Methods</a:t>
+            </a:r>
+            <a:endParaRPr lang="en-US" dirty="0">
+              <a:latin typeface="Arial" panose="020B0604020202020204" pitchFamily="34" charset="0"/>
+              <a:cs typeface="Arial" panose="020B0604020202020204" pitchFamily="34" charset="0"/>
+            </a:endParaRPr>
+          </a:p>
+        </p:txBody>
+      </p:sp>
+      <p:sp>
+        <p:nvSpPr>
+          <p:cNvPr id="3" name="Content Placeholder 2">
+            <a:extLst>
+              <a:ext uri="{FF2B5EF4-FFF2-40B4-BE49-F238E27FC236}">
+                <a16:creationId xmlns:a16="http://schemas.microsoft.com/office/drawing/2014/main" id="{BE3FB728-F36C-4A19-84C0-7B717486095B}"/>
+              </a:ext>
+            </a:extLst>
+          </p:cNvPr>
           <p:cNvSpPr>
             <a:spLocks noGrp="1"/>
           </p:cNvSpPr>
@@ -4153,42 +4179,50 @@
             <p:ph idx="1"/>
           </p:nvPr>
         </p:nvSpPr>
-        <p:spPr/>
+        <p:spPr>
+          <a:xfrm>
+            <a:off x="838200" y="3798277"/>
+            <a:ext cx="10515600" cy="2378686"/>
+          </a:xfrm>
+        </p:spPr>
         <p:txBody>
           <a:bodyPr>
             <a:normAutofit/>
           </a:bodyPr>
           <a:lstStyle/>
           <a:p>
-            <a:r>
-              <a:rPr lang="nb-NO" dirty="0">
-                <a:latin typeface="Arial" panose="020B0604020202020204" pitchFamily="34" charset="0"/>
-                <a:cs typeface="Arial" panose="020B0604020202020204" pitchFamily="34" charset="0"/>
-              </a:rPr>
-              <a:t>POST json w/ "username", "password_hash", "email" to users and the user will be added to the database, returns json with «status»: «ok» or «error», and «user_id» if successful</a:t>
-            </a:r>
-          </a:p>
-          <a:p>
-            <a:r>
-              <a:rPr lang="nb-NO" dirty="0">
-                <a:latin typeface="Arial" panose="020B0604020202020204" pitchFamily="34" charset="0"/>
-                <a:cs typeface="Arial" panose="020B0604020202020204" pitchFamily="34" charset="0"/>
-              </a:rPr>
-              <a:t>GET method w/ params «username» and «password_hash» will return «status»: «ok» or «error» based on whether or not the login attempt was successful, and «user_id» if successful</a:t>
-            </a:r>
-          </a:p>
-          <a:p>
-            <a:endParaRPr lang="nb-NO" dirty="0">
-              <a:latin typeface="Arial" panose="020B0604020202020204" pitchFamily="34" charset="0"/>
-              <a:cs typeface="Arial" panose="020B0604020202020204" pitchFamily="34" charset="0"/>
-            </a:endParaRPr>
+            <a:pPr marL="0" indent="0" algn="ctr">
+              <a:buNone/>
+            </a:pPr>
+            <a:r>
+              <a:rPr lang="nb-NO" dirty="0">
+                <a:latin typeface="Arial" panose="020B0604020202020204" pitchFamily="34" charset="0"/>
+                <a:cs typeface="Arial" panose="020B0604020202020204" pitchFamily="34" charset="0"/>
+              </a:rPr>
+              <a:t>Small note: if an HTTP method requires JSON data to be passed in, a request should have a Content-Type: application/json header. See </a:t>
+            </a:r>
+            <a:r>
+              <a:rPr lang="nb-NO" dirty="0">
+                <a:latin typeface="Arial" panose="020B0604020202020204" pitchFamily="34" charset="0"/>
+                <a:cs typeface="Arial" panose="020B0604020202020204" pitchFamily="34" charset="0"/>
+                <a:hlinkClick r:id="rId2"/>
+              </a:rPr>
+              <a:t>https://stackoverflow.com/questions/44959749/fetch-with-headers</a:t>
+            </a:r>
+            <a:r>
+              <a:rPr lang="nb-NO" dirty="0">
+                <a:latin typeface="Arial" panose="020B0604020202020204" pitchFamily="34" charset="0"/>
+                <a:cs typeface="Arial" panose="020B0604020202020204" pitchFamily="34" charset="0"/>
+              </a:rPr>
+              <a:t> for an example.</a:t>
+            </a:r>
           </a:p>
         </p:txBody>
       </p:sp>
     </p:spTree>
     <p:extLst>
       <p:ext uri="{BB962C8B-B14F-4D97-AF65-F5344CB8AC3E}">
-        <p14:creationId xmlns:p14="http://schemas.microsoft.com/office/powerpoint/2010/main" val="199329726"/>
+        <p14:creationId xmlns:p14="http://schemas.microsoft.com/office/powerpoint/2010/main" val="4062299613"/>
       </p:ext>
     </p:extLst>
   </p:cSld>
@@ -4240,7 +4274,7 @@
                 <a:latin typeface="Arial" panose="020B0604020202020204" pitchFamily="34" charset="0"/>
                 <a:cs typeface="Arial" panose="020B0604020202020204" pitchFamily="34" charset="0"/>
               </a:rPr>
-              <a:t>/users</a:t>
+              <a:t>/login</a:t>
             </a:r>
           </a:p>
         </p:txBody>
@@ -4267,24 +4301,30 @@
                 <a:latin typeface="Arial" panose="020B0604020202020204" pitchFamily="34" charset="0"/>
                 <a:cs typeface="Arial" panose="020B0604020202020204" pitchFamily="34" charset="0"/>
               </a:rPr>
-              <a:t>GET method w/ params «user_id» and returns json of username, email, name, login_days, last_login, and planet_id</a:t>
-            </a:r>
-          </a:p>
-          <a:p>
-            <a:r>
-              <a:rPr lang="nb-NO" dirty="0">
-                <a:latin typeface="Arial" panose="020B0604020202020204" pitchFamily="34" charset="0"/>
-                <a:cs typeface="Arial" panose="020B0604020202020204" pitchFamily="34" charset="0"/>
-              </a:rPr>
-              <a:t>PATCH method w/ params «user_id» will update last_login, and if the new last_login is on a different day, increases login_days by 1 and returns json with «new_day»: true, otherwise returns «new_day»: false, and regardless also returns login_days</a:t>
-            </a:r>
+              <a:t>POST json w/ "username", "password_hash", "email" to users and the user will be added to the database, returns json with «status»: «ok» or «error», and «user_id» if successful</a:t>
+            </a:r>
+          </a:p>
+          <a:p>
+            <a:r>
+              <a:rPr lang="nb-NO" dirty="0">
+                <a:latin typeface="Arial" panose="020B0604020202020204" pitchFamily="34" charset="0"/>
+                <a:cs typeface="Arial" panose="020B0604020202020204" pitchFamily="34" charset="0"/>
+              </a:rPr>
+              <a:t>GET method w/ params «username» and «password_hash» will return «status»: «ok» or «error» based on whether or not the login attempt was successful, and «user_id» if successful</a:t>
+            </a:r>
+          </a:p>
+          <a:p>
+            <a:endParaRPr lang="nb-NO" dirty="0">
+              <a:latin typeface="Arial" panose="020B0604020202020204" pitchFamily="34" charset="0"/>
+              <a:cs typeface="Arial" panose="020B0604020202020204" pitchFamily="34" charset="0"/>
+            </a:endParaRPr>
           </a:p>
         </p:txBody>
       </p:sp>
     </p:spTree>
     <p:extLst>
       <p:ext uri="{BB962C8B-B14F-4D97-AF65-F5344CB8AC3E}">
-        <p14:creationId xmlns:p14="http://schemas.microsoft.com/office/powerpoint/2010/main" val="696820992"/>
+        <p14:creationId xmlns:p14="http://schemas.microsoft.com/office/powerpoint/2010/main" val="199329726"/>
       </p:ext>
     </p:extLst>
   </p:cSld>
@@ -4336,7 +4376,7 @@
                 <a:latin typeface="Arial" panose="020B0604020202020204" pitchFamily="34" charset="0"/>
                 <a:cs typeface="Arial" panose="020B0604020202020204" pitchFamily="34" charset="0"/>
               </a:rPr>
-              <a:t>/visitors</a:t>
+              <a:t>/users</a:t>
             </a:r>
           </a:p>
         </p:txBody>
@@ -4354,7 +4394,7 @@
         <p:spPr/>
         <p:txBody>
           <a:bodyPr>
-            <a:normAutofit fontScale="55000" lnSpcReduction="20000"/>
+            <a:normAutofit/>
           </a:bodyPr>
           <a:lstStyle/>
           <a:p>
@@ -4363,174 +4403,24 @@
                 <a:latin typeface="Arial" panose="020B0604020202020204" pitchFamily="34" charset="0"/>
                 <a:cs typeface="Arial" panose="020B0604020202020204" pitchFamily="34" charset="0"/>
               </a:rPr>
-              <a:t>POST method w/ params «visitor_id» and «visited_id» adds a relationship between the Users</a:t>
-            </a:r>
-          </a:p>
-          <a:p>
-            <a:r>
-              <a:rPr lang="nb-NO" dirty="0">
-                <a:latin typeface="Arial" panose="020B0604020202020204" pitchFamily="34" charset="0"/>
-                <a:cs typeface="Arial" panose="020B0604020202020204" pitchFamily="34" charset="0"/>
-              </a:rPr>
-              <a:t>GET method w/ params «user_id» returns json that contains each user_id they’ve visited</a:t>
-            </a:r>
-          </a:p>
-          <a:p>
-            <a:r>
-              <a:rPr lang="nb-NO" dirty="0">
-                <a:latin typeface="Arial" panose="020B0604020202020204" pitchFamily="34" charset="0"/>
-                <a:cs typeface="Arial" panose="020B0604020202020204" pitchFamily="34" charset="0"/>
-              </a:rPr>
-              <a:t>DELETE method w/ params «user_id» takes note that that user has updated their planet, and removes all relationships where visited is the user</a:t>
-            </a:r>
-          </a:p>
-          <a:p>
-            <a:pPr marL="0" indent="0">
-              <a:buNone/>
-            </a:pPr>
-            <a:r>
-              <a:rPr lang="nb-NO" dirty="0">
-                <a:latin typeface="Arial" panose="020B0604020202020204" pitchFamily="34" charset="0"/>
-                <a:cs typeface="Arial" panose="020B0604020202020204" pitchFamily="34" charset="0"/>
-              </a:rPr>
-              <a:t>{</a:t>
-            </a:r>
-          </a:p>
-          <a:p>
-            <a:pPr marL="0" indent="0">
-              <a:buNone/>
-            </a:pPr>
-            <a:r>
-              <a:rPr lang="nb-NO" dirty="0">
-                <a:latin typeface="Arial" panose="020B0604020202020204" pitchFamily="34" charset="0"/>
-                <a:cs typeface="Arial" panose="020B0604020202020204" pitchFamily="34" charset="0"/>
-              </a:rPr>
-              <a:t>«results»:</a:t>
-            </a:r>
-          </a:p>
-          <a:p>
-            <a:pPr marL="0" indent="0">
-              <a:buNone/>
-            </a:pPr>
-            <a:r>
-              <a:rPr lang="nb-NO" dirty="0">
-                <a:latin typeface="Arial" panose="020B0604020202020204" pitchFamily="34" charset="0"/>
-                <a:cs typeface="Arial" panose="020B0604020202020204" pitchFamily="34" charset="0"/>
-              </a:rPr>
-              <a:t>	[</a:t>
-            </a:r>
-          </a:p>
-          <a:p>
-            <a:pPr marL="0" indent="0">
-              <a:buNone/>
-            </a:pPr>
-            <a:r>
-              <a:rPr lang="nb-NO" dirty="0">
-                <a:latin typeface="Arial" panose="020B0604020202020204" pitchFamily="34" charset="0"/>
-                <a:cs typeface="Arial" panose="020B0604020202020204" pitchFamily="34" charset="0"/>
-              </a:rPr>
-              <a:t>		{</a:t>
-            </a:r>
-          </a:p>
-          <a:p>
-            <a:pPr marL="0" indent="0">
-              <a:buNone/>
-            </a:pPr>
-            <a:r>
-              <a:rPr lang="nb-NO" dirty="0">
-                <a:latin typeface="Arial" panose="020B0604020202020204" pitchFamily="34" charset="0"/>
-                <a:cs typeface="Arial" panose="020B0604020202020204" pitchFamily="34" charset="0"/>
-              </a:rPr>
-              <a:t>			«id»: 9</a:t>
-            </a:r>
-          </a:p>
-          <a:p>
-            <a:pPr marL="0" indent="0">
-              <a:buNone/>
-            </a:pPr>
-            <a:r>
-              <a:rPr lang="nb-NO" dirty="0">
-                <a:latin typeface="Arial" panose="020B0604020202020204" pitchFamily="34" charset="0"/>
-                <a:cs typeface="Arial" panose="020B0604020202020204" pitchFamily="34" charset="0"/>
-              </a:rPr>
-              <a:t>		},</a:t>
-            </a:r>
-          </a:p>
-          <a:p>
-            <a:pPr marL="0" indent="0">
-              <a:buNone/>
-            </a:pPr>
-            <a:r>
-              <a:rPr lang="nb-NO" dirty="0">
-                <a:latin typeface="Arial" panose="020B0604020202020204" pitchFamily="34" charset="0"/>
-                <a:cs typeface="Arial" panose="020B0604020202020204" pitchFamily="34" charset="0"/>
-              </a:rPr>
-              <a:t>		{</a:t>
-            </a:r>
-          </a:p>
-          <a:p>
-            <a:pPr marL="0" indent="0">
-              <a:buNone/>
-            </a:pPr>
-            <a:r>
-              <a:rPr lang="nb-NO" dirty="0">
-                <a:latin typeface="Arial" panose="020B0604020202020204" pitchFamily="34" charset="0"/>
-                <a:cs typeface="Arial" panose="020B0604020202020204" pitchFamily="34" charset="0"/>
-              </a:rPr>
-              <a:t>			«id»: 10</a:t>
-            </a:r>
-          </a:p>
-          <a:p>
-            <a:pPr marL="0" indent="0">
-              <a:buNone/>
-            </a:pPr>
-            <a:r>
-              <a:rPr lang="nb-NO" dirty="0">
-                <a:latin typeface="Arial" panose="020B0604020202020204" pitchFamily="34" charset="0"/>
-                <a:cs typeface="Arial" panose="020B0604020202020204" pitchFamily="34" charset="0"/>
-              </a:rPr>
-              <a:t>		}</a:t>
-            </a:r>
-          </a:p>
-          <a:p>
-            <a:pPr marL="0" indent="0">
-              <a:buNone/>
-            </a:pPr>
-            <a:r>
-              <a:rPr lang="nb-NO" dirty="0">
-                <a:latin typeface="Arial" panose="020B0604020202020204" pitchFamily="34" charset="0"/>
-                <a:cs typeface="Arial" panose="020B0604020202020204" pitchFamily="34" charset="0"/>
-              </a:rPr>
-              <a:t>	]</a:t>
-            </a:r>
-          </a:p>
-          <a:p>
-            <a:pPr marL="0" indent="0">
-              <a:buNone/>
-            </a:pPr>
-            <a:r>
-              <a:rPr lang="nb-NO" dirty="0">
-                <a:latin typeface="Arial" panose="020B0604020202020204" pitchFamily="34" charset="0"/>
-                <a:cs typeface="Arial" panose="020B0604020202020204" pitchFamily="34" charset="0"/>
-              </a:rPr>
-              <a:t>}</a:t>
-            </a:r>
-          </a:p>
-          <a:p>
-            <a:pPr marL="0" indent="0">
-              <a:buNone/>
-            </a:pPr>
-            <a:endParaRPr lang="nb-NO" dirty="0">
-              <a:latin typeface="Arial" panose="020B0604020202020204" pitchFamily="34" charset="0"/>
-              <a:cs typeface="Arial" panose="020B0604020202020204" pitchFamily="34" charset="0"/>
-            </a:endParaRPr>
+              <a:t>GET method w/ params «user_id» and returns json of username, email, name, login_days, last_login, and planet_id</a:t>
+            </a:r>
+          </a:p>
+          <a:p>
+            <a:r>
+              <a:rPr lang="nb-NO" dirty="0">
+                <a:latin typeface="Arial" panose="020B0604020202020204" pitchFamily="34" charset="0"/>
+                <a:cs typeface="Arial" panose="020B0604020202020204" pitchFamily="34" charset="0"/>
+              </a:rPr>
+              <a:t>PATCH method w/ params «user_id» will update last_login, and if the new last_login is on a different day, increases login_days by 1 and returns json with «new_day»: true, otherwise returns «new_day»: false, and regardless also returns login_days</a:t>
+            </a:r>
           </a:p>
         </p:txBody>
       </p:sp>
     </p:spTree>
     <p:extLst>
       <p:ext uri="{BB962C8B-B14F-4D97-AF65-F5344CB8AC3E}">
-        <p14:creationId xmlns:p14="http://schemas.microsoft.com/office/powerpoint/2010/main" val="1092747602"/>
+        <p14:creationId xmlns:p14="http://schemas.microsoft.com/office/powerpoint/2010/main" val="696820992"/>
       </p:ext>
     </p:extLst>
   </p:cSld>
@@ -4582,7 +4472,7 @@
                 <a:latin typeface="Arial" panose="020B0604020202020204" pitchFamily="34" charset="0"/>
                 <a:cs typeface="Arial" panose="020B0604020202020204" pitchFamily="34" charset="0"/>
               </a:rPr>
-              <a:t>/galaxies</a:t>
+              <a:t>/visitors</a:t>
             </a:r>
           </a:p>
         </p:txBody>
@@ -4609,7 +4499,25 @@
                 <a:latin typeface="Arial" panose="020B0604020202020204" pitchFamily="34" charset="0"/>
                 <a:cs typeface="Arial" panose="020B0604020202020204" pitchFamily="34" charset="0"/>
               </a:rPr>
-              <a:t>GET method will return json that contains each Galaxy and its variables, for example:</a:t>
+              <a:t>POST method w/ params «visitor_id» and «visited_id» adds a relationship between the Users</a:t>
+            </a:r>
+          </a:p>
+          <a:p>
+            <a:r>
+              <a:rPr lang="nb-NO" dirty="0">
+                <a:latin typeface="Arial" panose="020B0604020202020204" pitchFamily="34" charset="0"/>
+                <a:cs typeface="Arial" panose="020B0604020202020204" pitchFamily="34" charset="0"/>
+              </a:rPr>
+              <a:t>GET method w/ params «user_id» returns json that contains each user_id they’ve visited</a:t>
+            </a:r>
+          </a:p>
+          <a:p>
+            <a:r>
+              <a:rPr lang="nb-NO" dirty="0">
+                <a:latin typeface="Arial" panose="020B0604020202020204" pitchFamily="34" charset="0"/>
+                <a:cs typeface="Arial" panose="020B0604020202020204" pitchFamily="34" charset="0"/>
+              </a:rPr>
+              <a:t>DELETE method w/ params «user_id» takes note that that user has updated their planet, and removes all relationships where visited is the user</a:t>
             </a:r>
           </a:p>
           <a:p>
@@ -4645,7 +4553,7 @@
                 <a:latin typeface="Arial" panose="020B0604020202020204" pitchFamily="34" charset="0"/>
                 <a:cs typeface="Arial" panose="020B0604020202020204" pitchFamily="34" charset="0"/>
               </a:rPr>
-              <a:t>	[,</a:t>
+              <a:t>	[</a:t>
             </a:r>
           </a:p>
           <a:p>
@@ -4669,7 +4577,7 @@
                 <a:latin typeface="Arial" panose="020B0604020202020204" pitchFamily="34" charset="0"/>
                 <a:cs typeface="Arial" panose="020B0604020202020204" pitchFamily="34" charset="0"/>
               </a:rPr>
-              <a:t>			«id»: «0»,</a:t>
+              <a:t>			«id»: 9</a:t>
             </a:r>
           </a:p>
           <a:p>
@@ -4681,7 +4589,7 @@
                 <a:latin typeface="Arial" panose="020B0604020202020204" pitchFamily="34" charset="0"/>
                 <a:cs typeface="Arial" panose="020B0604020202020204" pitchFamily="34" charset="0"/>
               </a:rPr>
-              <a:t>			«name»: «Build-It-Yourself Galaxy»,</a:t>
+              <a:t>		},</a:t>
             </a:r>
           </a:p>
           <a:p>
@@ -4693,7 +4601,7 @@
                 <a:latin typeface="Arial" panose="020B0604020202020204" pitchFamily="34" charset="0"/>
                 <a:cs typeface="Arial" panose="020B0604020202020204" pitchFamily="34" charset="0"/>
               </a:rPr>
-              <a:t>			«description»: «Where way cool inventors dwell.»,</a:t>
+              <a:t>		{</a:t>
             </a:r>
           </a:p>
           <a:p>
@@ -4705,7 +4613,7 @@
                 <a:latin typeface="Arial" panose="020B0604020202020204" pitchFamily="34" charset="0"/>
                 <a:cs typeface="Arial" panose="020B0604020202020204" pitchFamily="34" charset="0"/>
               </a:rPr>
-              <a:t>			...</a:t>
+              <a:t>			«id»: 10</a:t>
             </a:r>
           </a:p>
           <a:p>
@@ -4717,7 +4625,7 @@
                 <a:latin typeface="Arial" panose="020B0604020202020204" pitchFamily="34" charset="0"/>
                 <a:cs typeface="Arial" panose="020B0604020202020204" pitchFamily="34" charset="0"/>
               </a:rPr>
-              <a:t>		},</a:t>
+              <a:t>		}</a:t>
             </a:r>
           </a:p>
           <a:p>
@@ -4729,7 +4637,7 @@
                 <a:latin typeface="Arial" panose="020B0604020202020204" pitchFamily="34" charset="0"/>
                 <a:cs typeface="Arial" panose="020B0604020202020204" pitchFamily="34" charset="0"/>
               </a:rPr>
-              <a:t>		...</a:t>
+              <a:t>	]</a:t>
             </a:r>
           </a:p>
           <a:p>
@@ -4741,36 +4649,24 @@
                 <a:latin typeface="Arial" panose="020B0604020202020204" pitchFamily="34" charset="0"/>
                 <a:cs typeface="Arial" panose="020B0604020202020204" pitchFamily="34" charset="0"/>
               </a:rPr>
-              <a:t>	]</a:t>
+              <a:t>}</a:t>
             </a:r>
           </a:p>
           <a:p>
             <a:pPr marL="0" indent="0">
               <a:buNone/>
             </a:pPr>
-            <a:r>
-              <a:rPr lang="nb-NO" dirty="0">
-                <a:latin typeface="Arial" panose="020B0604020202020204" pitchFamily="34" charset="0"/>
-                <a:cs typeface="Arial" panose="020B0604020202020204" pitchFamily="34" charset="0"/>
-              </a:rPr>
-              <a:t>}</a:t>
-            </a:r>
-          </a:p>
-          <a:p>
-            <a:r>
-              <a:rPr lang="nb-NO" dirty="0">
-                <a:latin typeface="Arial" panose="020B0604020202020204" pitchFamily="34" charset="0"/>
-                <a:cs typeface="Arial" panose="020B0604020202020204" pitchFamily="34" charset="0"/>
-              </a:rPr>
-              <a:t>POST method with json «name», «description», «x», «y», and «image» will create a galaxy</a:t>
-            </a:r>
+            <a:endParaRPr lang="nb-NO" dirty="0">
+              <a:latin typeface="Arial" panose="020B0604020202020204" pitchFamily="34" charset="0"/>
+              <a:cs typeface="Arial" panose="020B0604020202020204" pitchFamily="34" charset="0"/>
+            </a:endParaRPr>
           </a:p>
         </p:txBody>
       </p:sp>
     </p:spTree>
     <p:extLst>
       <p:ext uri="{BB962C8B-B14F-4D97-AF65-F5344CB8AC3E}">
-        <p14:creationId xmlns:p14="http://schemas.microsoft.com/office/powerpoint/2010/main" val="1557958327"/>
+        <p14:creationId xmlns:p14="http://schemas.microsoft.com/office/powerpoint/2010/main" val="1092747602"/>
       </p:ext>
     </p:extLst>
   </p:cSld>
@@ -4822,7 +4718,7 @@
                 <a:latin typeface="Arial" panose="020B0604020202020204" pitchFamily="34" charset="0"/>
                 <a:cs typeface="Arial" panose="020B0604020202020204" pitchFamily="34" charset="0"/>
               </a:rPr>
-              <a:t>/systems</a:t>
+              <a:t>/galaxies</a:t>
             </a:r>
           </a:p>
         </p:txBody>
@@ -4849,7 +4745,7 @@
                 <a:latin typeface="Arial" panose="020B0604020202020204" pitchFamily="34" charset="0"/>
                 <a:cs typeface="Arial" panose="020B0604020202020204" pitchFamily="34" charset="0"/>
               </a:rPr>
-              <a:t>GET method with params «galaxy_id» will return json that contains each System and its variables, for example:</a:t>
+              <a:t>GET method will return json that contains each Galaxy and its variables, for example:</a:t>
             </a:r>
           </a:p>
           <a:p>
@@ -4885,7 +4781,7 @@
                 <a:latin typeface="Arial" panose="020B0604020202020204" pitchFamily="34" charset="0"/>
                 <a:cs typeface="Arial" panose="020B0604020202020204" pitchFamily="34" charset="0"/>
               </a:rPr>
-              <a:t>	[</a:t>
+              <a:t>	[,</a:t>
             </a:r>
           </a:p>
           <a:p>
@@ -4921,7 +4817,7 @@
                 <a:latin typeface="Arial" panose="020B0604020202020204" pitchFamily="34" charset="0"/>
                 <a:cs typeface="Arial" panose="020B0604020202020204" pitchFamily="34" charset="0"/>
               </a:rPr>
-              <a:t>			«name»: «Solaris»,</a:t>
+              <a:t>			«name»: «Build-It-Yourself Galaxy»,</a:t>
             </a:r>
           </a:p>
           <a:p>
@@ -4933,7 +4829,7 @@
                 <a:latin typeface="Arial" panose="020B0604020202020204" pitchFamily="34" charset="0"/>
                 <a:cs typeface="Arial" panose="020B0604020202020204" pitchFamily="34" charset="0"/>
               </a:rPr>
-              <a:t>			«quadrant»: «4»,</a:t>
+              <a:t>			«description»: «Where way cool inventors dwell.»,</a:t>
             </a:r>
           </a:p>
           <a:p>
@@ -5002,30 +4898,15 @@
                 <a:latin typeface="Arial" panose="020B0604020202020204" pitchFamily="34" charset="0"/>
                 <a:cs typeface="Arial" panose="020B0604020202020204" pitchFamily="34" charset="0"/>
               </a:rPr>
-              <a:t>GET method with params «system_id» will return json with information on just that system and its variables</a:t>
-            </a:r>
-          </a:p>
-          <a:p>
-            <a:r>
-              <a:rPr lang="nb-NO" dirty="0">
-                <a:latin typeface="Arial" panose="020B0604020202020204" pitchFamily="34" charset="0"/>
-                <a:cs typeface="Arial" panose="020B0604020202020204" pitchFamily="34" charset="0"/>
-              </a:rPr>
-              <a:t>POST method with json «galaxy_id», «name», «quadrant», «x», «y», and «image» will create a system</a:t>
-            </a:r>
-          </a:p>
-          <a:p>
-            <a:endParaRPr lang="nb-NO" dirty="0">
-              <a:latin typeface="Arial" panose="020B0604020202020204" pitchFamily="34" charset="0"/>
-              <a:cs typeface="Arial" panose="020B0604020202020204" pitchFamily="34" charset="0"/>
-            </a:endParaRPr>
+              <a:t>POST method with json «name», «description», «x», «y», and «image» will create a galaxy</a:t>
+            </a:r>
           </a:p>
         </p:txBody>
       </p:sp>
     </p:spTree>
     <p:extLst>
       <p:ext uri="{BB962C8B-B14F-4D97-AF65-F5344CB8AC3E}">
-        <p14:creationId xmlns:p14="http://schemas.microsoft.com/office/powerpoint/2010/main" val="254303226"/>
+        <p14:creationId xmlns:p14="http://schemas.microsoft.com/office/powerpoint/2010/main" val="1557958327"/>
       </p:ext>
     </p:extLst>
   </p:cSld>
@@ -5339,7 +5220,7 @@
                 <a:latin typeface="Arial" panose="020B0604020202020204" pitchFamily="34" charset="0"/>
                 <a:cs typeface="Arial" panose="020B0604020202020204" pitchFamily="34" charset="0"/>
               </a:rPr>
-              <a:t>/planets</a:t>
+              <a:t>/systems</a:t>
             </a:r>
           </a:p>
         </p:txBody>
@@ -5354,15 +5235,10 @@
             <p:ph idx="1"/>
           </p:nvPr>
         </p:nvSpPr>
-        <p:spPr>
-          <a:xfrm>
-            <a:off x="838200" y="1825625"/>
-            <a:ext cx="10515600" cy="4610686"/>
-          </a:xfrm>
-        </p:spPr>
+        <p:spPr/>
         <p:txBody>
           <a:bodyPr>
-            <a:normAutofit fontScale="47500" lnSpcReduction="20000"/>
+            <a:normAutofit fontScale="55000" lnSpcReduction="20000"/>
           </a:bodyPr>
           <a:lstStyle/>
           <a:p>
@@ -5371,7 +5247,7 @@
                 <a:latin typeface="Arial" panose="020B0604020202020204" pitchFamily="34" charset="0"/>
                 <a:cs typeface="Arial" panose="020B0604020202020204" pitchFamily="34" charset="0"/>
               </a:rPr>
-              <a:t>GET method with params «system_id» will return json that contains each Planet’s variables, for example:</a:t>
+              <a:t>GET method with params «galaxy_id» will return json that contains each System and its variables, for example:</a:t>
             </a:r>
           </a:p>
           <a:p>
@@ -5443,7 +5319,7 @@
                 <a:latin typeface="Arial" panose="020B0604020202020204" pitchFamily="34" charset="0"/>
                 <a:cs typeface="Arial" panose="020B0604020202020204" pitchFamily="34" charset="0"/>
               </a:rPr>
-              <a:t>			«owner_id»: «6»,</a:t>
+              <a:t>			«name»: «Solaris»,</a:t>
             </a:r>
           </a:p>
           <a:p>
@@ -5455,7 +5331,7 @@
                 <a:latin typeface="Arial" panose="020B0604020202020204" pitchFamily="34" charset="0"/>
                 <a:cs typeface="Arial" panose="020B0604020202020204" pitchFamily="34" charset="0"/>
               </a:rPr>
-              <a:t>			«order»: «0»,</a:t>
+              <a:t>			«quadrant»: «4»,</a:t>
             </a:r>
           </a:p>
           <a:p>
@@ -5524,25 +5400,16 @@
                 <a:latin typeface="Arial" panose="020B0604020202020204" pitchFamily="34" charset="0"/>
                 <a:cs typeface="Arial" panose="020B0604020202020204" pitchFamily="34" charset="0"/>
               </a:rPr>
-              <a:t>GET method with params «user_id» or «planet_id» will return json that contains the Planet’s variables</a:t>
-            </a:r>
-          </a:p>
-          <a:p>
-            <a:r>
-              <a:rPr lang="nb-NO" dirty="0">
-                <a:latin typeface="Arial" panose="020B0604020202020204" pitchFamily="34" charset="0"/>
-                <a:cs typeface="Arial" panose="020B0604020202020204" pitchFamily="34" charset="0"/>
-              </a:rPr>
-              <a:t>PATCH method with json «planet_id», «name», and «user_id» will set the planet’s owner_id to that user_id and rename it in the db. If the user already has a planet, unlinks the old one and removes its name. If the planet already has an owner or the db call fails for some reason, returns json with «status»: «error», otherwise sends «status»: «ok»</a:t>
-            </a:r>
-          </a:p>
-          <a:p>
-            <a:r>
-              <a:rPr lang="nb-NO" dirty="0">
-                <a:latin typeface="Arial" panose="020B0604020202020204" pitchFamily="34" charset="0"/>
-                <a:cs typeface="Arial" panose="020B0604020202020204" pitchFamily="34" charset="0"/>
-              </a:rPr>
-              <a:t>POST method with json «system_id», «order», «size», «surface», and «image» will create a planet</a:t>
+              <a:t>GET method with params «system_id» will return json with information on just that system and its variables</a:t>
+            </a:r>
+          </a:p>
+          <a:p>
+            <a:r>
+              <a:rPr lang="nb-NO" dirty="0">
+                <a:latin typeface="Arial" panose="020B0604020202020204" pitchFamily="34" charset="0"/>
+                <a:cs typeface="Arial" panose="020B0604020202020204" pitchFamily="34" charset="0"/>
+              </a:rPr>
+              <a:t>POST method with json «galaxy_id», «name», «quadrant», «x», «y», and «image» will create a system</a:t>
             </a:r>
           </a:p>
           <a:p>
@@ -5556,7 +5423,7 @@
     </p:spTree>
     <p:extLst>
       <p:ext uri="{BB962C8B-B14F-4D97-AF65-F5344CB8AC3E}">
-        <p14:creationId xmlns:p14="http://schemas.microsoft.com/office/powerpoint/2010/main" val="4061486045"/>
+        <p14:creationId xmlns:p14="http://schemas.microsoft.com/office/powerpoint/2010/main" val="254303226"/>
       </p:ext>
     </p:extLst>
   </p:cSld>
@@ -5608,7 +5475,7 @@
                 <a:latin typeface="Arial" panose="020B0604020202020204" pitchFamily="34" charset="0"/>
                 <a:cs typeface="Arial" panose="020B0604020202020204" pitchFamily="34" charset="0"/>
               </a:rPr>
-              <a:t>/catalog</a:t>
+              <a:t>/planets</a:t>
             </a:r>
           </a:p>
         </p:txBody>
@@ -5623,7 +5490,12 @@
             <p:ph idx="1"/>
           </p:nvPr>
         </p:nvSpPr>
-        <p:spPr/>
+        <p:spPr>
+          <a:xfrm>
+            <a:off x="838200" y="1825625"/>
+            <a:ext cx="10515600" cy="4610686"/>
+          </a:xfrm>
+        </p:spPr>
         <p:txBody>
           <a:bodyPr>
             <a:normAutofit fontScale="47500" lnSpcReduction="20000"/>
@@ -5635,7 +5507,7 @@
                 <a:latin typeface="Arial" panose="020B0604020202020204" pitchFamily="34" charset="0"/>
                 <a:cs typeface="Arial" panose="020B0604020202020204" pitchFamily="34" charset="0"/>
               </a:rPr>
-              <a:t>GET method returns json that contains each CatalogItem there is and their variables, for example:</a:t>
+              <a:t>GET method with params «system_id» will return json that contains each Planet’s variables, for example:</a:t>
             </a:r>
           </a:p>
           <a:p>
@@ -5707,7 +5579,7 @@
                 <a:latin typeface="Arial" panose="020B0604020202020204" pitchFamily="34" charset="0"/>
                 <a:cs typeface="Arial" panose="020B0604020202020204" pitchFamily="34" charset="0"/>
               </a:rPr>
-              <a:t>			«image»: «images/statue.png»,</a:t>
+              <a:t>			«owner_id»: «6»,</a:t>
             </a:r>
           </a:p>
           <a:p>
@@ -5719,7 +5591,7 @@
                 <a:latin typeface="Arial" panose="020B0604020202020204" pitchFamily="34" charset="0"/>
                 <a:cs typeface="Arial" panose="020B0604020202020204" pitchFamily="34" charset="0"/>
               </a:rPr>
-              <a:t>			«available»: «true»,</a:t>
+              <a:t>			«order»: «0»,</a:t>
             </a:r>
           </a:p>
           <a:p>
@@ -5788,24 +5660,39 @@
                 <a:latin typeface="Arial" panose="020B0604020202020204" pitchFamily="34" charset="0"/>
                 <a:cs typeface="Arial" panose="020B0604020202020204" pitchFamily="34" charset="0"/>
               </a:rPr>
-              <a:t>POST method with json «name», «image», «event_specific», «available», «cost1», «cost2», and «cost3» will create a planet</a:t>
-            </a:r>
-          </a:p>
-          <a:p>
-            <a:r>
-              <a:rPr lang="nb-NO" dirty="0">
-                <a:latin typeface="Arial" panose="020B0604020202020204" pitchFamily="34" charset="0"/>
-                <a:cs typeface="Arial" panose="020B0604020202020204" pitchFamily="34" charset="0"/>
-              </a:rPr>
-              <a:t>PATCH method with the param «catalog_id» flips the value of the available variable</a:t>
-            </a:r>
+              <a:t>GET method with params «user_id» or «planet_id» will return json that contains the Planet’s variables</a:t>
+            </a:r>
+          </a:p>
+          <a:p>
+            <a:r>
+              <a:rPr lang="nb-NO" dirty="0">
+                <a:latin typeface="Arial" panose="020B0604020202020204" pitchFamily="34" charset="0"/>
+                <a:cs typeface="Arial" panose="020B0604020202020204" pitchFamily="34" charset="0"/>
+              </a:rPr>
+              <a:t>PATCH method with json «planet_id», «name», and «user_id» will set the planet’s owner_id to that user_id and rename it in the db. If the user already has a planet, unlinks the old one and removes its name. If the planet already has an owner or the db call fails for some reason, returns json with «status»: «error», otherwise sends «status»: «ok»</a:t>
+            </a:r>
+          </a:p>
+          <a:p>
+            <a:r>
+              <a:rPr lang="nb-NO" dirty="0">
+                <a:latin typeface="Arial" panose="020B0604020202020204" pitchFamily="34" charset="0"/>
+                <a:cs typeface="Arial" panose="020B0604020202020204" pitchFamily="34" charset="0"/>
+              </a:rPr>
+              <a:t>POST method with json «system_id», «order», «size», «surface», and «image» will create a planet</a:t>
+            </a:r>
+          </a:p>
+          <a:p>
+            <a:endParaRPr lang="nb-NO" dirty="0">
+              <a:latin typeface="Arial" panose="020B0604020202020204" pitchFamily="34" charset="0"/>
+              <a:cs typeface="Arial" panose="020B0604020202020204" pitchFamily="34" charset="0"/>
+            </a:endParaRPr>
           </a:p>
         </p:txBody>
       </p:sp>
     </p:spTree>
     <p:extLst>
       <p:ext uri="{BB962C8B-B14F-4D97-AF65-F5344CB8AC3E}">
-        <p14:creationId xmlns:p14="http://schemas.microsoft.com/office/powerpoint/2010/main" val="4128414604"/>
+        <p14:creationId xmlns:p14="http://schemas.microsoft.com/office/powerpoint/2010/main" val="4061486045"/>
       </p:ext>
     </p:extLst>
   </p:cSld>
@@ -5857,7 +5744,7 @@
                 <a:latin typeface="Arial" panose="020B0604020202020204" pitchFamily="34" charset="0"/>
                 <a:cs typeface="Arial" panose="020B0604020202020204" pitchFamily="34" charset="0"/>
               </a:rPr>
-              <a:t>/items</a:t>
+              <a:t>/catalog</a:t>
             </a:r>
           </a:p>
         </p:txBody>
@@ -5872,12 +5759,7 @@
             <p:ph idx="1"/>
           </p:nvPr>
         </p:nvSpPr>
-        <p:spPr>
-          <a:xfrm>
-            <a:off x="838200" y="1331650"/>
-            <a:ext cx="10515600" cy="5433134"/>
-          </a:xfrm>
-        </p:spPr>
+        <p:spPr/>
         <p:txBody>
           <a:bodyPr>
             <a:normAutofit fontScale="47500" lnSpcReduction="20000"/>
@@ -5889,7 +5771,7 @@
                 <a:latin typeface="Arial" panose="020B0604020202020204" pitchFamily="34" charset="0"/>
                 <a:cs typeface="Arial" panose="020B0604020202020204" pitchFamily="34" charset="0"/>
               </a:rPr>
-              <a:t>GET method with params «user_id» will return json that contains each PlanetItem and its variables as well as the image variable that comes from its parent, for example:</a:t>
+              <a:t>GET method returns json that contains each CatalogItem there is and their variables, for example:</a:t>
             </a:r>
           </a:p>
           <a:p>
@@ -5913,7 +5795,7 @@
                 <a:latin typeface="Arial" panose="020B0604020202020204" pitchFamily="34" charset="0"/>
                 <a:cs typeface="Arial" panose="020B0604020202020204" pitchFamily="34" charset="0"/>
               </a:rPr>
-              <a:t>«result:»</a:t>
+              <a:t>«results»:</a:t>
             </a:r>
           </a:p>
           <a:p>
@@ -5949,7 +5831,7 @@
                 <a:latin typeface="Arial" panose="020B0604020202020204" pitchFamily="34" charset="0"/>
                 <a:cs typeface="Arial" panose="020B0604020202020204" pitchFamily="34" charset="0"/>
               </a:rPr>
-              <a:t>			«id»: «342»,</a:t>
+              <a:t>			«id»: «0»,</a:t>
             </a:r>
           </a:p>
           <a:p>
@@ -5961,7 +5843,7 @@
                 <a:latin typeface="Arial" panose="020B0604020202020204" pitchFamily="34" charset="0"/>
                 <a:cs typeface="Arial" panose="020B0604020202020204" pitchFamily="34" charset="0"/>
               </a:rPr>
-              <a:t>			«catalog_parent_id»: «0»,</a:t>
+              <a:t>			«image»: «images/statue.png»,</a:t>
             </a:r>
           </a:p>
           <a:p>
@@ -5973,7 +5855,7 @@
                 <a:latin typeface="Arial" panose="020B0604020202020204" pitchFamily="34" charset="0"/>
                 <a:cs typeface="Arial" panose="020B0604020202020204" pitchFamily="34" charset="0"/>
               </a:rPr>
-              <a:t>			«image»: «images/statue.png»,</a:t>
+              <a:t>			«available»: «true»,</a:t>
             </a:r>
           </a:p>
           <a:p>
@@ -5985,7 +5867,7 @@
                 <a:latin typeface="Arial" panose="020B0604020202020204" pitchFamily="34" charset="0"/>
                 <a:cs typeface="Arial" panose="020B0604020202020204" pitchFamily="34" charset="0"/>
               </a:rPr>
-              <a:t>			«x»: «40»</a:t>
+              <a:t>			...</a:t>
             </a:r>
           </a:p>
           <a:p>
@@ -5997,7 +5879,7 @@
                 <a:latin typeface="Arial" panose="020B0604020202020204" pitchFamily="34" charset="0"/>
                 <a:cs typeface="Arial" panose="020B0604020202020204" pitchFamily="34" charset="0"/>
               </a:rPr>
-              <a:t>			«y»: «80»</a:t>
+              <a:t>		},</a:t>
             </a:r>
           </a:p>
           <a:p>
@@ -6009,7 +5891,7 @@
                 <a:latin typeface="Arial" panose="020B0604020202020204" pitchFamily="34" charset="0"/>
                 <a:cs typeface="Arial" panose="020B0604020202020204" pitchFamily="34" charset="0"/>
               </a:rPr>
-              <a:t>			...</a:t>
+              <a:t>		...</a:t>
             </a:r>
           </a:p>
           <a:p>
@@ -6021,7 +5903,7 @@
                 <a:latin typeface="Arial" panose="020B0604020202020204" pitchFamily="34" charset="0"/>
                 <a:cs typeface="Arial" panose="020B0604020202020204" pitchFamily="34" charset="0"/>
               </a:rPr>
-              <a:t>		},</a:t>
+              <a:t>	]</a:t>
             </a:r>
           </a:p>
           <a:p>
@@ -6033,30 +5915,6 @@
                 <a:latin typeface="Arial" panose="020B0604020202020204" pitchFamily="34" charset="0"/>
                 <a:cs typeface="Arial" panose="020B0604020202020204" pitchFamily="34" charset="0"/>
               </a:rPr>
-              <a:t>		...</a:t>
-            </a:r>
-          </a:p>
-          <a:p>
-            <a:pPr marL="0" indent="0">
-              <a:buNone/>
-            </a:pPr>
-            <a:r>
-              <a:rPr lang="nb-NO" dirty="0">
-                <a:latin typeface="Arial" panose="020B0604020202020204" pitchFamily="34" charset="0"/>
-                <a:cs typeface="Arial" panose="020B0604020202020204" pitchFamily="34" charset="0"/>
-              </a:rPr>
-              <a:t>	]</a:t>
-            </a:r>
-          </a:p>
-          <a:p>
-            <a:pPr marL="0" indent="0">
-              <a:buNone/>
-            </a:pPr>
-            <a:r>
-              <a:rPr lang="nb-NO" dirty="0">
-                <a:latin typeface="Arial" panose="020B0604020202020204" pitchFamily="34" charset="0"/>
-                <a:cs typeface="Arial" panose="020B0604020202020204" pitchFamily="34" charset="0"/>
-              </a:rPr>
               <a:t>}</a:t>
             </a:r>
           </a:p>
@@ -6066,25 +5924,16 @@
                 <a:latin typeface="Arial" panose="020B0604020202020204" pitchFamily="34" charset="0"/>
                 <a:cs typeface="Arial" panose="020B0604020202020204" pitchFamily="34" charset="0"/>
               </a:rPr>
-              <a:t>POST method with json «user_id» «catalog_id», «x» and «y» adds a new item to a user’s list of PlanetItems, returning the new «id» and «image»</a:t>
-            </a:r>
-          </a:p>
-          <a:p>
-            <a:r>
-              <a:rPr lang="nb-NO" dirty="0">
-                <a:latin typeface="Arial" panose="020B0604020202020204" pitchFamily="34" charset="0"/>
-                <a:cs typeface="Arial" panose="020B0604020202020204" pitchFamily="34" charset="0"/>
-              </a:rPr>
-              <a:t>DELETE method with params «item_id» will remove that item from the database</a:t>
-            </a:r>
-          </a:p>
-          <a:p>
-            <a:r>
-              <a:rPr lang="nb-NO" dirty="0">
-                <a:latin typeface="Arial" panose="020B0604020202020204" pitchFamily="34" charset="0"/>
-                <a:cs typeface="Arial" panose="020B0604020202020204" pitchFamily="34" charset="0"/>
-              </a:rPr>
-              <a:t>PATCH method with json «item_id», «x» and «y» updates an item’s x and y position</a:t>
+              <a:t>POST method with json «name», «image», «event_specific», «available», «cost1», «cost2», and «cost3» will create a planet</a:t>
+            </a:r>
+          </a:p>
+          <a:p>
+            <a:r>
+              <a:rPr lang="nb-NO" dirty="0">
+                <a:latin typeface="Arial" panose="020B0604020202020204" pitchFamily="34" charset="0"/>
+                <a:cs typeface="Arial" panose="020B0604020202020204" pitchFamily="34" charset="0"/>
+              </a:rPr>
+              <a:t>PATCH method with the param «catalog_id» flips the value of the available variable</a:t>
             </a:r>
           </a:p>
         </p:txBody>
@@ -6092,7 +5941,7 @@
     </p:spTree>
     <p:extLst>
       <p:ext uri="{BB962C8B-B14F-4D97-AF65-F5344CB8AC3E}">
-        <p14:creationId xmlns:p14="http://schemas.microsoft.com/office/powerpoint/2010/main" val="3976820580"/>
+        <p14:creationId xmlns:p14="http://schemas.microsoft.com/office/powerpoint/2010/main" val="4128414604"/>
       </p:ext>
     </p:extLst>
   </p:cSld>
@@ -6144,7 +5993,7 @@
                 <a:latin typeface="Arial" panose="020B0604020202020204" pitchFamily="34" charset="0"/>
                 <a:cs typeface="Arial" panose="020B0604020202020204" pitchFamily="34" charset="0"/>
               </a:rPr>
-              <a:t>/currency</a:t>
+              <a:t>/items</a:t>
             </a:r>
           </a:p>
         </p:txBody>
@@ -6159,10 +6008,15 @@
             <p:ph idx="1"/>
           </p:nvPr>
         </p:nvSpPr>
-        <p:spPr/>
+        <p:spPr>
+          <a:xfrm>
+            <a:off x="838200" y="1331650"/>
+            <a:ext cx="10515600" cy="5433134"/>
+          </a:xfrm>
+        </p:spPr>
         <p:txBody>
           <a:bodyPr>
-            <a:normAutofit/>
+            <a:normAutofit fontScale="47500" lnSpcReduction="20000"/>
           </a:bodyPr>
           <a:lstStyle/>
           <a:p>
@@ -6171,16 +6025,202 @@
                 <a:latin typeface="Arial" panose="020B0604020202020204" pitchFamily="34" charset="0"/>
                 <a:cs typeface="Arial" panose="020B0604020202020204" pitchFamily="34" charset="0"/>
               </a:rPr>
-              <a:t>GET method with params «user_id» returns cur1-3, vou2-3, lifetime_cur1-3</a:t>
-            </a:r>
-          </a:p>
-          <a:p>
-            <a:r>
-              <a:rPr lang="nb-NO" dirty="0">
-                <a:latin typeface="Arial" panose="020B0604020202020204" pitchFamily="34" charset="0"/>
-                <a:cs typeface="Arial" panose="020B0604020202020204" pitchFamily="34" charset="0"/>
-              </a:rPr>
-              <a:t>PATCH with json including «user_id», «cur1», «cur2», «cur3», «vou2» and «vou3» add these curs and vous to the User’s currency – if they’re positive increments both the current and lifetime currencies, if they’re negative only decreases the current ones</a:t>
+              <a:t>GET method with params «user_id» will return json that contains each PlanetItem and its variables as well as the image variable that comes from its parent, for example:</a:t>
+            </a:r>
+          </a:p>
+          <a:p>
+            <a:pPr marL="0" indent="0">
+              <a:buNone/>
+            </a:pPr>
+            <a:r>
+              <a:rPr lang="nb-NO" dirty="0">
+                <a:latin typeface="Arial" panose="020B0604020202020204" pitchFamily="34" charset="0"/>
+                <a:cs typeface="Arial" panose="020B0604020202020204" pitchFamily="34" charset="0"/>
+              </a:rPr>
+              <a:t>{</a:t>
+            </a:r>
+          </a:p>
+          <a:p>
+            <a:pPr marL="0" indent="0">
+              <a:buNone/>
+            </a:pPr>
+            <a:r>
+              <a:rPr lang="nb-NO" dirty="0">
+                <a:latin typeface="Arial" panose="020B0604020202020204" pitchFamily="34" charset="0"/>
+                <a:cs typeface="Arial" panose="020B0604020202020204" pitchFamily="34" charset="0"/>
+              </a:rPr>
+              <a:t>«result:»</a:t>
+            </a:r>
+          </a:p>
+          <a:p>
+            <a:pPr marL="0" indent="0">
+              <a:buNone/>
+            </a:pPr>
+            <a:r>
+              <a:rPr lang="nb-NO" dirty="0">
+                <a:latin typeface="Arial" panose="020B0604020202020204" pitchFamily="34" charset="0"/>
+                <a:cs typeface="Arial" panose="020B0604020202020204" pitchFamily="34" charset="0"/>
+              </a:rPr>
+              <a:t>	[</a:t>
+            </a:r>
+          </a:p>
+          <a:p>
+            <a:pPr marL="0" indent="0">
+              <a:buNone/>
+            </a:pPr>
+            <a:r>
+              <a:rPr lang="nb-NO" dirty="0">
+                <a:latin typeface="Arial" panose="020B0604020202020204" pitchFamily="34" charset="0"/>
+                <a:cs typeface="Arial" panose="020B0604020202020204" pitchFamily="34" charset="0"/>
+              </a:rPr>
+              <a:t>		{</a:t>
+            </a:r>
+          </a:p>
+          <a:p>
+            <a:pPr marL="0" indent="0">
+              <a:buNone/>
+            </a:pPr>
+            <a:r>
+              <a:rPr lang="nb-NO" dirty="0">
+                <a:latin typeface="Arial" panose="020B0604020202020204" pitchFamily="34" charset="0"/>
+                <a:cs typeface="Arial" panose="020B0604020202020204" pitchFamily="34" charset="0"/>
+              </a:rPr>
+              <a:t>			«id»: «342»,</a:t>
+            </a:r>
+          </a:p>
+          <a:p>
+            <a:pPr marL="0" indent="0">
+              <a:buNone/>
+            </a:pPr>
+            <a:r>
+              <a:rPr lang="nb-NO" dirty="0">
+                <a:latin typeface="Arial" panose="020B0604020202020204" pitchFamily="34" charset="0"/>
+                <a:cs typeface="Arial" panose="020B0604020202020204" pitchFamily="34" charset="0"/>
+              </a:rPr>
+              <a:t>			«catalog_parent_id»: «0»,</a:t>
+            </a:r>
+          </a:p>
+          <a:p>
+            <a:pPr marL="0" indent="0">
+              <a:buNone/>
+            </a:pPr>
+            <a:r>
+              <a:rPr lang="nb-NO" dirty="0">
+                <a:latin typeface="Arial" panose="020B0604020202020204" pitchFamily="34" charset="0"/>
+                <a:cs typeface="Arial" panose="020B0604020202020204" pitchFamily="34" charset="0"/>
+              </a:rPr>
+              <a:t>			«image»: «images/statue.png»,</a:t>
+            </a:r>
+          </a:p>
+          <a:p>
+            <a:pPr marL="0" indent="0">
+              <a:buNone/>
+            </a:pPr>
+            <a:r>
+              <a:rPr lang="nb-NO" dirty="0">
+                <a:latin typeface="Arial" panose="020B0604020202020204" pitchFamily="34" charset="0"/>
+                <a:cs typeface="Arial" panose="020B0604020202020204" pitchFamily="34" charset="0"/>
+              </a:rPr>
+              <a:t>			«x»: «40»</a:t>
+            </a:r>
+          </a:p>
+          <a:p>
+            <a:pPr marL="0" indent="0">
+              <a:buNone/>
+            </a:pPr>
+            <a:r>
+              <a:rPr lang="nb-NO" dirty="0">
+                <a:latin typeface="Arial" panose="020B0604020202020204" pitchFamily="34" charset="0"/>
+                <a:cs typeface="Arial" panose="020B0604020202020204" pitchFamily="34" charset="0"/>
+              </a:rPr>
+              <a:t>			«y»: «80»</a:t>
+            </a:r>
+          </a:p>
+          <a:p>
+            <a:pPr marL="0" indent="0">
+              <a:buNone/>
+            </a:pPr>
+            <a:r>
+              <a:rPr lang="nb-NO" dirty="0">
+                <a:latin typeface="Arial" panose="020B0604020202020204" pitchFamily="34" charset="0"/>
+                <a:cs typeface="Arial" panose="020B0604020202020204" pitchFamily="34" charset="0"/>
+              </a:rPr>
+              <a:t>			...</a:t>
+            </a:r>
+          </a:p>
+          <a:p>
+            <a:pPr marL="0" indent="0">
+              <a:buNone/>
+            </a:pPr>
+            <a:r>
+              <a:rPr lang="nb-NO" dirty="0">
+                <a:latin typeface="Arial" panose="020B0604020202020204" pitchFamily="34" charset="0"/>
+                <a:cs typeface="Arial" panose="020B0604020202020204" pitchFamily="34" charset="0"/>
+              </a:rPr>
+              <a:t>		},</a:t>
+            </a:r>
+          </a:p>
+          <a:p>
+            <a:pPr marL="0" indent="0">
+              <a:buNone/>
+            </a:pPr>
+            <a:r>
+              <a:rPr lang="nb-NO" dirty="0">
+                <a:latin typeface="Arial" panose="020B0604020202020204" pitchFamily="34" charset="0"/>
+                <a:cs typeface="Arial" panose="020B0604020202020204" pitchFamily="34" charset="0"/>
+              </a:rPr>
+              <a:t>		...</a:t>
+            </a:r>
+          </a:p>
+          <a:p>
+            <a:pPr marL="0" indent="0">
+              <a:buNone/>
+            </a:pPr>
+            <a:r>
+              <a:rPr lang="nb-NO" dirty="0">
+                <a:latin typeface="Arial" panose="020B0604020202020204" pitchFamily="34" charset="0"/>
+                <a:cs typeface="Arial" panose="020B0604020202020204" pitchFamily="34" charset="0"/>
+              </a:rPr>
+              <a:t>	]</a:t>
+            </a:r>
+          </a:p>
+          <a:p>
+            <a:pPr marL="0" indent="0">
+              <a:buNone/>
+            </a:pPr>
+            <a:r>
+              <a:rPr lang="nb-NO" dirty="0">
+                <a:latin typeface="Arial" panose="020B0604020202020204" pitchFamily="34" charset="0"/>
+                <a:cs typeface="Arial" panose="020B0604020202020204" pitchFamily="34" charset="0"/>
+              </a:rPr>
+              <a:t>}</a:t>
+            </a:r>
+          </a:p>
+          <a:p>
+            <a:r>
+              <a:rPr lang="nb-NO" dirty="0">
+                <a:latin typeface="Arial" panose="020B0604020202020204" pitchFamily="34" charset="0"/>
+                <a:cs typeface="Arial" panose="020B0604020202020204" pitchFamily="34" charset="0"/>
+              </a:rPr>
+              <a:t>POST method with json «user_id» «catalog_id», «x» and «y» adds a new item to a user’s list of PlanetItems, returning the new «id» and «image»</a:t>
+            </a:r>
+          </a:p>
+          <a:p>
+            <a:r>
+              <a:rPr lang="nb-NO" dirty="0">
+                <a:latin typeface="Arial" panose="020B0604020202020204" pitchFamily="34" charset="0"/>
+                <a:cs typeface="Arial" panose="020B0604020202020204" pitchFamily="34" charset="0"/>
+              </a:rPr>
+              <a:t>DELETE method with params «item_id» will remove that item from the database</a:t>
+            </a:r>
+          </a:p>
+          <a:p>
+            <a:r>
+              <a:rPr lang="nb-NO" dirty="0">
+                <a:latin typeface="Arial" panose="020B0604020202020204" pitchFamily="34" charset="0"/>
+                <a:cs typeface="Arial" panose="020B0604020202020204" pitchFamily="34" charset="0"/>
+              </a:rPr>
+              <a:t>PATCH method with json «item_id», «x» and «y» updates an item’s x and y position</a:t>
             </a:r>
           </a:p>
         </p:txBody>
@@ -6188,7 +6228,7 @@
     </p:spTree>
     <p:extLst>
       <p:ext uri="{BB962C8B-B14F-4D97-AF65-F5344CB8AC3E}">
-        <p14:creationId xmlns:p14="http://schemas.microsoft.com/office/powerpoint/2010/main" val="1802617112"/>
+        <p14:creationId xmlns:p14="http://schemas.microsoft.com/office/powerpoint/2010/main" val="3976820580"/>
       </p:ext>
     </p:extLst>
   </p:cSld>
@@ -6240,6 +6280,102 @@
                 <a:latin typeface="Arial" panose="020B0604020202020204" pitchFamily="34" charset="0"/>
                 <a:cs typeface="Arial" panose="020B0604020202020204" pitchFamily="34" charset="0"/>
               </a:rPr>
+              <a:t>/currency</a:t>
+            </a:r>
+          </a:p>
+        </p:txBody>
+      </p:sp>
+      <p:sp>
+        <p:nvSpPr>
+          <p:cNvPr id="3" name="Content Placeholder 2"/>
+          <p:cNvSpPr>
+            <a:spLocks noGrp="1"/>
+          </p:cNvSpPr>
+          <p:nvPr>
+            <p:ph idx="1"/>
+          </p:nvPr>
+        </p:nvSpPr>
+        <p:spPr/>
+        <p:txBody>
+          <a:bodyPr>
+            <a:normAutofit/>
+          </a:bodyPr>
+          <a:lstStyle/>
+          <a:p>
+            <a:r>
+              <a:rPr lang="nb-NO" dirty="0">
+                <a:latin typeface="Arial" panose="020B0604020202020204" pitchFamily="34" charset="0"/>
+                <a:cs typeface="Arial" panose="020B0604020202020204" pitchFamily="34" charset="0"/>
+              </a:rPr>
+              <a:t>GET method with params «user_id» returns cur1-3, vou2-3, lifetime_cur1-3</a:t>
+            </a:r>
+          </a:p>
+          <a:p>
+            <a:r>
+              <a:rPr lang="nb-NO" dirty="0">
+                <a:latin typeface="Arial" panose="020B0604020202020204" pitchFamily="34" charset="0"/>
+                <a:cs typeface="Arial" panose="020B0604020202020204" pitchFamily="34" charset="0"/>
+              </a:rPr>
+              <a:t>PATCH with json including «user_id», «cur1», «cur2», «cur3», «vou2» and «vou3» add these curs and vous to the User’s currency – if they’re positive increments both the current and lifetime currencies, if they’re negative only decreases the current ones</a:t>
+            </a:r>
+          </a:p>
+        </p:txBody>
+      </p:sp>
+    </p:spTree>
+    <p:extLst>
+      <p:ext uri="{BB962C8B-B14F-4D97-AF65-F5344CB8AC3E}">
+        <p14:creationId xmlns:p14="http://schemas.microsoft.com/office/powerpoint/2010/main" val="1802617112"/>
+      </p:ext>
+    </p:extLst>
+  </p:cSld>
+  <p:clrMapOvr>
+    <a:masterClrMapping/>
+  </p:clrMapOvr>
+</p:sld>
+</file>
+
+<file path=ppt/slides/slide25.xml><?xml version="1.0" encoding="utf-8"?>
+<p:sld xmlns:a="http://schemas.openxmlformats.org/drawingml/2006/main" xmlns:r="http://schemas.openxmlformats.org/officeDocument/2006/relationships" xmlns:p="http://schemas.openxmlformats.org/presentationml/2006/main">
+  <p:cSld>
+    <p:spTree>
+      <p:nvGrpSpPr>
+        <p:cNvPr id="1" name=""/>
+        <p:cNvGrpSpPr/>
+        <p:nvPr/>
+      </p:nvGrpSpPr>
+      <p:grpSpPr>
+        <a:xfrm>
+          <a:off x="0" y="0"/>
+          <a:ext cx="0" cy="0"/>
+          <a:chOff x="0" y="0"/>
+          <a:chExt cx="0" cy="0"/>
+        </a:xfrm>
+      </p:grpSpPr>
+      <p:sp>
+        <p:nvSpPr>
+          <p:cNvPr id="2" name="Title 1"/>
+          <p:cNvSpPr>
+            <a:spLocks noGrp="1"/>
+          </p:cNvSpPr>
+          <p:nvPr>
+            <p:ph type="title"/>
+          </p:nvPr>
+        </p:nvSpPr>
+        <p:spPr>
+          <a:xfrm>
+            <a:off x="838200" y="365125"/>
+            <a:ext cx="10515600" cy="1325563"/>
+          </a:xfrm>
+        </p:spPr>
+        <p:txBody>
+          <a:bodyPr/>
+          <a:lstStyle/>
+          <a:p>
+            <a:r>
+              <a:rPr lang="en-US" dirty="0">
+                <a:latin typeface="Arial" panose="020B0604020202020204" pitchFamily="34" charset="0"/>
+                <a:cs typeface="Arial" panose="020B0604020202020204" pitchFamily="34" charset="0"/>
+              </a:rPr>
               <a:t>/missions</a:t>
             </a:r>
           </a:p>
@@ -6303,7 +6439,7 @@
 </p:sld>
 </file>
 
-<file path=ppt/slides/slide25.xml><?xml version="1.0" encoding="utf-8"?>
+<file path=ppt/slides/slide26.xml><?xml version="1.0" encoding="utf-8"?>
 <p:sld xmlns:a="http://schemas.openxmlformats.org/drawingml/2006/main" xmlns:r="http://schemas.openxmlformats.org/officeDocument/2006/relationships" xmlns:p="http://schemas.openxmlformats.org/presentationml/2006/main">
   <p:cSld>
     <p:spTree>
@@ -6441,7 +6577,7 @@
                 <a:latin typeface="Arial" panose="020B0604020202020204" pitchFamily="34" charset="0"/>
                 <a:cs typeface="Arial" panose="020B0604020202020204" pitchFamily="34" charset="0"/>
               </a:rPr>
-              <a:t>How to use it?</a:t>
+              <a:t>The specific commands:</a:t>
             </a:r>
           </a:p>
         </p:txBody>
@@ -6456,96 +6592,115 @@
             <p:ph idx="1"/>
           </p:nvPr>
         </p:nvSpPr>
-        <p:spPr/>
+        <p:spPr>
+          <a:xfrm>
+            <a:off x="838200" y="1793631"/>
+            <a:ext cx="10515600" cy="2848707"/>
+          </a:xfrm>
+        </p:spPr>
         <p:txBody>
           <a:bodyPr>
-            <a:normAutofit fontScale="92500" lnSpcReduction="10000"/>
+            <a:normAutofit/>
           </a:bodyPr>
           <a:lstStyle/>
           <a:p>
             <a:r>
-              <a:rPr lang="nb-NO" dirty="0">
-                <a:latin typeface="Arial" panose="020B0604020202020204" pitchFamily="34" charset="0"/>
-                <a:cs typeface="Arial" panose="020B0604020202020204" pitchFamily="34" charset="0"/>
-              </a:rPr>
-              <a:t>While in the backend, input $ export FLASK_APP=serve.py for Linux, $env:FLASK_APP = "server.py" for Windows, or export FLASK_APP=«server.py» for Mac, </a:t>
+              <a:rPr lang="en-US" dirty="0" err="1">
+                <a:latin typeface="Arial" panose="020B0604020202020204" pitchFamily="34" charset="0"/>
+                <a:cs typeface="Arial" panose="020B0604020202020204" pitchFamily="34" charset="0"/>
+              </a:rPr>
+              <a:t>npm</a:t>
             </a:r>
             <a:r>
               <a:rPr lang="en-US" dirty="0">
                 <a:latin typeface="Arial" panose="020B0604020202020204" pitchFamily="34" charset="0"/>
                 <a:cs typeface="Arial" panose="020B0604020202020204" pitchFamily="34" charset="0"/>
               </a:rPr>
-              <a:t>to specify the app’s location</a:t>
-            </a:r>
-          </a:p>
-          <a:p>
+              <a:t> install flask</a:t>
+            </a:r>
+          </a:p>
+          <a:p>
+            <a:r>
+              <a:rPr lang="en-US" dirty="0" err="1">
+                <a:latin typeface="Arial" panose="020B0604020202020204" pitchFamily="34" charset="0"/>
+                <a:cs typeface="Arial" panose="020B0604020202020204" pitchFamily="34" charset="0"/>
+              </a:rPr>
+              <a:t>npm</a:t>
+            </a:r>
             <a:r>
               <a:rPr lang="en-US" dirty="0">
                 <a:latin typeface="Arial" panose="020B0604020202020204" pitchFamily="34" charset="0"/>
                 <a:cs typeface="Arial" panose="020B0604020202020204" pitchFamily="34" charset="0"/>
               </a:rPr>
-              <a:t>flask run starts the server running</a:t>
-            </a:r>
-          </a:p>
-          <a:p>
-            <a:r>
-              <a:rPr lang="nb-NO" dirty="0">
-                <a:latin typeface="Arial" panose="020B0604020202020204" pitchFamily="34" charset="0"/>
-                <a:cs typeface="Arial" panose="020B0604020202020204" pitchFamily="34" charset="0"/>
-              </a:rPr>
-              <a:t>flask shell opens a python shell with SQLAlchemy</a:t>
-            </a:r>
-          </a:p>
-          <a:p>
-            <a:pPr lvl="1"/>
-            <a:r>
-              <a:rPr lang="nb-NO" dirty="0">
-                <a:latin typeface="Arial" panose="020B0604020202020204" pitchFamily="34" charset="0"/>
-                <a:cs typeface="Arial" panose="020B0604020202020204" pitchFamily="34" charset="0"/>
-              </a:rPr>
-              <a:t>Use python to instantiate objects, ie u = User(username=«test», password_hash=«test123», email=«test@email.com»)</a:t>
-            </a:r>
-          </a:p>
-          <a:p>
-            <a:pPr lvl="1"/>
-            <a:r>
-              <a:rPr lang="nb-NO" dirty="0">
-                <a:latin typeface="Arial" panose="020B0604020202020204" pitchFamily="34" charset="0"/>
-                <a:cs typeface="Arial" panose="020B0604020202020204" pitchFamily="34" charset="0"/>
-              </a:rPr>
-              <a:t>Use db.session commands to update the database, ie db.session.add(u) and db.session.commit() (or in case something goes wrong, db.session.rollback())</a:t>
-            </a:r>
-          </a:p>
-          <a:p>
-            <a:r>
-              <a:rPr lang="nb-NO" dirty="0">
-                <a:latin typeface="Arial" panose="020B0604020202020204" pitchFamily="34" charset="0"/>
-                <a:cs typeface="Arial" panose="020B0604020202020204" pitchFamily="34" charset="0"/>
-              </a:rPr>
-              <a:t>flask db migrate –m "insert title here" makes any needed database schema changes, but doesn’t actually commit them</a:t>
-            </a:r>
-          </a:p>
-          <a:p>
-            <a:r>
-              <a:rPr lang="nb-NO" dirty="0">
-                <a:latin typeface="Arial" panose="020B0604020202020204" pitchFamily="34" charset="0"/>
-                <a:cs typeface="Arial" panose="020B0604020202020204" pitchFamily="34" charset="0"/>
-              </a:rPr>
-              <a:t>flask db upgrade makes the changes reality</a:t>
-            </a:r>
-          </a:p>
-          <a:p>
-            <a:endParaRPr lang="nb-NO" dirty="0">
+              <a:t> install </a:t>
+            </a:r>
+            <a:r>
+              <a:rPr lang="en-US" dirty="0" err="1">
+                <a:latin typeface="Arial" panose="020B0604020202020204" pitchFamily="34" charset="0"/>
+                <a:cs typeface="Arial" panose="020B0604020202020204" pitchFamily="34" charset="0"/>
+              </a:rPr>
+              <a:t>sqlite</a:t>
+            </a:r>
+            <a:endParaRPr lang="en-US" dirty="0">
               <a:latin typeface="Arial" panose="020B0604020202020204" pitchFamily="34" charset="0"/>
               <a:cs typeface="Arial" panose="020B0604020202020204" pitchFamily="34" charset="0"/>
             </a:endParaRPr>
           </a:p>
+          <a:p>
+            <a:r>
+              <a:rPr lang="en-US" dirty="0">
+                <a:latin typeface="Arial" panose="020B0604020202020204" pitchFamily="34" charset="0"/>
+                <a:cs typeface="Arial" panose="020B0604020202020204" pitchFamily="34" charset="0"/>
+              </a:rPr>
+              <a:t>pip install flask-</a:t>
+            </a:r>
+            <a:r>
+              <a:rPr lang="en-US" dirty="0" err="1">
+                <a:latin typeface="Arial" panose="020B0604020202020204" pitchFamily="34" charset="0"/>
+                <a:cs typeface="Arial" panose="020B0604020202020204" pitchFamily="34" charset="0"/>
+              </a:rPr>
+              <a:t>sqlalchemy</a:t>
+            </a:r>
+            <a:endParaRPr lang="en-US" dirty="0">
+              <a:latin typeface="Arial" panose="020B0604020202020204" pitchFamily="34" charset="0"/>
+              <a:cs typeface="Arial" panose="020B0604020202020204" pitchFamily="34" charset="0"/>
+            </a:endParaRPr>
+          </a:p>
+          <a:p>
+            <a:r>
+              <a:rPr lang="en-US" dirty="0">
+                <a:latin typeface="Arial" panose="020B0604020202020204" pitchFamily="34" charset="0"/>
+                <a:cs typeface="Arial" panose="020B0604020202020204" pitchFamily="34" charset="0"/>
+              </a:rPr>
+              <a:t>pip install flask-migrate</a:t>
+            </a:r>
+          </a:p>
+          <a:p>
+            <a:r>
+              <a:rPr lang="en-US" dirty="0">
+                <a:latin typeface="Arial" panose="020B0604020202020204" pitchFamily="34" charset="0"/>
+                <a:cs typeface="Arial" panose="020B0604020202020204" pitchFamily="34" charset="0"/>
+              </a:rPr>
+              <a:t>pip install flask-</a:t>
+            </a:r>
+            <a:r>
+              <a:rPr lang="en-US" dirty="0" err="1">
+                <a:latin typeface="Arial" panose="020B0604020202020204" pitchFamily="34" charset="0"/>
+                <a:cs typeface="Arial" panose="020B0604020202020204" pitchFamily="34" charset="0"/>
+              </a:rPr>
+              <a:t>socketio</a:t>
+            </a:r>
+            <a:endParaRPr lang="en-US" dirty="0">
+              <a:latin typeface="Arial" panose="020B0604020202020204" pitchFamily="34" charset="0"/>
+              <a:cs typeface="Arial" panose="020B0604020202020204" pitchFamily="34" charset="0"/>
+            </a:endParaRPr>
+          </a:p>
         </p:txBody>
       </p:sp>
     </p:spTree>
     <p:extLst>
       <p:ext uri="{BB962C8B-B14F-4D97-AF65-F5344CB8AC3E}">
-        <p14:creationId xmlns:p14="http://schemas.microsoft.com/office/powerpoint/2010/main" val="530032164"/>
+        <p14:creationId xmlns:p14="http://schemas.microsoft.com/office/powerpoint/2010/main" val="1592436602"/>
       </p:ext>
     </p:extLst>
   </p:cSld>
@@ -6597,7 +6752,7 @@
                 <a:latin typeface="Arial" panose="020B0604020202020204" pitchFamily="34" charset="0"/>
                 <a:cs typeface="Arial" panose="020B0604020202020204" pitchFamily="34" charset="0"/>
               </a:rPr>
-              <a:t>config.py</a:t>
+              <a:t>How to use it?</a:t>
             </a:r>
           </a:p>
         </p:txBody>
@@ -6615,7 +6770,7 @@
         <p:spPr/>
         <p:txBody>
           <a:bodyPr>
-            <a:normAutofit/>
+            <a:normAutofit fontScale="92500" lnSpcReduction="10000"/>
           </a:bodyPr>
           <a:lstStyle/>
           <a:p>
@@ -6624,15 +6779,84 @@
                 <a:latin typeface="Arial" panose="020B0604020202020204" pitchFamily="34" charset="0"/>
                 <a:cs typeface="Arial" panose="020B0604020202020204" pitchFamily="34" charset="0"/>
               </a:rPr>
-              <a:t>Initializes some of the variables for SQLAlchemy, is imported into server.py</a:t>
-            </a:r>
+              <a:t>While in the backend, input $ export FLASK_APP=serve.py for Linux, $env:FLASK_APP = "server.py" for Windows, or export FLASK_APP=«server.py» for Mac, </a:t>
+            </a:r>
+            <a:r>
+              <a:rPr lang="en-US" dirty="0">
+                <a:latin typeface="Arial" panose="020B0604020202020204" pitchFamily="34" charset="0"/>
+                <a:cs typeface="Arial" panose="020B0604020202020204" pitchFamily="34" charset="0"/>
+              </a:rPr>
+              <a:t>to specify the app’s location</a:t>
+            </a:r>
+          </a:p>
+          <a:p>
+            <a:r>
+              <a:rPr lang="en-US" dirty="0">
+                <a:latin typeface="Arial" panose="020B0604020202020204" pitchFamily="34" charset="0"/>
+                <a:cs typeface="Arial" panose="020B0604020202020204" pitchFamily="34" charset="0"/>
+              </a:rPr>
+              <a:t>flask run starts the server running</a:t>
+            </a:r>
+          </a:p>
+          <a:p>
+            <a:r>
+              <a:rPr lang="nb-NO" dirty="0">
+                <a:latin typeface="Arial" panose="020B0604020202020204" pitchFamily="34" charset="0"/>
+                <a:cs typeface="Arial" panose="020B0604020202020204" pitchFamily="34" charset="0"/>
+              </a:rPr>
+              <a:t>flask shell opens a python shell with SQLAlchemy</a:t>
+            </a:r>
+          </a:p>
+          <a:p>
+            <a:pPr lvl="1"/>
+            <a:r>
+              <a:rPr lang="nb-NO" dirty="0">
+                <a:latin typeface="Arial" panose="020B0604020202020204" pitchFamily="34" charset="0"/>
+                <a:cs typeface="Arial" panose="020B0604020202020204" pitchFamily="34" charset="0"/>
+              </a:rPr>
+              <a:t>Use python to instantiate objects, ie u = User(username=«test», password_hash=«test123», email=«test@email.com»)</a:t>
+            </a:r>
+          </a:p>
+          <a:p>
+            <a:pPr lvl="1"/>
+            <a:r>
+              <a:rPr lang="nb-NO" dirty="0">
+                <a:latin typeface="Arial" panose="020B0604020202020204" pitchFamily="34" charset="0"/>
+                <a:cs typeface="Arial" panose="020B0604020202020204" pitchFamily="34" charset="0"/>
+              </a:rPr>
+              <a:t>Use db.session commands to update the database, ie db.session.add(u) and db.session.commit() (or in case something goes wrong, db.session.rollback())</a:t>
+            </a:r>
+          </a:p>
+          <a:p>
+            <a:r>
+              <a:rPr lang="nb-NO" dirty="0">
+                <a:latin typeface="Arial" panose="020B0604020202020204" pitchFamily="34" charset="0"/>
+                <a:cs typeface="Arial" panose="020B0604020202020204" pitchFamily="34" charset="0"/>
+              </a:rPr>
+              <a:t>flask db migrate –m "insert title here" makes any needed database schema changes, but doesn’t actually commit them</a:t>
+            </a:r>
+          </a:p>
+          <a:p>
+            <a:r>
+              <a:rPr lang="nb-NO" dirty="0">
+                <a:latin typeface="Arial" panose="020B0604020202020204" pitchFamily="34" charset="0"/>
+                <a:cs typeface="Arial" panose="020B0604020202020204" pitchFamily="34" charset="0"/>
+              </a:rPr>
+              <a:t>flask db upgrade makes the changes reality</a:t>
+            </a:r>
+          </a:p>
+          <a:p>
+            <a:endParaRPr lang="nb-NO" dirty="0">
+              <a:latin typeface="Arial" panose="020B0604020202020204" pitchFamily="34" charset="0"/>
+              <a:cs typeface="Arial" panose="020B0604020202020204" pitchFamily="34" charset="0"/>
+            </a:endParaRPr>
           </a:p>
         </p:txBody>
       </p:sp>
     </p:spTree>
     <p:extLst>
       <p:ext uri="{BB962C8B-B14F-4D97-AF65-F5344CB8AC3E}">
-        <p14:creationId xmlns:p14="http://schemas.microsoft.com/office/powerpoint/2010/main" val="1251547270"/>
+        <p14:creationId xmlns:p14="http://schemas.microsoft.com/office/powerpoint/2010/main" val="530032164"/>
       </p:ext>
     </p:extLst>
   </p:cSld>
@@ -6684,7 +6908,7 @@
                 <a:latin typeface="Arial" panose="020B0604020202020204" pitchFamily="34" charset="0"/>
                 <a:cs typeface="Arial" panose="020B0604020202020204" pitchFamily="34" charset="0"/>
               </a:rPr>
-              <a:t>models.py</a:t>
+              <a:t>config.py</a:t>
             </a:r>
           </a:p>
         </p:txBody>
@@ -6711,16 +6935,7 @@
                 <a:latin typeface="Arial" panose="020B0604020202020204" pitchFamily="34" charset="0"/>
                 <a:cs typeface="Arial" panose="020B0604020202020204" pitchFamily="34" charset="0"/>
               </a:rPr>
-              <a:t>Keeps track of the classes that are high-level representations of database schema</a:t>
-            </a:r>
-          </a:p>
-          <a:p>
-            <a:r>
-              <a:rPr lang="nb-NO" dirty="0">
-                <a:latin typeface="Arial" panose="020B0604020202020204" pitchFamily="34" charset="0"/>
-                <a:cs typeface="Arial" panose="020B0604020202020204" pitchFamily="34" charset="0"/>
-              </a:rPr>
-              <a:t>classes import from db.Model and consist of assigning db.Columns to variables</a:t>
+              <a:t>Initializes some of the variables for SQLAlchemy, is imported into server.py</a:t>
             </a:r>
           </a:p>
         </p:txBody>
@@ -6728,7 +6943,7 @@
     </p:spTree>
     <p:extLst>
       <p:ext uri="{BB962C8B-B14F-4D97-AF65-F5344CB8AC3E}">
-        <p14:creationId xmlns:p14="http://schemas.microsoft.com/office/powerpoint/2010/main" val="1331669685"/>
+        <p14:creationId xmlns:p14="http://schemas.microsoft.com/office/powerpoint/2010/main" val="1251547270"/>
       </p:ext>
     </p:extLst>
   </p:cSld>
@@ -6780,7 +6995,7 @@
                 <a:latin typeface="Arial" panose="020B0604020202020204" pitchFamily="34" charset="0"/>
                 <a:cs typeface="Arial" panose="020B0604020202020204" pitchFamily="34" charset="0"/>
               </a:rPr>
-              <a:t>server.py</a:t>
+              <a:t>models.py</a:t>
             </a:r>
           </a:p>
         </p:txBody>
@@ -6807,16 +7022,16 @@
                 <a:latin typeface="Arial" panose="020B0604020202020204" pitchFamily="34" charset="0"/>
                 <a:cs typeface="Arial" panose="020B0604020202020204" pitchFamily="34" charset="0"/>
               </a:rPr>
-              <a:t>This is where the app is found</a:t>
-            </a:r>
-          </a:p>
-          <a:p>
-            <a:r>
-              <a:rPr lang="nb-NO" dirty="0">
-                <a:latin typeface="Arial" panose="020B0604020202020204" pitchFamily="34" charset="0"/>
-                <a:cs typeface="Arial" panose="020B0604020202020204" pitchFamily="34" charset="0"/>
-              </a:rPr>
-              <a:t>Routes different url’s for different http methods</a:t>
+              <a:t>Keeps track of the classes that are high-level representations of database schema</a:t>
+            </a:r>
+          </a:p>
+          <a:p>
+            <a:r>
+              <a:rPr lang="nb-NO" dirty="0">
+                <a:latin typeface="Arial" panose="020B0604020202020204" pitchFamily="34" charset="0"/>
+                <a:cs typeface="Arial" panose="020B0604020202020204" pitchFamily="34" charset="0"/>
+              </a:rPr>
+              <a:t>classes import from db.Model and consist of assigning db.Columns to variables</a:t>
             </a:r>
           </a:p>
         </p:txBody>
@@ -6824,7 +7039,7 @@
     </p:spTree>
     <p:extLst>
       <p:ext uri="{BB962C8B-B14F-4D97-AF65-F5344CB8AC3E}">
-        <p14:creationId xmlns:p14="http://schemas.microsoft.com/office/powerpoint/2010/main" val="4085005084"/>
+        <p14:creationId xmlns:p14="http://schemas.microsoft.com/office/powerpoint/2010/main" val="1331669685"/>
       </p:ext>
     </p:extLst>
   </p:cSld>
@@ -6863,7 +7078,7 @@
         </p:nvSpPr>
         <p:spPr>
           <a:xfrm>
-            <a:off x="873710" y="2602298"/>
+            <a:off x="838200" y="365125"/>
             <a:ext cx="10515600" cy="1325563"/>
           </a:xfrm>
         </p:spPr>
@@ -6871,25 +7086,56 @@
           <a:bodyPr/>
           <a:lstStyle/>
           <a:p>
-            <a:pPr algn="ctr"/>
-            <a:r>
-              <a:rPr lang="en-US" sz="8000" dirty="0">
-                <a:latin typeface="Arial" panose="020B0604020202020204" pitchFamily="34" charset="0"/>
-                <a:cs typeface="Arial" panose="020B0604020202020204" pitchFamily="34" charset="0"/>
-              </a:rPr>
-              <a:t>Models</a:t>
-            </a:r>
-            <a:endParaRPr lang="en-US" dirty="0">
-              <a:latin typeface="Arial" panose="020B0604020202020204" pitchFamily="34" charset="0"/>
-              <a:cs typeface="Arial" panose="020B0604020202020204" pitchFamily="34" charset="0"/>
-            </a:endParaRPr>
+            <a:r>
+              <a:rPr lang="en-US" dirty="0">
+                <a:latin typeface="Arial" panose="020B0604020202020204" pitchFamily="34" charset="0"/>
+                <a:cs typeface="Arial" panose="020B0604020202020204" pitchFamily="34" charset="0"/>
+              </a:rPr>
+              <a:t>server.py</a:t>
+            </a:r>
+          </a:p>
+        </p:txBody>
+      </p:sp>
+      <p:sp>
+        <p:nvSpPr>
+          <p:cNvPr id="3" name="Content Placeholder 2"/>
+          <p:cNvSpPr>
+            <a:spLocks noGrp="1"/>
+          </p:cNvSpPr>
+          <p:nvPr>
+            <p:ph idx="1"/>
+          </p:nvPr>
+        </p:nvSpPr>
+        <p:spPr/>
+        <p:txBody>
+          <a:bodyPr>
+            <a:normAutofit/>
+          </a:bodyPr>
+          <a:lstStyle/>
+          <a:p>
+            <a:r>
+              <a:rPr lang="nb-NO" dirty="0">
+                <a:latin typeface="Arial" panose="020B0604020202020204" pitchFamily="34" charset="0"/>
+                <a:cs typeface="Arial" panose="020B0604020202020204" pitchFamily="34" charset="0"/>
+              </a:rPr>
+              <a:t>This is where the app is found</a:t>
+            </a:r>
+          </a:p>
+          <a:p>
+            <a:r>
+              <a:rPr lang="nb-NO" dirty="0">
+                <a:latin typeface="Arial" panose="020B0604020202020204" pitchFamily="34" charset="0"/>
+                <a:cs typeface="Arial" panose="020B0604020202020204" pitchFamily="34" charset="0"/>
+              </a:rPr>
+              <a:t>Routes different url’s for different http methods</a:t>
+            </a:r>
           </a:p>
         </p:txBody>
       </p:sp>
     </p:spTree>
     <p:extLst>
       <p:ext uri="{BB962C8B-B14F-4D97-AF65-F5344CB8AC3E}">
-        <p14:creationId xmlns:p14="http://schemas.microsoft.com/office/powerpoint/2010/main" val="3518167796"/>
+        <p14:creationId xmlns:p14="http://schemas.microsoft.com/office/powerpoint/2010/main" val="4085005084"/>
       </p:ext>
     </p:extLst>
   </p:cSld>
@@ -6928,7 +7174,7 @@
         </p:nvSpPr>
         <p:spPr>
           <a:xfrm>
-            <a:off x="838200" y="365125"/>
+            <a:off x="873710" y="2602298"/>
             <a:ext cx="10515600" cy="1325563"/>
           </a:xfrm>
         </p:spPr>
@@ -6936,156 +7182,15 @@
           <a:bodyPr/>
           <a:lstStyle/>
           <a:p>
-            <a:r>
-              <a:rPr lang="en-US" dirty="0">
-                <a:latin typeface="Arial" panose="020B0604020202020204" pitchFamily="34" charset="0"/>
-                <a:cs typeface="Arial" panose="020B0604020202020204" pitchFamily="34" charset="0"/>
-              </a:rPr>
-              <a:t>User</a:t>
-            </a:r>
-          </a:p>
-        </p:txBody>
-      </p:sp>
-      <p:sp>
-        <p:nvSpPr>
-          <p:cNvPr id="3" name="Content Placeholder 2"/>
-          <p:cNvSpPr>
-            <a:spLocks noGrp="1"/>
-          </p:cNvSpPr>
-          <p:nvPr>
-            <p:ph idx="1"/>
-          </p:nvPr>
-        </p:nvSpPr>
-        <p:spPr>
-          <a:xfrm>
-            <a:off x="838200" y="1526960"/>
-            <a:ext cx="10515600" cy="5220069"/>
-          </a:xfrm>
-        </p:spPr>
-        <p:txBody>
-          <a:bodyPr>
-            <a:normAutofit fontScale="70000" lnSpcReduction="20000"/>
-          </a:bodyPr>
-          <a:lstStyle/>
-          <a:p>
-            <a:r>
-              <a:rPr lang="nb-NO" dirty="0">
-                <a:latin typeface="Arial" panose="020B0604020202020204" pitchFamily="34" charset="0"/>
-                <a:cs typeface="Arial" panose="020B0604020202020204" pitchFamily="34" charset="0"/>
-              </a:rPr>
-              <a:t>username: String(64), index = True, unique = True</a:t>
-            </a:r>
-          </a:p>
-          <a:p>
-            <a:r>
-              <a:rPr lang="nb-NO" dirty="0">
-                <a:latin typeface="Arial" panose="020B0604020202020204" pitchFamily="34" charset="0"/>
-                <a:cs typeface="Arial" panose="020B0604020202020204" pitchFamily="34" charset="0"/>
-              </a:rPr>
-              <a:t>email: String(64), index = True, unique = True</a:t>
-            </a:r>
-          </a:p>
-          <a:p>
-            <a:r>
-              <a:rPr lang="nb-NO" dirty="0">
-                <a:latin typeface="Arial" panose="020B0604020202020204" pitchFamily="34" charset="0"/>
-                <a:cs typeface="Arial" panose="020B0604020202020204" pitchFamily="34" charset="0"/>
-              </a:rPr>
-              <a:t>password_hash: String(128)</a:t>
-            </a:r>
-          </a:p>
-          <a:p>
-            <a:r>
-              <a:rPr lang="nb-NO" dirty="0">
-                <a:latin typeface="Arial" panose="020B0604020202020204" pitchFamily="34" charset="0"/>
-                <a:cs typeface="Arial" panose="020B0604020202020204" pitchFamily="34" charset="0"/>
-              </a:rPr>
-              <a:t>name: String(64)</a:t>
-            </a:r>
-          </a:p>
-          <a:p>
-            <a:r>
-              <a:rPr lang="nb-NO" dirty="0">
-                <a:latin typeface="Arial" panose="020B0604020202020204" pitchFamily="34" charset="0"/>
-                <a:cs typeface="Arial" panose="020B0604020202020204" pitchFamily="34" charset="0"/>
-              </a:rPr>
-              <a:t>login_days: Integer, default = 1</a:t>
-            </a:r>
-          </a:p>
-          <a:p>
-            <a:r>
-              <a:rPr lang="nb-NO" dirty="0">
-                <a:latin typeface="Arial" panose="020B0604020202020204" pitchFamily="34" charset="0"/>
-                <a:cs typeface="Arial" panose="020B0604020202020204" pitchFamily="34" charset="0"/>
-              </a:rPr>
-              <a:t>last_login: dateTime, default = datetime.utcnow</a:t>
-            </a:r>
-          </a:p>
-          <a:p>
-            <a:r>
-              <a:rPr lang="nb-NO" dirty="0">
-                <a:latin typeface="Arial" panose="020B0604020202020204" pitchFamily="34" charset="0"/>
-                <a:cs typeface="Arial" panose="020B0604020202020204" pitchFamily="34" charset="0"/>
-              </a:rPr>
-              <a:t>mission_type: String(16), default = "visit" </a:t>
-            </a:r>
-          </a:p>
-          <a:p>
-            <a:r>
-              <a:rPr lang="nb-NO" dirty="0">
-                <a:latin typeface="Arial" panose="020B0604020202020204" pitchFamily="34" charset="0"/>
-                <a:cs typeface="Arial" panose="020B0604020202020204" pitchFamily="34" charset="0"/>
-              </a:rPr>
-              <a:t>mission_current: Integer, default = 0</a:t>
-            </a:r>
-          </a:p>
-          <a:p>
-            <a:r>
-              <a:rPr lang="nb-NO" dirty="0">
-                <a:latin typeface="Arial" panose="020B0604020202020204" pitchFamily="34" charset="0"/>
-                <a:cs typeface="Arial" panose="020B0604020202020204" pitchFamily="34" charset="0"/>
-              </a:rPr>
-              <a:t>mission_total: Integer, default = 10</a:t>
-            </a:r>
-          </a:p>
-          <a:p>
-            <a:r>
-              <a:rPr lang="nb-NO" dirty="0">
-                <a:latin typeface="Arial" panose="020B0604020202020204" pitchFamily="34" charset="0"/>
-                <a:cs typeface="Arial" panose="020B0604020202020204" pitchFamily="34" charset="0"/>
-              </a:rPr>
-              <a:t>planet: a one-to-one relationship between User and Planet, giving owner variable to Planet</a:t>
-            </a:r>
-          </a:p>
-          <a:p>
-            <a:r>
-              <a:rPr lang="nb-NO" dirty="0">
-                <a:latin typeface="Arial" panose="020B0604020202020204" pitchFamily="34" charset="0"/>
-                <a:cs typeface="Arial" panose="020B0604020202020204" pitchFamily="34" charset="0"/>
-              </a:rPr>
-              <a:t>planet_items: a one-to-many relationship between User and PlanetItems, giving owner variable to PlanetItem</a:t>
-            </a:r>
-          </a:p>
-          <a:p>
-            <a:r>
-              <a:rPr lang="nb-NO" dirty="0">
-                <a:latin typeface="Arial" panose="020B0604020202020204" pitchFamily="34" charset="0"/>
-                <a:cs typeface="Arial" panose="020B0604020202020204" pitchFamily="34" charset="0"/>
-              </a:rPr>
-              <a:t>visited/visitors: a many-to-many relationship between Users</a:t>
-            </a:r>
-          </a:p>
-          <a:p>
-            <a:r>
-              <a:rPr lang="nb-NO" dirty="0">
-                <a:latin typeface="Arial" panose="020B0604020202020204" pitchFamily="34" charset="0"/>
-                <a:cs typeface="Arial" panose="020B0604020202020204" pitchFamily="34" charset="0"/>
-              </a:rPr>
-              <a:t>cur1, cur2, cur3, vou2, vou3, lifetime_cur1, lifetime_cur2, lifetime_cur3: all Integers, all default = 0</a:t>
-            </a:r>
-          </a:p>
-          <a:p>
-            <a:endParaRPr lang="nb-NO" dirty="0">
+            <a:pPr algn="ctr"/>
+            <a:r>
+              <a:rPr lang="en-US" sz="8000" dirty="0">
+                <a:latin typeface="Arial" panose="020B0604020202020204" pitchFamily="34" charset="0"/>
+                <a:cs typeface="Arial" panose="020B0604020202020204" pitchFamily="34" charset="0"/>
+              </a:rPr>
+              <a:t>Models</a:t>
+            </a:r>
+            <a:endParaRPr lang="en-US" dirty="0">
               <a:latin typeface="Arial" panose="020B0604020202020204" pitchFamily="34" charset="0"/>
               <a:cs typeface="Arial" panose="020B0604020202020204" pitchFamily="34" charset="0"/>
             </a:endParaRPr>
@@ -7095,7 +7200,7 @@
     </p:spTree>
     <p:extLst>
       <p:ext uri="{BB962C8B-B14F-4D97-AF65-F5344CB8AC3E}">
-        <p14:creationId xmlns:p14="http://schemas.microsoft.com/office/powerpoint/2010/main" val="28240710"/>
+        <p14:creationId xmlns:p14="http://schemas.microsoft.com/office/powerpoint/2010/main" val="3518167796"/>
       </p:ext>
     </p:extLst>
   </p:cSld>
@@ -7147,7 +7252,7 @@
                 <a:latin typeface="Arial" panose="020B0604020202020204" pitchFamily="34" charset="0"/>
                 <a:cs typeface="Arial" panose="020B0604020202020204" pitchFamily="34" charset="0"/>
               </a:rPr>
-              <a:t>Galaxy</a:t>
+              <a:t>User</a:t>
             </a:r>
           </a:p>
         </p:txBody>
@@ -7162,10 +7267,15 @@
             <p:ph idx="1"/>
           </p:nvPr>
         </p:nvSpPr>
-        <p:spPr/>
+        <p:spPr>
+          <a:xfrm>
+            <a:off x="838200" y="1526960"/>
+            <a:ext cx="10515600" cy="5220069"/>
+          </a:xfrm>
+        </p:spPr>
         <p:txBody>
           <a:bodyPr>
-            <a:normAutofit/>
+            <a:normAutofit fontScale="70000" lnSpcReduction="20000"/>
           </a:bodyPr>
           <a:lstStyle/>
           <a:p>
@@ -7174,43 +7284,115 @@
                 <a:latin typeface="Arial" panose="020B0604020202020204" pitchFamily="34" charset="0"/>
                 <a:cs typeface="Arial" panose="020B0604020202020204" pitchFamily="34" charset="0"/>
               </a:rPr>
-              <a:t>name: String(64), index = True, unique = True</a:t>
-            </a:r>
-          </a:p>
-          <a:p>
-            <a:r>
-              <a:rPr lang="nb-NO" dirty="0">
-                <a:latin typeface="Arial" panose="020B0604020202020204" pitchFamily="34" charset="0"/>
-                <a:cs typeface="Arial" panose="020B0604020202020204" pitchFamily="34" charset="0"/>
-              </a:rPr>
-              <a:t>description: String(128)</a:t>
-            </a:r>
-          </a:p>
-          <a:p>
-            <a:r>
-              <a:rPr lang="nb-NO" dirty="0">
-                <a:latin typeface="Arial" panose="020B0604020202020204" pitchFamily="34" charset="0"/>
-                <a:cs typeface="Arial" panose="020B0604020202020204" pitchFamily="34" charset="0"/>
-              </a:rPr>
-              <a:t>x, y: Integers</a:t>
-            </a:r>
-          </a:p>
-          <a:p>
-            <a:r>
-              <a:rPr lang="nb-NO" dirty="0">
-                <a:latin typeface="Arial" panose="020B0604020202020204" pitchFamily="34" charset="0"/>
-                <a:cs typeface="Arial" panose="020B0604020202020204" pitchFamily="34" charset="0"/>
-              </a:rPr>
-              <a:t>image: String(128)</a:t>
-            </a:r>
-          </a:p>
-          <a:p>
-            <a:r>
-              <a:rPr lang="nb-NO" dirty="0">
-                <a:latin typeface="Arial" panose="020B0604020202020204" pitchFamily="34" charset="0"/>
-                <a:cs typeface="Arial" panose="020B0604020202020204" pitchFamily="34" charset="0"/>
-              </a:rPr>
-              <a:t>systems: a one-to-many relationship between Galaxy and System, giving galaxy variable to System</a:t>
+              <a:t>username: String(64), index = True, unique = True</a:t>
+            </a:r>
+          </a:p>
+          <a:p>
+            <a:r>
+              <a:rPr lang="nb-NO" dirty="0">
+                <a:latin typeface="Arial" panose="020B0604020202020204" pitchFamily="34" charset="0"/>
+                <a:cs typeface="Arial" panose="020B0604020202020204" pitchFamily="34" charset="0"/>
+              </a:rPr>
+              <a:t>email: String(64), index = True, unique = True</a:t>
+            </a:r>
+          </a:p>
+          <a:p>
+            <a:r>
+              <a:rPr lang="nb-NO" dirty="0">
+                <a:latin typeface="Arial" panose="020B0604020202020204" pitchFamily="34" charset="0"/>
+                <a:cs typeface="Arial" panose="020B0604020202020204" pitchFamily="34" charset="0"/>
+              </a:rPr>
+              <a:t>password_hash: String(128)</a:t>
+            </a:r>
+          </a:p>
+          <a:p>
+            <a:r>
+              <a:rPr lang="nb-NO" dirty="0">
+                <a:latin typeface="Arial" panose="020B0604020202020204" pitchFamily="34" charset="0"/>
+                <a:cs typeface="Arial" panose="020B0604020202020204" pitchFamily="34" charset="0"/>
+              </a:rPr>
+              <a:t>name: String(64)</a:t>
+            </a:r>
+          </a:p>
+          <a:p>
+            <a:r>
+              <a:rPr lang="nb-NO" dirty="0">
+                <a:latin typeface="Arial" panose="020B0604020202020204" pitchFamily="34" charset="0"/>
+                <a:cs typeface="Arial" panose="020B0604020202020204" pitchFamily="34" charset="0"/>
+              </a:rPr>
+              <a:t>login_days: Integer, default = 1</a:t>
+            </a:r>
+          </a:p>
+          <a:p>
+            <a:r>
+              <a:rPr lang="nb-NO" dirty="0">
+                <a:latin typeface="Arial" panose="020B0604020202020204" pitchFamily="34" charset="0"/>
+                <a:cs typeface="Arial" panose="020B0604020202020204" pitchFamily="34" charset="0"/>
+              </a:rPr>
+              <a:t>last_login: dateTime, default = datetime.utcnow</a:t>
+            </a:r>
+          </a:p>
+          <a:p>
+            <a:r>
+              <a:rPr lang="nb-NO" dirty="0">
+                <a:latin typeface="Arial" panose="020B0604020202020204" pitchFamily="34" charset="0"/>
+                <a:cs typeface="Arial" panose="020B0604020202020204" pitchFamily="34" charset="0"/>
+              </a:rPr>
+              <a:t>mission_type: String(16), default = "visit" </a:t>
+            </a:r>
+          </a:p>
+          <a:p>
+            <a:r>
+              <a:rPr lang="nb-NO" dirty="0">
+                <a:latin typeface="Arial" panose="020B0604020202020204" pitchFamily="34" charset="0"/>
+                <a:cs typeface="Arial" panose="020B0604020202020204" pitchFamily="34" charset="0"/>
+              </a:rPr>
+              <a:t>mission_current: Integer, default = 0</a:t>
+            </a:r>
+          </a:p>
+          <a:p>
+            <a:r>
+              <a:rPr lang="nb-NO" dirty="0">
+                <a:latin typeface="Arial" panose="020B0604020202020204" pitchFamily="34" charset="0"/>
+                <a:cs typeface="Arial" panose="020B0604020202020204" pitchFamily="34" charset="0"/>
+              </a:rPr>
+              <a:t>mission_total: Integer, default = 10</a:t>
+            </a:r>
+          </a:p>
+          <a:p>
+            <a:r>
+              <a:rPr lang="nb-NO" dirty="0">
+                <a:latin typeface="Arial" panose="020B0604020202020204" pitchFamily="34" charset="0"/>
+                <a:cs typeface="Arial" panose="020B0604020202020204" pitchFamily="34" charset="0"/>
+              </a:rPr>
+              <a:t>planet: a one-to-one relationship between User and Planet, giving owner variable to Planet</a:t>
+            </a:r>
+          </a:p>
+          <a:p>
+            <a:r>
+              <a:rPr lang="nb-NO" dirty="0">
+                <a:latin typeface="Arial" panose="020B0604020202020204" pitchFamily="34" charset="0"/>
+                <a:cs typeface="Arial" panose="020B0604020202020204" pitchFamily="34" charset="0"/>
+              </a:rPr>
+              <a:t>planet_items: a one-to-many relationship between User and PlanetItems, giving owner variable to PlanetItem</a:t>
+            </a:r>
+          </a:p>
+          <a:p>
+            <a:r>
+              <a:rPr lang="nb-NO" dirty="0">
+                <a:latin typeface="Arial" panose="020B0604020202020204" pitchFamily="34" charset="0"/>
+                <a:cs typeface="Arial" panose="020B0604020202020204" pitchFamily="34" charset="0"/>
+              </a:rPr>
+              <a:t>visited/visitors: a many-to-many relationship between Users</a:t>
+            </a:r>
+          </a:p>
+          <a:p>
+            <a:r>
+              <a:rPr lang="nb-NO" dirty="0">
+                <a:latin typeface="Arial" panose="020B0604020202020204" pitchFamily="34" charset="0"/>
+                <a:cs typeface="Arial" panose="020B0604020202020204" pitchFamily="34" charset="0"/>
+              </a:rPr>
+              <a:t>cur1, cur2, cur3, vou2, vou3, lifetime_cur1, lifetime_cur2, lifetime_cur3: all Integers, all default = 0</a:t>
             </a:r>
           </a:p>
           <a:p>
@@ -7219,18 +7401,12 @@
               <a:cs typeface="Arial" panose="020B0604020202020204" pitchFamily="34" charset="0"/>
             </a:endParaRPr>
           </a:p>
-          <a:p>
-            <a:endParaRPr lang="nb-NO" dirty="0">
-              <a:latin typeface="Arial" panose="020B0604020202020204" pitchFamily="34" charset="0"/>
-              <a:cs typeface="Arial" panose="020B0604020202020204" pitchFamily="34" charset="0"/>
-            </a:endParaRPr>
-          </a:p>
         </p:txBody>
       </p:sp>
     </p:spTree>
     <p:extLst>
       <p:ext uri="{BB962C8B-B14F-4D97-AF65-F5344CB8AC3E}">
-        <p14:creationId xmlns:p14="http://schemas.microsoft.com/office/powerpoint/2010/main" val="1213547390"/>
+        <p14:creationId xmlns:p14="http://schemas.microsoft.com/office/powerpoint/2010/main" val="28240710"/>
       </p:ext>
     </p:extLst>
   </p:cSld>

</xml_diff>

<commit_message>
Shop Item Update, Powerpoint Update
</commit_message>
<xml_diff>
--- a/iu-spec-backend.pptx
+++ b/iu-spec-backend.pptx
@@ -18,20 +18,23 @@
     <p:sldId id="267" r:id="rId12"/>
     <p:sldId id="266" r:id="rId13"/>
     <p:sldId id="268" r:id="rId14"/>
-    <p:sldId id="269" r:id="rId15"/>
-    <p:sldId id="270" r:id="rId16"/>
-    <p:sldId id="271" r:id="rId17"/>
-    <p:sldId id="277" r:id="rId18"/>
-    <p:sldId id="279" r:id="rId19"/>
-    <p:sldId id="272" r:id="rId20"/>
-    <p:sldId id="273" r:id="rId21"/>
-    <p:sldId id="274" r:id="rId22"/>
-    <p:sldId id="275" r:id="rId23"/>
-    <p:sldId id="276" r:id="rId24"/>
-    <p:sldId id="278" r:id="rId25"/>
-    <p:sldId id="281" r:id="rId26"/>
-    <p:sldId id="280" r:id="rId27"/>
-    <p:sldId id="284" r:id="rId28"/>
+    <p:sldId id="286" r:id="rId15"/>
+    <p:sldId id="285" r:id="rId16"/>
+    <p:sldId id="269" r:id="rId17"/>
+    <p:sldId id="270" r:id="rId18"/>
+    <p:sldId id="271" r:id="rId19"/>
+    <p:sldId id="277" r:id="rId20"/>
+    <p:sldId id="279" r:id="rId21"/>
+    <p:sldId id="272" r:id="rId22"/>
+    <p:sldId id="273" r:id="rId23"/>
+    <p:sldId id="274" r:id="rId24"/>
+    <p:sldId id="275" r:id="rId25"/>
+    <p:sldId id="276" r:id="rId26"/>
+    <p:sldId id="287" r:id="rId27"/>
+    <p:sldId id="278" r:id="rId28"/>
+    <p:sldId id="281" r:id="rId29"/>
+    <p:sldId id="280" r:id="rId30"/>
+    <p:sldId id="284" r:id="rId31"/>
   </p:sldIdLst>
   <p:sldSz cx="12192000" cy="6858000"/>
   <p:notesSz cx="6858000" cy="9144000"/>
@@ -285,7 +288,7 @@
           <a:p>
             <a:fld id="{CB54544B-930A-4C71-864D-1F69A4B5B49D}" type="datetimeFigureOut">
               <a:rPr lang="en-US" smtClean="0"/>
-              <a:t>7/25/2018</a:t>
+              <a:t>8/6/2018</a:t>
             </a:fld>
             <a:endParaRPr lang="en-US"/>
           </a:p>
@@ -483,7 +486,7 @@
           <a:p>
             <a:fld id="{CB54544B-930A-4C71-864D-1F69A4B5B49D}" type="datetimeFigureOut">
               <a:rPr lang="en-US" smtClean="0"/>
-              <a:t>7/25/2018</a:t>
+              <a:t>8/6/2018</a:t>
             </a:fld>
             <a:endParaRPr lang="en-US"/>
           </a:p>
@@ -691,7 +694,7 @@
           <a:p>
             <a:fld id="{CB54544B-930A-4C71-864D-1F69A4B5B49D}" type="datetimeFigureOut">
               <a:rPr lang="en-US" smtClean="0"/>
-              <a:t>7/25/2018</a:t>
+              <a:t>8/6/2018</a:t>
             </a:fld>
             <a:endParaRPr lang="en-US"/>
           </a:p>
@@ -889,7 +892,7 @@
           <a:p>
             <a:fld id="{CB54544B-930A-4C71-864D-1F69A4B5B49D}" type="datetimeFigureOut">
               <a:rPr lang="en-US" smtClean="0"/>
-              <a:t>7/25/2018</a:t>
+              <a:t>8/6/2018</a:t>
             </a:fld>
             <a:endParaRPr lang="en-US"/>
           </a:p>
@@ -1164,7 +1167,7 @@
           <a:p>
             <a:fld id="{CB54544B-930A-4C71-864D-1F69A4B5B49D}" type="datetimeFigureOut">
               <a:rPr lang="en-US" smtClean="0"/>
-              <a:t>7/25/2018</a:t>
+              <a:t>8/6/2018</a:t>
             </a:fld>
             <a:endParaRPr lang="en-US"/>
           </a:p>
@@ -1429,7 +1432,7 @@
           <a:p>
             <a:fld id="{CB54544B-930A-4C71-864D-1F69A4B5B49D}" type="datetimeFigureOut">
               <a:rPr lang="en-US" smtClean="0"/>
-              <a:t>7/25/2018</a:t>
+              <a:t>8/6/2018</a:t>
             </a:fld>
             <a:endParaRPr lang="en-US"/>
           </a:p>
@@ -1841,7 +1844,7 @@
           <a:p>
             <a:fld id="{CB54544B-930A-4C71-864D-1F69A4B5B49D}" type="datetimeFigureOut">
               <a:rPr lang="en-US" smtClean="0"/>
-              <a:t>7/25/2018</a:t>
+              <a:t>8/6/2018</a:t>
             </a:fld>
             <a:endParaRPr lang="en-US"/>
           </a:p>
@@ -1982,7 +1985,7 @@
           <a:p>
             <a:fld id="{CB54544B-930A-4C71-864D-1F69A4B5B49D}" type="datetimeFigureOut">
               <a:rPr lang="en-US" smtClean="0"/>
-              <a:t>7/25/2018</a:t>
+              <a:t>8/6/2018</a:t>
             </a:fld>
             <a:endParaRPr lang="en-US"/>
           </a:p>
@@ -2095,7 +2098,7 @@
           <a:p>
             <a:fld id="{CB54544B-930A-4C71-864D-1F69A4B5B49D}" type="datetimeFigureOut">
               <a:rPr lang="en-US" smtClean="0"/>
-              <a:t>7/25/2018</a:t>
+              <a:t>8/6/2018</a:t>
             </a:fld>
             <a:endParaRPr lang="en-US"/>
           </a:p>
@@ -2406,7 +2409,7 @@
           <a:p>
             <a:fld id="{CB54544B-930A-4C71-864D-1F69A4B5B49D}" type="datetimeFigureOut">
               <a:rPr lang="en-US" smtClean="0"/>
-              <a:t>7/25/2018</a:t>
+              <a:t>8/6/2018</a:t>
             </a:fld>
             <a:endParaRPr lang="en-US"/>
           </a:p>
@@ -2694,7 +2697,7 @@
           <a:p>
             <a:fld id="{CB54544B-930A-4C71-864D-1F69A4B5B49D}" type="datetimeFigureOut">
               <a:rPr lang="en-US" smtClean="0"/>
-              <a:t>7/25/2018</a:t>
+              <a:t>8/6/2018</a:t>
             </a:fld>
             <a:endParaRPr lang="en-US"/>
           </a:p>
@@ -2935,7 +2938,7 @@
           <a:p>
             <a:fld id="{CB54544B-930A-4C71-864D-1F69A4B5B49D}" type="datetimeFigureOut">
               <a:rPr lang="en-US" smtClean="0"/>
-              <a:t>7/25/2018</a:t>
+              <a:t>8/6/2018</a:t>
             </a:fld>
             <a:endParaRPr lang="en-US"/>
           </a:p>
@@ -3760,10 +3763,15 @@
             <p:ph idx="1"/>
           </p:nvPr>
         </p:nvSpPr>
-        <p:spPr/>
+        <p:spPr>
+          <a:xfrm>
+            <a:off x="838200" y="1825625"/>
+            <a:ext cx="10515600" cy="4821360"/>
+          </a:xfrm>
+        </p:spPr>
         <p:txBody>
           <a:bodyPr>
-            <a:normAutofit fontScale="92500" lnSpcReduction="20000"/>
+            <a:normAutofit fontScale="92500" lnSpcReduction="10000"/>
           </a:bodyPr>
           <a:lstStyle/>
           <a:p>
@@ -4054,12 +4062,16 @@
           <a:lstStyle/>
           <a:p>
             <a:r>
-              <a:rPr lang="en-US" dirty="0">
-                <a:latin typeface="Arial" panose="020B0604020202020204" pitchFamily="34" charset="0"/>
-                <a:cs typeface="Arial" panose="020B0604020202020204" pitchFamily="34" charset="0"/>
-              </a:rPr>
-              <a:t>Status</a:t>
-            </a:r>
+              <a:rPr lang="en-US" dirty="0" err="1">
+                <a:latin typeface="Arial" panose="020B0604020202020204" pitchFamily="34" charset="0"/>
+                <a:cs typeface="Arial" panose="020B0604020202020204" pitchFamily="34" charset="0"/>
+              </a:rPr>
+              <a:t>PlanetItem</a:t>
+            </a:r>
+            <a:endParaRPr lang="en-US" dirty="0">
+              <a:latin typeface="Arial" panose="020B0604020202020204" pitchFamily="34" charset="0"/>
+              <a:cs typeface="Arial" panose="020B0604020202020204" pitchFamily="34" charset="0"/>
+            </a:endParaRPr>
           </a:p>
         </p:txBody>
       </p:sp>
@@ -4085,24 +4097,48 @@
                 <a:latin typeface="Arial" panose="020B0604020202020204" pitchFamily="34" charset="0"/>
                 <a:cs typeface="Arial" panose="020B0604020202020204" pitchFamily="34" charset="0"/>
               </a:rPr>
-              <a:t>event: Boolean that keeps track of whether or not an event is taking place</a:t>
-            </a:r>
-          </a:p>
-          <a:p>
-            <a:r>
-              <a:rPr lang="nb-NO" dirty="0">
-                <a:latin typeface="Arial" panose="020B0604020202020204" pitchFamily="34" charset="0"/>
-                <a:cs typeface="Arial" panose="020B0604020202020204" pitchFamily="34" charset="0"/>
-              </a:rPr>
-              <a:t>news: String(256) that displays on login</a:t>
-            </a:r>
+              <a:t>owner_id: links to User from User-PlanetItem relation</a:t>
+            </a:r>
+          </a:p>
+          <a:p>
+            <a:r>
+              <a:rPr lang="nb-NO" dirty="0">
+                <a:latin typeface="Arial" panose="020B0604020202020204" pitchFamily="34" charset="0"/>
+                <a:cs typeface="Arial" panose="020B0604020202020204" pitchFamily="34" charset="0"/>
+              </a:rPr>
+              <a:t>catalog_owner_id: links to CatalogItem from CatalogItem-PlanetItem relation</a:t>
+            </a:r>
+          </a:p>
+          <a:p>
+            <a:r>
+              <a:rPr lang="nb-NO" dirty="0">
+                <a:latin typeface="Arial" panose="020B0604020202020204" pitchFamily="34" charset="0"/>
+                <a:cs typeface="Arial" panose="020B0604020202020204" pitchFamily="34" charset="0"/>
+              </a:rPr>
+              <a:t>x: Integer</a:t>
+            </a:r>
+          </a:p>
+          <a:p>
+            <a:r>
+              <a:rPr lang="nb-NO" dirty="0">
+                <a:latin typeface="Arial" panose="020B0604020202020204" pitchFamily="34" charset="0"/>
+                <a:cs typeface="Arial" panose="020B0604020202020204" pitchFamily="34" charset="0"/>
+              </a:rPr>
+              <a:t>y: Integer</a:t>
+            </a:r>
+          </a:p>
+          <a:p>
+            <a:endParaRPr lang="nb-NO" dirty="0">
+              <a:latin typeface="Arial" panose="020B0604020202020204" pitchFamily="34" charset="0"/>
+              <a:cs typeface="Arial" panose="020B0604020202020204" pitchFamily="34" charset="0"/>
+            </a:endParaRPr>
           </a:p>
         </p:txBody>
       </p:sp>
     </p:spTree>
     <p:extLst>
       <p:ext uri="{BB962C8B-B14F-4D97-AF65-F5344CB8AC3E}">
-        <p14:creationId xmlns:p14="http://schemas.microsoft.com/office/powerpoint/2010/main" val="2941787461"/>
+        <p14:creationId xmlns:p14="http://schemas.microsoft.com/office/powerpoint/2010/main" val="412844008"/>
       </p:ext>
     </p:extLst>
   </p:cSld>
@@ -4141,7 +4177,7 @@
         </p:nvSpPr>
         <p:spPr>
           <a:xfrm>
-            <a:off x="900087" y="1734160"/>
+            <a:off x="838200" y="365125"/>
             <a:ext cx="10515600" cy="1325563"/>
           </a:xfrm>
         </p:spPr>
@@ -4149,13 +4185,12 @@
           <a:bodyPr/>
           <a:lstStyle/>
           <a:p>
-            <a:pPr algn="ctr"/>
-            <a:r>
-              <a:rPr lang="en-US" sz="8000" dirty="0">
-                <a:latin typeface="Arial" panose="020B0604020202020204" pitchFamily="34" charset="0"/>
-                <a:cs typeface="Arial" panose="020B0604020202020204" pitchFamily="34" charset="0"/>
-              </a:rPr>
-              <a:t>HTTP Methods</a:t>
+            <a:r>
+              <a:rPr lang="en-US" dirty="0" err="1">
+                <a:latin typeface="Arial" panose="020B0604020202020204" pitchFamily="34" charset="0"/>
+                <a:cs typeface="Arial" panose="020B0604020202020204" pitchFamily="34" charset="0"/>
+              </a:rPr>
+              <a:t>ChatItem</a:t>
             </a:r>
             <a:endParaRPr lang="en-US" dirty="0">
               <a:latin typeface="Arial" panose="020B0604020202020204" pitchFamily="34" charset="0"/>
@@ -4166,13 +4201,7 @@
       </p:sp>
       <p:sp>
         <p:nvSpPr>
-          <p:cNvPr id="3" name="Content Placeholder 2">
-            <a:extLst>
-              <a:ext uri="{FF2B5EF4-FFF2-40B4-BE49-F238E27FC236}">
-                <a16:creationId xmlns:a16="http://schemas.microsoft.com/office/drawing/2014/main" id="{BE3FB728-F36C-4A19-84C0-7B717486095B}"/>
-              </a:ext>
-            </a:extLst>
-          </p:cNvPr>
+          <p:cNvPr id="3" name="Content Placeholder 2"/>
           <p:cNvSpPr>
             <a:spLocks noGrp="1"/>
           </p:cNvSpPr>
@@ -4180,50 +4209,51 @@
             <p:ph idx="1"/>
           </p:nvPr>
         </p:nvSpPr>
-        <p:spPr>
-          <a:xfrm>
-            <a:off x="838200" y="3798277"/>
-            <a:ext cx="10515600" cy="2378686"/>
-          </a:xfrm>
-        </p:spPr>
+        <p:spPr/>
         <p:txBody>
           <a:bodyPr>
             <a:normAutofit/>
           </a:bodyPr>
           <a:lstStyle/>
           <a:p>
-            <a:pPr marL="0" indent="0" algn="ctr">
-              <a:buNone/>
-            </a:pPr>
-            <a:r>
-              <a:rPr lang="nb-NO" dirty="0">
-                <a:latin typeface="Arial" panose="020B0604020202020204" pitchFamily="34" charset="0"/>
-                <a:cs typeface="Arial" panose="020B0604020202020204" pitchFamily="34" charset="0"/>
-              </a:rPr>
-              <a:t>Small note: if an HTTP method requires JSON data to be passed in, a request should have a Content-Type: application/json header. See </a:t>
-            </a:r>
-            <a:r>
-              <a:rPr lang="nb-NO" dirty="0">
-                <a:latin typeface="Arial" panose="020B0604020202020204" pitchFamily="34" charset="0"/>
-                <a:cs typeface="Arial" panose="020B0604020202020204" pitchFamily="34" charset="0"/>
-                <a:hlinkClick r:id="rId2"/>
-              </a:rPr>
-              <a:t>https://stackoverflow.com/questions/44959749/fetch-with-headers</a:t>
-            </a:r>
-            <a:r>
-              <a:rPr lang="nb-NO" dirty="0">
-                <a:latin typeface="Arial" panose="020B0604020202020204" pitchFamily="34" charset="0"/>
-                <a:cs typeface="Arial" panose="020B0604020202020204" pitchFamily="34" charset="0"/>
-              </a:rPr>
-              <a:t> for an example.</a:t>
-            </a:r>
+            <a:r>
+              <a:rPr lang="nb-NO" dirty="0">
+                <a:latin typeface="Arial" panose="020B0604020202020204" pitchFamily="34" charset="0"/>
+                <a:cs typeface="Arial" panose="020B0604020202020204" pitchFamily="34" charset="0"/>
+              </a:rPr>
+              <a:t>itemType: Integer</a:t>
+            </a:r>
+          </a:p>
+          <a:p>
+            <a:r>
+              <a:rPr lang="nb-NO" dirty="0">
+                <a:latin typeface="Arial" panose="020B0604020202020204" pitchFamily="34" charset="0"/>
+                <a:cs typeface="Arial" panose="020B0604020202020204" pitchFamily="34" charset="0"/>
+              </a:rPr>
+              <a:t>string: String(16)</a:t>
+            </a:r>
+          </a:p>
+          <a:p>
+            <a:r>
+              <a:rPr lang="nb-NO" dirty="0">
+                <a:latin typeface="Arial" panose="020B0604020202020204" pitchFamily="34" charset="0"/>
+                <a:cs typeface="Arial" panose="020B0604020202020204" pitchFamily="34" charset="0"/>
+              </a:rPr>
+              <a:t>cost1, cost2, cost3 are all Integers</a:t>
+            </a:r>
+          </a:p>
+          <a:p>
+            <a:endParaRPr lang="nb-NO" dirty="0">
+              <a:latin typeface="Arial" panose="020B0604020202020204" pitchFamily="34" charset="0"/>
+              <a:cs typeface="Arial" panose="020B0604020202020204" pitchFamily="34" charset="0"/>
+            </a:endParaRPr>
           </a:p>
         </p:txBody>
       </p:sp>
     </p:spTree>
     <p:extLst>
       <p:ext uri="{BB962C8B-B14F-4D97-AF65-F5344CB8AC3E}">
-        <p14:creationId xmlns:p14="http://schemas.microsoft.com/office/powerpoint/2010/main" val="4062299613"/>
+        <p14:creationId xmlns:p14="http://schemas.microsoft.com/office/powerpoint/2010/main" val="1099134368"/>
       </p:ext>
     </p:extLst>
   </p:cSld>
@@ -4275,7 +4305,7 @@
                 <a:latin typeface="Arial" panose="020B0604020202020204" pitchFamily="34" charset="0"/>
                 <a:cs typeface="Arial" panose="020B0604020202020204" pitchFamily="34" charset="0"/>
               </a:rPr>
-              <a:t>/login</a:t>
+              <a:t>Status</a:t>
             </a:r>
           </a:p>
         </p:txBody>
@@ -4302,39 +4332,24 @@
                 <a:latin typeface="Arial" panose="020B0604020202020204" pitchFamily="34" charset="0"/>
                 <a:cs typeface="Arial" panose="020B0604020202020204" pitchFamily="34" charset="0"/>
               </a:rPr>
-              <a:t>POST json w/ "username", "password_hash", "email" to users and the user will be added to the database, returns json with «status»: «ok» or «error», and «user_id» if successful</a:t>
-            </a:r>
-          </a:p>
-          <a:p>
-            <a:r>
-              <a:rPr lang="nb-NO" dirty="0">
-                <a:latin typeface="Arial" panose="020B0604020202020204" pitchFamily="34" charset="0"/>
-                <a:cs typeface="Arial" panose="020B0604020202020204" pitchFamily="34" charset="0"/>
-              </a:rPr>
-              <a:t>GET method w/ params «username» and «password_hash» will return «status»: «ok» or «error» based on whether or not the login attempt was successful, and «user_id» if successful</a:t>
-            </a:r>
-          </a:p>
-          <a:p>
-            <a:r>
-              <a:rPr lang="nb-NO" dirty="0">
-                <a:latin typeface="Arial" panose="020B0604020202020204" pitchFamily="34" charset="0"/>
-                <a:cs typeface="Arial" panose="020B0604020202020204" pitchFamily="34" charset="0"/>
-              </a:rPr>
-              <a:t>DELETE method w/ params «username» will logout the current user, returning «status»: «ok» or «error»</a:t>
-            </a:r>
-          </a:p>
-          <a:p>
-            <a:endParaRPr lang="nb-NO" dirty="0">
-              <a:latin typeface="Arial" panose="020B0604020202020204" pitchFamily="34" charset="0"/>
-              <a:cs typeface="Arial" panose="020B0604020202020204" pitchFamily="34" charset="0"/>
-            </a:endParaRPr>
+              <a:t>event: Boolean that keeps track of whether or not an event is taking place</a:t>
+            </a:r>
+          </a:p>
+          <a:p>
+            <a:r>
+              <a:rPr lang="nb-NO" dirty="0">
+                <a:latin typeface="Arial" panose="020B0604020202020204" pitchFamily="34" charset="0"/>
+                <a:cs typeface="Arial" panose="020B0604020202020204" pitchFamily="34" charset="0"/>
+              </a:rPr>
+              <a:t>news: String(256) that displays on login</a:t>
+            </a:r>
           </a:p>
         </p:txBody>
       </p:sp>
     </p:spTree>
     <p:extLst>
       <p:ext uri="{BB962C8B-B14F-4D97-AF65-F5344CB8AC3E}">
-        <p14:creationId xmlns:p14="http://schemas.microsoft.com/office/powerpoint/2010/main" val="199329726"/>
+        <p14:creationId xmlns:p14="http://schemas.microsoft.com/office/powerpoint/2010/main" val="2941787461"/>
       </p:ext>
     </p:extLst>
   </p:cSld>
@@ -4373,7 +4388,7 @@
         </p:nvSpPr>
         <p:spPr>
           <a:xfrm>
-            <a:off x="838200" y="365125"/>
+            <a:off x="900087" y="1734160"/>
             <a:ext cx="10515600" cy="1325563"/>
           </a:xfrm>
         </p:spPr>
@@ -4381,19 +4396,30 @@
           <a:bodyPr/>
           <a:lstStyle/>
           <a:p>
-            <a:r>
-              <a:rPr lang="en-US" dirty="0">
-                <a:latin typeface="Arial" panose="020B0604020202020204" pitchFamily="34" charset="0"/>
-                <a:cs typeface="Arial" panose="020B0604020202020204" pitchFamily="34" charset="0"/>
-              </a:rPr>
-              <a:t>/users</a:t>
-            </a:r>
-          </a:p>
-        </p:txBody>
-      </p:sp>
-      <p:sp>
-        <p:nvSpPr>
-          <p:cNvPr id="3" name="Content Placeholder 2"/>
+            <a:pPr algn="ctr"/>
+            <a:r>
+              <a:rPr lang="en-US" sz="8000" dirty="0">
+                <a:latin typeface="Arial" panose="020B0604020202020204" pitchFamily="34" charset="0"/>
+                <a:cs typeface="Arial" panose="020B0604020202020204" pitchFamily="34" charset="0"/>
+              </a:rPr>
+              <a:t>HTTP Methods</a:t>
+            </a:r>
+            <a:endParaRPr lang="en-US" dirty="0">
+              <a:latin typeface="Arial" panose="020B0604020202020204" pitchFamily="34" charset="0"/>
+              <a:cs typeface="Arial" panose="020B0604020202020204" pitchFamily="34" charset="0"/>
+            </a:endParaRPr>
+          </a:p>
+        </p:txBody>
+      </p:sp>
+      <p:sp>
+        <p:nvSpPr>
+          <p:cNvPr id="3" name="Content Placeholder 2">
+            <a:extLst>
+              <a:ext uri="{FF2B5EF4-FFF2-40B4-BE49-F238E27FC236}">
+                <a16:creationId xmlns:a16="http://schemas.microsoft.com/office/drawing/2014/main" id="{BE3FB728-F36C-4A19-84C0-7B717486095B}"/>
+              </a:ext>
+            </a:extLst>
+          </p:cNvPr>
           <p:cNvSpPr>
             <a:spLocks noGrp="1"/>
           </p:cNvSpPr>
@@ -4401,57 +4427,50 @@
             <p:ph idx="1"/>
           </p:nvPr>
         </p:nvSpPr>
-        <p:spPr/>
+        <p:spPr>
+          <a:xfrm>
+            <a:off x="838200" y="3798277"/>
+            <a:ext cx="10515600" cy="2378686"/>
+          </a:xfrm>
+        </p:spPr>
         <p:txBody>
           <a:bodyPr>
             <a:normAutofit/>
           </a:bodyPr>
           <a:lstStyle/>
           <a:p>
-            <a:r>
-              <a:rPr lang="nb-NO" dirty="0">
-                <a:latin typeface="Arial" panose="020B0604020202020204" pitchFamily="34" charset="0"/>
-                <a:cs typeface="Arial" panose="020B0604020202020204" pitchFamily="34" charset="0"/>
-              </a:rPr>
-              <a:t>GET method w/ params «user_id» and returns json of username, email, name, login_days, last_login, planet_id, chat_color, and alien</a:t>
-            </a:r>
-          </a:p>
-          <a:p>
-            <a:r>
-              <a:rPr lang="nb-NO" dirty="0">
-                <a:latin typeface="Arial" panose="020B0604020202020204" pitchFamily="34" charset="0"/>
-                <a:cs typeface="Arial" panose="020B0604020202020204" pitchFamily="34" charset="0"/>
-              </a:rPr>
-              <a:t>PATCH method w/ params «user_id» and nothing else will update last_login, and if the new last_login is on a different day, increases login_days by 1 and returns json with «new_day»: true, otherwise returns «new_day»: false, and regardless also returns login_days</a:t>
-            </a:r>
-          </a:p>
-          <a:p>
-            <a:r>
-              <a:rPr lang="nb-NO" dirty="0">
-                <a:latin typeface="Arial" panose="020B0604020202020204" pitchFamily="34" charset="0"/>
-                <a:cs typeface="Arial" panose="020B0604020202020204" pitchFamily="34" charset="0"/>
-              </a:rPr>
-              <a:t>PATCH method w/ params «user_id» and «chat_color» or «alien» or «rocket» will update that value</a:t>
-            </a:r>
-          </a:p>
-          <a:p>
-            <a:endParaRPr lang="nb-NO" dirty="0">
-              <a:latin typeface="Arial" panose="020B0604020202020204" pitchFamily="34" charset="0"/>
-              <a:cs typeface="Arial" panose="020B0604020202020204" pitchFamily="34" charset="0"/>
-            </a:endParaRPr>
-          </a:p>
-          <a:p>
-            <a:endParaRPr lang="nb-NO" dirty="0">
-              <a:latin typeface="Arial" panose="020B0604020202020204" pitchFamily="34" charset="0"/>
-              <a:cs typeface="Arial" panose="020B0604020202020204" pitchFamily="34" charset="0"/>
-            </a:endParaRPr>
+            <a:pPr marL="0" indent="0" algn="ctr">
+              <a:buNone/>
+            </a:pPr>
+            <a:r>
+              <a:rPr lang="nb-NO" dirty="0">
+                <a:latin typeface="Arial" panose="020B0604020202020204" pitchFamily="34" charset="0"/>
+                <a:cs typeface="Arial" panose="020B0604020202020204" pitchFamily="34" charset="0"/>
+              </a:rPr>
+              <a:t>Small note: if an HTTP method requires JSON data to be passed in, a request should have a Content-Type: application/json header. See </a:t>
+            </a:r>
+            <a:r>
+              <a:rPr lang="nb-NO" dirty="0">
+                <a:latin typeface="Arial" panose="020B0604020202020204" pitchFamily="34" charset="0"/>
+                <a:cs typeface="Arial" panose="020B0604020202020204" pitchFamily="34" charset="0"/>
+                <a:hlinkClick r:id="rId2"/>
+              </a:rPr>
+              <a:t>https://stackoverflow.com/questions/44959749/fetch-with-headers</a:t>
+            </a:r>
+            <a:r>
+              <a:rPr lang="nb-NO" dirty="0">
+                <a:latin typeface="Arial" panose="020B0604020202020204" pitchFamily="34" charset="0"/>
+                <a:cs typeface="Arial" panose="020B0604020202020204" pitchFamily="34" charset="0"/>
+              </a:rPr>
+              <a:t> for an example.</a:t>
+            </a:r>
           </a:p>
         </p:txBody>
       </p:sp>
     </p:spTree>
     <p:extLst>
       <p:ext uri="{BB962C8B-B14F-4D97-AF65-F5344CB8AC3E}">
-        <p14:creationId xmlns:p14="http://schemas.microsoft.com/office/powerpoint/2010/main" val="696820992"/>
+        <p14:creationId xmlns:p14="http://schemas.microsoft.com/office/powerpoint/2010/main" val="4062299613"/>
       </p:ext>
     </p:extLst>
   </p:cSld>
@@ -4503,7 +4522,7 @@
                 <a:latin typeface="Arial" panose="020B0604020202020204" pitchFamily="34" charset="0"/>
                 <a:cs typeface="Arial" panose="020B0604020202020204" pitchFamily="34" charset="0"/>
               </a:rPr>
-              <a:t>/visitors</a:t>
+              <a:t>/login</a:t>
             </a:r>
           </a:p>
         </p:txBody>
@@ -4521,7 +4540,7 @@
         <p:spPr/>
         <p:txBody>
           <a:bodyPr>
-            <a:normAutofit fontScale="55000" lnSpcReduction="20000"/>
+            <a:normAutofit/>
           </a:bodyPr>
           <a:lstStyle/>
           <a:p>
@@ -4530,163 +4549,28 @@
                 <a:latin typeface="Arial" panose="020B0604020202020204" pitchFamily="34" charset="0"/>
                 <a:cs typeface="Arial" panose="020B0604020202020204" pitchFamily="34" charset="0"/>
               </a:rPr>
-              <a:t>POST method w/ params «visitor_id» and «visited_id» adds a relationship between the Users</a:t>
-            </a:r>
-          </a:p>
-          <a:p>
-            <a:r>
-              <a:rPr lang="nb-NO" dirty="0">
-                <a:latin typeface="Arial" panose="020B0604020202020204" pitchFamily="34" charset="0"/>
-                <a:cs typeface="Arial" panose="020B0604020202020204" pitchFamily="34" charset="0"/>
-              </a:rPr>
-              <a:t>GET method w/ params «user_id» returns json that contains each user_id they’ve visited</a:t>
-            </a:r>
-          </a:p>
-          <a:p>
-            <a:r>
-              <a:rPr lang="nb-NO" dirty="0">
-                <a:latin typeface="Arial" panose="020B0604020202020204" pitchFamily="34" charset="0"/>
-                <a:cs typeface="Arial" panose="020B0604020202020204" pitchFamily="34" charset="0"/>
-              </a:rPr>
-              <a:t>DELETE method w/ params «user_id» takes note that that user has updated their planet, and removes all relationships where visited is the user</a:t>
-            </a:r>
-          </a:p>
-          <a:p>
-            <a:pPr marL="0" indent="0">
-              <a:buNone/>
-            </a:pPr>
-            <a:r>
-              <a:rPr lang="nb-NO" dirty="0">
-                <a:latin typeface="Arial" panose="020B0604020202020204" pitchFamily="34" charset="0"/>
-                <a:cs typeface="Arial" panose="020B0604020202020204" pitchFamily="34" charset="0"/>
-              </a:rPr>
-              <a:t>{</a:t>
-            </a:r>
-          </a:p>
-          <a:p>
-            <a:pPr marL="0" indent="0">
-              <a:buNone/>
-            </a:pPr>
-            <a:r>
-              <a:rPr lang="nb-NO" dirty="0">
-                <a:latin typeface="Arial" panose="020B0604020202020204" pitchFamily="34" charset="0"/>
-                <a:cs typeface="Arial" panose="020B0604020202020204" pitchFamily="34" charset="0"/>
-              </a:rPr>
-              <a:t>«results»:</a:t>
-            </a:r>
-          </a:p>
-          <a:p>
-            <a:pPr marL="0" indent="0">
-              <a:buNone/>
-            </a:pPr>
-            <a:r>
-              <a:rPr lang="nb-NO" dirty="0">
-                <a:latin typeface="Arial" panose="020B0604020202020204" pitchFamily="34" charset="0"/>
-                <a:cs typeface="Arial" panose="020B0604020202020204" pitchFamily="34" charset="0"/>
-              </a:rPr>
-              <a:t>	[</a:t>
-            </a:r>
-          </a:p>
-          <a:p>
-            <a:pPr marL="0" indent="0">
-              <a:buNone/>
-            </a:pPr>
-            <a:r>
-              <a:rPr lang="nb-NO" dirty="0">
-                <a:latin typeface="Arial" panose="020B0604020202020204" pitchFamily="34" charset="0"/>
-                <a:cs typeface="Arial" panose="020B0604020202020204" pitchFamily="34" charset="0"/>
-              </a:rPr>
-              <a:t>		{</a:t>
-            </a:r>
-          </a:p>
-          <a:p>
-            <a:pPr marL="0" indent="0">
-              <a:buNone/>
-            </a:pPr>
-            <a:r>
-              <a:rPr lang="nb-NO" dirty="0">
-                <a:latin typeface="Arial" panose="020B0604020202020204" pitchFamily="34" charset="0"/>
-                <a:cs typeface="Arial" panose="020B0604020202020204" pitchFamily="34" charset="0"/>
-              </a:rPr>
-              <a:t>			«id»: 9</a:t>
-            </a:r>
-          </a:p>
-          <a:p>
-            <a:pPr marL="0" indent="0">
-              <a:buNone/>
-            </a:pPr>
-            <a:r>
-              <a:rPr lang="nb-NO" dirty="0">
-                <a:latin typeface="Arial" panose="020B0604020202020204" pitchFamily="34" charset="0"/>
-                <a:cs typeface="Arial" panose="020B0604020202020204" pitchFamily="34" charset="0"/>
-              </a:rPr>
-              <a:t>		},</a:t>
-            </a:r>
-          </a:p>
-          <a:p>
-            <a:pPr marL="0" indent="0">
-              <a:buNone/>
-            </a:pPr>
-            <a:r>
-              <a:rPr lang="nb-NO" dirty="0">
-                <a:latin typeface="Arial" panose="020B0604020202020204" pitchFamily="34" charset="0"/>
-                <a:cs typeface="Arial" panose="020B0604020202020204" pitchFamily="34" charset="0"/>
-              </a:rPr>
-              <a:t>		{</a:t>
-            </a:r>
-          </a:p>
-          <a:p>
-            <a:pPr marL="0" indent="0">
-              <a:buNone/>
-            </a:pPr>
-            <a:r>
-              <a:rPr lang="nb-NO" dirty="0">
-                <a:latin typeface="Arial" panose="020B0604020202020204" pitchFamily="34" charset="0"/>
-                <a:cs typeface="Arial" panose="020B0604020202020204" pitchFamily="34" charset="0"/>
-              </a:rPr>
-              <a:t>			«id»: 10</a:t>
-            </a:r>
-          </a:p>
-          <a:p>
-            <a:pPr marL="0" indent="0">
-              <a:buNone/>
-            </a:pPr>
-            <a:r>
-              <a:rPr lang="nb-NO" dirty="0">
-                <a:latin typeface="Arial" panose="020B0604020202020204" pitchFamily="34" charset="0"/>
-                <a:cs typeface="Arial" panose="020B0604020202020204" pitchFamily="34" charset="0"/>
-              </a:rPr>
-              <a:t>		}</a:t>
-            </a:r>
-          </a:p>
-          <a:p>
-            <a:pPr marL="0" indent="0">
-              <a:buNone/>
-            </a:pPr>
-            <a:r>
-              <a:rPr lang="nb-NO" dirty="0">
-                <a:latin typeface="Arial" panose="020B0604020202020204" pitchFamily="34" charset="0"/>
-                <a:cs typeface="Arial" panose="020B0604020202020204" pitchFamily="34" charset="0"/>
-              </a:rPr>
-              <a:t>	]</a:t>
-            </a:r>
-          </a:p>
-          <a:p>
-            <a:pPr marL="0" indent="0">
-              <a:buNone/>
-            </a:pPr>
-            <a:r>
-              <a:rPr lang="nb-NO" dirty="0">
-                <a:latin typeface="Arial" panose="020B0604020202020204" pitchFamily="34" charset="0"/>
-                <a:cs typeface="Arial" panose="020B0604020202020204" pitchFamily="34" charset="0"/>
-              </a:rPr>
-              <a:t>}</a:t>
-            </a:r>
-          </a:p>
-          <a:p>
-            <a:pPr marL="0" indent="0">
-              <a:buNone/>
-            </a:pPr>
+              <a:t>POST json w/ "username", "password_hash", "email" to users and the user will be added to the database, returns json with «status»: «ok» or «error», and «user_id» if successful</a:t>
+            </a:r>
+          </a:p>
+          <a:p>
+            <a:r>
+              <a:rPr lang="nb-NO" dirty="0">
+                <a:latin typeface="Arial" panose="020B0604020202020204" pitchFamily="34" charset="0"/>
+                <a:cs typeface="Arial" panose="020B0604020202020204" pitchFamily="34" charset="0"/>
+              </a:rPr>
+              <a:t>GET method w/ params «username» and «password_hash» will return «status»: «ok» or «error» based on whether or not the login attempt was successful, and «user_id» if successful</a:t>
+            </a:r>
+          </a:p>
+          <a:p>
+            <a:r>
+              <a:rPr lang="nb-NO" dirty="0">
+                <a:latin typeface="Arial" panose="020B0604020202020204" pitchFamily="34" charset="0"/>
+                <a:cs typeface="Arial" panose="020B0604020202020204" pitchFamily="34" charset="0"/>
+              </a:rPr>
+              <a:t>DELETE method w/ params «username» will logout the current user, returning «status»: «ok» or «error»</a:t>
+            </a:r>
+          </a:p>
+          <a:p>
             <a:endParaRPr lang="nb-NO" dirty="0">
               <a:latin typeface="Arial" panose="020B0604020202020204" pitchFamily="34" charset="0"/>
               <a:cs typeface="Arial" panose="020B0604020202020204" pitchFamily="34" charset="0"/>
@@ -4697,7 +4581,7 @@
     </p:spTree>
     <p:extLst>
       <p:ext uri="{BB962C8B-B14F-4D97-AF65-F5344CB8AC3E}">
-        <p14:creationId xmlns:p14="http://schemas.microsoft.com/office/powerpoint/2010/main" val="1092747602"/>
+        <p14:creationId xmlns:p14="http://schemas.microsoft.com/office/powerpoint/2010/main" val="199329726"/>
       </p:ext>
     </p:extLst>
   </p:cSld>
@@ -4749,7 +4633,7 @@
                 <a:latin typeface="Arial" panose="020B0604020202020204" pitchFamily="34" charset="0"/>
                 <a:cs typeface="Arial" panose="020B0604020202020204" pitchFamily="34" charset="0"/>
               </a:rPr>
-              <a:t>/galaxies</a:t>
+              <a:t>/users</a:t>
             </a:r>
           </a:p>
         </p:txBody>
@@ -4767,7 +4651,7 @@
         <p:spPr/>
         <p:txBody>
           <a:bodyPr>
-            <a:normAutofit fontScale="55000" lnSpcReduction="20000"/>
+            <a:normAutofit/>
           </a:bodyPr>
           <a:lstStyle/>
           <a:p>
@@ -4776,168 +4660,45 @@
                 <a:latin typeface="Arial" panose="020B0604020202020204" pitchFamily="34" charset="0"/>
                 <a:cs typeface="Arial" panose="020B0604020202020204" pitchFamily="34" charset="0"/>
               </a:rPr>
-              <a:t>GET method will return json that contains each Galaxy and its variables, for example:</a:t>
-            </a:r>
-          </a:p>
-          <a:p>
-            <a:pPr marL="0" indent="0">
-              <a:buNone/>
-            </a:pPr>
-            <a:r>
-              <a:rPr lang="nb-NO" dirty="0">
-                <a:latin typeface="Arial" panose="020B0604020202020204" pitchFamily="34" charset="0"/>
-                <a:cs typeface="Arial" panose="020B0604020202020204" pitchFamily="34" charset="0"/>
-              </a:rPr>
-              <a:t>{</a:t>
-            </a:r>
-          </a:p>
-          <a:p>
-            <a:pPr marL="0" indent="0">
-              <a:buNone/>
-            </a:pPr>
-            <a:r>
-              <a:rPr lang="nb-NO" dirty="0">
-                <a:latin typeface="Arial" panose="020B0604020202020204" pitchFamily="34" charset="0"/>
-                <a:cs typeface="Arial" panose="020B0604020202020204" pitchFamily="34" charset="0"/>
-              </a:rPr>
-              <a:t>«results»:</a:t>
-            </a:r>
-          </a:p>
-          <a:p>
-            <a:pPr marL="0" indent="0">
-              <a:buNone/>
-            </a:pPr>
-            <a:r>
-              <a:rPr lang="nb-NO" dirty="0">
-                <a:latin typeface="Arial" panose="020B0604020202020204" pitchFamily="34" charset="0"/>
-                <a:cs typeface="Arial" panose="020B0604020202020204" pitchFamily="34" charset="0"/>
-              </a:rPr>
-              <a:t>	[,</a:t>
-            </a:r>
-          </a:p>
-          <a:p>
-            <a:pPr marL="0" indent="0">
-              <a:buNone/>
-            </a:pPr>
-            <a:r>
-              <a:rPr lang="nb-NO" dirty="0">
-                <a:latin typeface="Arial" panose="020B0604020202020204" pitchFamily="34" charset="0"/>
-                <a:cs typeface="Arial" panose="020B0604020202020204" pitchFamily="34" charset="0"/>
-              </a:rPr>
-              <a:t>		{</a:t>
-            </a:r>
-          </a:p>
-          <a:p>
-            <a:pPr marL="0" indent="0">
-              <a:buNone/>
-            </a:pPr>
-            <a:r>
-              <a:rPr lang="nb-NO" dirty="0">
-                <a:latin typeface="Arial" panose="020B0604020202020204" pitchFamily="34" charset="0"/>
-                <a:cs typeface="Arial" panose="020B0604020202020204" pitchFamily="34" charset="0"/>
-              </a:rPr>
-              <a:t>			«id»: «0»,</a:t>
-            </a:r>
-          </a:p>
-          <a:p>
-            <a:pPr marL="0" indent="0">
-              <a:buNone/>
-            </a:pPr>
-            <a:r>
-              <a:rPr lang="nb-NO" dirty="0">
-                <a:latin typeface="Arial" panose="020B0604020202020204" pitchFamily="34" charset="0"/>
-                <a:cs typeface="Arial" panose="020B0604020202020204" pitchFamily="34" charset="0"/>
-              </a:rPr>
-              <a:t>			«name»: «Build-It-Yourself Galaxy»,</a:t>
-            </a:r>
-          </a:p>
-          <a:p>
-            <a:pPr marL="0" indent="0">
-              <a:buNone/>
-            </a:pPr>
-            <a:r>
-              <a:rPr lang="nb-NO" dirty="0">
-                <a:latin typeface="Arial" panose="020B0604020202020204" pitchFamily="34" charset="0"/>
-                <a:cs typeface="Arial" panose="020B0604020202020204" pitchFamily="34" charset="0"/>
-              </a:rPr>
-              <a:t>			«description»: «Where way cool inventors dwell.»,</a:t>
-            </a:r>
-          </a:p>
-          <a:p>
-            <a:pPr marL="0" indent="0">
-              <a:buNone/>
-            </a:pPr>
-            <a:r>
-              <a:rPr lang="nb-NO" dirty="0">
-                <a:latin typeface="Arial" panose="020B0604020202020204" pitchFamily="34" charset="0"/>
-                <a:cs typeface="Arial" panose="020B0604020202020204" pitchFamily="34" charset="0"/>
-              </a:rPr>
-              <a:t>			...</a:t>
-            </a:r>
-          </a:p>
-          <a:p>
-            <a:pPr marL="0" indent="0">
-              <a:buNone/>
-            </a:pPr>
-            <a:r>
-              <a:rPr lang="nb-NO" dirty="0">
-                <a:latin typeface="Arial" panose="020B0604020202020204" pitchFamily="34" charset="0"/>
-                <a:cs typeface="Arial" panose="020B0604020202020204" pitchFamily="34" charset="0"/>
-              </a:rPr>
-              <a:t>		},</a:t>
-            </a:r>
-          </a:p>
-          <a:p>
-            <a:pPr marL="0" indent="0">
-              <a:buNone/>
-            </a:pPr>
-            <a:r>
-              <a:rPr lang="nb-NO" dirty="0">
-                <a:latin typeface="Arial" panose="020B0604020202020204" pitchFamily="34" charset="0"/>
-                <a:cs typeface="Arial" panose="020B0604020202020204" pitchFamily="34" charset="0"/>
-              </a:rPr>
-              <a:t>		...</a:t>
-            </a:r>
-          </a:p>
-          <a:p>
-            <a:pPr marL="0" indent="0">
-              <a:buNone/>
-            </a:pPr>
-            <a:r>
-              <a:rPr lang="nb-NO" dirty="0">
-                <a:latin typeface="Arial" panose="020B0604020202020204" pitchFamily="34" charset="0"/>
-                <a:cs typeface="Arial" panose="020B0604020202020204" pitchFamily="34" charset="0"/>
-              </a:rPr>
-              <a:t>	]</a:t>
-            </a:r>
-          </a:p>
-          <a:p>
-            <a:pPr marL="0" indent="0">
-              <a:buNone/>
-            </a:pPr>
-            <a:r>
-              <a:rPr lang="nb-NO" dirty="0">
-                <a:latin typeface="Arial" panose="020B0604020202020204" pitchFamily="34" charset="0"/>
-                <a:cs typeface="Arial" panose="020B0604020202020204" pitchFamily="34" charset="0"/>
-              </a:rPr>
-              <a:t>}</a:t>
-            </a:r>
-          </a:p>
-          <a:p>
-            <a:r>
-              <a:rPr lang="nb-NO" dirty="0">
-                <a:latin typeface="Arial" panose="020B0604020202020204" pitchFamily="34" charset="0"/>
-                <a:cs typeface="Arial" panose="020B0604020202020204" pitchFamily="34" charset="0"/>
-              </a:rPr>
-              <a:t>POST method with json «name», «description», «x», «y», and «image» will create a galaxy</a:t>
-            </a:r>
+              <a:t>GET method w/ params «user_id» and returns json of username, email, name, login_days, last_login, planet_id, chat_color, and alien</a:t>
+            </a:r>
+          </a:p>
+          <a:p>
+            <a:r>
+              <a:rPr lang="nb-NO" dirty="0">
+                <a:latin typeface="Arial" panose="020B0604020202020204" pitchFamily="34" charset="0"/>
+                <a:cs typeface="Arial" panose="020B0604020202020204" pitchFamily="34" charset="0"/>
+              </a:rPr>
+              <a:t>PATCH method w/ params «user_id» and nothing else will update last_login, and if the new last_login is on a different day, increases login_days by 1 and returns json with «new_day»: true, otherwise returns «new_day»: false, and regardless also returns login_days</a:t>
+            </a:r>
+          </a:p>
+          <a:p>
+            <a:r>
+              <a:rPr lang="nb-NO" dirty="0">
+                <a:latin typeface="Arial" panose="020B0604020202020204" pitchFamily="34" charset="0"/>
+                <a:cs typeface="Arial" panose="020B0604020202020204" pitchFamily="34" charset="0"/>
+              </a:rPr>
+              <a:t>PATCH method w/ params «user_id» and «chat_color» or «alien» or «rocket» will update that value</a:t>
+            </a:r>
+          </a:p>
+          <a:p>
+            <a:endParaRPr lang="nb-NO" dirty="0">
+              <a:latin typeface="Arial" panose="020B0604020202020204" pitchFamily="34" charset="0"/>
+              <a:cs typeface="Arial" panose="020B0604020202020204" pitchFamily="34" charset="0"/>
+            </a:endParaRPr>
+          </a:p>
+          <a:p>
+            <a:endParaRPr lang="nb-NO" dirty="0">
+              <a:latin typeface="Arial" panose="020B0604020202020204" pitchFamily="34" charset="0"/>
+              <a:cs typeface="Arial" panose="020B0604020202020204" pitchFamily="34" charset="0"/>
+            </a:endParaRPr>
           </a:p>
         </p:txBody>
       </p:sp>
     </p:spTree>
     <p:extLst>
       <p:ext uri="{BB962C8B-B14F-4D97-AF65-F5344CB8AC3E}">
-        <p14:creationId xmlns:p14="http://schemas.microsoft.com/office/powerpoint/2010/main" val="1557958327"/>
+        <p14:creationId xmlns:p14="http://schemas.microsoft.com/office/powerpoint/2010/main" val="696820992"/>
       </p:ext>
     </p:extLst>
   </p:cSld>
@@ -5260,7 +5021,7 @@
                 <a:latin typeface="Arial" panose="020B0604020202020204" pitchFamily="34" charset="0"/>
                 <a:cs typeface="Arial" panose="020B0604020202020204" pitchFamily="34" charset="0"/>
               </a:rPr>
-              <a:t>/systems</a:t>
+              <a:t>/visitors</a:t>
             </a:r>
           </a:p>
         </p:txBody>
@@ -5287,7 +5048,25 @@
                 <a:latin typeface="Arial" panose="020B0604020202020204" pitchFamily="34" charset="0"/>
                 <a:cs typeface="Arial" panose="020B0604020202020204" pitchFamily="34" charset="0"/>
               </a:rPr>
-              <a:t>GET method with params «galaxy_id» will return json that contains each System and its variables, for example:</a:t>
+              <a:t>POST method w/ params «visitor_id» and «visited_id» adds a relationship between the Users</a:t>
+            </a:r>
+          </a:p>
+          <a:p>
+            <a:r>
+              <a:rPr lang="nb-NO" dirty="0">
+                <a:latin typeface="Arial" panose="020B0604020202020204" pitchFamily="34" charset="0"/>
+                <a:cs typeface="Arial" panose="020B0604020202020204" pitchFamily="34" charset="0"/>
+              </a:rPr>
+              <a:t>GET method w/ params «user_id» returns json that contains each user_id they’ve visited</a:t>
+            </a:r>
+          </a:p>
+          <a:p>
+            <a:r>
+              <a:rPr lang="nb-NO" dirty="0">
+                <a:latin typeface="Arial" panose="020B0604020202020204" pitchFamily="34" charset="0"/>
+                <a:cs typeface="Arial" panose="020B0604020202020204" pitchFamily="34" charset="0"/>
+              </a:rPr>
+              <a:t>DELETE method w/ params «user_id» takes note that that user has updated their planet, and removes all relationships where visited is the user</a:t>
             </a:r>
           </a:p>
           <a:p>
@@ -5347,43 +5126,7 @@
                 <a:latin typeface="Arial" panose="020B0604020202020204" pitchFamily="34" charset="0"/>
                 <a:cs typeface="Arial" panose="020B0604020202020204" pitchFamily="34" charset="0"/>
               </a:rPr>
-              <a:t>			«id»: «0»,</a:t>
-            </a:r>
-          </a:p>
-          <a:p>
-            <a:pPr marL="0" indent="0">
-              <a:buNone/>
-            </a:pPr>
-            <a:r>
-              <a:rPr lang="nb-NO" dirty="0">
-                <a:latin typeface="Arial" panose="020B0604020202020204" pitchFamily="34" charset="0"/>
-                <a:cs typeface="Arial" panose="020B0604020202020204" pitchFamily="34" charset="0"/>
-              </a:rPr>
-              <a:t>			«name»: «Solaris»,</a:t>
-            </a:r>
-          </a:p>
-          <a:p>
-            <a:pPr marL="0" indent="0">
-              <a:buNone/>
-            </a:pPr>
-            <a:r>
-              <a:rPr lang="nb-NO" dirty="0">
-                <a:latin typeface="Arial" panose="020B0604020202020204" pitchFamily="34" charset="0"/>
-                <a:cs typeface="Arial" panose="020B0604020202020204" pitchFamily="34" charset="0"/>
-              </a:rPr>
-              <a:t>			«quadrant»: «4»,</a:t>
-            </a:r>
-          </a:p>
-          <a:p>
-            <a:pPr marL="0" indent="0">
-              <a:buNone/>
-            </a:pPr>
-            <a:r>
-              <a:rPr lang="nb-NO" dirty="0">
-                <a:latin typeface="Arial" panose="020B0604020202020204" pitchFamily="34" charset="0"/>
-                <a:cs typeface="Arial" panose="020B0604020202020204" pitchFamily="34" charset="0"/>
-              </a:rPr>
-              <a:t>			...</a:t>
+              <a:t>			«id»: 9</a:t>
             </a:r>
           </a:p>
           <a:p>
@@ -5407,7 +5150,31 @@
                 <a:latin typeface="Arial" panose="020B0604020202020204" pitchFamily="34" charset="0"/>
                 <a:cs typeface="Arial" panose="020B0604020202020204" pitchFamily="34" charset="0"/>
               </a:rPr>
-              <a:t>		...</a:t>
+              <a:t>		{</a:t>
+            </a:r>
+          </a:p>
+          <a:p>
+            <a:pPr marL="0" indent="0">
+              <a:buNone/>
+            </a:pPr>
+            <a:r>
+              <a:rPr lang="nb-NO" dirty="0">
+                <a:latin typeface="Arial" panose="020B0604020202020204" pitchFamily="34" charset="0"/>
+                <a:cs typeface="Arial" panose="020B0604020202020204" pitchFamily="34" charset="0"/>
+              </a:rPr>
+              <a:t>			«id»: 10</a:t>
+            </a:r>
+          </a:p>
+          <a:p>
+            <a:pPr marL="0" indent="0">
+              <a:buNone/>
+            </a:pPr>
+            <a:r>
+              <a:rPr lang="nb-NO" dirty="0">
+                <a:latin typeface="Arial" panose="020B0604020202020204" pitchFamily="34" charset="0"/>
+                <a:cs typeface="Arial" panose="020B0604020202020204" pitchFamily="34" charset="0"/>
+              </a:rPr>
+              <a:t>		}</a:t>
             </a:r>
           </a:p>
           <a:p>
@@ -5435,24 +5202,9 @@
             </a:r>
           </a:p>
           <a:p>
-            <a:r>
-              <a:rPr lang="nb-NO" dirty="0">
-                <a:latin typeface="Arial" panose="020B0604020202020204" pitchFamily="34" charset="0"/>
-                <a:cs typeface="Arial" panose="020B0604020202020204" pitchFamily="34" charset="0"/>
-              </a:rPr>
-              <a:t>GET method with params «system_id» will return json with information on just that system and its variables</a:t>
-            </a:r>
-          </a:p>
-          <a:p>
-            <a:r>
-              <a:rPr lang="nb-NO" dirty="0">
-                <a:latin typeface="Arial" panose="020B0604020202020204" pitchFamily="34" charset="0"/>
-                <a:cs typeface="Arial" panose="020B0604020202020204" pitchFamily="34" charset="0"/>
-              </a:rPr>
-              <a:t>POST method with json «galaxy_id», «name», «quadrant», «x», «y», and «image» will create a system</a:t>
-            </a:r>
-          </a:p>
-          <a:p>
+            <a:pPr marL="0" indent="0">
+              <a:buNone/>
+            </a:pPr>
             <a:endParaRPr lang="nb-NO" dirty="0">
               <a:latin typeface="Arial" panose="020B0604020202020204" pitchFamily="34" charset="0"/>
               <a:cs typeface="Arial" panose="020B0604020202020204" pitchFamily="34" charset="0"/>
@@ -5463,7 +5215,7 @@
     </p:spTree>
     <p:extLst>
       <p:ext uri="{BB962C8B-B14F-4D97-AF65-F5344CB8AC3E}">
-        <p14:creationId xmlns:p14="http://schemas.microsoft.com/office/powerpoint/2010/main" val="254303226"/>
+        <p14:creationId xmlns:p14="http://schemas.microsoft.com/office/powerpoint/2010/main" val="1092747602"/>
       </p:ext>
     </p:extLst>
   </p:cSld>
@@ -5515,7 +5267,7 @@
                 <a:latin typeface="Arial" panose="020B0604020202020204" pitchFamily="34" charset="0"/>
                 <a:cs typeface="Arial" panose="020B0604020202020204" pitchFamily="34" charset="0"/>
               </a:rPr>
-              <a:t>/planets</a:t>
+              <a:t>/galaxies</a:t>
             </a:r>
           </a:p>
         </p:txBody>
@@ -5530,15 +5282,10 @@
             <p:ph idx="1"/>
           </p:nvPr>
         </p:nvSpPr>
-        <p:spPr>
-          <a:xfrm>
-            <a:off x="838200" y="1825625"/>
-            <a:ext cx="10515600" cy="4610686"/>
-          </a:xfrm>
-        </p:spPr>
+        <p:spPr/>
         <p:txBody>
           <a:bodyPr>
-            <a:normAutofit fontScale="47500" lnSpcReduction="20000"/>
+            <a:normAutofit fontScale="55000" lnSpcReduction="20000"/>
           </a:bodyPr>
           <a:lstStyle/>
           <a:p>
@@ -5547,7 +5294,7 @@
                 <a:latin typeface="Arial" panose="020B0604020202020204" pitchFamily="34" charset="0"/>
                 <a:cs typeface="Arial" panose="020B0604020202020204" pitchFamily="34" charset="0"/>
               </a:rPr>
-              <a:t>GET method with params «system_id» will return json that contains each Planet’s variables, for example:</a:t>
+              <a:t>GET method will return json that contains each Galaxy and its variables, for example:</a:t>
             </a:r>
           </a:p>
           <a:p>
@@ -5583,7 +5330,7 @@
                 <a:latin typeface="Arial" panose="020B0604020202020204" pitchFamily="34" charset="0"/>
                 <a:cs typeface="Arial" panose="020B0604020202020204" pitchFamily="34" charset="0"/>
               </a:rPr>
-              <a:t>	[</a:t>
+              <a:t>	[,</a:t>
             </a:r>
           </a:p>
           <a:p>
@@ -5619,19 +5366,19 @@
                 <a:latin typeface="Arial" panose="020B0604020202020204" pitchFamily="34" charset="0"/>
                 <a:cs typeface="Arial" panose="020B0604020202020204" pitchFamily="34" charset="0"/>
               </a:rPr>
-              <a:t>			«owner_id»: «6»,</a:t>
-            </a:r>
-          </a:p>
-          <a:p>
-            <a:pPr marL="0" indent="0">
-              <a:buNone/>
-            </a:pPr>
-            <a:r>
-              <a:rPr lang="nb-NO" dirty="0">
-                <a:latin typeface="Arial" panose="020B0604020202020204" pitchFamily="34" charset="0"/>
-                <a:cs typeface="Arial" panose="020B0604020202020204" pitchFamily="34" charset="0"/>
-              </a:rPr>
-              <a:t>			«order»: «0»,</a:t>
+              <a:t>			«name»: «Build-It-Yourself Galaxy»,</a:t>
+            </a:r>
+          </a:p>
+          <a:p>
+            <a:pPr marL="0" indent="0">
+              <a:buNone/>
+            </a:pPr>
+            <a:r>
+              <a:rPr lang="nb-NO" dirty="0">
+                <a:latin typeface="Arial" panose="020B0604020202020204" pitchFamily="34" charset="0"/>
+                <a:cs typeface="Arial" panose="020B0604020202020204" pitchFamily="34" charset="0"/>
+              </a:rPr>
+              <a:t>			«description»: «Where way cool inventors dwell.»,</a:t>
             </a:r>
           </a:p>
           <a:p>
@@ -5700,39 +5447,15 @@
                 <a:latin typeface="Arial" panose="020B0604020202020204" pitchFamily="34" charset="0"/>
                 <a:cs typeface="Arial" panose="020B0604020202020204" pitchFamily="34" charset="0"/>
               </a:rPr>
-              <a:t>GET method with params «user_id» or «planet_id» will return json that contains the Planet’s variables</a:t>
-            </a:r>
-          </a:p>
-          <a:p>
-            <a:r>
-              <a:rPr lang="nb-NO" dirty="0">
-                <a:latin typeface="Arial" panose="020B0604020202020204" pitchFamily="34" charset="0"/>
-                <a:cs typeface="Arial" panose="020B0604020202020204" pitchFamily="34" charset="0"/>
-              </a:rPr>
-              <a:t>PATCH method with json «planet_id», «name», and «user_id» will set the planet’s owner_id to that user_id and rename it in the db. If the user already has a planet, unlinks the old one and removes its name. If the planet already has an owner or the db call fails for some reason, returns json with «status»: «error», otherwise sends «status»: «ok»</a:t>
-            </a:r>
-          </a:p>
-          <a:p>
-            <a:r>
-              <a:rPr lang="nb-NO" dirty="0">
-                <a:latin typeface="Arial" panose="020B0604020202020204" pitchFamily="34" charset="0"/>
-                <a:cs typeface="Arial" panose="020B0604020202020204" pitchFamily="34" charset="0"/>
-              </a:rPr>
-              <a:t>POST method with json «system_id», «order», «size», «surface», and «image» will create a planet</a:t>
-            </a:r>
-          </a:p>
-          <a:p>
-            <a:endParaRPr lang="nb-NO" dirty="0">
-              <a:latin typeface="Arial" panose="020B0604020202020204" pitchFamily="34" charset="0"/>
-              <a:cs typeface="Arial" panose="020B0604020202020204" pitchFamily="34" charset="0"/>
-            </a:endParaRPr>
+              <a:t>POST method with json «name», «description», «x», «y», and «image» will create a galaxy</a:t>
+            </a:r>
           </a:p>
         </p:txBody>
       </p:sp>
     </p:spTree>
     <p:extLst>
       <p:ext uri="{BB962C8B-B14F-4D97-AF65-F5344CB8AC3E}">
-        <p14:creationId xmlns:p14="http://schemas.microsoft.com/office/powerpoint/2010/main" val="4061486045"/>
+        <p14:creationId xmlns:p14="http://schemas.microsoft.com/office/powerpoint/2010/main" val="1557958327"/>
       </p:ext>
     </p:extLst>
   </p:cSld>
@@ -5784,7 +5507,7 @@
                 <a:latin typeface="Arial" panose="020B0604020202020204" pitchFamily="34" charset="0"/>
                 <a:cs typeface="Arial" panose="020B0604020202020204" pitchFamily="34" charset="0"/>
               </a:rPr>
-              <a:t>/catalog</a:t>
+              <a:t>/systems</a:t>
             </a:r>
           </a:p>
         </p:txBody>
@@ -5802,7 +5525,7 @@
         <p:spPr/>
         <p:txBody>
           <a:bodyPr>
-            <a:normAutofit fontScale="47500" lnSpcReduction="20000"/>
+            <a:normAutofit fontScale="55000" lnSpcReduction="20000"/>
           </a:bodyPr>
           <a:lstStyle/>
           <a:p>
@@ -5811,7 +5534,7 @@
                 <a:latin typeface="Arial" panose="020B0604020202020204" pitchFamily="34" charset="0"/>
                 <a:cs typeface="Arial" panose="020B0604020202020204" pitchFamily="34" charset="0"/>
               </a:rPr>
-              <a:t>GET method with specified «catalog_id» returns the specified CatalogItem’s variables, the method without any params returns json that contains each CatalogItem there is and their variables, for example:</a:t>
+              <a:t>GET method with params «galaxy_id» will return json that contains each System and its variables, for example:</a:t>
             </a:r>
           </a:p>
           <a:p>
@@ -5883,19 +5606,19 @@
                 <a:latin typeface="Arial" panose="020B0604020202020204" pitchFamily="34" charset="0"/>
                 <a:cs typeface="Arial" panose="020B0604020202020204" pitchFamily="34" charset="0"/>
               </a:rPr>
-              <a:t>			«image»: «images/statue.png»,</a:t>
-            </a:r>
-          </a:p>
-          <a:p>
-            <a:pPr marL="0" indent="0">
-              <a:buNone/>
-            </a:pPr>
-            <a:r>
-              <a:rPr lang="nb-NO" dirty="0">
-                <a:latin typeface="Arial" panose="020B0604020202020204" pitchFamily="34" charset="0"/>
-                <a:cs typeface="Arial" panose="020B0604020202020204" pitchFamily="34" charset="0"/>
-              </a:rPr>
-              <a:t>			«available»: «true»,</a:t>
+              <a:t>			«name»: «Solaris»,</a:t>
+            </a:r>
+          </a:p>
+          <a:p>
+            <a:pPr marL="0" indent="0">
+              <a:buNone/>
+            </a:pPr>
+            <a:r>
+              <a:rPr lang="nb-NO" dirty="0">
+                <a:latin typeface="Arial" panose="020B0604020202020204" pitchFamily="34" charset="0"/>
+                <a:cs typeface="Arial" panose="020B0604020202020204" pitchFamily="34" charset="0"/>
+              </a:rPr>
+              <a:t>			«quadrant»: «4»,</a:t>
             </a:r>
           </a:p>
           <a:p>
@@ -5964,24 +5687,30 @@
                 <a:latin typeface="Arial" panose="020B0604020202020204" pitchFamily="34" charset="0"/>
                 <a:cs typeface="Arial" panose="020B0604020202020204" pitchFamily="34" charset="0"/>
               </a:rPr>
-              <a:t>POST method with json «name», «image», «event_specific», «available», «cost1», «cost2», and «cost3» will create a planet</a:t>
-            </a:r>
-          </a:p>
-          <a:p>
-            <a:r>
-              <a:rPr lang="nb-NO" dirty="0">
-                <a:latin typeface="Arial" panose="020B0604020202020204" pitchFamily="34" charset="0"/>
-                <a:cs typeface="Arial" panose="020B0604020202020204" pitchFamily="34" charset="0"/>
-              </a:rPr>
-              <a:t>PATCH method with the param «catalog_id» flips the value of the available variable</a:t>
-            </a:r>
+              <a:t>GET method with params «system_id» will return json with information on just that system and its variables</a:t>
+            </a:r>
+          </a:p>
+          <a:p>
+            <a:r>
+              <a:rPr lang="nb-NO" dirty="0">
+                <a:latin typeface="Arial" panose="020B0604020202020204" pitchFamily="34" charset="0"/>
+                <a:cs typeface="Arial" panose="020B0604020202020204" pitchFamily="34" charset="0"/>
+              </a:rPr>
+              <a:t>POST method with json «galaxy_id», «name», «quadrant», «x», «y», and «image» will create a system</a:t>
+            </a:r>
+          </a:p>
+          <a:p>
+            <a:endParaRPr lang="nb-NO" dirty="0">
+              <a:latin typeface="Arial" panose="020B0604020202020204" pitchFamily="34" charset="0"/>
+              <a:cs typeface="Arial" panose="020B0604020202020204" pitchFamily="34" charset="0"/>
+            </a:endParaRPr>
           </a:p>
         </p:txBody>
       </p:sp>
     </p:spTree>
     <p:extLst>
       <p:ext uri="{BB962C8B-B14F-4D97-AF65-F5344CB8AC3E}">
-        <p14:creationId xmlns:p14="http://schemas.microsoft.com/office/powerpoint/2010/main" val="4128414604"/>
+        <p14:creationId xmlns:p14="http://schemas.microsoft.com/office/powerpoint/2010/main" val="254303226"/>
       </p:ext>
     </p:extLst>
   </p:cSld>
@@ -6033,7 +5762,7 @@
                 <a:latin typeface="Arial" panose="020B0604020202020204" pitchFamily="34" charset="0"/>
                 <a:cs typeface="Arial" panose="020B0604020202020204" pitchFamily="34" charset="0"/>
               </a:rPr>
-              <a:t>/items</a:t>
+              <a:t>/planets</a:t>
             </a:r>
           </a:p>
         </p:txBody>
@@ -6050,8 +5779,8 @@
         </p:nvSpPr>
         <p:spPr>
           <a:xfrm>
-            <a:off x="838200" y="1331650"/>
-            <a:ext cx="10515600" cy="5433134"/>
+            <a:off x="838200" y="1825625"/>
+            <a:ext cx="10515600" cy="4610686"/>
           </a:xfrm>
         </p:spPr>
         <p:txBody>
@@ -6065,7 +5794,7 @@
                 <a:latin typeface="Arial" panose="020B0604020202020204" pitchFamily="34" charset="0"/>
                 <a:cs typeface="Arial" panose="020B0604020202020204" pitchFamily="34" charset="0"/>
               </a:rPr>
-              <a:t>GET method with params «user_id» will return json that contains each PlanetItem and its variables as well as the image variable that comes from its parent, for example:</a:t>
+              <a:t>GET method with params «system_id» will return json that contains each Planet’s variables, for example:</a:t>
             </a:r>
           </a:p>
           <a:p>
@@ -6089,7 +5818,7 @@
                 <a:latin typeface="Arial" panose="020B0604020202020204" pitchFamily="34" charset="0"/>
                 <a:cs typeface="Arial" panose="020B0604020202020204" pitchFamily="34" charset="0"/>
               </a:rPr>
-              <a:t>«result:»</a:t>
+              <a:t>«results»:</a:t>
             </a:r>
           </a:p>
           <a:p>
@@ -6125,55 +5854,31 @@
                 <a:latin typeface="Arial" panose="020B0604020202020204" pitchFamily="34" charset="0"/>
                 <a:cs typeface="Arial" panose="020B0604020202020204" pitchFamily="34" charset="0"/>
               </a:rPr>
-              <a:t>			«id»: «342»,</a:t>
-            </a:r>
-          </a:p>
-          <a:p>
-            <a:pPr marL="0" indent="0">
-              <a:buNone/>
-            </a:pPr>
-            <a:r>
-              <a:rPr lang="nb-NO" dirty="0">
-                <a:latin typeface="Arial" panose="020B0604020202020204" pitchFamily="34" charset="0"/>
-                <a:cs typeface="Arial" panose="020B0604020202020204" pitchFamily="34" charset="0"/>
-              </a:rPr>
-              <a:t>			«catalog_parent_id»: «0»,</a:t>
-            </a:r>
-          </a:p>
-          <a:p>
-            <a:pPr marL="0" indent="0">
-              <a:buNone/>
-            </a:pPr>
-            <a:r>
-              <a:rPr lang="nb-NO" dirty="0">
-                <a:latin typeface="Arial" panose="020B0604020202020204" pitchFamily="34" charset="0"/>
-                <a:cs typeface="Arial" panose="020B0604020202020204" pitchFamily="34" charset="0"/>
-              </a:rPr>
-              <a:t>			«image»: «images/statue.png»,</a:t>
-            </a:r>
-          </a:p>
-          <a:p>
-            <a:pPr marL="0" indent="0">
-              <a:buNone/>
-            </a:pPr>
-            <a:r>
-              <a:rPr lang="nb-NO" dirty="0">
-                <a:latin typeface="Arial" panose="020B0604020202020204" pitchFamily="34" charset="0"/>
-                <a:cs typeface="Arial" panose="020B0604020202020204" pitchFamily="34" charset="0"/>
-              </a:rPr>
-              <a:t>			«x»: «40»</a:t>
-            </a:r>
-          </a:p>
-          <a:p>
-            <a:pPr marL="0" indent="0">
-              <a:buNone/>
-            </a:pPr>
-            <a:r>
-              <a:rPr lang="nb-NO" dirty="0">
-                <a:latin typeface="Arial" panose="020B0604020202020204" pitchFamily="34" charset="0"/>
-                <a:cs typeface="Arial" panose="020B0604020202020204" pitchFamily="34" charset="0"/>
-              </a:rPr>
-              <a:t>			«y»: «80»</a:t>
+              <a:t>			«id»: «0»,</a:t>
+            </a:r>
+          </a:p>
+          <a:p>
+            <a:pPr marL="0" indent="0">
+              <a:buNone/>
+            </a:pPr>
+            <a:r>
+              <a:rPr lang="nb-NO" dirty="0">
+                <a:latin typeface="Arial" panose="020B0604020202020204" pitchFamily="34" charset="0"/>
+                <a:cs typeface="Arial" panose="020B0604020202020204" pitchFamily="34" charset="0"/>
+              </a:rPr>
+              <a:t>			«owner_id»: «6»,</a:t>
+            </a:r>
+          </a:p>
+          <a:p>
+            <a:pPr marL="0" indent="0">
+              <a:buNone/>
+            </a:pPr>
+            <a:r>
+              <a:rPr lang="nb-NO" dirty="0">
+                <a:latin typeface="Arial" panose="020B0604020202020204" pitchFamily="34" charset="0"/>
+                <a:cs typeface="Arial" panose="020B0604020202020204" pitchFamily="34" charset="0"/>
+              </a:rPr>
+              <a:t>			«order»: «0»,</a:t>
             </a:r>
           </a:p>
           <a:p>
@@ -6242,33 +5947,39 @@
                 <a:latin typeface="Arial" panose="020B0604020202020204" pitchFamily="34" charset="0"/>
                 <a:cs typeface="Arial" panose="020B0604020202020204" pitchFamily="34" charset="0"/>
               </a:rPr>
-              <a:t>POST method with json «user_id» «catalog_id», «x» and «y» adds a new item to a user’s list of PlanetItems, returning the new «id» and «image»</a:t>
-            </a:r>
-          </a:p>
-          <a:p>
-            <a:r>
-              <a:rPr lang="nb-NO" dirty="0">
-                <a:latin typeface="Arial" panose="020B0604020202020204" pitchFamily="34" charset="0"/>
-                <a:cs typeface="Arial" panose="020B0604020202020204" pitchFamily="34" charset="0"/>
-              </a:rPr>
-              <a:t>DELETE method with params «item_id» will remove that item from the database</a:t>
-            </a:r>
-          </a:p>
-          <a:p>
-            <a:r>
-              <a:rPr lang="nb-NO" dirty="0">
-                <a:latin typeface="Arial" panose="020B0604020202020204" pitchFamily="34" charset="0"/>
-                <a:cs typeface="Arial" panose="020B0604020202020204" pitchFamily="34" charset="0"/>
-              </a:rPr>
-              <a:t>PATCH method with json «item_id», «x» and «y» updates an item’s x and y position</a:t>
-            </a:r>
+              <a:t>GET method with params «user_id» or «planet_id» will return json that contains the Planet’s variables</a:t>
+            </a:r>
+          </a:p>
+          <a:p>
+            <a:r>
+              <a:rPr lang="nb-NO" dirty="0">
+                <a:latin typeface="Arial" panose="020B0604020202020204" pitchFamily="34" charset="0"/>
+                <a:cs typeface="Arial" panose="020B0604020202020204" pitchFamily="34" charset="0"/>
+              </a:rPr>
+              <a:t>PATCH method with json «planet_id», «name», and «user_id» will set the planet’s owner_id to that user_id and rename it in the db. If the user already has a planet, unlinks the old one and removes its name. If the planet already has an owner or the db call fails for some reason, returns json with «status»: «error», otherwise sends «status»: «ok»</a:t>
+            </a:r>
+          </a:p>
+          <a:p>
+            <a:r>
+              <a:rPr lang="nb-NO" dirty="0">
+                <a:latin typeface="Arial" panose="020B0604020202020204" pitchFamily="34" charset="0"/>
+                <a:cs typeface="Arial" panose="020B0604020202020204" pitchFamily="34" charset="0"/>
+              </a:rPr>
+              <a:t>POST method with json «system_id», «order», «size», «surface», and «image» will create a planet</a:t>
+            </a:r>
+          </a:p>
+          <a:p>
+            <a:endParaRPr lang="nb-NO" dirty="0">
+              <a:latin typeface="Arial" panose="020B0604020202020204" pitchFamily="34" charset="0"/>
+              <a:cs typeface="Arial" panose="020B0604020202020204" pitchFamily="34" charset="0"/>
+            </a:endParaRPr>
           </a:p>
         </p:txBody>
       </p:sp>
     </p:spTree>
     <p:extLst>
       <p:ext uri="{BB962C8B-B14F-4D97-AF65-F5344CB8AC3E}">
-        <p14:creationId xmlns:p14="http://schemas.microsoft.com/office/powerpoint/2010/main" val="3976820580"/>
+        <p14:creationId xmlns:p14="http://schemas.microsoft.com/office/powerpoint/2010/main" val="4061486045"/>
       </p:ext>
     </p:extLst>
   </p:cSld>
@@ -6320,7 +6031,7 @@
                 <a:latin typeface="Arial" panose="020B0604020202020204" pitchFamily="34" charset="0"/>
                 <a:cs typeface="Arial" panose="020B0604020202020204" pitchFamily="34" charset="0"/>
               </a:rPr>
-              <a:t>/currency</a:t>
+              <a:t>/catalog</a:t>
             </a:r>
           </a:p>
         </p:txBody>
@@ -6338,7 +6049,7 @@
         <p:spPr/>
         <p:txBody>
           <a:bodyPr>
-            <a:normAutofit/>
+            <a:normAutofit fontScale="47500" lnSpcReduction="20000"/>
           </a:bodyPr>
           <a:lstStyle/>
           <a:p>
@@ -6347,16 +6058,169 @@
                 <a:latin typeface="Arial" panose="020B0604020202020204" pitchFamily="34" charset="0"/>
                 <a:cs typeface="Arial" panose="020B0604020202020204" pitchFamily="34" charset="0"/>
               </a:rPr>
-              <a:t>GET method with params «user_id» returns cur1-3, vou2-3, lifetime_cur1-3</a:t>
-            </a:r>
-          </a:p>
-          <a:p>
-            <a:r>
-              <a:rPr lang="nb-NO" dirty="0">
-                <a:latin typeface="Arial" panose="020B0604020202020204" pitchFamily="34" charset="0"/>
-                <a:cs typeface="Arial" panose="020B0604020202020204" pitchFamily="34" charset="0"/>
-              </a:rPr>
-              <a:t>PATCH with json including «user_id», «cur1», «cur2», «cur3», «vou2» and «vou3» add these curs and vous to the User’s currency – if they’re positive increments both the current and lifetime currencies, if they’re negative only decreases the current ones</a:t>
+              <a:t>GET method with specified «catalog_id» returns the specified CatalogItem’s variables, the method without any params returns json that contains each CatalogItem there is and their variables, for example:</a:t>
+            </a:r>
+          </a:p>
+          <a:p>
+            <a:pPr marL="0" indent="0">
+              <a:buNone/>
+            </a:pPr>
+            <a:r>
+              <a:rPr lang="nb-NO" dirty="0">
+                <a:latin typeface="Arial" panose="020B0604020202020204" pitchFamily="34" charset="0"/>
+                <a:cs typeface="Arial" panose="020B0604020202020204" pitchFamily="34" charset="0"/>
+              </a:rPr>
+              <a:t>{</a:t>
+            </a:r>
+          </a:p>
+          <a:p>
+            <a:pPr marL="0" indent="0">
+              <a:buNone/>
+            </a:pPr>
+            <a:r>
+              <a:rPr lang="nb-NO" dirty="0">
+                <a:latin typeface="Arial" panose="020B0604020202020204" pitchFamily="34" charset="0"/>
+                <a:cs typeface="Arial" panose="020B0604020202020204" pitchFamily="34" charset="0"/>
+              </a:rPr>
+              <a:t>«results»:</a:t>
+            </a:r>
+          </a:p>
+          <a:p>
+            <a:pPr marL="0" indent="0">
+              <a:buNone/>
+            </a:pPr>
+            <a:r>
+              <a:rPr lang="nb-NO" dirty="0">
+                <a:latin typeface="Arial" panose="020B0604020202020204" pitchFamily="34" charset="0"/>
+                <a:cs typeface="Arial" panose="020B0604020202020204" pitchFamily="34" charset="0"/>
+              </a:rPr>
+              <a:t>	[</a:t>
+            </a:r>
+          </a:p>
+          <a:p>
+            <a:pPr marL="0" indent="0">
+              <a:buNone/>
+            </a:pPr>
+            <a:r>
+              <a:rPr lang="nb-NO" dirty="0">
+                <a:latin typeface="Arial" panose="020B0604020202020204" pitchFamily="34" charset="0"/>
+                <a:cs typeface="Arial" panose="020B0604020202020204" pitchFamily="34" charset="0"/>
+              </a:rPr>
+              <a:t>		{</a:t>
+            </a:r>
+          </a:p>
+          <a:p>
+            <a:pPr marL="0" indent="0">
+              <a:buNone/>
+            </a:pPr>
+            <a:r>
+              <a:rPr lang="nb-NO" dirty="0">
+                <a:latin typeface="Arial" panose="020B0604020202020204" pitchFamily="34" charset="0"/>
+                <a:cs typeface="Arial" panose="020B0604020202020204" pitchFamily="34" charset="0"/>
+              </a:rPr>
+              <a:t>			«id»: «0»,</a:t>
+            </a:r>
+          </a:p>
+          <a:p>
+            <a:pPr marL="0" indent="0">
+              <a:buNone/>
+            </a:pPr>
+            <a:r>
+              <a:rPr lang="nb-NO" dirty="0">
+                <a:latin typeface="Arial" panose="020B0604020202020204" pitchFamily="34" charset="0"/>
+                <a:cs typeface="Arial" panose="020B0604020202020204" pitchFamily="34" charset="0"/>
+              </a:rPr>
+              <a:t>			«image»: «images/statue.png»,</a:t>
+            </a:r>
+          </a:p>
+          <a:p>
+            <a:pPr marL="0" indent="0">
+              <a:buNone/>
+            </a:pPr>
+            <a:r>
+              <a:rPr lang="nb-NO" dirty="0">
+                <a:latin typeface="Arial" panose="020B0604020202020204" pitchFamily="34" charset="0"/>
+                <a:cs typeface="Arial" panose="020B0604020202020204" pitchFamily="34" charset="0"/>
+              </a:rPr>
+              <a:t>			«available»: «true»,</a:t>
+            </a:r>
+          </a:p>
+          <a:p>
+            <a:pPr marL="0" indent="0">
+              <a:buNone/>
+            </a:pPr>
+            <a:r>
+              <a:rPr lang="nb-NO" dirty="0">
+                <a:latin typeface="Arial" panose="020B0604020202020204" pitchFamily="34" charset="0"/>
+                <a:cs typeface="Arial" panose="020B0604020202020204" pitchFamily="34" charset="0"/>
+              </a:rPr>
+              <a:t>			...</a:t>
+            </a:r>
+          </a:p>
+          <a:p>
+            <a:pPr marL="0" indent="0">
+              <a:buNone/>
+            </a:pPr>
+            <a:r>
+              <a:rPr lang="nb-NO" dirty="0">
+                <a:latin typeface="Arial" panose="020B0604020202020204" pitchFamily="34" charset="0"/>
+                <a:cs typeface="Arial" panose="020B0604020202020204" pitchFamily="34" charset="0"/>
+              </a:rPr>
+              <a:t>		},</a:t>
+            </a:r>
+          </a:p>
+          <a:p>
+            <a:pPr marL="0" indent="0">
+              <a:buNone/>
+            </a:pPr>
+            <a:r>
+              <a:rPr lang="nb-NO" dirty="0">
+                <a:latin typeface="Arial" panose="020B0604020202020204" pitchFamily="34" charset="0"/>
+                <a:cs typeface="Arial" panose="020B0604020202020204" pitchFamily="34" charset="0"/>
+              </a:rPr>
+              <a:t>		...</a:t>
+            </a:r>
+          </a:p>
+          <a:p>
+            <a:pPr marL="0" indent="0">
+              <a:buNone/>
+            </a:pPr>
+            <a:r>
+              <a:rPr lang="nb-NO" dirty="0">
+                <a:latin typeface="Arial" panose="020B0604020202020204" pitchFamily="34" charset="0"/>
+                <a:cs typeface="Arial" panose="020B0604020202020204" pitchFamily="34" charset="0"/>
+              </a:rPr>
+              <a:t>	]</a:t>
+            </a:r>
+          </a:p>
+          <a:p>
+            <a:pPr marL="0" indent="0">
+              <a:buNone/>
+            </a:pPr>
+            <a:r>
+              <a:rPr lang="nb-NO" dirty="0">
+                <a:latin typeface="Arial" panose="020B0604020202020204" pitchFamily="34" charset="0"/>
+                <a:cs typeface="Arial" panose="020B0604020202020204" pitchFamily="34" charset="0"/>
+              </a:rPr>
+              <a:t>}</a:t>
+            </a:r>
+          </a:p>
+          <a:p>
+            <a:r>
+              <a:rPr lang="nb-NO" dirty="0">
+                <a:latin typeface="Arial" panose="020B0604020202020204" pitchFamily="34" charset="0"/>
+                <a:cs typeface="Arial" panose="020B0604020202020204" pitchFamily="34" charset="0"/>
+              </a:rPr>
+              <a:t>POST method with json «name», «image», «event_specific», «available», «cost1», «cost2», and «cost3» will create a planet</a:t>
+            </a:r>
+          </a:p>
+          <a:p>
+            <a:r>
+              <a:rPr lang="nb-NO" dirty="0">
+                <a:latin typeface="Arial" panose="020B0604020202020204" pitchFamily="34" charset="0"/>
+                <a:cs typeface="Arial" panose="020B0604020202020204" pitchFamily="34" charset="0"/>
+              </a:rPr>
+              <a:t>PATCH method with the param «catalog_id» flips the value of the available variable</a:t>
             </a:r>
           </a:p>
         </p:txBody>
@@ -6364,7 +6228,7 @@
     </p:spTree>
     <p:extLst>
       <p:ext uri="{BB962C8B-B14F-4D97-AF65-F5344CB8AC3E}">
-        <p14:creationId xmlns:p14="http://schemas.microsoft.com/office/powerpoint/2010/main" val="1802617112"/>
+        <p14:creationId xmlns:p14="http://schemas.microsoft.com/office/powerpoint/2010/main" val="4128414604"/>
       </p:ext>
     </p:extLst>
   </p:cSld>
@@ -6416,7 +6280,7 @@
                 <a:latin typeface="Arial" panose="020B0604020202020204" pitchFamily="34" charset="0"/>
                 <a:cs typeface="Arial" panose="020B0604020202020204" pitchFamily="34" charset="0"/>
               </a:rPr>
-              <a:t>/missions</a:t>
+              <a:t>/items</a:t>
             </a:r>
           </a:p>
         </p:txBody>
@@ -6431,10 +6295,15 @@
             <p:ph idx="1"/>
           </p:nvPr>
         </p:nvSpPr>
-        <p:spPr/>
+        <p:spPr>
+          <a:xfrm>
+            <a:off x="838200" y="1331650"/>
+            <a:ext cx="10515600" cy="5433134"/>
+          </a:xfrm>
+        </p:spPr>
         <p:txBody>
           <a:bodyPr>
-            <a:normAutofit/>
+            <a:normAutofit fontScale="47500" lnSpcReduction="20000"/>
           </a:bodyPr>
           <a:lstStyle/>
           <a:p>
@@ -6443,25 +6312,202 @@
                 <a:latin typeface="Arial" panose="020B0604020202020204" pitchFamily="34" charset="0"/>
                 <a:cs typeface="Arial" panose="020B0604020202020204" pitchFamily="34" charset="0"/>
               </a:rPr>
-              <a:t>GET method with params «user_id» returns mission_type, mission_current, mission_total</a:t>
-            </a:r>
-          </a:p>
-          <a:p>
-            <a:r>
-              <a:rPr lang="nb-NO" dirty="0">
-                <a:latin typeface="Arial" panose="020B0604020202020204" pitchFamily="34" charset="0"/>
-                <a:cs typeface="Arial" panose="020B0604020202020204" pitchFamily="34" charset="0"/>
-              </a:rPr>
-              <a:t>POST method with params «user_id» increases mission_current by 1</a:t>
-            </a:r>
-          </a:p>
-          <a:p>
-            <a:r>
-              <a:rPr lang="nb-NO" dirty="0">
-                <a:latin typeface="Arial" panose="020B0604020202020204" pitchFamily="34" charset="0"/>
-                <a:cs typeface="Arial" panose="020B0604020202020204" pitchFamily="34" charset="0"/>
-              </a:rPr>
-              <a:t>PATCH with params «user_id» will set mission_current and mission_total to -1, then begins a 10 minute timer to get a new mission</a:t>
+              <a:t>GET method with params «user_id» will return json that contains each PlanetItem and its variables as well as the image variable that comes from its parent, for example:</a:t>
+            </a:r>
+          </a:p>
+          <a:p>
+            <a:pPr marL="0" indent="0">
+              <a:buNone/>
+            </a:pPr>
+            <a:r>
+              <a:rPr lang="nb-NO" dirty="0">
+                <a:latin typeface="Arial" panose="020B0604020202020204" pitchFamily="34" charset="0"/>
+                <a:cs typeface="Arial" panose="020B0604020202020204" pitchFamily="34" charset="0"/>
+              </a:rPr>
+              <a:t>{</a:t>
+            </a:r>
+          </a:p>
+          <a:p>
+            <a:pPr marL="0" indent="0">
+              <a:buNone/>
+            </a:pPr>
+            <a:r>
+              <a:rPr lang="nb-NO" dirty="0">
+                <a:latin typeface="Arial" panose="020B0604020202020204" pitchFamily="34" charset="0"/>
+                <a:cs typeface="Arial" panose="020B0604020202020204" pitchFamily="34" charset="0"/>
+              </a:rPr>
+              <a:t>«result:»</a:t>
+            </a:r>
+          </a:p>
+          <a:p>
+            <a:pPr marL="0" indent="0">
+              <a:buNone/>
+            </a:pPr>
+            <a:r>
+              <a:rPr lang="nb-NO" dirty="0">
+                <a:latin typeface="Arial" panose="020B0604020202020204" pitchFamily="34" charset="0"/>
+                <a:cs typeface="Arial" panose="020B0604020202020204" pitchFamily="34" charset="0"/>
+              </a:rPr>
+              <a:t>	[</a:t>
+            </a:r>
+          </a:p>
+          <a:p>
+            <a:pPr marL="0" indent="0">
+              <a:buNone/>
+            </a:pPr>
+            <a:r>
+              <a:rPr lang="nb-NO" dirty="0">
+                <a:latin typeface="Arial" panose="020B0604020202020204" pitchFamily="34" charset="0"/>
+                <a:cs typeface="Arial" panose="020B0604020202020204" pitchFamily="34" charset="0"/>
+              </a:rPr>
+              <a:t>		{</a:t>
+            </a:r>
+          </a:p>
+          <a:p>
+            <a:pPr marL="0" indent="0">
+              <a:buNone/>
+            </a:pPr>
+            <a:r>
+              <a:rPr lang="nb-NO" dirty="0">
+                <a:latin typeface="Arial" panose="020B0604020202020204" pitchFamily="34" charset="0"/>
+                <a:cs typeface="Arial" panose="020B0604020202020204" pitchFamily="34" charset="0"/>
+              </a:rPr>
+              <a:t>			«id»: «342»,</a:t>
+            </a:r>
+          </a:p>
+          <a:p>
+            <a:pPr marL="0" indent="0">
+              <a:buNone/>
+            </a:pPr>
+            <a:r>
+              <a:rPr lang="nb-NO" dirty="0">
+                <a:latin typeface="Arial" panose="020B0604020202020204" pitchFamily="34" charset="0"/>
+                <a:cs typeface="Arial" panose="020B0604020202020204" pitchFamily="34" charset="0"/>
+              </a:rPr>
+              <a:t>			«catalog_parent_id»: «0»,</a:t>
+            </a:r>
+          </a:p>
+          <a:p>
+            <a:pPr marL="0" indent="0">
+              <a:buNone/>
+            </a:pPr>
+            <a:r>
+              <a:rPr lang="nb-NO" dirty="0">
+                <a:latin typeface="Arial" panose="020B0604020202020204" pitchFamily="34" charset="0"/>
+                <a:cs typeface="Arial" panose="020B0604020202020204" pitchFamily="34" charset="0"/>
+              </a:rPr>
+              <a:t>			«image»: «images/statue.png»,</a:t>
+            </a:r>
+          </a:p>
+          <a:p>
+            <a:pPr marL="0" indent="0">
+              <a:buNone/>
+            </a:pPr>
+            <a:r>
+              <a:rPr lang="nb-NO" dirty="0">
+                <a:latin typeface="Arial" panose="020B0604020202020204" pitchFamily="34" charset="0"/>
+                <a:cs typeface="Arial" panose="020B0604020202020204" pitchFamily="34" charset="0"/>
+              </a:rPr>
+              <a:t>			«x»: «40»</a:t>
+            </a:r>
+          </a:p>
+          <a:p>
+            <a:pPr marL="0" indent="0">
+              <a:buNone/>
+            </a:pPr>
+            <a:r>
+              <a:rPr lang="nb-NO" dirty="0">
+                <a:latin typeface="Arial" panose="020B0604020202020204" pitchFamily="34" charset="0"/>
+                <a:cs typeface="Arial" panose="020B0604020202020204" pitchFamily="34" charset="0"/>
+              </a:rPr>
+              <a:t>			«y»: «80»</a:t>
+            </a:r>
+          </a:p>
+          <a:p>
+            <a:pPr marL="0" indent="0">
+              <a:buNone/>
+            </a:pPr>
+            <a:r>
+              <a:rPr lang="nb-NO" dirty="0">
+                <a:latin typeface="Arial" panose="020B0604020202020204" pitchFamily="34" charset="0"/>
+                <a:cs typeface="Arial" panose="020B0604020202020204" pitchFamily="34" charset="0"/>
+              </a:rPr>
+              <a:t>			...</a:t>
+            </a:r>
+          </a:p>
+          <a:p>
+            <a:pPr marL="0" indent="0">
+              <a:buNone/>
+            </a:pPr>
+            <a:r>
+              <a:rPr lang="nb-NO" dirty="0">
+                <a:latin typeface="Arial" panose="020B0604020202020204" pitchFamily="34" charset="0"/>
+                <a:cs typeface="Arial" panose="020B0604020202020204" pitchFamily="34" charset="0"/>
+              </a:rPr>
+              <a:t>		},</a:t>
+            </a:r>
+          </a:p>
+          <a:p>
+            <a:pPr marL="0" indent="0">
+              <a:buNone/>
+            </a:pPr>
+            <a:r>
+              <a:rPr lang="nb-NO" dirty="0">
+                <a:latin typeface="Arial" panose="020B0604020202020204" pitchFamily="34" charset="0"/>
+                <a:cs typeface="Arial" panose="020B0604020202020204" pitchFamily="34" charset="0"/>
+              </a:rPr>
+              <a:t>		...</a:t>
+            </a:r>
+          </a:p>
+          <a:p>
+            <a:pPr marL="0" indent="0">
+              <a:buNone/>
+            </a:pPr>
+            <a:r>
+              <a:rPr lang="nb-NO" dirty="0">
+                <a:latin typeface="Arial" panose="020B0604020202020204" pitchFamily="34" charset="0"/>
+                <a:cs typeface="Arial" panose="020B0604020202020204" pitchFamily="34" charset="0"/>
+              </a:rPr>
+              <a:t>	]</a:t>
+            </a:r>
+          </a:p>
+          <a:p>
+            <a:pPr marL="0" indent="0">
+              <a:buNone/>
+            </a:pPr>
+            <a:r>
+              <a:rPr lang="nb-NO" dirty="0">
+                <a:latin typeface="Arial" panose="020B0604020202020204" pitchFamily="34" charset="0"/>
+                <a:cs typeface="Arial" panose="020B0604020202020204" pitchFamily="34" charset="0"/>
+              </a:rPr>
+              <a:t>}</a:t>
+            </a:r>
+          </a:p>
+          <a:p>
+            <a:r>
+              <a:rPr lang="nb-NO" dirty="0">
+                <a:latin typeface="Arial" panose="020B0604020202020204" pitchFamily="34" charset="0"/>
+                <a:cs typeface="Arial" panose="020B0604020202020204" pitchFamily="34" charset="0"/>
+              </a:rPr>
+              <a:t>POST method with json «user_id» «catalog_id», «x» and «y» adds a new item to a user’s list of PlanetItems, returning the new «id» and «image»</a:t>
+            </a:r>
+          </a:p>
+          <a:p>
+            <a:r>
+              <a:rPr lang="nb-NO" dirty="0">
+                <a:latin typeface="Arial" panose="020B0604020202020204" pitchFamily="34" charset="0"/>
+                <a:cs typeface="Arial" panose="020B0604020202020204" pitchFamily="34" charset="0"/>
+              </a:rPr>
+              <a:t>DELETE method with params «item_id» will remove that item from the database</a:t>
+            </a:r>
+          </a:p>
+          <a:p>
+            <a:r>
+              <a:rPr lang="nb-NO" dirty="0">
+                <a:latin typeface="Arial" panose="020B0604020202020204" pitchFamily="34" charset="0"/>
+                <a:cs typeface="Arial" panose="020B0604020202020204" pitchFamily="34" charset="0"/>
+              </a:rPr>
+              <a:t>PATCH method with json «item_id», «x» and «y» updates an item’s x and y position</a:t>
             </a:r>
           </a:p>
         </p:txBody>
@@ -6469,7 +6515,7 @@
     </p:spTree>
     <p:extLst>
       <p:ext uri="{BB962C8B-B14F-4D97-AF65-F5344CB8AC3E}">
-        <p14:creationId xmlns:p14="http://schemas.microsoft.com/office/powerpoint/2010/main" val="3689206682"/>
+        <p14:creationId xmlns:p14="http://schemas.microsoft.com/office/powerpoint/2010/main" val="3976820580"/>
       </p:ext>
     </p:extLst>
   </p:cSld>
@@ -6521,8 +6567,19 @@
                 <a:latin typeface="Arial" panose="020B0604020202020204" pitchFamily="34" charset="0"/>
                 <a:cs typeface="Arial" panose="020B0604020202020204" pitchFamily="34" charset="0"/>
               </a:rPr>
-              <a:t>/status</a:t>
-            </a:r>
+              <a:t>/</a:t>
+            </a:r>
+            <a:r>
+              <a:rPr lang="en-US" dirty="0" err="1">
+                <a:latin typeface="Arial" panose="020B0604020202020204" pitchFamily="34" charset="0"/>
+                <a:cs typeface="Arial" panose="020B0604020202020204" pitchFamily="34" charset="0"/>
+              </a:rPr>
+              <a:t>chatitems</a:t>
+            </a:r>
+            <a:endParaRPr lang="en-US" dirty="0">
+              <a:latin typeface="Arial" panose="020B0604020202020204" pitchFamily="34" charset="0"/>
+              <a:cs typeface="Arial" panose="020B0604020202020204" pitchFamily="34" charset="0"/>
+            </a:endParaRPr>
           </a:p>
         </p:txBody>
       </p:sp>
@@ -6536,10 +6593,15 @@
             <p:ph idx="1"/>
           </p:nvPr>
         </p:nvSpPr>
-        <p:spPr/>
+        <p:spPr>
+          <a:xfrm>
+            <a:off x="838200" y="1331650"/>
+            <a:ext cx="10515600" cy="5433134"/>
+          </a:xfrm>
+        </p:spPr>
         <p:txBody>
           <a:bodyPr>
-            <a:normAutofit/>
+            <a:normAutofit fontScale="62500" lnSpcReduction="20000"/>
           </a:bodyPr>
           <a:lstStyle/>
           <a:p>
@@ -6548,24 +6610,203 @@
                 <a:latin typeface="Arial" panose="020B0604020202020204" pitchFamily="34" charset="0"/>
                 <a:cs typeface="Arial" panose="020B0604020202020204" pitchFamily="34" charset="0"/>
               </a:rPr>
-              <a:t>GET method returns «event» and «news» from the server status</a:t>
-            </a:r>
-          </a:p>
-          <a:p>
-            <a:r>
-              <a:rPr lang="nb-NO" dirty="0">
-                <a:latin typeface="Arial" panose="020B0604020202020204" pitchFamily="34" charset="0"/>
-                <a:cs typeface="Arial" panose="020B0604020202020204" pitchFamily="34" charset="0"/>
-              </a:rPr>
-              <a:t>PATCH with json including «event» and «news» to update the server status – leave a param null to not update it</a:t>
-            </a:r>
+              <a:t>GET method with params «user_id» will return json that contains each ChatItem the User owns and its variables, for example:</a:t>
+            </a:r>
+          </a:p>
+          <a:p>
+            <a:pPr marL="0" indent="0">
+              <a:buNone/>
+            </a:pPr>
+            <a:r>
+              <a:rPr lang="nb-NO" dirty="0">
+                <a:latin typeface="Arial" panose="020B0604020202020204" pitchFamily="34" charset="0"/>
+                <a:cs typeface="Arial" panose="020B0604020202020204" pitchFamily="34" charset="0"/>
+              </a:rPr>
+              <a:t>{</a:t>
+            </a:r>
+          </a:p>
+          <a:p>
+            <a:pPr marL="0" indent="0">
+              <a:buNone/>
+            </a:pPr>
+            <a:r>
+              <a:rPr lang="nb-NO" dirty="0">
+                <a:latin typeface="Arial" panose="020B0604020202020204" pitchFamily="34" charset="0"/>
+                <a:cs typeface="Arial" panose="020B0604020202020204" pitchFamily="34" charset="0"/>
+              </a:rPr>
+              <a:t>«result:»</a:t>
+            </a:r>
+          </a:p>
+          <a:p>
+            <a:pPr marL="0" indent="0">
+              <a:buNone/>
+            </a:pPr>
+            <a:r>
+              <a:rPr lang="nb-NO" dirty="0">
+                <a:latin typeface="Arial" panose="020B0604020202020204" pitchFamily="34" charset="0"/>
+                <a:cs typeface="Arial" panose="020B0604020202020204" pitchFamily="34" charset="0"/>
+              </a:rPr>
+              <a:t>	[</a:t>
+            </a:r>
+          </a:p>
+          <a:p>
+            <a:pPr marL="0" indent="0">
+              <a:buNone/>
+            </a:pPr>
+            <a:r>
+              <a:rPr lang="nb-NO" dirty="0">
+                <a:latin typeface="Arial" panose="020B0604020202020204" pitchFamily="34" charset="0"/>
+                <a:cs typeface="Arial" panose="020B0604020202020204" pitchFamily="34" charset="0"/>
+              </a:rPr>
+              <a:t>		{</a:t>
+            </a:r>
+          </a:p>
+          <a:p>
+            <a:pPr marL="0" indent="0">
+              <a:buNone/>
+            </a:pPr>
+            <a:r>
+              <a:rPr lang="nb-NO" dirty="0">
+                <a:latin typeface="Arial" panose="020B0604020202020204" pitchFamily="34" charset="0"/>
+                <a:cs typeface="Arial" panose="020B0604020202020204" pitchFamily="34" charset="0"/>
+              </a:rPr>
+              <a:t>			«id»: «0»,</a:t>
+            </a:r>
+          </a:p>
+          <a:p>
+            <a:pPr marL="0" indent="0">
+              <a:buNone/>
+            </a:pPr>
+            <a:r>
+              <a:rPr lang="nb-NO" dirty="0">
+                <a:latin typeface="Arial" panose="020B0604020202020204" pitchFamily="34" charset="0"/>
+                <a:cs typeface="Arial" panose="020B0604020202020204" pitchFamily="34" charset="0"/>
+              </a:rPr>
+              <a:t>			«itemType»: «0»,</a:t>
+            </a:r>
+          </a:p>
+          <a:p>
+            <a:pPr marL="0" indent="0">
+              <a:buNone/>
+            </a:pPr>
+            <a:r>
+              <a:rPr lang="nb-NO" dirty="0">
+                <a:latin typeface="Arial" panose="020B0604020202020204" pitchFamily="34" charset="0"/>
+                <a:cs typeface="Arial" panose="020B0604020202020204" pitchFamily="34" charset="0"/>
+              </a:rPr>
+              <a:t>			«string»: «purple»,</a:t>
+            </a:r>
+          </a:p>
+          <a:p>
+            <a:pPr marL="0" indent="0">
+              <a:buNone/>
+            </a:pPr>
+            <a:r>
+              <a:rPr lang="nb-NO" dirty="0">
+                <a:latin typeface="Arial" panose="020B0604020202020204" pitchFamily="34" charset="0"/>
+                <a:cs typeface="Arial" panose="020B0604020202020204" pitchFamily="34" charset="0"/>
+              </a:rPr>
+              <a:t>			«cost1»: «40»</a:t>
+            </a:r>
+          </a:p>
+          <a:p>
+            <a:pPr marL="0" indent="0">
+              <a:buNone/>
+            </a:pPr>
+            <a:r>
+              <a:rPr lang="nb-NO" dirty="0">
+                <a:latin typeface="Arial" panose="020B0604020202020204" pitchFamily="34" charset="0"/>
+                <a:cs typeface="Arial" panose="020B0604020202020204" pitchFamily="34" charset="0"/>
+              </a:rPr>
+              <a:t>			«cost2»: «5»</a:t>
+            </a:r>
+          </a:p>
+          <a:p>
+            <a:pPr marL="0" indent="0">
+              <a:buNone/>
+            </a:pPr>
+            <a:r>
+              <a:rPr lang="nb-NO" dirty="0">
+                <a:latin typeface="Arial" panose="020B0604020202020204" pitchFamily="34" charset="0"/>
+                <a:cs typeface="Arial" panose="020B0604020202020204" pitchFamily="34" charset="0"/>
+              </a:rPr>
+              <a:t>			...</a:t>
+            </a:r>
+          </a:p>
+          <a:p>
+            <a:pPr marL="0" indent="0">
+              <a:buNone/>
+            </a:pPr>
+            <a:r>
+              <a:rPr lang="nb-NO" dirty="0">
+                <a:latin typeface="Arial" panose="020B0604020202020204" pitchFamily="34" charset="0"/>
+                <a:cs typeface="Arial" panose="020B0604020202020204" pitchFamily="34" charset="0"/>
+              </a:rPr>
+              <a:t>		},</a:t>
+            </a:r>
+          </a:p>
+          <a:p>
+            <a:pPr marL="0" indent="0">
+              <a:buNone/>
+            </a:pPr>
+            <a:r>
+              <a:rPr lang="nb-NO" dirty="0">
+                <a:latin typeface="Arial" panose="020B0604020202020204" pitchFamily="34" charset="0"/>
+                <a:cs typeface="Arial" panose="020B0604020202020204" pitchFamily="34" charset="0"/>
+              </a:rPr>
+              <a:t>		...</a:t>
+            </a:r>
+          </a:p>
+          <a:p>
+            <a:pPr marL="0" indent="0">
+              <a:buNone/>
+            </a:pPr>
+            <a:r>
+              <a:rPr lang="nb-NO" dirty="0">
+                <a:latin typeface="Arial" panose="020B0604020202020204" pitchFamily="34" charset="0"/>
+                <a:cs typeface="Arial" panose="020B0604020202020204" pitchFamily="34" charset="0"/>
+              </a:rPr>
+              <a:t>	]</a:t>
+            </a:r>
+          </a:p>
+          <a:p>
+            <a:pPr marL="0" indent="0">
+              <a:buNone/>
+            </a:pPr>
+            <a:r>
+              <a:rPr lang="nb-NO" dirty="0">
+                <a:latin typeface="Arial" panose="020B0604020202020204" pitchFamily="34" charset="0"/>
+                <a:cs typeface="Arial" panose="020B0604020202020204" pitchFamily="34" charset="0"/>
+              </a:rPr>
+              <a:t>}</a:t>
+            </a:r>
+          </a:p>
+          <a:p>
+            <a:r>
+              <a:rPr lang="nb-NO" dirty="0">
+                <a:latin typeface="Arial" panose="020B0604020202020204" pitchFamily="34" charset="0"/>
+                <a:cs typeface="Arial" panose="020B0604020202020204" pitchFamily="34" charset="0"/>
+              </a:rPr>
+              <a:t>POST method with json including «user_id» and «chat_item_</a:t>
+            </a:r>
+            <a:r>
+              <a:rPr lang="nb-NO">
+                <a:latin typeface="Arial" panose="020B0604020202020204" pitchFamily="34" charset="0"/>
+                <a:cs typeface="Arial" panose="020B0604020202020204" pitchFamily="34" charset="0"/>
+              </a:rPr>
+              <a:t>id» to add that ChatItem to the User</a:t>
+            </a:r>
+            <a:endParaRPr lang="nb-NO" dirty="0">
+              <a:latin typeface="Arial" panose="020B0604020202020204" pitchFamily="34" charset="0"/>
+              <a:cs typeface="Arial" panose="020B0604020202020204" pitchFamily="34" charset="0"/>
+            </a:endParaRPr>
           </a:p>
         </p:txBody>
       </p:sp>
     </p:spTree>
     <p:extLst>
       <p:ext uri="{BB962C8B-B14F-4D97-AF65-F5344CB8AC3E}">
-        <p14:creationId xmlns:p14="http://schemas.microsoft.com/office/powerpoint/2010/main" val="809141698"/>
+        <p14:creationId xmlns:p14="http://schemas.microsoft.com/office/powerpoint/2010/main" val="1642849653"/>
       </p:ext>
     </p:extLst>
   </p:cSld>
@@ -6617,7 +6858,7 @@
                 <a:latin typeface="Arial" panose="020B0604020202020204" pitchFamily="34" charset="0"/>
                 <a:cs typeface="Arial" panose="020B0604020202020204" pitchFamily="34" charset="0"/>
               </a:rPr>
-              <a:t>/files</a:t>
+              <a:t>/currency</a:t>
             </a:r>
           </a:p>
         </p:txBody>
@@ -6644,16 +6885,16 @@
                 <a:latin typeface="Arial" panose="020B0604020202020204" pitchFamily="34" charset="0"/>
                 <a:cs typeface="Arial" panose="020B0604020202020204" pitchFamily="34" charset="0"/>
               </a:rPr>
-              <a:t>POST here to upload an image file. Must have the header Content-Type: application/x-www-form-urlencoded and, in the body, have «file»: &lt;file here&gt;</a:t>
-            </a:r>
-          </a:p>
-          <a:p>
-            <a:r>
-              <a:rPr lang="nb-NO" dirty="0">
-                <a:latin typeface="Arial" panose="020B0604020202020204" pitchFamily="34" charset="0"/>
-                <a:cs typeface="Arial" panose="020B0604020202020204" pitchFamily="34" charset="0"/>
-              </a:rPr>
-              <a:t>In order to get an uploaded image, the url is http://127.0.0.1:5000/uploads/&lt;file&gt;</a:t>
+              <a:t>GET method with params «user_id» returns cur1-3, vou2-3, lifetime_cur1-3</a:t>
+            </a:r>
+          </a:p>
+          <a:p>
+            <a:r>
+              <a:rPr lang="nb-NO" dirty="0">
+                <a:latin typeface="Arial" panose="020B0604020202020204" pitchFamily="34" charset="0"/>
+                <a:cs typeface="Arial" panose="020B0604020202020204" pitchFamily="34" charset="0"/>
+              </a:rPr>
+              <a:t>PATCH with json including «user_id», «cur1», «cur2», «cur3», «vou2» and «vou3» add these curs and vous to the User’s currency – if they’re positive increments both the current and lifetime currencies, if they’re negative only decreases the current ones</a:t>
             </a:r>
           </a:p>
         </p:txBody>
@@ -6661,7 +6902,208 @@
     </p:spTree>
     <p:extLst>
       <p:ext uri="{BB962C8B-B14F-4D97-AF65-F5344CB8AC3E}">
-        <p14:creationId xmlns:p14="http://schemas.microsoft.com/office/powerpoint/2010/main" val="2579076952"/>
+        <p14:creationId xmlns:p14="http://schemas.microsoft.com/office/powerpoint/2010/main" val="1802617112"/>
+      </p:ext>
+    </p:extLst>
+  </p:cSld>
+  <p:clrMapOvr>
+    <a:masterClrMapping/>
+  </p:clrMapOvr>
+</p:sld>
+</file>
+
+<file path=ppt/slides/slide28.xml><?xml version="1.0" encoding="utf-8"?>
+<p:sld xmlns:a="http://schemas.openxmlformats.org/drawingml/2006/main" xmlns:r="http://schemas.openxmlformats.org/officeDocument/2006/relationships" xmlns:p="http://schemas.openxmlformats.org/presentationml/2006/main">
+  <p:cSld>
+    <p:spTree>
+      <p:nvGrpSpPr>
+        <p:cNvPr id="1" name=""/>
+        <p:cNvGrpSpPr/>
+        <p:nvPr/>
+      </p:nvGrpSpPr>
+      <p:grpSpPr>
+        <a:xfrm>
+          <a:off x="0" y="0"/>
+          <a:ext cx="0" cy="0"/>
+          <a:chOff x="0" y="0"/>
+          <a:chExt cx="0" cy="0"/>
+        </a:xfrm>
+      </p:grpSpPr>
+      <p:sp>
+        <p:nvSpPr>
+          <p:cNvPr id="2" name="Title 1"/>
+          <p:cNvSpPr>
+            <a:spLocks noGrp="1"/>
+          </p:cNvSpPr>
+          <p:nvPr>
+            <p:ph type="title"/>
+          </p:nvPr>
+        </p:nvSpPr>
+        <p:spPr>
+          <a:xfrm>
+            <a:off x="838200" y="365125"/>
+            <a:ext cx="10515600" cy="1325563"/>
+          </a:xfrm>
+        </p:spPr>
+        <p:txBody>
+          <a:bodyPr/>
+          <a:lstStyle/>
+          <a:p>
+            <a:r>
+              <a:rPr lang="en-US" dirty="0">
+                <a:latin typeface="Arial" panose="020B0604020202020204" pitchFamily="34" charset="0"/>
+                <a:cs typeface="Arial" panose="020B0604020202020204" pitchFamily="34" charset="0"/>
+              </a:rPr>
+              <a:t>/missions</a:t>
+            </a:r>
+          </a:p>
+        </p:txBody>
+      </p:sp>
+      <p:sp>
+        <p:nvSpPr>
+          <p:cNvPr id="3" name="Content Placeholder 2"/>
+          <p:cNvSpPr>
+            <a:spLocks noGrp="1"/>
+          </p:cNvSpPr>
+          <p:nvPr>
+            <p:ph idx="1"/>
+          </p:nvPr>
+        </p:nvSpPr>
+        <p:spPr/>
+        <p:txBody>
+          <a:bodyPr>
+            <a:normAutofit/>
+          </a:bodyPr>
+          <a:lstStyle/>
+          <a:p>
+            <a:r>
+              <a:rPr lang="nb-NO" dirty="0">
+                <a:latin typeface="Arial" panose="020B0604020202020204" pitchFamily="34" charset="0"/>
+                <a:cs typeface="Arial" panose="020B0604020202020204" pitchFamily="34" charset="0"/>
+              </a:rPr>
+              <a:t>GET method with params «user_id» returns mission_type, mission_current, mission_total</a:t>
+            </a:r>
+          </a:p>
+          <a:p>
+            <a:r>
+              <a:rPr lang="nb-NO" dirty="0">
+                <a:latin typeface="Arial" panose="020B0604020202020204" pitchFamily="34" charset="0"/>
+                <a:cs typeface="Arial" panose="020B0604020202020204" pitchFamily="34" charset="0"/>
+              </a:rPr>
+              <a:t>POST method with params «user_id» increases mission_current by 1</a:t>
+            </a:r>
+          </a:p>
+          <a:p>
+            <a:r>
+              <a:rPr lang="nb-NO" dirty="0">
+                <a:latin typeface="Arial" panose="020B0604020202020204" pitchFamily="34" charset="0"/>
+                <a:cs typeface="Arial" panose="020B0604020202020204" pitchFamily="34" charset="0"/>
+              </a:rPr>
+              <a:t>PATCH with params «user_id» will set mission_current and mission_total to -1, then begins a 10 minute timer to get a new mission</a:t>
+            </a:r>
+          </a:p>
+        </p:txBody>
+      </p:sp>
+    </p:spTree>
+    <p:extLst>
+      <p:ext uri="{BB962C8B-B14F-4D97-AF65-F5344CB8AC3E}">
+        <p14:creationId xmlns:p14="http://schemas.microsoft.com/office/powerpoint/2010/main" val="3689206682"/>
+      </p:ext>
+    </p:extLst>
+  </p:cSld>
+  <p:clrMapOvr>
+    <a:masterClrMapping/>
+  </p:clrMapOvr>
+</p:sld>
+</file>
+
+<file path=ppt/slides/slide29.xml><?xml version="1.0" encoding="utf-8"?>
+<p:sld xmlns:a="http://schemas.openxmlformats.org/drawingml/2006/main" xmlns:r="http://schemas.openxmlformats.org/officeDocument/2006/relationships" xmlns:p="http://schemas.openxmlformats.org/presentationml/2006/main">
+  <p:cSld>
+    <p:spTree>
+      <p:nvGrpSpPr>
+        <p:cNvPr id="1" name=""/>
+        <p:cNvGrpSpPr/>
+        <p:nvPr/>
+      </p:nvGrpSpPr>
+      <p:grpSpPr>
+        <a:xfrm>
+          <a:off x="0" y="0"/>
+          <a:ext cx="0" cy="0"/>
+          <a:chOff x="0" y="0"/>
+          <a:chExt cx="0" cy="0"/>
+        </a:xfrm>
+      </p:grpSpPr>
+      <p:sp>
+        <p:nvSpPr>
+          <p:cNvPr id="2" name="Title 1"/>
+          <p:cNvSpPr>
+            <a:spLocks noGrp="1"/>
+          </p:cNvSpPr>
+          <p:nvPr>
+            <p:ph type="title"/>
+          </p:nvPr>
+        </p:nvSpPr>
+        <p:spPr>
+          <a:xfrm>
+            <a:off x="838200" y="365125"/>
+            <a:ext cx="10515600" cy="1325563"/>
+          </a:xfrm>
+        </p:spPr>
+        <p:txBody>
+          <a:bodyPr/>
+          <a:lstStyle/>
+          <a:p>
+            <a:r>
+              <a:rPr lang="en-US" dirty="0">
+                <a:latin typeface="Arial" panose="020B0604020202020204" pitchFamily="34" charset="0"/>
+                <a:cs typeface="Arial" panose="020B0604020202020204" pitchFamily="34" charset="0"/>
+              </a:rPr>
+              <a:t>/status</a:t>
+            </a:r>
+          </a:p>
+        </p:txBody>
+      </p:sp>
+      <p:sp>
+        <p:nvSpPr>
+          <p:cNvPr id="3" name="Content Placeholder 2"/>
+          <p:cNvSpPr>
+            <a:spLocks noGrp="1"/>
+          </p:cNvSpPr>
+          <p:nvPr>
+            <p:ph idx="1"/>
+          </p:nvPr>
+        </p:nvSpPr>
+        <p:spPr/>
+        <p:txBody>
+          <a:bodyPr>
+            <a:normAutofit/>
+          </a:bodyPr>
+          <a:lstStyle/>
+          <a:p>
+            <a:r>
+              <a:rPr lang="nb-NO" dirty="0">
+                <a:latin typeface="Arial" panose="020B0604020202020204" pitchFamily="34" charset="0"/>
+                <a:cs typeface="Arial" panose="020B0604020202020204" pitchFamily="34" charset="0"/>
+              </a:rPr>
+              <a:t>GET method returns «event» and «news» from the server status</a:t>
+            </a:r>
+          </a:p>
+          <a:p>
+            <a:r>
+              <a:rPr lang="nb-NO" dirty="0">
+                <a:latin typeface="Arial" panose="020B0604020202020204" pitchFamily="34" charset="0"/>
+                <a:cs typeface="Arial" panose="020B0604020202020204" pitchFamily="34" charset="0"/>
+              </a:rPr>
+              <a:t>PATCH with json including «event» and «news» to update the server status – leave a param null to not update it</a:t>
+            </a:r>
+          </a:p>
+        </p:txBody>
+      </p:sp>
+    </p:spTree>
+    <p:extLst>
+      <p:ext uri="{BB962C8B-B14F-4D97-AF65-F5344CB8AC3E}">
+        <p14:creationId xmlns:p14="http://schemas.microsoft.com/office/powerpoint/2010/main" val="809141698"/>
       </p:ext>
     </p:extLst>
   </p:cSld>
@@ -6731,7 +7173,7 @@
         <p:spPr>
           <a:xfrm>
             <a:off x="838200" y="1793631"/>
-            <a:ext cx="10515600" cy="3411415"/>
+            <a:ext cx="10515600" cy="4528038"/>
           </a:xfrm>
         </p:spPr>
         <p:txBody>
@@ -6739,6 +7181,15 @@
             <a:normAutofit/>
           </a:bodyPr>
           <a:lstStyle/>
+          <a:p>
+            <a:r>
+              <a:rPr lang="en-US" dirty="0">
+                <a:latin typeface="Arial" panose="020B0604020202020204" pitchFamily="34" charset="0"/>
+                <a:cs typeface="Arial" panose="020B0604020202020204" pitchFamily="34" charset="0"/>
+              </a:rPr>
+              <a:t>Make sure Python 3 is installed</a:t>
+            </a:r>
+          </a:p>
           <a:p>
             <a:r>
               <a:rPr lang="en-US" dirty="0" err="1">
@@ -6846,6 +7297,102 @@
     <p:extLst>
       <p:ext uri="{BB962C8B-B14F-4D97-AF65-F5344CB8AC3E}">
         <p14:creationId xmlns:p14="http://schemas.microsoft.com/office/powerpoint/2010/main" val="1592436602"/>
+      </p:ext>
+    </p:extLst>
+  </p:cSld>
+  <p:clrMapOvr>
+    <a:masterClrMapping/>
+  </p:clrMapOvr>
+</p:sld>
+</file>
+
+<file path=ppt/slides/slide30.xml><?xml version="1.0" encoding="utf-8"?>
+<p:sld xmlns:a="http://schemas.openxmlformats.org/drawingml/2006/main" xmlns:r="http://schemas.openxmlformats.org/officeDocument/2006/relationships" xmlns:p="http://schemas.openxmlformats.org/presentationml/2006/main">
+  <p:cSld>
+    <p:spTree>
+      <p:nvGrpSpPr>
+        <p:cNvPr id="1" name=""/>
+        <p:cNvGrpSpPr/>
+        <p:nvPr/>
+      </p:nvGrpSpPr>
+      <p:grpSpPr>
+        <a:xfrm>
+          <a:off x="0" y="0"/>
+          <a:ext cx="0" cy="0"/>
+          <a:chOff x="0" y="0"/>
+          <a:chExt cx="0" cy="0"/>
+        </a:xfrm>
+      </p:grpSpPr>
+      <p:sp>
+        <p:nvSpPr>
+          <p:cNvPr id="2" name="Title 1"/>
+          <p:cNvSpPr>
+            <a:spLocks noGrp="1"/>
+          </p:cNvSpPr>
+          <p:nvPr>
+            <p:ph type="title"/>
+          </p:nvPr>
+        </p:nvSpPr>
+        <p:spPr>
+          <a:xfrm>
+            <a:off x="838200" y="365125"/>
+            <a:ext cx="10515600" cy="1325563"/>
+          </a:xfrm>
+        </p:spPr>
+        <p:txBody>
+          <a:bodyPr/>
+          <a:lstStyle/>
+          <a:p>
+            <a:r>
+              <a:rPr lang="en-US" dirty="0">
+                <a:latin typeface="Arial" panose="020B0604020202020204" pitchFamily="34" charset="0"/>
+                <a:cs typeface="Arial" panose="020B0604020202020204" pitchFamily="34" charset="0"/>
+              </a:rPr>
+              <a:t>/files</a:t>
+            </a:r>
+          </a:p>
+        </p:txBody>
+      </p:sp>
+      <p:sp>
+        <p:nvSpPr>
+          <p:cNvPr id="3" name="Content Placeholder 2"/>
+          <p:cNvSpPr>
+            <a:spLocks noGrp="1"/>
+          </p:cNvSpPr>
+          <p:nvPr>
+            <p:ph idx="1"/>
+          </p:nvPr>
+        </p:nvSpPr>
+        <p:spPr/>
+        <p:txBody>
+          <a:bodyPr>
+            <a:normAutofit/>
+          </a:bodyPr>
+          <a:lstStyle/>
+          <a:p>
+            <a:r>
+              <a:rPr lang="nb-NO" dirty="0">
+                <a:latin typeface="Arial" panose="020B0604020202020204" pitchFamily="34" charset="0"/>
+                <a:cs typeface="Arial" panose="020B0604020202020204" pitchFamily="34" charset="0"/>
+              </a:rPr>
+              <a:t>POST here to upload an image file. Must have the header Content-Type: application/x-www-form-urlencoded and, in the body, have «file»: &lt;file here&gt;</a:t>
+            </a:r>
+          </a:p>
+          <a:p>
+            <a:r>
+              <a:rPr lang="nb-NO" dirty="0">
+                <a:latin typeface="Arial" panose="020B0604020202020204" pitchFamily="34" charset="0"/>
+                <a:cs typeface="Arial" panose="020B0604020202020204" pitchFamily="34" charset="0"/>
+              </a:rPr>
+              <a:t>In order to get an uploaded image, the url is http://127.0.0.1:5000/uploads/&lt;file&gt;</a:t>
+            </a:r>
+          </a:p>
+        </p:txBody>
+      </p:sp>
+    </p:spTree>
+    <p:extLst>
+      <p:ext uri="{BB962C8B-B14F-4D97-AF65-F5344CB8AC3E}">
+        <p14:creationId xmlns:p14="http://schemas.microsoft.com/office/powerpoint/2010/main" val="2579076952"/>
       </p:ext>
     </p:extLst>
   </p:cSld>
@@ -6912,10 +7459,15 @@
             <p:ph idx="1"/>
           </p:nvPr>
         </p:nvSpPr>
-        <p:spPr/>
+        <p:spPr>
+          <a:xfrm>
+            <a:off x="838200" y="1825624"/>
+            <a:ext cx="10515600" cy="4667251"/>
+          </a:xfrm>
+        </p:spPr>
         <p:txBody>
           <a:bodyPr>
-            <a:normAutofit fontScale="92500" lnSpcReduction="10000"/>
+            <a:normAutofit fontScale="92500" lnSpcReduction="20000"/>
           </a:bodyPr>
           <a:lstStyle/>
           <a:p>
@@ -6989,6 +7541,21 @@
               </a:rPr>
               <a:t>flask db upgrade makes the changes reality</a:t>
             </a:r>
+          </a:p>
+          <a:p>
+            <a:r>
+              <a:rPr lang="nb-NO" dirty="0">
+                <a:latin typeface="Arial" panose="020B0604020202020204" pitchFamily="34" charset="0"/>
+                <a:cs typeface="Arial" panose="020B0604020202020204" pitchFamily="34" charset="0"/>
+              </a:rPr>
+              <a:t>Note that the server is running on port 5000, so you can access it using localhost:5000 or http://127.0.0.1:5000</a:t>
+            </a:r>
+          </a:p>
+          <a:p>
+            <a:endParaRPr lang="nb-NO" dirty="0">
+              <a:latin typeface="Arial" panose="020B0604020202020204" pitchFamily="34" charset="0"/>
+              <a:cs typeface="Arial" panose="020B0604020202020204" pitchFamily="34" charset="0"/>
+            </a:endParaRPr>
           </a:p>
           <a:p>
             <a:endParaRPr lang="nb-NO" dirty="0">
@@ -7429,7 +7996,7 @@
         </p:spPr>
         <p:txBody>
           <a:bodyPr>
-            <a:normAutofit fontScale="55000" lnSpcReduction="20000"/>
+            <a:normAutofit fontScale="47500" lnSpcReduction="20000"/>
           </a:bodyPr>
           <a:lstStyle/>
           <a:p>
@@ -7565,6 +8132,15 @@
                 <a:cs typeface="Arial" panose="020B0604020202020204" pitchFamily="34" charset="0"/>
               </a:rPr>
               <a:t>planet_items: a one-to-many relationship between User and PlanetItems, giving owner variable to PlanetItem</a:t>
+            </a:r>
+          </a:p>
+          <a:p>
+            <a:r>
+              <a:rPr lang="nb-NO" dirty="0">
+                <a:latin typeface="Arial" panose="020B0604020202020204" pitchFamily="34" charset="0"/>
+                <a:cs typeface="Arial" panose="020B0604020202020204" pitchFamily="34" charset="0"/>
+              </a:rPr>
+              <a:t>chat_items: a many-to-many relationship between Users and ChatItems</a:t>
             </a:r>
           </a:p>
           <a:p>

</xml_diff>

<commit_message>
Prevented Shop Resale from Increasing Currency
</commit_message>
<xml_diff>
--- a/iu-spec-backend.pptx
+++ b/iu-spec-backend.pptx
@@ -6706,19 +6706,8 @@
                 <a:latin typeface="Arial" panose="020B0604020202020204" pitchFamily="34" charset="0"/>
                 <a:cs typeface="Arial" panose="020B0604020202020204" pitchFamily="34" charset="0"/>
               </a:rPr>
-              <a:t>			«cost1»: «</a:t>
-            </a:r>
-            <a:r>
-              <a:rPr lang="nb-NO">
-                <a:latin typeface="Arial" panose="020B0604020202020204" pitchFamily="34" charset="0"/>
-                <a:cs typeface="Arial" panose="020B0604020202020204" pitchFamily="34" charset="0"/>
-              </a:rPr>
-              <a:t>40»,</a:t>
-            </a:r>
-            <a:endParaRPr lang="nb-NO" dirty="0">
-              <a:latin typeface="Arial" panose="020B0604020202020204" pitchFamily="34" charset="0"/>
-              <a:cs typeface="Arial" panose="020B0604020202020204" pitchFamily="34" charset="0"/>
-            </a:endParaRPr>
+              <a:t>			«cost1»: «40»,</a:t>
+            </a:r>
           </a:p>
           <a:p>
             <a:pPr marL="0" indent="0">
@@ -6912,8 +6901,19 @@
                 <a:latin typeface="Arial" panose="020B0604020202020204" pitchFamily="34" charset="0"/>
                 <a:cs typeface="Arial" panose="020B0604020202020204" pitchFamily="34" charset="0"/>
               </a:rPr>
-              <a:t>PATCH with json including «user_id», «cur1», «cur2», «cur3», «vou2» and «vou3» add these curs and vous to the User’s currency – if they’re positive increments both the current and lifetime currencies, if they’re negative only decreases the current ones</a:t>
-            </a:r>
+              <a:t>PATCH with json including «user_id», «cur1», «cur2», «cur3», «vou2» and «vou3» add these curs and vous to the User’s currency – if they’re positive increments both the current and lifetime currencies, if they’re negative only decreases the </a:t>
+            </a:r>
+            <a:r>
+              <a:rPr lang="nb-NO">
+                <a:latin typeface="Arial" panose="020B0604020202020204" pitchFamily="34" charset="0"/>
+                <a:cs typeface="Arial" panose="020B0604020202020204" pitchFamily="34" charset="0"/>
+              </a:rPr>
+              <a:t>current ones (note: you can also send an «update_lifetime» boolean to force updating or not updating lifetime currency)</a:t>
+            </a:r>
+            <a:endParaRPr lang="nb-NO" dirty="0">
+              <a:latin typeface="Arial" panose="020B0604020202020204" pitchFamily="34" charset="0"/>
+              <a:cs typeface="Arial" panose="020B0604020202020204" pitchFamily="34" charset="0"/>
+            </a:endParaRPr>
           </a:p>
         </p:txBody>
       </p:sp>

</xml_diff>

<commit_message>
Allow for Multiple Patches
</commit_message>
<xml_diff>
--- a/iu-spec-backend.pptx
+++ b/iu-spec-backend.pptx
@@ -5779,13 +5779,13 @@
         </p:nvSpPr>
         <p:spPr>
           <a:xfrm>
-            <a:off x="838200" y="1825625"/>
-            <a:ext cx="10515600" cy="4610686"/>
+            <a:off x="439615" y="1424354"/>
+            <a:ext cx="11570677" cy="5275384"/>
           </a:xfrm>
         </p:spPr>
         <p:txBody>
           <a:bodyPr>
-            <a:normAutofit fontScale="47500" lnSpcReduction="20000"/>
+            <a:normAutofit fontScale="55000" lnSpcReduction="20000"/>
           </a:bodyPr>
           <a:lstStyle/>
           <a:p>
@@ -5957,6 +5957,30 @@
                 <a:cs typeface="Arial" panose="020B0604020202020204" pitchFamily="34" charset="0"/>
               </a:rPr>
               <a:t>PATCH method with json «planet_id», «name», and «user_id» will set the planet’s owner_id to that user_id and rename it in the db. If the user already has a planet, unlinks the old one and removes its name. If the planet already has an owner or the db call fails for some reason, returns json with «status»: «error», otherwise sends «status»: «ok»</a:t>
+            </a:r>
+          </a:p>
+          <a:p>
+            <a:pPr lvl="1"/>
+            <a:r>
+              <a:rPr lang="nb-NO" dirty="0">
+                <a:latin typeface="Arial" panose="020B0604020202020204" pitchFamily="34" charset="0"/>
+                <a:cs typeface="Arial" panose="020B0604020202020204" pitchFamily="34" charset="0"/>
+              </a:rPr>
+              <a:t>You can also patch </a:t>
+            </a:r>
+            <a:r>
+              <a:rPr lang="nb-NO">
+                <a:latin typeface="Arial" panose="020B0604020202020204" pitchFamily="34" charset="0"/>
+                <a:cs typeface="Arial" panose="020B0604020202020204" pitchFamily="34" charset="0"/>
+              </a:rPr>
+              <a:t>with json </a:t>
+            </a:r>
+            <a:r>
+              <a:rPr lang="nb-NO" dirty="0">
+                <a:latin typeface="Arial" panose="020B0604020202020204" pitchFamily="34" charset="0"/>
+                <a:cs typeface="Arial" panose="020B0604020202020204" pitchFamily="34" charset="0"/>
+              </a:rPr>
+              <a:t>«surface» or «image» alongside «planet_id» to change those variables</a:t>
             </a:r>
           </a:p>
           <a:p>
@@ -6901,19 +6925,8 @@
                 <a:latin typeface="Arial" panose="020B0604020202020204" pitchFamily="34" charset="0"/>
                 <a:cs typeface="Arial" panose="020B0604020202020204" pitchFamily="34" charset="0"/>
               </a:rPr>
-              <a:t>PATCH with json including «user_id», «cur1», «cur2», «cur3», «vou2» and «vou3» add these curs and vous to the User’s currency – if they’re positive increments both the current and lifetime currencies, if they’re negative only decreases the </a:t>
-            </a:r>
-            <a:r>
-              <a:rPr lang="nb-NO">
-                <a:latin typeface="Arial" panose="020B0604020202020204" pitchFamily="34" charset="0"/>
-                <a:cs typeface="Arial" panose="020B0604020202020204" pitchFamily="34" charset="0"/>
-              </a:rPr>
-              <a:t>current ones (note: you can also send an «update_lifetime» boolean to force updating or not updating lifetime currency)</a:t>
-            </a:r>
-            <a:endParaRPr lang="nb-NO" dirty="0">
-              <a:latin typeface="Arial" panose="020B0604020202020204" pitchFamily="34" charset="0"/>
-              <a:cs typeface="Arial" panose="020B0604020202020204" pitchFamily="34" charset="0"/>
-            </a:endParaRPr>
+              <a:t>PATCH with json including «user_id», «cur1», «cur2», «cur3», «vou2» and «vou3» add these curs and vous to the User’s currency – if they’re positive increments both the current and lifetime currencies, if they’re negative only decreases the current ones (note: you can also send an «update_lifetime» boolean to force updating or not updating lifetime currency)</a:t>
+            </a:r>
           </a:p>
         </p:txBody>
       </p:sp>

</xml_diff>

<commit_message>
Revert "Allow for Multiple Patches"
This reverts commit 5bc3ce97bdfb81fe0a49a3c7e16c8374783d5f32.
</commit_message>
<xml_diff>
--- a/iu-spec-backend.pptx
+++ b/iu-spec-backend.pptx
@@ -5779,13 +5779,13 @@
         </p:nvSpPr>
         <p:spPr>
           <a:xfrm>
-            <a:off x="439615" y="1424354"/>
-            <a:ext cx="11570677" cy="5275384"/>
+            <a:off x="838200" y="1825625"/>
+            <a:ext cx="10515600" cy="4610686"/>
           </a:xfrm>
         </p:spPr>
         <p:txBody>
           <a:bodyPr>
-            <a:normAutofit fontScale="55000" lnSpcReduction="20000"/>
+            <a:normAutofit fontScale="47500" lnSpcReduction="20000"/>
           </a:bodyPr>
           <a:lstStyle/>
           <a:p>
@@ -5957,30 +5957,6 @@
                 <a:cs typeface="Arial" panose="020B0604020202020204" pitchFamily="34" charset="0"/>
               </a:rPr>
               <a:t>PATCH method with json «planet_id», «name», and «user_id» will set the planet’s owner_id to that user_id and rename it in the db. If the user already has a planet, unlinks the old one and removes its name. If the planet already has an owner or the db call fails for some reason, returns json with «status»: «error», otherwise sends «status»: «ok»</a:t>
-            </a:r>
-          </a:p>
-          <a:p>
-            <a:pPr lvl="1"/>
-            <a:r>
-              <a:rPr lang="nb-NO" dirty="0">
-                <a:latin typeface="Arial" panose="020B0604020202020204" pitchFamily="34" charset="0"/>
-                <a:cs typeface="Arial" panose="020B0604020202020204" pitchFamily="34" charset="0"/>
-              </a:rPr>
-              <a:t>You can also patch </a:t>
-            </a:r>
-            <a:r>
-              <a:rPr lang="nb-NO">
-                <a:latin typeface="Arial" panose="020B0604020202020204" pitchFamily="34" charset="0"/>
-                <a:cs typeface="Arial" panose="020B0604020202020204" pitchFamily="34" charset="0"/>
-              </a:rPr>
-              <a:t>with json </a:t>
-            </a:r>
-            <a:r>
-              <a:rPr lang="nb-NO" dirty="0">
-                <a:latin typeface="Arial" panose="020B0604020202020204" pitchFamily="34" charset="0"/>
-                <a:cs typeface="Arial" panose="020B0604020202020204" pitchFamily="34" charset="0"/>
-              </a:rPr>
-              <a:t>«surface» or «image» alongside «planet_id» to change those variables</a:t>
             </a:r>
           </a:p>
           <a:p>
@@ -6925,8 +6901,19 @@
                 <a:latin typeface="Arial" panose="020B0604020202020204" pitchFamily="34" charset="0"/>
                 <a:cs typeface="Arial" panose="020B0604020202020204" pitchFamily="34" charset="0"/>
               </a:rPr>
-              <a:t>PATCH with json including «user_id», «cur1», «cur2», «cur3», «vou2» and «vou3» add these curs and vous to the User’s currency – if they’re positive increments both the current and lifetime currencies, if they’re negative only decreases the current ones (note: you can also send an «update_lifetime» boolean to force updating or not updating lifetime currency)</a:t>
-            </a:r>
+              <a:t>PATCH with json including «user_id», «cur1», «cur2», «cur3», «vou2» and «vou3» add these curs and vous to the User’s currency – if they’re positive increments both the current and lifetime currencies, if they’re negative only decreases the </a:t>
+            </a:r>
+            <a:r>
+              <a:rPr lang="nb-NO">
+                <a:latin typeface="Arial" panose="020B0604020202020204" pitchFamily="34" charset="0"/>
+                <a:cs typeface="Arial" panose="020B0604020202020204" pitchFamily="34" charset="0"/>
+              </a:rPr>
+              <a:t>current ones (note: you can also send an «update_lifetime» boolean to force updating or not updating lifetime currency)</a:t>
+            </a:r>
+            <a:endParaRPr lang="nb-NO" dirty="0">
+              <a:latin typeface="Arial" panose="020B0604020202020204" pitchFamily="34" charset="0"/>
+              <a:cs typeface="Arial" panose="020B0604020202020204" pitchFamily="34" charset="0"/>
+            </a:endParaRPr>
           </a:p>
         </p:txBody>
       </p:sp>

</xml_diff>

<commit_message>
Fixed backend bugs, added aliens, rockets, and user info
</commit_message>
<xml_diff>
--- a/iu-spec-backend.pptx
+++ b/iu-spec-backend.pptx
@@ -18,23 +18,27 @@
     <p:sldId id="267" r:id="rId12"/>
     <p:sldId id="266" r:id="rId13"/>
     <p:sldId id="268" r:id="rId14"/>
-    <p:sldId id="286" r:id="rId15"/>
-    <p:sldId id="285" r:id="rId16"/>
-    <p:sldId id="269" r:id="rId17"/>
-    <p:sldId id="270" r:id="rId18"/>
-    <p:sldId id="271" r:id="rId19"/>
-    <p:sldId id="277" r:id="rId20"/>
-    <p:sldId id="279" r:id="rId21"/>
-    <p:sldId id="272" r:id="rId22"/>
-    <p:sldId id="273" r:id="rId23"/>
-    <p:sldId id="274" r:id="rId24"/>
-    <p:sldId id="275" r:id="rId25"/>
-    <p:sldId id="276" r:id="rId26"/>
-    <p:sldId id="287" r:id="rId27"/>
-    <p:sldId id="278" r:id="rId28"/>
-    <p:sldId id="281" r:id="rId29"/>
-    <p:sldId id="280" r:id="rId30"/>
-    <p:sldId id="284" r:id="rId31"/>
+    <p:sldId id="288" r:id="rId15"/>
+    <p:sldId id="289" r:id="rId16"/>
+    <p:sldId id="286" r:id="rId17"/>
+    <p:sldId id="285" r:id="rId18"/>
+    <p:sldId id="269" r:id="rId19"/>
+    <p:sldId id="270" r:id="rId20"/>
+    <p:sldId id="271" r:id="rId21"/>
+    <p:sldId id="277" r:id="rId22"/>
+    <p:sldId id="279" r:id="rId23"/>
+    <p:sldId id="272" r:id="rId24"/>
+    <p:sldId id="273" r:id="rId25"/>
+    <p:sldId id="274" r:id="rId26"/>
+    <p:sldId id="275" r:id="rId27"/>
+    <p:sldId id="290" r:id="rId28"/>
+    <p:sldId id="291" r:id="rId29"/>
+    <p:sldId id="276" r:id="rId30"/>
+    <p:sldId id="287" r:id="rId31"/>
+    <p:sldId id="278" r:id="rId32"/>
+    <p:sldId id="281" r:id="rId33"/>
+    <p:sldId id="280" r:id="rId34"/>
+    <p:sldId id="284" r:id="rId35"/>
   </p:sldIdLst>
   <p:sldSz cx="12192000" cy="6858000"/>
   <p:notesSz cx="6858000" cy="9144000"/>
@@ -288,7 +292,7 @@
           <a:p>
             <a:fld id="{CB54544B-930A-4C71-864D-1F69A4B5B49D}" type="datetimeFigureOut">
               <a:rPr lang="en-US" smtClean="0"/>
-              <a:t>8/6/2018</a:t>
+              <a:t>8/16/2018</a:t>
             </a:fld>
             <a:endParaRPr lang="en-US"/>
           </a:p>
@@ -486,7 +490,7 @@
           <a:p>
             <a:fld id="{CB54544B-930A-4C71-864D-1F69A4B5B49D}" type="datetimeFigureOut">
               <a:rPr lang="en-US" smtClean="0"/>
-              <a:t>8/6/2018</a:t>
+              <a:t>8/16/2018</a:t>
             </a:fld>
             <a:endParaRPr lang="en-US"/>
           </a:p>
@@ -694,7 +698,7 @@
           <a:p>
             <a:fld id="{CB54544B-930A-4C71-864D-1F69A4B5B49D}" type="datetimeFigureOut">
               <a:rPr lang="en-US" smtClean="0"/>
-              <a:t>8/6/2018</a:t>
+              <a:t>8/16/2018</a:t>
             </a:fld>
             <a:endParaRPr lang="en-US"/>
           </a:p>
@@ -892,7 +896,7 @@
           <a:p>
             <a:fld id="{CB54544B-930A-4C71-864D-1F69A4B5B49D}" type="datetimeFigureOut">
               <a:rPr lang="en-US" smtClean="0"/>
-              <a:t>8/6/2018</a:t>
+              <a:t>8/16/2018</a:t>
             </a:fld>
             <a:endParaRPr lang="en-US"/>
           </a:p>
@@ -1167,7 +1171,7 @@
           <a:p>
             <a:fld id="{CB54544B-930A-4C71-864D-1F69A4B5B49D}" type="datetimeFigureOut">
               <a:rPr lang="en-US" smtClean="0"/>
-              <a:t>8/6/2018</a:t>
+              <a:t>8/16/2018</a:t>
             </a:fld>
             <a:endParaRPr lang="en-US"/>
           </a:p>
@@ -1432,7 +1436,7 @@
           <a:p>
             <a:fld id="{CB54544B-930A-4C71-864D-1F69A4B5B49D}" type="datetimeFigureOut">
               <a:rPr lang="en-US" smtClean="0"/>
-              <a:t>8/6/2018</a:t>
+              <a:t>8/16/2018</a:t>
             </a:fld>
             <a:endParaRPr lang="en-US"/>
           </a:p>
@@ -1844,7 +1848,7 @@
           <a:p>
             <a:fld id="{CB54544B-930A-4C71-864D-1F69A4B5B49D}" type="datetimeFigureOut">
               <a:rPr lang="en-US" smtClean="0"/>
-              <a:t>8/6/2018</a:t>
+              <a:t>8/16/2018</a:t>
             </a:fld>
             <a:endParaRPr lang="en-US"/>
           </a:p>
@@ -1985,7 +1989,7 @@
           <a:p>
             <a:fld id="{CB54544B-930A-4C71-864D-1F69A4B5B49D}" type="datetimeFigureOut">
               <a:rPr lang="en-US" smtClean="0"/>
-              <a:t>8/6/2018</a:t>
+              <a:t>8/16/2018</a:t>
             </a:fld>
             <a:endParaRPr lang="en-US"/>
           </a:p>
@@ -2098,7 +2102,7 @@
           <a:p>
             <a:fld id="{CB54544B-930A-4C71-864D-1F69A4B5B49D}" type="datetimeFigureOut">
               <a:rPr lang="en-US" smtClean="0"/>
-              <a:t>8/6/2018</a:t>
+              <a:t>8/16/2018</a:t>
             </a:fld>
             <a:endParaRPr lang="en-US"/>
           </a:p>
@@ -2409,7 +2413,7 @@
           <a:p>
             <a:fld id="{CB54544B-930A-4C71-864D-1F69A4B5B49D}" type="datetimeFigureOut">
               <a:rPr lang="en-US" smtClean="0"/>
-              <a:t>8/6/2018</a:t>
+              <a:t>8/16/2018</a:t>
             </a:fld>
             <a:endParaRPr lang="en-US"/>
           </a:p>
@@ -2697,7 +2701,7 @@
           <a:p>
             <a:fld id="{CB54544B-930A-4C71-864D-1F69A4B5B49D}" type="datetimeFigureOut">
               <a:rPr lang="en-US" smtClean="0"/>
-              <a:t>8/6/2018</a:t>
+              <a:t>8/16/2018</a:t>
             </a:fld>
             <a:endParaRPr lang="en-US"/>
           </a:p>
@@ -2938,7 +2942,7 @@
           <a:p>
             <a:fld id="{CB54544B-930A-4C71-864D-1F69A4B5B49D}" type="datetimeFigureOut">
               <a:rPr lang="en-US" smtClean="0"/>
-              <a:t>8/6/2018</a:t>
+              <a:t>8/16/2018</a:t>
             </a:fld>
             <a:endParaRPr lang="en-US"/>
           </a:p>
@@ -3855,12 +3859,6 @@
               <a:t>surface: String(128)</a:t>
             </a:r>
           </a:p>
-          <a:p>
-            <a:endParaRPr lang="nb-NO" dirty="0">
-              <a:latin typeface="Arial" panose="020B0604020202020204" pitchFamily="34" charset="0"/>
-              <a:cs typeface="Arial" panose="020B0604020202020204" pitchFamily="34" charset="0"/>
-            </a:endParaRPr>
-          </a:p>
         </p:txBody>
       </p:sp>
     </p:spTree>
@@ -4066,7 +4064,7 @@
                 <a:latin typeface="Arial" panose="020B0604020202020204" pitchFamily="34" charset="0"/>
                 <a:cs typeface="Arial" panose="020B0604020202020204" pitchFamily="34" charset="0"/>
               </a:rPr>
-              <a:t>PlanetItem</a:t>
+              <a:t>AlienSpecies</a:t>
             </a:r>
             <a:endParaRPr lang="en-US" dirty="0">
               <a:latin typeface="Arial" panose="020B0604020202020204" pitchFamily="34" charset="0"/>
@@ -4097,34 +4095,34 @@
                 <a:latin typeface="Arial" panose="020B0604020202020204" pitchFamily="34" charset="0"/>
                 <a:cs typeface="Arial" panose="020B0604020202020204" pitchFamily="34" charset="0"/>
               </a:rPr>
-              <a:t>owner_id: links to User from User-PlanetItem relation</a:t>
-            </a:r>
-          </a:p>
-          <a:p>
-            <a:r>
-              <a:rPr lang="nb-NO" dirty="0">
-                <a:latin typeface="Arial" panose="020B0604020202020204" pitchFamily="34" charset="0"/>
-                <a:cs typeface="Arial" panose="020B0604020202020204" pitchFamily="34" charset="0"/>
-              </a:rPr>
-              <a:t>catalog_owner_id: links to CatalogItem from CatalogItem-PlanetItem relation</a:t>
-            </a:r>
-          </a:p>
-          <a:p>
-            <a:r>
-              <a:rPr lang="nb-NO" dirty="0">
-                <a:latin typeface="Arial" panose="020B0604020202020204" pitchFamily="34" charset="0"/>
-                <a:cs typeface="Arial" panose="020B0604020202020204" pitchFamily="34" charset="0"/>
-              </a:rPr>
-              <a:t>x: Integer</a:t>
-            </a:r>
-          </a:p>
-          <a:p>
-            <a:r>
-              <a:rPr lang="nb-NO" dirty="0">
-                <a:latin typeface="Arial" panose="020B0604020202020204" pitchFamily="34" charset="0"/>
-                <a:cs typeface="Arial" panose="020B0604020202020204" pitchFamily="34" charset="0"/>
-              </a:rPr>
-              <a:t>y: Integer</a:t>
+              <a:t>name: String(64), index = True, unique = True </a:t>
+            </a:r>
+          </a:p>
+          <a:p>
+            <a:r>
+              <a:rPr lang="nb-NO" dirty="0">
+                <a:latin typeface="Arial" panose="020B0604020202020204" pitchFamily="34" charset="0"/>
+                <a:cs typeface="Arial" panose="020B0604020202020204" pitchFamily="34" charset="0"/>
+              </a:rPr>
+              <a:t>image: String(128)</a:t>
+            </a:r>
+          </a:p>
+          <a:p>
+            <a:r>
+              <a:rPr lang="nb-NO" dirty="0">
+                <a:latin typeface="Arial" panose="020B0604020202020204" pitchFamily="34" charset="0"/>
+                <a:cs typeface="Arial" panose="020B0604020202020204" pitchFamily="34" charset="0"/>
+              </a:rPr>
+              <a:t>available: Boolean</a:t>
+            </a:r>
+          </a:p>
+          <a:p>
+            <a:r>
+              <a:rPr lang="nb-NO" dirty="0">
+                <a:latin typeface="Arial" panose="020B0604020202020204" pitchFamily="34" charset="0"/>
+                <a:cs typeface="Arial" panose="020B0604020202020204" pitchFamily="34" charset="0"/>
+              </a:rPr>
+              <a:t>aliens: a one-to-many relationship between AlienSpecies and Aliens, giving species variable to PlanetItem</a:t>
             </a:r>
           </a:p>
           <a:p>
@@ -4133,12 +4131,18 @@
               <a:cs typeface="Arial" panose="020B0604020202020204" pitchFamily="34" charset="0"/>
             </a:endParaRPr>
           </a:p>
+          <a:p>
+            <a:endParaRPr lang="nb-NO" dirty="0">
+              <a:latin typeface="Arial" panose="020B0604020202020204" pitchFamily="34" charset="0"/>
+              <a:cs typeface="Arial" panose="020B0604020202020204" pitchFamily="34" charset="0"/>
+            </a:endParaRPr>
+          </a:p>
         </p:txBody>
       </p:sp>
     </p:spTree>
     <p:extLst>
       <p:ext uri="{BB962C8B-B14F-4D97-AF65-F5344CB8AC3E}">
-        <p14:creationId xmlns:p14="http://schemas.microsoft.com/office/powerpoint/2010/main" val="412844008"/>
+        <p14:creationId xmlns:p14="http://schemas.microsoft.com/office/powerpoint/2010/main" val="3290516661"/>
       </p:ext>
     </p:extLst>
   </p:cSld>
@@ -4186,16 +4190,12 @@
           <a:lstStyle/>
           <a:p>
             <a:r>
-              <a:rPr lang="en-US" dirty="0" err="1">
-                <a:latin typeface="Arial" panose="020B0604020202020204" pitchFamily="34" charset="0"/>
-                <a:cs typeface="Arial" panose="020B0604020202020204" pitchFamily="34" charset="0"/>
-              </a:rPr>
-              <a:t>ChatItem</a:t>
-            </a:r>
-            <a:endParaRPr lang="en-US" dirty="0">
-              <a:latin typeface="Arial" panose="020B0604020202020204" pitchFamily="34" charset="0"/>
-              <a:cs typeface="Arial" panose="020B0604020202020204" pitchFamily="34" charset="0"/>
-            </a:endParaRPr>
+              <a:rPr lang="en-US" dirty="0">
+                <a:latin typeface="Arial" panose="020B0604020202020204" pitchFamily="34" charset="0"/>
+                <a:cs typeface="Arial" panose="020B0604020202020204" pitchFamily="34" charset="0"/>
+              </a:rPr>
+              <a:t>Alien</a:t>
+            </a:r>
           </a:p>
         </p:txBody>
       </p:sp>
@@ -4221,39 +4221,51 @@
                 <a:latin typeface="Arial" panose="020B0604020202020204" pitchFamily="34" charset="0"/>
                 <a:cs typeface="Arial" panose="020B0604020202020204" pitchFamily="34" charset="0"/>
               </a:rPr>
-              <a:t>itemType: Integer</a:t>
-            </a:r>
-          </a:p>
-          <a:p>
-            <a:r>
-              <a:rPr lang="nb-NO" dirty="0">
-                <a:latin typeface="Arial" panose="020B0604020202020204" pitchFamily="34" charset="0"/>
-                <a:cs typeface="Arial" panose="020B0604020202020204" pitchFamily="34" charset="0"/>
-              </a:rPr>
-              <a:t>string: String(16)</a:t>
-            </a:r>
-          </a:p>
-          <a:p>
-            <a:r>
-              <a:rPr lang="nb-NO" dirty="0">
-                <a:latin typeface="Arial" panose="020B0604020202020204" pitchFamily="34" charset="0"/>
-                <a:cs typeface="Arial" panose="020B0604020202020204" pitchFamily="34" charset="0"/>
-              </a:rPr>
-              <a:t>cost1, cost2, cost3 are all Integers</a:t>
-            </a:r>
-          </a:p>
-          <a:p>
-            <a:endParaRPr lang="nb-NO" dirty="0">
-              <a:latin typeface="Arial" panose="020B0604020202020204" pitchFamily="34" charset="0"/>
-              <a:cs typeface="Arial" panose="020B0604020202020204" pitchFamily="34" charset="0"/>
-            </a:endParaRPr>
+              <a:t>name: String(64), index = True, unique = True </a:t>
+            </a:r>
+          </a:p>
+          <a:p>
+            <a:r>
+              <a:rPr lang="nb-NO" dirty="0">
+                <a:latin typeface="Arial" panose="020B0604020202020204" pitchFamily="34" charset="0"/>
+                <a:cs typeface="Arial" panose="020B0604020202020204" pitchFamily="34" charset="0"/>
+              </a:rPr>
+              <a:t>x: Integer</a:t>
+            </a:r>
+          </a:p>
+          <a:p>
+            <a:r>
+              <a:rPr lang="nb-NO" dirty="0">
+                <a:latin typeface="Arial" panose="020B0604020202020204" pitchFamily="34" charset="0"/>
+                <a:cs typeface="Arial" panose="020B0604020202020204" pitchFamily="34" charset="0"/>
+              </a:rPr>
+              <a:t>y: Integer</a:t>
+            </a:r>
+          </a:p>
+          <a:p>
+            <a:r>
+              <a:rPr lang="nb-NO" dirty="0">
+                <a:latin typeface="Arial" panose="020B0604020202020204" pitchFamily="34" charset="0"/>
+                <a:cs typeface="Arial" panose="020B0604020202020204" pitchFamily="34" charset="0"/>
+              </a:rPr>
+              <a:t>species: links to AlienSpecies from Alien-AlienSpecies relation</a:t>
+            </a:r>
+          </a:p>
+          <a:p>
+            <a:r>
+              <a:rPr lang="nb-NO" dirty="0">
+                <a:latin typeface="Arial" panose="020B0604020202020204" pitchFamily="34" charset="0"/>
+                <a:cs typeface="Arial" panose="020B0604020202020204" pitchFamily="34" charset="0"/>
+              </a:rPr>
+              <a:t>owner: links to User from Alien-User relation</a:t>
+            </a:r>
           </a:p>
         </p:txBody>
       </p:sp>
     </p:spTree>
     <p:extLst>
       <p:ext uri="{BB962C8B-B14F-4D97-AF65-F5344CB8AC3E}">
-        <p14:creationId xmlns:p14="http://schemas.microsoft.com/office/powerpoint/2010/main" val="1099134368"/>
+        <p14:creationId xmlns:p14="http://schemas.microsoft.com/office/powerpoint/2010/main" val="1735612626"/>
       </p:ext>
     </p:extLst>
   </p:cSld>
@@ -4301,12 +4313,16 @@
           <a:lstStyle/>
           <a:p>
             <a:r>
-              <a:rPr lang="en-US" dirty="0">
-                <a:latin typeface="Arial" panose="020B0604020202020204" pitchFamily="34" charset="0"/>
-                <a:cs typeface="Arial" panose="020B0604020202020204" pitchFamily="34" charset="0"/>
-              </a:rPr>
-              <a:t>Status</a:t>
-            </a:r>
+              <a:rPr lang="en-US" dirty="0" err="1">
+                <a:latin typeface="Arial" panose="020B0604020202020204" pitchFamily="34" charset="0"/>
+                <a:cs typeface="Arial" panose="020B0604020202020204" pitchFamily="34" charset="0"/>
+              </a:rPr>
+              <a:t>PlanetItem</a:t>
+            </a:r>
+            <a:endParaRPr lang="en-US" dirty="0">
+              <a:latin typeface="Arial" panose="020B0604020202020204" pitchFamily="34" charset="0"/>
+              <a:cs typeface="Arial" panose="020B0604020202020204" pitchFamily="34" charset="0"/>
+            </a:endParaRPr>
           </a:p>
         </p:txBody>
       </p:sp>
@@ -4332,24 +4348,57 @@
                 <a:latin typeface="Arial" panose="020B0604020202020204" pitchFamily="34" charset="0"/>
                 <a:cs typeface="Arial" panose="020B0604020202020204" pitchFamily="34" charset="0"/>
               </a:rPr>
-              <a:t>event: Boolean that keeps track of whether or not an event is taking place</a:t>
-            </a:r>
-          </a:p>
-          <a:p>
-            <a:r>
-              <a:rPr lang="nb-NO" dirty="0">
-                <a:latin typeface="Arial" panose="020B0604020202020204" pitchFamily="34" charset="0"/>
-                <a:cs typeface="Arial" panose="020B0604020202020204" pitchFamily="34" charset="0"/>
-              </a:rPr>
-              <a:t>news: String(256) that displays on login</a:t>
-            </a:r>
+              <a:t>owner_id: links to User from User-PlanetItem relation</a:t>
+            </a:r>
+          </a:p>
+          <a:p>
+            <a:r>
+              <a:rPr lang="nb-NO" dirty="0">
+                <a:latin typeface="Arial" panose="020B0604020202020204" pitchFamily="34" charset="0"/>
+                <a:cs typeface="Arial" panose="020B0604020202020204" pitchFamily="34" charset="0"/>
+              </a:rPr>
+              <a:t>catalog_owner_id: links to CatalogItem from CatalogItem-PlanetItem relation</a:t>
+            </a:r>
+          </a:p>
+          <a:p>
+            <a:r>
+              <a:rPr lang="nb-NO" dirty="0">
+                <a:latin typeface="Arial" panose="020B0604020202020204" pitchFamily="34" charset="0"/>
+                <a:cs typeface="Arial" panose="020B0604020202020204" pitchFamily="34" charset="0"/>
+              </a:rPr>
+              <a:t>x: Integer</a:t>
+            </a:r>
+          </a:p>
+          <a:p>
+            <a:r>
+              <a:rPr lang="nb-NO" dirty="0">
+                <a:latin typeface="Arial" panose="020B0604020202020204" pitchFamily="34" charset="0"/>
+                <a:cs typeface="Arial" panose="020B0604020202020204" pitchFamily="34" charset="0"/>
+              </a:rPr>
+              <a:t>y: Integer</a:t>
+            </a:r>
+          </a:p>
+          <a:p>
+            <a:r>
+              <a:rPr lang="nb-NO" dirty="0">
+                <a:latin typeface="Arial" panose="020B0604020202020204" pitchFamily="34" charset="0"/>
+                <a:cs typeface="Arial" panose="020B0604020202020204" pitchFamily="34" charset="0"/>
+              </a:rPr>
+              <a:t>isRocket: boolean</a:t>
+            </a:r>
+          </a:p>
+          <a:p>
+            <a:endParaRPr lang="nb-NO" dirty="0">
+              <a:latin typeface="Arial" panose="020B0604020202020204" pitchFamily="34" charset="0"/>
+              <a:cs typeface="Arial" panose="020B0604020202020204" pitchFamily="34" charset="0"/>
+            </a:endParaRPr>
           </a:p>
         </p:txBody>
       </p:sp>
     </p:spTree>
     <p:extLst>
       <p:ext uri="{BB962C8B-B14F-4D97-AF65-F5344CB8AC3E}">
-        <p14:creationId xmlns:p14="http://schemas.microsoft.com/office/powerpoint/2010/main" val="2941787461"/>
+        <p14:creationId xmlns:p14="http://schemas.microsoft.com/office/powerpoint/2010/main" val="412844008"/>
       </p:ext>
     </p:extLst>
   </p:cSld>
@@ -4388,7 +4437,7 @@
         </p:nvSpPr>
         <p:spPr>
           <a:xfrm>
-            <a:off x="900087" y="1734160"/>
+            <a:off x="838200" y="365125"/>
             <a:ext cx="10515600" cy="1325563"/>
           </a:xfrm>
         </p:spPr>
@@ -4396,13 +4445,12 @@
           <a:bodyPr/>
           <a:lstStyle/>
           <a:p>
-            <a:pPr algn="ctr"/>
-            <a:r>
-              <a:rPr lang="en-US" sz="8000" dirty="0">
-                <a:latin typeface="Arial" panose="020B0604020202020204" pitchFamily="34" charset="0"/>
-                <a:cs typeface="Arial" panose="020B0604020202020204" pitchFamily="34" charset="0"/>
-              </a:rPr>
-              <a:t>HTTP Methods</a:t>
+            <a:r>
+              <a:rPr lang="en-US" dirty="0" err="1">
+                <a:latin typeface="Arial" panose="020B0604020202020204" pitchFamily="34" charset="0"/>
+                <a:cs typeface="Arial" panose="020B0604020202020204" pitchFamily="34" charset="0"/>
+              </a:rPr>
+              <a:t>ChatItem</a:t>
             </a:r>
             <a:endParaRPr lang="en-US" dirty="0">
               <a:latin typeface="Arial" panose="020B0604020202020204" pitchFamily="34" charset="0"/>
@@ -4413,13 +4461,7 @@
       </p:sp>
       <p:sp>
         <p:nvSpPr>
-          <p:cNvPr id="3" name="Content Placeholder 2">
-            <a:extLst>
-              <a:ext uri="{FF2B5EF4-FFF2-40B4-BE49-F238E27FC236}">
-                <a16:creationId xmlns:a16="http://schemas.microsoft.com/office/drawing/2014/main" id="{BE3FB728-F36C-4A19-84C0-7B717486095B}"/>
-              </a:ext>
-            </a:extLst>
-          </p:cNvPr>
+          <p:cNvPr id="3" name="Content Placeholder 2"/>
           <p:cNvSpPr>
             <a:spLocks noGrp="1"/>
           </p:cNvSpPr>
@@ -4427,50 +4469,51 @@
             <p:ph idx="1"/>
           </p:nvPr>
         </p:nvSpPr>
-        <p:spPr>
-          <a:xfrm>
-            <a:off x="838200" y="3798277"/>
-            <a:ext cx="10515600" cy="2378686"/>
-          </a:xfrm>
-        </p:spPr>
+        <p:spPr/>
         <p:txBody>
           <a:bodyPr>
             <a:normAutofit/>
           </a:bodyPr>
           <a:lstStyle/>
           <a:p>
-            <a:pPr marL="0" indent="0" algn="ctr">
-              <a:buNone/>
-            </a:pPr>
-            <a:r>
-              <a:rPr lang="nb-NO" dirty="0">
-                <a:latin typeface="Arial" panose="020B0604020202020204" pitchFamily="34" charset="0"/>
-                <a:cs typeface="Arial" panose="020B0604020202020204" pitchFamily="34" charset="0"/>
-              </a:rPr>
-              <a:t>Small note: if an HTTP method requires JSON data to be passed in, a request should have a Content-Type: application/json header. See </a:t>
-            </a:r>
-            <a:r>
-              <a:rPr lang="nb-NO" dirty="0">
-                <a:latin typeface="Arial" panose="020B0604020202020204" pitchFamily="34" charset="0"/>
-                <a:cs typeface="Arial" panose="020B0604020202020204" pitchFamily="34" charset="0"/>
-                <a:hlinkClick r:id="rId2"/>
-              </a:rPr>
-              <a:t>https://stackoverflow.com/questions/44959749/fetch-with-headers</a:t>
-            </a:r>
-            <a:r>
-              <a:rPr lang="nb-NO" dirty="0">
-                <a:latin typeface="Arial" panose="020B0604020202020204" pitchFamily="34" charset="0"/>
-                <a:cs typeface="Arial" panose="020B0604020202020204" pitchFamily="34" charset="0"/>
-              </a:rPr>
-              <a:t> for an example.</a:t>
-            </a:r>
+            <a:r>
+              <a:rPr lang="nb-NO" dirty="0">
+                <a:latin typeface="Arial" panose="020B0604020202020204" pitchFamily="34" charset="0"/>
+                <a:cs typeface="Arial" panose="020B0604020202020204" pitchFamily="34" charset="0"/>
+              </a:rPr>
+              <a:t>itemType: Integer</a:t>
+            </a:r>
+          </a:p>
+          <a:p>
+            <a:r>
+              <a:rPr lang="nb-NO" dirty="0">
+                <a:latin typeface="Arial" panose="020B0604020202020204" pitchFamily="34" charset="0"/>
+                <a:cs typeface="Arial" panose="020B0604020202020204" pitchFamily="34" charset="0"/>
+              </a:rPr>
+              <a:t>string: String(16)</a:t>
+            </a:r>
+          </a:p>
+          <a:p>
+            <a:r>
+              <a:rPr lang="nb-NO" dirty="0">
+                <a:latin typeface="Arial" panose="020B0604020202020204" pitchFamily="34" charset="0"/>
+                <a:cs typeface="Arial" panose="020B0604020202020204" pitchFamily="34" charset="0"/>
+              </a:rPr>
+              <a:t>cost1, cost2, cost3 are all Integers</a:t>
+            </a:r>
+          </a:p>
+          <a:p>
+            <a:endParaRPr lang="nb-NO" dirty="0">
+              <a:latin typeface="Arial" panose="020B0604020202020204" pitchFamily="34" charset="0"/>
+              <a:cs typeface="Arial" panose="020B0604020202020204" pitchFamily="34" charset="0"/>
+            </a:endParaRPr>
           </a:p>
         </p:txBody>
       </p:sp>
     </p:spTree>
     <p:extLst>
       <p:ext uri="{BB962C8B-B14F-4D97-AF65-F5344CB8AC3E}">
-        <p14:creationId xmlns:p14="http://schemas.microsoft.com/office/powerpoint/2010/main" val="4062299613"/>
+        <p14:creationId xmlns:p14="http://schemas.microsoft.com/office/powerpoint/2010/main" val="1099134368"/>
       </p:ext>
     </p:extLst>
   </p:cSld>
@@ -4522,7 +4565,7 @@
                 <a:latin typeface="Arial" panose="020B0604020202020204" pitchFamily="34" charset="0"/>
                 <a:cs typeface="Arial" panose="020B0604020202020204" pitchFamily="34" charset="0"/>
               </a:rPr>
-              <a:t>/login</a:t>
+              <a:t>Status</a:t>
             </a:r>
           </a:p>
         </p:txBody>
@@ -4549,39 +4592,24 @@
                 <a:latin typeface="Arial" panose="020B0604020202020204" pitchFamily="34" charset="0"/>
                 <a:cs typeface="Arial" panose="020B0604020202020204" pitchFamily="34" charset="0"/>
               </a:rPr>
-              <a:t>POST json w/ "username", "password_hash", "email" to users and the user will be added to the database, returns json with «status»: «ok» or «error», and «user_id» if successful</a:t>
-            </a:r>
-          </a:p>
-          <a:p>
-            <a:r>
-              <a:rPr lang="nb-NO" dirty="0">
-                <a:latin typeface="Arial" panose="020B0604020202020204" pitchFamily="34" charset="0"/>
-                <a:cs typeface="Arial" panose="020B0604020202020204" pitchFamily="34" charset="0"/>
-              </a:rPr>
-              <a:t>GET method w/ params «username» and «password_hash» will return «status»: «ok» or «error» based on whether or not the login attempt was successful, and «user_id» if successful</a:t>
-            </a:r>
-          </a:p>
-          <a:p>
-            <a:r>
-              <a:rPr lang="nb-NO" dirty="0">
-                <a:latin typeface="Arial" panose="020B0604020202020204" pitchFamily="34" charset="0"/>
-                <a:cs typeface="Arial" panose="020B0604020202020204" pitchFamily="34" charset="0"/>
-              </a:rPr>
-              <a:t>DELETE method w/ params «username» will logout the current user, returning «status»: «ok» or «error»</a:t>
-            </a:r>
-          </a:p>
-          <a:p>
-            <a:endParaRPr lang="nb-NO" dirty="0">
-              <a:latin typeface="Arial" panose="020B0604020202020204" pitchFamily="34" charset="0"/>
-              <a:cs typeface="Arial" panose="020B0604020202020204" pitchFamily="34" charset="0"/>
-            </a:endParaRPr>
+              <a:t>event: Boolean that keeps track of whether or not an event is taking place</a:t>
+            </a:r>
+          </a:p>
+          <a:p>
+            <a:r>
+              <a:rPr lang="nb-NO" dirty="0">
+                <a:latin typeface="Arial" panose="020B0604020202020204" pitchFamily="34" charset="0"/>
+                <a:cs typeface="Arial" panose="020B0604020202020204" pitchFamily="34" charset="0"/>
+              </a:rPr>
+              <a:t>news: String(256) that displays on login</a:t>
+            </a:r>
           </a:p>
         </p:txBody>
       </p:sp>
     </p:spTree>
     <p:extLst>
       <p:ext uri="{BB962C8B-B14F-4D97-AF65-F5344CB8AC3E}">
-        <p14:creationId xmlns:p14="http://schemas.microsoft.com/office/powerpoint/2010/main" val="199329726"/>
+        <p14:creationId xmlns:p14="http://schemas.microsoft.com/office/powerpoint/2010/main" val="2941787461"/>
       </p:ext>
     </p:extLst>
   </p:cSld>
@@ -4620,7 +4648,7 @@
         </p:nvSpPr>
         <p:spPr>
           <a:xfrm>
-            <a:off x="838200" y="365125"/>
+            <a:off x="900087" y="1734160"/>
             <a:ext cx="10515600" cy="1325563"/>
           </a:xfrm>
         </p:spPr>
@@ -4628,19 +4656,30 @@
           <a:bodyPr/>
           <a:lstStyle/>
           <a:p>
-            <a:r>
-              <a:rPr lang="en-US" dirty="0">
-                <a:latin typeface="Arial" panose="020B0604020202020204" pitchFamily="34" charset="0"/>
-                <a:cs typeface="Arial" panose="020B0604020202020204" pitchFamily="34" charset="0"/>
-              </a:rPr>
-              <a:t>/users</a:t>
-            </a:r>
-          </a:p>
-        </p:txBody>
-      </p:sp>
-      <p:sp>
-        <p:nvSpPr>
-          <p:cNvPr id="3" name="Content Placeholder 2"/>
+            <a:pPr algn="ctr"/>
+            <a:r>
+              <a:rPr lang="en-US" sz="8000" dirty="0">
+                <a:latin typeface="Arial" panose="020B0604020202020204" pitchFamily="34" charset="0"/>
+                <a:cs typeface="Arial" panose="020B0604020202020204" pitchFamily="34" charset="0"/>
+              </a:rPr>
+              <a:t>HTTP Methods</a:t>
+            </a:r>
+            <a:endParaRPr lang="en-US" dirty="0">
+              <a:latin typeface="Arial" panose="020B0604020202020204" pitchFamily="34" charset="0"/>
+              <a:cs typeface="Arial" panose="020B0604020202020204" pitchFamily="34" charset="0"/>
+            </a:endParaRPr>
+          </a:p>
+        </p:txBody>
+      </p:sp>
+      <p:sp>
+        <p:nvSpPr>
+          <p:cNvPr id="3" name="Content Placeholder 2">
+            <a:extLst>
+              <a:ext uri="{FF2B5EF4-FFF2-40B4-BE49-F238E27FC236}">
+                <a16:creationId xmlns:a16="http://schemas.microsoft.com/office/drawing/2014/main" id="{BE3FB728-F36C-4A19-84C0-7B717486095B}"/>
+              </a:ext>
+            </a:extLst>
+          </p:cNvPr>
           <p:cNvSpPr>
             <a:spLocks noGrp="1"/>
           </p:cNvSpPr>
@@ -4648,57 +4687,50 @@
             <p:ph idx="1"/>
           </p:nvPr>
         </p:nvSpPr>
-        <p:spPr/>
+        <p:spPr>
+          <a:xfrm>
+            <a:off x="838200" y="3798277"/>
+            <a:ext cx="10515600" cy="2378686"/>
+          </a:xfrm>
+        </p:spPr>
         <p:txBody>
           <a:bodyPr>
             <a:normAutofit/>
           </a:bodyPr>
           <a:lstStyle/>
           <a:p>
-            <a:r>
-              <a:rPr lang="nb-NO" dirty="0">
-                <a:latin typeface="Arial" panose="020B0604020202020204" pitchFamily="34" charset="0"/>
-                <a:cs typeface="Arial" panose="020B0604020202020204" pitchFamily="34" charset="0"/>
-              </a:rPr>
-              <a:t>GET method w/ params «user_id» and returns json of username, email, name, login_days, last_login, planet_id, chat_color, and alien</a:t>
-            </a:r>
-          </a:p>
-          <a:p>
-            <a:r>
-              <a:rPr lang="nb-NO" dirty="0">
-                <a:latin typeface="Arial" panose="020B0604020202020204" pitchFamily="34" charset="0"/>
-                <a:cs typeface="Arial" panose="020B0604020202020204" pitchFamily="34" charset="0"/>
-              </a:rPr>
-              <a:t>PATCH method w/ params «user_id» and nothing else will update last_login, and if the new last_login is on a different day, increases login_days by 1 and returns json with «new_day»: true, otherwise returns «new_day»: false, and regardless also returns login_days</a:t>
-            </a:r>
-          </a:p>
-          <a:p>
-            <a:r>
-              <a:rPr lang="nb-NO" dirty="0">
-                <a:latin typeface="Arial" panose="020B0604020202020204" pitchFamily="34" charset="0"/>
-                <a:cs typeface="Arial" panose="020B0604020202020204" pitchFamily="34" charset="0"/>
-              </a:rPr>
-              <a:t>PATCH method w/ params «user_id» and «chat_color» or «alien» or «rocket» will update that value</a:t>
-            </a:r>
-          </a:p>
-          <a:p>
-            <a:endParaRPr lang="nb-NO" dirty="0">
-              <a:latin typeface="Arial" panose="020B0604020202020204" pitchFamily="34" charset="0"/>
-              <a:cs typeface="Arial" panose="020B0604020202020204" pitchFamily="34" charset="0"/>
-            </a:endParaRPr>
-          </a:p>
-          <a:p>
-            <a:endParaRPr lang="nb-NO" dirty="0">
-              <a:latin typeface="Arial" panose="020B0604020202020204" pitchFamily="34" charset="0"/>
-              <a:cs typeface="Arial" panose="020B0604020202020204" pitchFamily="34" charset="0"/>
-            </a:endParaRPr>
+            <a:pPr marL="0" indent="0" algn="ctr">
+              <a:buNone/>
+            </a:pPr>
+            <a:r>
+              <a:rPr lang="nb-NO" dirty="0">
+                <a:latin typeface="Arial" panose="020B0604020202020204" pitchFamily="34" charset="0"/>
+                <a:cs typeface="Arial" panose="020B0604020202020204" pitchFamily="34" charset="0"/>
+              </a:rPr>
+              <a:t>Small note: if an HTTP method requires JSON data to be passed in, a request should have a Content-Type: application/json header. See </a:t>
+            </a:r>
+            <a:r>
+              <a:rPr lang="nb-NO" dirty="0">
+                <a:latin typeface="Arial" panose="020B0604020202020204" pitchFamily="34" charset="0"/>
+                <a:cs typeface="Arial" panose="020B0604020202020204" pitchFamily="34" charset="0"/>
+                <a:hlinkClick r:id="rId2"/>
+              </a:rPr>
+              <a:t>https://stackoverflow.com/questions/44959749/fetch-with-headers</a:t>
+            </a:r>
+            <a:r>
+              <a:rPr lang="nb-NO" dirty="0">
+                <a:latin typeface="Arial" panose="020B0604020202020204" pitchFamily="34" charset="0"/>
+                <a:cs typeface="Arial" panose="020B0604020202020204" pitchFamily="34" charset="0"/>
+              </a:rPr>
+              <a:t> for an example.</a:t>
+            </a:r>
           </a:p>
         </p:txBody>
       </p:sp>
     </p:spTree>
     <p:extLst>
       <p:ext uri="{BB962C8B-B14F-4D97-AF65-F5344CB8AC3E}">
-        <p14:creationId xmlns:p14="http://schemas.microsoft.com/office/powerpoint/2010/main" val="696820992"/>
+        <p14:creationId xmlns:p14="http://schemas.microsoft.com/office/powerpoint/2010/main" val="4062299613"/>
       </p:ext>
     </p:extLst>
   </p:cSld>
@@ -5021,7 +5053,7 @@
                 <a:latin typeface="Arial" panose="020B0604020202020204" pitchFamily="34" charset="0"/>
                 <a:cs typeface="Arial" panose="020B0604020202020204" pitchFamily="34" charset="0"/>
               </a:rPr>
-              <a:t>/visitors</a:t>
+              <a:t>/login</a:t>
             </a:r>
           </a:p>
         </p:txBody>
@@ -5039,7 +5071,7 @@
         <p:spPr/>
         <p:txBody>
           <a:bodyPr>
-            <a:normAutofit fontScale="55000" lnSpcReduction="20000"/>
+            <a:normAutofit/>
           </a:bodyPr>
           <a:lstStyle/>
           <a:p>
@@ -5048,163 +5080,28 @@
                 <a:latin typeface="Arial" panose="020B0604020202020204" pitchFamily="34" charset="0"/>
                 <a:cs typeface="Arial" panose="020B0604020202020204" pitchFamily="34" charset="0"/>
               </a:rPr>
-              <a:t>POST method w/ params «visitor_id» and «visited_id» adds a relationship between the Users</a:t>
-            </a:r>
-          </a:p>
-          <a:p>
-            <a:r>
-              <a:rPr lang="nb-NO" dirty="0">
-                <a:latin typeface="Arial" panose="020B0604020202020204" pitchFamily="34" charset="0"/>
-                <a:cs typeface="Arial" panose="020B0604020202020204" pitchFamily="34" charset="0"/>
-              </a:rPr>
-              <a:t>GET method w/ params «user_id» returns json that contains each user_id they’ve visited</a:t>
-            </a:r>
-          </a:p>
-          <a:p>
-            <a:r>
-              <a:rPr lang="nb-NO" dirty="0">
-                <a:latin typeface="Arial" panose="020B0604020202020204" pitchFamily="34" charset="0"/>
-                <a:cs typeface="Arial" panose="020B0604020202020204" pitchFamily="34" charset="0"/>
-              </a:rPr>
-              <a:t>DELETE method w/ params «user_id» takes note that that user has updated their planet, and removes all relationships where visited is the user</a:t>
-            </a:r>
-          </a:p>
-          <a:p>
-            <a:pPr marL="0" indent="0">
-              <a:buNone/>
-            </a:pPr>
-            <a:r>
-              <a:rPr lang="nb-NO" dirty="0">
-                <a:latin typeface="Arial" panose="020B0604020202020204" pitchFamily="34" charset="0"/>
-                <a:cs typeface="Arial" panose="020B0604020202020204" pitchFamily="34" charset="0"/>
-              </a:rPr>
-              <a:t>{</a:t>
-            </a:r>
-          </a:p>
-          <a:p>
-            <a:pPr marL="0" indent="0">
-              <a:buNone/>
-            </a:pPr>
-            <a:r>
-              <a:rPr lang="nb-NO" dirty="0">
-                <a:latin typeface="Arial" panose="020B0604020202020204" pitchFamily="34" charset="0"/>
-                <a:cs typeface="Arial" panose="020B0604020202020204" pitchFamily="34" charset="0"/>
-              </a:rPr>
-              <a:t>«results»:</a:t>
-            </a:r>
-          </a:p>
-          <a:p>
-            <a:pPr marL="0" indent="0">
-              <a:buNone/>
-            </a:pPr>
-            <a:r>
-              <a:rPr lang="nb-NO" dirty="0">
-                <a:latin typeface="Arial" panose="020B0604020202020204" pitchFamily="34" charset="0"/>
-                <a:cs typeface="Arial" panose="020B0604020202020204" pitchFamily="34" charset="0"/>
-              </a:rPr>
-              <a:t>	[</a:t>
-            </a:r>
-          </a:p>
-          <a:p>
-            <a:pPr marL="0" indent="0">
-              <a:buNone/>
-            </a:pPr>
-            <a:r>
-              <a:rPr lang="nb-NO" dirty="0">
-                <a:latin typeface="Arial" panose="020B0604020202020204" pitchFamily="34" charset="0"/>
-                <a:cs typeface="Arial" panose="020B0604020202020204" pitchFamily="34" charset="0"/>
-              </a:rPr>
-              <a:t>		{</a:t>
-            </a:r>
-          </a:p>
-          <a:p>
-            <a:pPr marL="0" indent="0">
-              <a:buNone/>
-            </a:pPr>
-            <a:r>
-              <a:rPr lang="nb-NO" dirty="0">
-                <a:latin typeface="Arial" panose="020B0604020202020204" pitchFamily="34" charset="0"/>
-                <a:cs typeface="Arial" panose="020B0604020202020204" pitchFamily="34" charset="0"/>
-              </a:rPr>
-              <a:t>			«id»: 9</a:t>
-            </a:r>
-          </a:p>
-          <a:p>
-            <a:pPr marL="0" indent="0">
-              <a:buNone/>
-            </a:pPr>
-            <a:r>
-              <a:rPr lang="nb-NO" dirty="0">
-                <a:latin typeface="Arial" panose="020B0604020202020204" pitchFamily="34" charset="0"/>
-                <a:cs typeface="Arial" panose="020B0604020202020204" pitchFamily="34" charset="0"/>
-              </a:rPr>
-              <a:t>		},</a:t>
-            </a:r>
-          </a:p>
-          <a:p>
-            <a:pPr marL="0" indent="0">
-              <a:buNone/>
-            </a:pPr>
-            <a:r>
-              <a:rPr lang="nb-NO" dirty="0">
-                <a:latin typeface="Arial" panose="020B0604020202020204" pitchFamily="34" charset="0"/>
-                <a:cs typeface="Arial" panose="020B0604020202020204" pitchFamily="34" charset="0"/>
-              </a:rPr>
-              <a:t>		{</a:t>
-            </a:r>
-          </a:p>
-          <a:p>
-            <a:pPr marL="0" indent="0">
-              <a:buNone/>
-            </a:pPr>
-            <a:r>
-              <a:rPr lang="nb-NO" dirty="0">
-                <a:latin typeface="Arial" panose="020B0604020202020204" pitchFamily="34" charset="0"/>
-                <a:cs typeface="Arial" panose="020B0604020202020204" pitchFamily="34" charset="0"/>
-              </a:rPr>
-              <a:t>			«id»: 10</a:t>
-            </a:r>
-          </a:p>
-          <a:p>
-            <a:pPr marL="0" indent="0">
-              <a:buNone/>
-            </a:pPr>
-            <a:r>
-              <a:rPr lang="nb-NO" dirty="0">
-                <a:latin typeface="Arial" panose="020B0604020202020204" pitchFamily="34" charset="0"/>
-                <a:cs typeface="Arial" panose="020B0604020202020204" pitchFamily="34" charset="0"/>
-              </a:rPr>
-              <a:t>		}</a:t>
-            </a:r>
-          </a:p>
-          <a:p>
-            <a:pPr marL="0" indent="0">
-              <a:buNone/>
-            </a:pPr>
-            <a:r>
-              <a:rPr lang="nb-NO" dirty="0">
-                <a:latin typeface="Arial" panose="020B0604020202020204" pitchFamily="34" charset="0"/>
-                <a:cs typeface="Arial" panose="020B0604020202020204" pitchFamily="34" charset="0"/>
-              </a:rPr>
-              <a:t>	]</a:t>
-            </a:r>
-          </a:p>
-          <a:p>
-            <a:pPr marL="0" indent="0">
-              <a:buNone/>
-            </a:pPr>
-            <a:r>
-              <a:rPr lang="nb-NO" dirty="0">
-                <a:latin typeface="Arial" panose="020B0604020202020204" pitchFamily="34" charset="0"/>
-                <a:cs typeface="Arial" panose="020B0604020202020204" pitchFamily="34" charset="0"/>
-              </a:rPr>
-              <a:t>}</a:t>
-            </a:r>
-          </a:p>
-          <a:p>
-            <a:pPr marL="0" indent="0">
-              <a:buNone/>
-            </a:pPr>
+              <a:t>POST json w/ "username", "password_hash", "email" to users and the user will be added to the database, returns json with «status»: «ok» or «error», and «user_id» if successful</a:t>
+            </a:r>
+          </a:p>
+          <a:p>
+            <a:r>
+              <a:rPr lang="nb-NO" dirty="0">
+                <a:latin typeface="Arial" panose="020B0604020202020204" pitchFamily="34" charset="0"/>
+                <a:cs typeface="Arial" panose="020B0604020202020204" pitchFamily="34" charset="0"/>
+              </a:rPr>
+              <a:t>GET method w/ params «username» and «password_hash» will return «status»: «ok» or «error» based on whether or not the login attempt was successful, and «user_id» if successful</a:t>
+            </a:r>
+          </a:p>
+          <a:p>
+            <a:r>
+              <a:rPr lang="nb-NO" dirty="0">
+                <a:latin typeface="Arial" panose="020B0604020202020204" pitchFamily="34" charset="0"/>
+                <a:cs typeface="Arial" panose="020B0604020202020204" pitchFamily="34" charset="0"/>
+              </a:rPr>
+              <a:t>DELETE method w/ params «username» will logout the current user, returning «status»: «ok» or «error»</a:t>
+            </a:r>
+          </a:p>
+          <a:p>
             <a:endParaRPr lang="nb-NO" dirty="0">
               <a:latin typeface="Arial" panose="020B0604020202020204" pitchFamily="34" charset="0"/>
               <a:cs typeface="Arial" panose="020B0604020202020204" pitchFamily="34" charset="0"/>
@@ -5215,7 +5112,7 @@
     </p:spTree>
     <p:extLst>
       <p:ext uri="{BB962C8B-B14F-4D97-AF65-F5344CB8AC3E}">
-        <p14:creationId xmlns:p14="http://schemas.microsoft.com/office/powerpoint/2010/main" val="1092747602"/>
+        <p14:creationId xmlns:p14="http://schemas.microsoft.com/office/powerpoint/2010/main" val="199329726"/>
       </p:ext>
     </p:extLst>
   </p:cSld>
@@ -5267,7 +5164,7 @@
                 <a:latin typeface="Arial" panose="020B0604020202020204" pitchFamily="34" charset="0"/>
                 <a:cs typeface="Arial" panose="020B0604020202020204" pitchFamily="34" charset="0"/>
               </a:rPr>
-              <a:t>/galaxies</a:t>
+              <a:t>/users</a:t>
             </a:r>
           </a:p>
         </p:txBody>
@@ -5285,7 +5182,7 @@
         <p:spPr/>
         <p:txBody>
           <a:bodyPr>
-            <a:normAutofit fontScale="55000" lnSpcReduction="20000"/>
+            <a:normAutofit/>
           </a:bodyPr>
           <a:lstStyle/>
           <a:p>
@@ -5294,168 +5191,45 @@
                 <a:latin typeface="Arial" panose="020B0604020202020204" pitchFamily="34" charset="0"/>
                 <a:cs typeface="Arial" panose="020B0604020202020204" pitchFamily="34" charset="0"/>
               </a:rPr>
-              <a:t>GET method will return json that contains each Galaxy and its variables, for example:</a:t>
-            </a:r>
-          </a:p>
-          <a:p>
-            <a:pPr marL="0" indent="0">
-              <a:buNone/>
-            </a:pPr>
-            <a:r>
-              <a:rPr lang="nb-NO" dirty="0">
-                <a:latin typeface="Arial" panose="020B0604020202020204" pitchFamily="34" charset="0"/>
-                <a:cs typeface="Arial" panose="020B0604020202020204" pitchFamily="34" charset="0"/>
-              </a:rPr>
-              <a:t>{</a:t>
-            </a:r>
-          </a:p>
-          <a:p>
-            <a:pPr marL="0" indent="0">
-              <a:buNone/>
-            </a:pPr>
-            <a:r>
-              <a:rPr lang="nb-NO" dirty="0">
-                <a:latin typeface="Arial" panose="020B0604020202020204" pitchFamily="34" charset="0"/>
-                <a:cs typeface="Arial" panose="020B0604020202020204" pitchFamily="34" charset="0"/>
-              </a:rPr>
-              <a:t>«results»:</a:t>
-            </a:r>
-          </a:p>
-          <a:p>
-            <a:pPr marL="0" indent="0">
-              <a:buNone/>
-            </a:pPr>
-            <a:r>
-              <a:rPr lang="nb-NO" dirty="0">
-                <a:latin typeface="Arial" panose="020B0604020202020204" pitchFamily="34" charset="0"/>
-                <a:cs typeface="Arial" panose="020B0604020202020204" pitchFamily="34" charset="0"/>
-              </a:rPr>
-              <a:t>	[,</a:t>
-            </a:r>
-          </a:p>
-          <a:p>
-            <a:pPr marL="0" indent="0">
-              <a:buNone/>
-            </a:pPr>
-            <a:r>
-              <a:rPr lang="nb-NO" dirty="0">
-                <a:latin typeface="Arial" panose="020B0604020202020204" pitchFamily="34" charset="0"/>
-                <a:cs typeface="Arial" panose="020B0604020202020204" pitchFamily="34" charset="0"/>
-              </a:rPr>
-              <a:t>		{</a:t>
-            </a:r>
-          </a:p>
-          <a:p>
-            <a:pPr marL="0" indent="0">
-              <a:buNone/>
-            </a:pPr>
-            <a:r>
-              <a:rPr lang="nb-NO" dirty="0">
-                <a:latin typeface="Arial" panose="020B0604020202020204" pitchFamily="34" charset="0"/>
-                <a:cs typeface="Arial" panose="020B0604020202020204" pitchFamily="34" charset="0"/>
-              </a:rPr>
-              <a:t>			«id»: «0»,</a:t>
-            </a:r>
-          </a:p>
-          <a:p>
-            <a:pPr marL="0" indent="0">
-              <a:buNone/>
-            </a:pPr>
-            <a:r>
-              <a:rPr lang="nb-NO" dirty="0">
-                <a:latin typeface="Arial" panose="020B0604020202020204" pitchFamily="34" charset="0"/>
-                <a:cs typeface="Arial" panose="020B0604020202020204" pitchFamily="34" charset="0"/>
-              </a:rPr>
-              <a:t>			«name»: «Build-It-Yourself Galaxy»,</a:t>
-            </a:r>
-          </a:p>
-          <a:p>
-            <a:pPr marL="0" indent="0">
-              <a:buNone/>
-            </a:pPr>
-            <a:r>
-              <a:rPr lang="nb-NO" dirty="0">
-                <a:latin typeface="Arial" panose="020B0604020202020204" pitchFamily="34" charset="0"/>
-                <a:cs typeface="Arial" panose="020B0604020202020204" pitchFamily="34" charset="0"/>
-              </a:rPr>
-              <a:t>			«description»: «Where way cool inventors dwell.»,</a:t>
-            </a:r>
-          </a:p>
-          <a:p>
-            <a:pPr marL="0" indent="0">
-              <a:buNone/>
-            </a:pPr>
-            <a:r>
-              <a:rPr lang="nb-NO" dirty="0">
-                <a:latin typeface="Arial" panose="020B0604020202020204" pitchFamily="34" charset="0"/>
-                <a:cs typeface="Arial" panose="020B0604020202020204" pitchFamily="34" charset="0"/>
-              </a:rPr>
-              <a:t>			...</a:t>
-            </a:r>
-          </a:p>
-          <a:p>
-            <a:pPr marL="0" indent="0">
-              <a:buNone/>
-            </a:pPr>
-            <a:r>
-              <a:rPr lang="nb-NO" dirty="0">
-                <a:latin typeface="Arial" panose="020B0604020202020204" pitchFamily="34" charset="0"/>
-                <a:cs typeface="Arial" panose="020B0604020202020204" pitchFamily="34" charset="0"/>
-              </a:rPr>
-              <a:t>		},</a:t>
-            </a:r>
-          </a:p>
-          <a:p>
-            <a:pPr marL="0" indent="0">
-              <a:buNone/>
-            </a:pPr>
-            <a:r>
-              <a:rPr lang="nb-NO" dirty="0">
-                <a:latin typeface="Arial" panose="020B0604020202020204" pitchFamily="34" charset="0"/>
-                <a:cs typeface="Arial" panose="020B0604020202020204" pitchFamily="34" charset="0"/>
-              </a:rPr>
-              <a:t>		...</a:t>
-            </a:r>
-          </a:p>
-          <a:p>
-            <a:pPr marL="0" indent="0">
-              <a:buNone/>
-            </a:pPr>
-            <a:r>
-              <a:rPr lang="nb-NO" dirty="0">
-                <a:latin typeface="Arial" panose="020B0604020202020204" pitchFamily="34" charset="0"/>
-                <a:cs typeface="Arial" panose="020B0604020202020204" pitchFamily="34" charset="0"/>
-              </a:rPr>
-              <a:t>	]</a:t>
-            </a:r>
-          </a:p>
-          <a:p>
-            <a:pPr marL="0" indent="0">
-              <a:buNone/>
-            </a:pPr>
-            <a:r>
-              <a:rPr lang="nb-NO" dirty="0">
-                <a:latin typeface="Arial" panose="020B0604020202020204" pitchFamily="34" charset="0"/>
-                <a:cs typeface="Arial" panose="020B0604020202020204" pitchFamily="34" charset="0"/>
-              </a:rPr>
-              <a:t>}</a:t>
-            </a:r>
-          </a:p>
-          <a:p>
-            <a:r>
-              <a:rPr lang="nb-NO" dirty="0">
-                <a:latin typeface="Arial" panose="020B0604020202020204" pitchFamily="34" charset="0"/>
-                <a:cs typeface="Arial" panose="020B0604020202020204" pitchFamily="34" charset="0"/>
-              </a:rPr>
-              <a:t>POST method with json «name», «description», «x», «y», and «image» will create a galaxy</a:t>
-            </a:r>
+              <a:t>GET method w/ params «user_id» and returns json of username, email, name, login_days, last_login, planet_id, chat_color, and alien</a:t>
+            </a:r>
+          </a:p>
+          <a:p>
+            <a:r>
+              <a:rPr lang="nb-NO" dirty="0">
+                <a:latin typeface="Arial" panose="020B0604020202020204" pitchFamily="34" charset="0"/>
+                <a:cs typeface="Arial" panose="020B0604020202020204" pitchFamily="34" charset="0"/>
+              </a:rPr>
+              <a:t>PATCH method w/ params «user_id» and nothing else will update last_login, and if the new last_login is on a different day, increases login_days by 1 and returns json with «new_day»: true, otherwise returns «new_day»: false, and regardless also returns login_days</a:t>
+            </a:r>
+          </a:p>
+          <a:p>
+            <a:r>
+              <a:rPr lang="nb-NO" dirty="0">
+                <a:latin typeface="Arial" panose="020B0604020202020204" pitchFamily="34" charset="0"/>
+                <a:cs typeface="Arial" panose="020B0604020202020204" pitchFamily="34" charset="0"/>
+              </a:rPr>
+              <a:t>PATCH method w/ params «user_id» and «chat_color» or «alien» or «rocket» will update that value</a:t>
+            </a:r>
+          </a:p>
+          <a:p>
+            <a:endParaRPr lang="nb-NO" dirty="0">
+              <a:latin typeface="Arial" panose="020B0604020202020204" pitchFamily="34" charset="0"/>
+              <a:cs typeface="Arial" panose="020B0604020202020204" pitchFamily="34" charset="0"/>
+            </a:endParaRPr>
+          </a:p>
+          <a:p>
+            <a:endParaRPr lang="nb-NO" dirty="0">
+              <a:latin typeface="Arial" panose="020B0604020202020204" pitchFamily="34" charset="0"/>
+              <a:cs typeface="Arial" panose="020B0604020202020204" pitchFamily="34" charset="0"/>
+            </a:endParaRPr>
           </a:p>
         </p:txBody>
       </p:sp>
     </p:spTree>
     <p:extLst>
       <p:ext uri="{BB962C8B-B14F-4D97-AF65-F5344CB8AC3E}">
-        <p14:creationId xmlns:p14="http://schemas.microsoft.com/office/powerpoint/2010/main" val="1557958327"/>
+        <p14:creationId xmlns:p14="http://schemas.microsoft.com/office/powerpoint/2010/main" val="696820992"/>
       </p:ext>
     </p:extLst>
   </p:cSld>
@@ -5507,7 +5281,7 @@
                 <a:latin typeface="Arial" panose="020B0604020202020204" pitchFamily="34" charset="0"/>
                 <a:cs typeface="Arial" panose="020B0604020202020204" pitchFamily="34" charset="0"/>
               </a:rPr>
-              <a:t>/systems</a:t>
+              <a:t>/visitors</a:t>
             </a:r>
           </a:p>
         </p:txBody>
@@ -5534,7 +5308,25 @@
                 <a:latin typeface="Arial" panose="020B0604020202020204" pitchFamily="34" charset="0"/>
                 <a:cs typeface="Arial" panose="020B0604020202020204" pitchFamily="34" charset="0"/>
               </a:rPr>
-              <a:t>GET method with params «galaxy_id» will return json that contains each System and its variables, for example:</a:t>
+              <a:t>POST method w/ params «visitor_id» and «visited_id» adds a relationship between the Users</a:t>
+            </a:r>
+          </a:p>
+          <a:p>
+            <a:r>
+              <a:rPr lang="nb-NO" dirty="0">
+                <a:latin typeface="Arial" panose="020B0604020202020204" pitchFamily="34" charset="0"/>
+                <a:cs typeface="Arial" panose="020B0604020202020204" pitchFamily="34" charset="0"/>
+              </a:rPr>
+              <a:t>GET method w/ params «user_id» returns json that contains each user_id they’ve visited</a:t>
+            </a:r>
+          </a:p>
+          <a:p>
+            <a:r>
+              <a:rPr lang="nb-NO" dirty="0">
+                <a:latin typeface="Arial" panose="020B0604020202020204" pitchFamily="34" charset="0"/>
+                <a:cs typeface="Arial" panose="020B0604020202020204" pitchFamily="34" charset="0"/>
+              </a:rPr>
+              <a:t>DELETE method w/ params «user_id» takes note that that user has updated their planet, and removes all relationships where visited is the user</a:t>
             </a:r>
           </a:p>
           <a:p>
@@ -5594,43 +5386,7 @@
                 <a:latin typeface="Arial" panose="020B0604020202020204" pitchFamily="34" charset="0"/>
                 <a:cs typeface="Arial" panose="020B0604020202020204" pitchFamily="34" charset="0"/>
               </a:rPr>
-              <a:t>			«id»: «0»,</a:t>
-            </a:r>
-          </a:p>
-          <a:p>
-            <a:pPr marL="0" indent="0">
-              <a:buNone/>
-            </a:pPr>
-            <a:r>
-              <a:rPr lang="nb-NO" dirty="0">
-                <a:latin typeface="Arial" panose="020B0604020202020204" pitchFamily="34" charset="0"/>
-                <a:cs typeface="Arial" panose="020B0604020202020204" pitchFamily="34" charset="0"/>
-              </a:rPr>
-              <a:t>			«name»: «Solaris»,</a:t>
-            </a:r>
-          </a:p>
-          <a:p>
-            <a:pPr marL="0" indent="0">
-              <a:buNone/>
-            </a:pPr>
-            <a:r>
-              <a:rPr lang="nb-NO" dirty="0">
-                <a:latin typeface="Arial" panose="020B0604020202020204" pitchFamily="34" charset="0"/>
-                <a:cs typeface="Arial" panose="020B0604020202020204" pitchFamily="34" charset="0"/>
-              </a:rPr>
-              <a:t>			«quadrant»: «4»,</a:t>
-            </a:r>
-          </a:p>
-          <a:p>
-            <a:pPr marL="0" indent="0">
-              <a:buNone/>
-            </a:pPr>
-            <a:r>
-              <a:rPr lang="nb-NO" dirty="0">
-                <a:latin typeface="Arial" panose="020B0604020202020204" pitchFamily="34" charset="0"/>
-                <a:cs typeface="Arial" panose="020B0604020202020204" pitchFamily="34" charset="0"/>
-              </a:rPr>
-              <a:t>			...</a:t>
+              <a:t>			«id»: 9</a:t>
             </a:r>
           </a:p>
           <a:p>
@@ -5654,7 +5410,31 @@
                 <a:latin typeface="Arial" panose="020B0604020202020204" pitchFamily="34" charset="0"/>
                 <a:cs typeface="Arial" panose="020B0604020202020204" pitchFamily="34" charset="0"/>
               </a:rPr>
-              <a:t>		...</a:t>
+              <a:t>		{</a:t>
+            </a:r>
+          </a:p>
+          <a:p>
+            <a:pPr marL="0" indent="0">
+              <a:buNone/>
+            </a:pPr>
+            <a:r>
+              <a:rPr lang="nb-NO" dirty="0">
+                <a:latin typeface="Arial" panose="020B0604020202020204" pitchFamily="34" charset="0"/>
+                <a:cs typeface="Arial" panose="020B0604020202020204" pitchFamily="34" charset="0"/>
+              </a:rPr>
+              <a:t>			«id»: 10</a:t>
+            </a:r>
+          </a:p>
+          <a:p>
+            <a:pPr marL="0" indent="0">
+              <a:buNone/>
+            </a:pPr>
+            <a:r>
+              <a:rPr lang="nb-NO" dirty="0">
+                <a:latin typeface="Arial" panose="020B0604020202020204" pitchFamily="34" charset="0"/>
+                <a:cs typeface="Arial" panose="020B0604020202020204" pitchFamily="34" charset="0"/>
+              </a:rPr>
+              <a:t>		}</a:t>
             </a:r>
           </a:p>
           <a:p>
@@ -5682,24 +5462,9 @@
             </a:r>
           </a:p>
           <a:p>
-            <a:r>
-              <a:rPr lang="nb-NO" dirty="0">
-                <a:latin typeface="Arial" panose="020B0604020202020204" pitchFamily="34" charset="0"/>
-                <a:cs typeface="Arial" panose="020B0604020202020204" pitchFamily="34" charset="0"/>
-              </a:rPr>
-              <a:t>GET method with params «system_id» will return json with information on just that system and its variables</a:t>
-            </a:r>
-          </a:p>
-          <a:p>
-            <a:r>
-              <a:rPr lang="nb-NO" dirty="0">
-                <a:latin typeface="Arial" panose="020B0604020202020204" pitchFamily="34" charset="0"/>
-                <a:cs typeface="Arial" panose="020B0604020202020204" pitchFamily="34" charset="0"/>
-              </a:rPr>
-              <a:t>POST method with json «galaxy_id», «name», «quadrant», «x», «y», and «image» will create a system</a:t>
-            </a:r>
-          </a:p>
-          <a:p>
+            <a:pPr marL="0" indent="0">
+              <a:buNone/>
+            </a:pPr>
             <a:endParaRPr lang="nb-NO" dirty="0">
               <a:latin typeface="Arial" panose="020B0604020202020204" pitchFamily="34" charset="0"/>
               <a:cs typeface="Arial" panose="020B0604020202020204" pitchFamily="34" charset="0"/>
@@ -5710,7 +5475,7 @@
     </p:spTree>
     <p:extLst>
       <p:ext uri="{BB962C8B-B14F-4D97-AF65-F5344CB8AC3E}">
-        <p14:creationId xmlns:p14="http://schemas.microsoft.com/office/powerpoint/2010/main" val="254303226"/>
+        <p14:creationId xmlns:p14="http://schemas.microsoft.com/office/powerpoint/2010/main" val="1092747602"/>
       </p:ext>
     </p:extLst>
   </p:cSld>
@@ -5762,7 +5527,7 @@
                 <a:latin typeface="Arial" panose="020B0604020202020204" pitchFamily="34" charset="0"/>
                 <a:cs typeface="Arial" panose="020B0604020202020204" pitchFamily="34" charset="0"/>
               </a:rPr>
-              <a:t>/planets</a:t>
+              <a:t>/galaxies</a:t>
             </a:r>
           </a:p>
         </p:txBody>
@@ -5777,15 +5542,10 @@
             <p:ph idx="1"/>
           </p:nvPr>
         </p:nvSpPr>
-        <p:spPr>
-          <a:xfrm>
-            <a:off x="838200" y="1825625"/>
-            <a:ext cx="10515600" cy="4610686"/>
-          </a:xfrm>
-        </p:spPr>
+        <p:spPr/>
         <p:txBody>
           <a:bodyPr>
-            <a:normAutofit fontScale="47500" lnSpcReduction="20000"/>
+            <a:normAutofit fontScale="55000" lnSpcReduction="20000"/>
           </a:bodyPr>
           <a:lstStyle/>
           <a:p>
@@ -5794,7 +5554,7 @@
                 <a:latin typeface="Arial" panose="020B0604020202020204" pitchFamily="34" charset="0"/>
                 <a:cs typeface="Arial" panose="020B0604020202020204" pitchFamily="34" charset="0"/>
               </a:rPr>
-              <a:t>GET method with params «system_id» will return json that contains each Planet’s variables, for example:</a:t>
+              <a:t>GET method will return json that contains each Galaxy and its variables, for example:</a:t>
             </a:r>
           </a:p>
           <a:p>
@@ -5830,7 +5590,7 @@
                 <a:latin typeface="Arial" panose="020B0604020202020204" pitchFamily="34" charset="0"/>
                 <a:cs typeface="Arial" panose="020B0604020202020204" pitchFamily="34" charset="0"/>
               </a:rPr>
-              <a:t>	[</a:t>
+              <a:t>	[,</a:t>
             </a:r>
           </a:p>
           <a:p>
@@ -5866,19 +5626,19 @@
                 <a:latin typeface="Arial" panose="020B0604020202020204" pitchFamily="34" charset="0"/>
                 <a:cs typeface="Arial" panose="020B0604020202020204" pitchFamily="34" charset="0"/>
               </a:rPr>
-              <a:t>			«owner_id»: «6»,</a:t>
-            </a:r>
-          </a:p>
-          <a:p>
-            <a:pPr marL="0" indent="0">
-              <a:buNone/>
-            </a:pPr>
-            <a:r>
-              <a:rPr lang="nb-NO" dirty="0">
-                <a:latin typeface="Arial" panose="020B0604020202020204" pitchFamily="34" charset="0"/>
-                <a:cs typeface="Arial" panose="020B0604020202020204" pitchFamily="34" charset="0"/>
-              </a:rPr>
-              <a:t>			«order»: «0»,</a:t>
+              <a:t>			«name»: «Build-It-Yourself Galaxy»,</a:t>
+            </a:r>
+          </a:p>
+          <a:p>
+            <a:pPr marL="0" indent="0">
+              <a:buNone/>
+            </a:pPr>
+            <a:r>
+              <a:rPr lang="nb-NO" dirty="0">
+                <a:latin typeface="Arial" panose="020B0604020202020204" pitchFamily="34" charset="0"/>
+                <a:cs typeface="Arial" panose="020B0604020202020204" pitchFamily="34" charset="0"/>
+              </a:rPr>
+              <a:t>			«description»: «Where way cool inventors dwell.»,</a:t>
             </a:r>
           </a:p>
           <a:p>
@@ -5947,39 +5707,15 @@
                 <a:latin typeface="Arial" panose="020B0604020202020204" pitchFamily="34" charset="0"/>
                 <a:cs typeface="Arial" panose="020B0604020202020204" pitchFamily="34" charset="0"/>
               </a:rPr>
-              <a:t>GET method with params «user_id» or «planet_id» will return json that contains the Planet’s variables</a:t>
-            </a:r>
-          </a:p>
-          <a:p>
-            <a:r>
-              <a:rPr lang="nb-NO" dirty="0">
-                <a:latin typeface="Arial" panose="020B0604020202020204" pitchFamily="34" charset="0"/>
-                <a:cs typeface="Arial" panose="020B0604020202020204" pitchFamily="34" charset="0"/>
-              </a:rPr>
-              <a:t>PATCH method with json «planet_id», «name», and «user_id» will set the planet’s owner_id to that user_id and rename it in the db. If the user already has a planet, unlinks the old one and removes its name. If the planet already has an owner or the db call fails for some reason, returns json with «status»: «error», otherwise sends «status»: «ok»</a:t>
-            </a:r>
-          </a:p>
-          <a:p>
-            <a:r>
-              <a:rPr lang="nb-NO" dirty="0">
-                <a:latin typeface="Arial" panose="020B0604020202020204" pitchFamily="34" charset="0"/>
-                <a:cs typeface="Arial" panose="020B0604020202020204" pitchFamily="34" charset="0"/>
-              </a:rPr>
-              <a:t>POST method with json «system_id», «order», «size», «surface», and «image» will create a planet</a:t>
-            </a:r>
-          </a:p>
-          <a:p>
-            <a:endParaRPr lang="nb-NO" dirty="0">
-              <a:latin typeface="Arial" panose="020B0604020202020204" pitchFamily="34" charset="0"/>
-              <a:cs typeface="Arial" panose="020B0604020202020204" pitchFamily="34" charset="0"/>
-            </a:endParaRPr>
+              <a:t>POST method with json «name», «description», «x», «y», and «image» will create a galaxy</a:t>
+            </a:r>
           </a:p>
         </p:txBody>
       </p:sp>
     </p:spTree>
     <p:extLst>
       <p:ext uri="{BB962C8B-B14F-4D97-AF65-F5344CB8AC3E}">
-        <p14:creationId xmlns:p14="http://schemas.microsoft.com/office/powerpoint/2010/main" val="4061486045"/>
+        <p14:creationId xmlns:p14="http://schemas.microsoft.com/office/powerpoint/2010/main" val="1557958327"/>
       </p:ext>
     </p:extLst>
   </p:cSld>
@@ -6031,7 +5767,7 @@
                 <a:latin typeface="Arial" panose="020B0604020202020204" pitchFamily="34" charset="0"/>
                 <a:cs typeface="Arial" panose="020B0604020202020204" pitchFamily="34" charset="0"/>
               </a:rPr>
-              <a:t>/catalog</a:t>
+              <a:t>/systems</a:t>
             </a:r>
           </a:p>
         </p:txBody>
@@ -6049,7 +5785,7 @@
         <p:spPr/>
         <p:txBody>
           <a:bodyPr>
-            <a:normAutofit fontScale="47500" lnSpcReduction="20000"/>
+            <a:normAutofit fontScale="55000" lnSpcReduction="20000"/>
           </a:bodyPr>
           <a:lstStyle/>
           <a:p>
@@ -6058,7 +5794,7 @@
                 <a:latin typeface="Arial" panose="020B0604020202020204" pitchFamily="34" charset="0"/>
                 <a:cs typeface="Arial" panose="020B0604020202020204" pitchFamily="34" charset="0"/>
               </a:rPr>
-              <a:t>GET method with specified «catalog_id» returns the specified CatalogItem’s variables, the method without any params returns json that contains each CatalogItem there is and their variables, for example:</a:t>
+              <a:t>GET method with params «galaxy_id» will return json that contains each System and its variables, for example:</a:t>
             </a:r>
           </a:p>
           <a:p>
@@ -6130,19 +5866,19 @@
                 <a:latin typeface="Arial" panose="020B0604020202020204" pitchFamily="34" charset="0"/>
                 <a:cs typeface="Arial" panose="020B0604020202020204" pitchFamily="34" charset="0"/>
               </a:rPr>
-              <a:t>			«image»: «images/statue.png»,</a:t>
-            </a:r>
-          </a:p>
-          <a:p>
-            <a:pPr marL="0" indent="0">
-              <a:buNone/>
-            </a:pPr>
-            <a:r>
-              <a:rPr lang="nb-NO" dirty="0">
-                <a:latin typeface="Arial" panose="020B0604020202020204" pitchFamily="34" charset="0"/>
-                <a:cs typeface="Arial" panose="020B0604020202020204" pitchFamily="34" charset="0"/>
-              </a:rPr>
-              <a:t>			«available»: «true»,</a:t>
+              <a:t>			«name»: «Solaris»,</a:t>
+            </a:r>
+          </a:p>
+          <a:p>
+            <a:pPr marL="0" indent="0">
+              <a:buNone/>
+            </a:pPr>
+            <a:r>
+              <a:rPr lang="nb-NO" dirty="0">
+                <a:latin typeface="Arial" panose="020B0604020202020204" pitchFamily="34" charset="0"/>
+                <a:cs typeface="Arial" panose="020B0604020202020204" pitchFamily="34" charset="0"/>
+              </a:rPr>
+              <a:t>			«quadrant»: «4»,</a:t>
             </a:r>
           </a:p>
           <a:p>
@@ -6211,24 +5947,30 @@
                 <a:latin typeface="Arial" panose="020B0604020202020204" pitchFamily="34" charset="0"/>
                 <a:cs typeface="Arial" panose="020B0604020202020204" pitchFamily="34" charset="0"/>
               </a:rPr>
-              <a:t>POST method with json «name», «image», «event_specific», «available», «cost1», «cost2», and «cost3» will create a planet</a:t>
-            </a:r>
-          </a:p>
-          <a:p>
-            <a:r>
-              <a:rPr lang="nb-NO" dirty="0">
-                <a:latin typeface="Arial" panose="020B0604020202020204" pitchFamily="34" charset="0"/>
-                <a:cs typeface="Arial" panose="020B0604020202020204" pitchFamily="34" charset="0"/>
-              </a:rPr>
-              <a:t>PATCH method with the param «catalog_id» flips the value of the available variable</a:t>
-            </a:r>
+              <a:t>GET method with params «system_id» will return json with information on just that system and its variables</a:t>
+            </a:r>
+          </a:p>
+          <a:p>
+            <a:r>
+              <a:rPr lang="nb-NO" dirty="0">
+                <a:latin typeface="Arial" panose="020B0604020202020204" pitchFamily="34" charset="0"/>
+                <a:cs typeface="Arial" panose="020B0604020202020204" pitchFamily="34" charset="0"/>
+              </a:rPr>
+              <a:t>POST method with json «galaxy_id», «name», «quadrant», «x», «y», and «image» will create a system</a:t>
+            </a:r>
+          </a:p>
+          <a:p>
+            <a:endParaRPr lang="nb-NO" dirty="0">
+              <a:latin typeface="Arial" panose="020B0604020202020204" pitchFamily="34" charset="0"/>
+              <a:cs typeface="Arial" panose="020B0604020202020204" pitchFamily="34" charset="0"/>
+            </a:endParaRPr>
           </a:p>
         </p:txBody>
       </p:sp>
     </p:spTree>
     <p:extLst>
       <p:ext uri="{BB962C8B-B14F-4D97-AF65-F5344CB8AC3E}">
-        <p14:creationId xmlns:p14="http://schemas.microsoft.com/office/powerpoint/2010/main" val="4128414604"/>
+        <p14:creationId xmlns:p14="http://schemas.microsoft.com/office/powerpoint/2010/main" val="254303226"/>
       </p:ext>
     </p:extLst>
   </p:cSld>
@@ -6280,7 +6022,7 @@
                 <a:latin typeface="Arial" panose="020B0604020202020204" pitchFamily="34" charset="0"/>
                 <a:cs typeface="Arial" panose="020B0604020202020204" pitchFamily="34" charset="0"/>
               </a:rPr>
-              <a:t>/items</a:t>
+              <a:t>/planets</a:t>
             </a:r>
           </a:p>
         </p:txBody>
@@ -6297,13 +6039,13 @@
         </p:nvSpPr>
         <p:spPr>
           <a:xfrm>
-            <a:off x="838200" y="1331650"/>
-            <a:ext cx="10515600" cy="5433134"/>
+            <a:off x="439615" y="1424354"/>
+            <a:ext cx="11570677" cy="5275384"/>
           </a:xfrm>
         </p:spPr>
         <p:txBody>
           <a:bodyPr>
-            <a:normAutofit fontScale="47500" lnSpcReduction="20000"/>
+            <a:normAutofit fontScale="55000" lnSpcReduction="20000"/>
           </a:bodyPr>
           <a:lstStyle/>
           <a:p>
@@ -6312,7 +6054,7 @@
                 <a:latin typeface="Arial" panose="020B0604020202020204" pitchFamily="34" charset="0"/>
                 <a:cs typeface="Arial" panose="020B0604020202020204" pitchFamily="34" charset="0"/>
               </a:rPr>
-              <a:t>GET method with params «user_id» will return json that contains each PlanetItem and its variables as well as the image variable that comes from its parent, for example:</a:t>
+              <a:t>GET method with params «system_id» will return json that contains each Planet’s variables, for example:</a:t>
             </a:r>
           </a:p>
           <a:p>
@@ -6336,7 +6078,7 @@
                 <a:latin typeface="Arial" panose="020B0604020202020204" pitchFamily="34" charset="0"/>
                 <a:cs typeface="Arial" panose="020B0604020202020204" pitchFamily="34" charset="0"/>
               </a:rPr>
-              <a:t>«result:»</a:t>
+              <a:t>«results»:</a:t>
             </a:r>
           </a:p>
           <a:p>
@@ -6372,55 +6114,31 @@
                 <a:latin typeface="Arial" panose="020B0604020202020204" pitchFamily="34" charset="0"/>
                 <a:cs typeface="Arial" panose="020B0604020202020204" pitchFamily="34" charset="0"/>
               </a:rPr>
-              <a:t>			«id»: «342»,</a:t>
-            </a:r>
-          </a:p>
-          <a:p>
-            <a:pPr marL="0" indent="0">
-              <a:buNone/>
-            </a:pPr>
-            <a:r>
-              <a:rPr lang="nb-NO" dirty="0">
-                <a:latin typeface="Arial" panose="020B0604020202020204" pitchFamily="34" charset="0"/>
-                <a:cs typeface="Arial" panose="020B0604020202020204" pitchFamily="34" charset="0"/>
-              </a:rPr>
-              <a:t>			«catalog_parent_id»: «0»,</a:t>
-            </a:r>
-          </a:p>
-          <a:p>
-            <a:pPr marL="0" indent="0">
-              <a:buNone/>
-            </a:pPr>
-            <a:r>
-              <a:rPr lang="nb-NO" dirty="0">
-                <a:latin typeface="Arial" panose="020B0604020202020204" pitchFamily="34" charset="0"/>
-                <a:cs typeface="Arial" panose="020B0604020202020204" pitchFamily="34" charset="0"/>
-              </a:rPr>
-              <a:t>			«image»: «images/statue.png»,</a:t>
-            </a:r>
-          </a:p>
-          <a:p>
-            <a:pPr marL="0" indent="0">
-              <a:buNone/>
-            </a:pPr>
-            <a:r>
-              <a:rPr lang="nb-NO" dirty="0">
-                <a:latin typeface="Arial" panose="020B0604020202020204" pitchFamily="34" charset="0"/>
-                <a:cs typeface="Arial" panose="020B0604020202020204" pitchFamily="34" charset="0"/>
-              </a:rPr>
-              <a:t>			«x»: «40»</a:t>
-            </a:r>
-          </a:p>
-          <a:p>
-            <a:pPr marL="0" indent="0">
-              <a:buNone/>
-            </a:pPr>
-            <a:r>
-              <a:rPr lang="nb-NO" dirty="0">
-                <a:latin typeface="Arial" panose="020B0604020202020204" pitchFamily="34" charset="0"/>
-                <a:cs typeface="Arial" panose="020B0604020202020204" pitchFamily="34" charset="0"/>
-              </a:rPr>
-              <a:t>			«y»: «80»</a:t>
+              <a:t>			«id»: «0»,</a:t>
+            </a:r>
+          </a:p>
+          <a:p>
+            <a:pPr marL="0" indent="0">
+              <a:buNone/>
+            </a:pPr>
+            <a:r>
+              <a:rPr lang="nb-NO" dirty="0">
+                <a:latin typeface="Arial" panose="020B0604020202020204" pitchFamily="34" charset="0"/>
+                <a:cs typeface="Arial" panose="020B0604020202020204" pitchFamily="34" charset="0"/>
+              </a:rPr>
+              <a:t>			«owner_id»: «6»,</a:t>
+            </a:r>
+          </a:p>
+          <a:p>
+            <a:pPr marL="0" indent="0">
+              <a:buNone/>
+            </a:pPr>
+            <a:r>
+              <a:rPr lang="nb-NO" dirty="0">
+                <a:latin typeface="Arial" panose="020B0604020202020204" pitchFamily="34" charset="0"/>
+                <a:cs typeface="Arial" panose="020B0604020202020204" pitchFamily="34" charset="0"/>
+              </a:rPr>
+              <a:t>			«order»: «0»,</a:t>
             </a:r>
           </a:p>
           <a:p>
@@ -6489,33 +6207,49 @@
                 <a:latin typeface="Arial" panose="020B0604020202020204" pitchFamily="34" charset="0"/>
                 <a:cs typeface="Arial" panose="020B0604020202020204" pitchFamily="34" charset="0"/>
               </a:rPr>
-              <a:t>POST method with json «user_id» «catalog_id», «x» and «y» adds a new item to a user’s list of PlanetItems, returning the new «id» and «image»</a:t>
-            </a:r>
-          </a:p>
-          <a:p>
-            <a:r>
-              <a:rPr lang="nb-NO" dirty="0">
-                <a:latin typeface="Arial" panose="020B0604020202020204" pitchFamily="34" charset="0"/>
-                <a:cs typeface="Arial" panose="020B0604020202020204" pitchFamily="34" charset="0"/>
-              </a:rPr>
-              <a:t>DELETE method with params «item_id» will remove that item from the database</a:t>
-            </a:r>
-          </a:p>
-          <a:p>
-            <a:r>
-              <a:rPr lang="nb-NO" dirty="0">
-                <a:latin typeface="Arial" panose="020B0604020202020204" pitchFamily="34" charset="0"/>
-                <a:cs typeface="Arial" panose="020B0604020202020204" pitchFamily="34" charset="0"/>
-              </a:rPr>
-              <a:t>PATCH method with json «item_id», «x» and «y» updates an item’s x and y position</a:t>
-            </a:r>
+              <a:t>GET method with params «user_id» or «planet_id» will return json that contains the Planet’s variables</a:t>
+            </a:r>
+          </a:p>
+          <a:p>
+            <a:r>
+              <a:rPr lang="nb-NO" dirty="0">
+                <a:latin typeface="Arial" panose="020B0604020202020204" pitchFamily="34" charset="0"/>
+                <a:cs typeface="Arial" panose="020B0604020202020204" pitchFamily="34" charset="0"/>
+              </a:rPr>
+              <a:t>PATCH method with json «planet_id», «name», and «user_id» will set the planet’s owner_id to that user_id and rename it in the db. If the user already has a planet, unlinks the old one and removes its name. If the planet already has an owner or the db call fails for some reason, returns json with «status»: «error», otherwise sends «status»: «ok»</a:t>
+            </a:r>
+          </a:p>
+          <a:p>
+            <a:pPr lvl="1"/>
+            <a:r>
+              <a:rPr lang="nb-NO" dirty="0">
+                <a:latin typeface="Arial" panose="020B0604020202020204" pitchFamily="34" charset="0"/>
+                <a:cs typeface="Arial" panose="020B0604020202020204" pitchFamily="34" charset="0"/>
+              </a:rPr>
+              <a:t>You can also patch with json «surface», «image», «song», and/or «description» alongside «planet_id» to change those variables</a:t>
+            </a:r>
+          </a:p>
+          <a:p>
+            <a:r>
+              <a:rPr lang="nb-NO" dirty="0">
+                <a:latin typeface="Arial" panose="020B0604020202020204" pitchFamily="34" charset="0"/>
+                <a:cs typeface="Arial" panose="020B0604020202020204" pitchFamily="34" charset="0"/>
+              </a:rPr>
+              <a:t>POST method with json «system_id», «order», «size», «surface», and «image» will create a planet</a:t>
+            </a:r>
+          </a:p>
+          <a:p>
+            <a:endParaRPr lang="nb-NO" dirty="0">
+              <a:latin typeface="Arial" panose="020B0604020202020204" pitchFamily="34" charset="0"/>
+              <a:cs typeface="Arial" panose="020B0604020202020204" pitchFamily="34" charset="0"/>
+            </a:endParaRPr>
           </a:p>
         </p:txBody>
       </p:sp>
     </p:spTree>
     <p:extLst>
       <p:ext uri="{BB962C8B-B14F-4D97-AF65-F5344CB8AC3E}">
-        <p14:creationId xmlns:p14="http://schemas.microsoft.com/office/powerpoint/2010/main" val="3976820580"/>
+        <p14:creationId xmlns:p14="http://schemas.microsoft.com/office/powerpoint/2010/main" val="4061486045"/>
       </p:ext>
     </p:extLst>
   </p:cSld>
@@ -6567,19 +6301,8 @@
                 <a:latin typeface="Arial" panose="020B0604020202020204" pitchFamily="34" charset="0"/>
                 <a:cs typeface="Arial" panose="020B0604020202020204" pitchFamily="34" charset="0"/>
               </a:rPr>
-              <a:t>/</a:t>
-            </a:r>
-            <a:r>
-              <a:rPr lang="en-US" dirty="0" err="1">
-                <a:latin typeface="Arial" panose="020B0604020202020204" pitchFamily="34" charset="0"/>
-                <a:cs typeface="Arial" panose="020B0604020202020204" pitchFamily="34" charset="0"/>
-              </a:rPr>
-              <a:t>chatitems</a:t>
-            </a:r>
-            <a:endParaRPr lang="en-US" dirty="0">
-              <a:latin typeface="Arial" panose="020B0604020202020204" pitchFamily="34" charset="0"/>
-              <a:cs typeface="Arial" panose="020B0604020202020204" pitchFamily="34" charset="0"/>
-            </a:endParaRPr>
+              <a:t>/catalog</a:t>
+            </a:r>
           </a:p>
         </p:txBody>
       </p:sp>
@@ -6593,15 +6316,10 @@
             <p:ph idx="1"/>
           </p:nvPr>
         </p:nvSpPr>
-        <p:spPr>
-          <a:xfrm>
-            <a:off x="378069" y="1331650"/>
-            <a:ext cx="11579469" cy="5433134"/>
-          </a:xfrm>
-        </p:spPr>
+        <p:spPr/>
         <p:txBody>
           <a:bodyPr>
-            <a:normAutofit fontScale="55000" lnSpcReduction="20000"/>
+            <a:normAutofit fontScale="47500" lnSpcReduction="20000"/>
           </a:bodyPr>
           <a:lstStyle/>
           <a:p>
@@ -6610,7 +6328,7 @@
                 <a:latin typeface="Arial" panose="020B0604020202020204" pitchFamily="34" charset="0"/>
                 <a:cs typeface="Arial" panose="020B0604020202020204" pitchFamily="34" charset="0"/>
               </a:rPr>
-              <a:t>GET method with params «user_id» and «item_type» (where 0 is a color and 1 is an emoticon) will return json that contains each ChatItem the User owns with that itemType and its variables, for example:</a:t>
+              <a:t>GET method with specified «catalog_id» returns the specified CatalogItem’s variables, the method without any params returns json that contains each CatalogItem there is and their variables, for example:</a:t>
             </a:r>
           </a:p>
           <a:p>
@@ -6634,7 +6352,7 @@
                 <a:latin typeface="Arial" panose="020B0604020202020204" pitchFamily="34" charset="0"/>
                 <a:cs typeface="Arial" panose="020B0604020202020204" pitchFamily="34" charset="0"/>
               </a:rPr>
-              <a:t>«result:»</a:t>
+              <a:t>«results»:</a:t>
             </a:r>
           </a:p>
           <a:p>
@@ -6682,43 +6400,19 @@
                 <a:latin typeface="Arial" panose="020B0604020202020204" pitchFamily="34" charset="0"/>
                 <a:cs typeface="Arial" panose="020B0604020202020204" pitchFamily="34" charset="0"/>
               </a:rPr>
-              <a:t>			«itemType»: «0»,</a:t>
-            </a:r>
-          </a:p>
-          <a:p>
-            <a:pPr marL="0" indent="0">
-              <a:buNone/>
-            </a:pPr>
-            <a:r>
-              <a:rPr lang="nb-NO" dirty="0">
-                <a:latin typeface="Arial" panose="020B0604020202020204" pitchFamily="34" charset="0"/>
-                <a:cs typeface="Arial" panose="020B0604020202020204" pitchFamily="34" charset="0"/>
-              </a:rPr>
-              <a:t>			«string»: «purple»,</a:t>
-            </a:r>
-          </a:p>
-          <a:p>
-            <a:pPr marL="0" indent="0">
-              <a:buNone/>
-            </a:pPr>
-            <a:r>
-              <a:rPr lang="nb-NO" dirty="0">
-                <a:latin typeface="Arial" panose="020B0604020202020204" pitchFamily="34" charset="0"/>
-                <a:cs typeface="Arial" panose="020B0604020202020204" pitchFamily="34" charset="0"/>
-              </a:rPr>
-              <a:t>			«cost1»: «40»,</a:t>
-            </a:r>
-          </a:p>
-          <a:p>
-            <a:pPr marL="0" indent="0">
-              <a:buNone/>
-            </a:pPr>
-            <a:r>
-              <a:rPr lang="nb-NO" dirty="0">
-                <a:latin typeface="Arial" panose="020B0604020202020204" pitchFamily="34" charset="0"/>
-                <a:cs typeface="Arial" panose="020B0604020202020204" pitchFamily="34" charset="0"/>
-              </a:rPr>
-              <a:t>			«cost2»: «5»</a:t>
+              <a:t>			«image»: «images/statue.png»,</a:t>
+            </a:r>
+          </a:p>
+          <a:p>
+            <a:pPr marL="0" indent="0">
+              <a:buNone/>
+            </a:pPr>
+            <a:r>
+              <a:rPr lang="nb-NO" dirty="0">
+                <a:latin typeface="Arial" panose="020B0604020202020204" pitchFamily="34" charset="0"/>
+                <a:cs typeface="Arial" panose="020B0604020202020204" pitchFamily="34" charset="0"/>
+              </a:rPr>
+              <a:t>			«available»: «true»,</a:t>
             </a:r>
           </a:p>
           <a:p>
@@ -6787,25 +6481,16 @@
                 <a:latin typeface="Arial" panose="020B0604020202020204" pitchFamily="34" charset="0"/>
                 <a:cs typeface="Arial" panose="020B0604020202020204" pitchFamily="34" charset="0"/>
               </a:rPr>
-              <a:t>GET method with only «user_id» param returns every ChatItem with an «owned» t/f value based on whether or not the user owns it</a:t>
-            </a:r>
-          </a:p>
-          <a:p>
-            <a:r>
-              <a:rPr lang="nb-NO" dirty="0">
-                <a:latin typeface="Arial" panose="020B0604020202020204" pitchFamily="34" charset="0"/>
-                <a:cs typeface="Arial" panose="020B0604020202020204" pitchFamily="34" charset="0"/>
-              </a:rPr>
-              <a:t>POST method with json including «item_type», «string», «cost1», «cost2», and «cost3» to create that ChatItem</a:t>
-            </a:r>
-          </a:p>
-          <a:p>
-            <a:r>
-              <a:rPr lang="nb-NO" dirty="0">
-                <a:latin typeface="Arial" panose="020B0604020202020204" pitchFamily="34" charset="0"/>
-                <a:cs typeface="Arial" panose="020B0604020202020204" pitchFamily="34" charset="0"/>
-              </a:rPr>
-              <a:t>PATCH method with json including «user_id» and «chat_item_id» to add that ChatItem to the User</a:t>
+              <a:t>POST method with json «name», «image», «event_specific», «available», «cost1», «cost2», and «cost3» will create a CatalogItem</a:t>
+            </a:r>
+          </a:p>
+          <a:p>
+            <a:r>
+              <a:rPr lang="nb-NO" dirty="0">
+                <a:latin typeface="Arial" panose="020B0604020202020204" pitchFamily="34" charset="0"/>
+                <a:cs typeface="Arial" panose="020B0604020202020204" pitchFamily="34" charset="0"/>
+              </a:rPr>
+              <a:t>PATCH method with the param «catalog_id» flips the value of the available variable</a:t>
             </a:r>
           </a:p>
         </p:txBody>
@@ -6813,7 +6498,7 @@
     </p:spTree>
     <p:extLst>
       <p:ext uri="{BB962C8B-B14F-4D97-AF65-F5344CB8AC3E}">
-        <p14:creationId xmlns:p14="http://schemas.microsoft.com/office/powerpoint/2010/main" val="1642849653"/>
+        <p14:creationId xmlns:p14="http://schemas.microsoft.com/office/powerpoint/2010/main" val="4128414604"/>
       </p:ext>
     </p:extLst>
   </p:cSld>
@@ -6865,7 +6550,7 @@
                 <a:latin typeface="Arial" panose="020B0604020202020204" pitchFamily="34" charset="0"/>
                 <a:cs typeface="Arial" panose="020B0604020202020204" pitchFamily="34" charset="0"/>
               </a:rPr>
-              <a:t>/currency</a:t>
+              <a:t>/species</a:t>
             </a:r>
           </a:p>
         </p:txBody>
@@ -6883,7 +6568,7 @@
         <p:spPr/>
         <p:txBody>
           <a:bodyPr>
-            <a:normAutofit/>
+            <a:normAutofit fontScale="47500" lnSpcReduction="20000"/>
           </a:bodyPr>
           <a:lstStyle/>
           <a:p>
@@ -6892,35 +6577,191 @@
                 <a:latin typeface="Arial" panose="020B0604020202020204" pitchFamily="34" charset="0"/>
                 <a:cs typeface="Arial" panose="020B0604020202020204" pitchFamily="34" charset="0"/>
               </a:rPr>
-              <a:t>GET method with params «user_id» returns cur1-3, vou2-3, lifetime_cur1-3</a:t>
-            </a:r>
-          </a:p>
-          <a:p>
-            <a:r>
-              <a:rPr lang="nb-NO" dirty="0">
-                <a:latin typeface="Arial" panose="020B0604020202020204" pitchFamily="34" charset="0"/>
-                <a:cs typeface="Arial" panose="020B0604020202020204" pitchFamily="34" charset="0"/>
-              </a:rPr>
-              <a:t>PATCH with json including «user_id», «cur1», «cur2», «cur3», «vou2» and «vou3» add these curs and vous to the User’s currency – if they’re positive increments both the current and lifetime currencies, if they’re negative only decreases the </a:t>
+              <a:t>GET method with specified «species_id» returns the specified AlienSpecies’s variables, the method without any params returns json that contains each AlienSpecies there is and their variables, for example:</a:t>
+            </a:r>
+          </a:p>
+          <a:p>
+            <a:pPr marL="0" indent="0">
+              <a:buNone/>
+            </a:pPr>
+            <a:r>
+              <a:rPr lang="nb-NO" dirty="0">
+                <a:latin typeface="Arial" panose="020B0604020202020204" pitchFamily="34" charset="0"/>
+                <a:cs typeface="Arial" panose="020B0604020202020204" pitchFamily="34" charset="0"/>
+              </a:rPr>
+              <a:t>{</a:t>
+            </a:r>
+          </a:p>
+          <a:p>
+            <a:pPr marL="0" indent="0">
+              <a:buNone/>
+            </a:pPr>
+            <a:r>
+              <a:rPr lang="nb-NO" dirty="0">
+                <a:latin typeface="Arial" panose="020B0604020202020204" pitchFamily="34" charset="0"/>
+                <a:cs typeface="Arial" panose="020B0604020202020204" pitchFamily="34" charset="0"/>
+              </a:rPr>
+              <a:t>«results»:</a:t>
+            </a:r>
+          </a:p>
+          <a:p>
+            <a:pPr marL="0" indent="0">
+              <a:buNone/>
+            </a:pPr>
+            <a:r>
+              <a:rPr lang="nb-NO" dirty="0">
+                <a:latin typeface="Arial" panose="020B0604020202020204" pitchFamily="34" charset="0"/>
+                <a:cs typeface="Arial" panose="020B0604020202020204" pitchFamily="34" charset="0"/>
+              </a:rPr>
+              <a:t>	[</a:t>
+            </a:r>
+          </a:p>
+          <a:p>
+            <a:pPr marL="0" indent="0">
+              <a:buNone/>
+            </a:pPr>
+            <a:r>
+              <a:rPr lang="nb-NO" dirty="0">
+                <a:latin typeface="Arial" panose="020B0604020202020204" pitchFamily="34" charset="0"/>
+                <a:cs typeface="Arial" panose="020B0604020202020204" pitchFamily="34" charset="0"/>
+              </a:rPr>
+              <a:t>		{</a:t>
+            </a:r>
+          </a:p>
+          <a:p>
+            <a:pPr marL="0" indent="0">
+              <a:buNone/>
+            </a:pPr>
+            <a:r>
+              <a:rPr lang="nb-NO" dirty="0">
+                <a:latin typeface="Arial" panose="020B0604020202020204" pitchFamily="34" charset="0"/>
+                <a:cs typeface="Arial" panose="020B0604020202020204" pitchFamily="34" charset="0"/>
+              </a:rPr>
+              <a:t>			«id»: «0»,</a:t>
+            </a:r>
+          </a:p>
+          <a:p>
+            <a:pPr marL="0" indent="0">
+              <a:buNone/>
+            </a:pPr>
+            <a:r>
+              <a:rPr lang="nb-NO" dirty="0">
+                <a:latin typeface="Arial" panose="020B0604020202020204" pitchFamily="34" charset="0"/>
+                <a:cs typeface="Arial" panose="020B0604020202020204" pitchFamily="34" charset="0"/>
+              </a:rPr>
+              <a:t>			«image»: «images/gleebnorb.png»,</a:t>
+            </a:r>
+          </a:p>
+          <a:p>
+            <a:pPr marL="0" indent="0">
+              <a:buNone/>
+            </a:pPr>
+            <a:r>
+              <a:rPr lang="nb-NO" dirty="0">
+                <a:latin typeface="Arial" panose="020B0604020202020204" pitchFamily="34" charset="0"/>
+                <a:cs typeface="Arial" panose="020B0604020202020204" pitchFamily="34" charset="0"/>
+              </a:rPr>
+              <a:t>			«name»: «Gleebnorb»,</a:t>
+            </a:r>
+          </a:p>
+          <a:p>
+            <a:pPr marL="0" indent="0">
+              <a:buNone/>
+            </a:pPr>
+            <a:r>
+              <a:rPr lang="nb-NO" dirty="0">
+                <a:latin typeface="Arial" panose="020B0604020202020204" pitchFamily="34" charset="0"/>
+                <a:cs typeface="Arial" panose="020B0604020202020204" pitchFamily="34" charset="0"/>
+              </a:rPr>
+              <a:t>			...</a:t>
+            </a:r>
+          </a:p>
+          <a:p>
+            <a:pPr marL="0" indent="0">
+              <a:buNone/>
+            </a:pPr>
+            <a:r>
+              <a:rPr lang="nb-NO" dirty="0">
+                <a:latin typeface="Arial" panose="020B0604020202020204" pitchFamily="34" charset="0"/>
+                <a:cs typeface="Arial" panose="020B0604020202020204" pitchFamily="34" charset="0"/>
+              </a:rPr>
+              <a:t>		},</a:t>
+            </a:r>
+          </a:p>
+          <a:p>
+            <a:pPr marL="0" indent="0">
+              <a:buNone/>
+            </a:pPr>
+            <a:r>
+              <a:rPr lang="nb-NO" dirty="0">
+                <a:latin typeface="Arial" panose="020B0604020202020204" pitchFamily="34" charset="0"/>
+                <a:cs typeface="Arial" panose="020B0604020202020204" pitchFamily="34" charset="0"/>
+              </a:rPr>
+              <a:t>		...</a:t>
+            </a:r>
+          </a:p>
+          <a:p>
+            <a:pPr marL="0" indent="0">
+              <a:buNone/>
+            </a:pPr>
+            <a:r>
+              <a:rPr lang="nb-NO" dirty="0">
+                <a:latin typeface="Arial" panose="020B0604020202020204" pitchFamily="34" charset="0"/>
+                <a:cs typeface="Arial" panose="020B0604020202020204" pitchFamily="34" charset="0"/>
+              </a:rPr>
+              <a:t>	]</a:t>
+            </a:r>
+          </a:p>
+          <a:p>
+            <a:pPr marL="0" indent="0">
+              <a:buNone/>
+            </a:pPr>
+            <a:r>
+              <a:rPr lang="nb-NO" dirty="0">
+                <a:latin typeface="Arial" panose="020B0604020202020204" pitchFamily="34" charset="0"/>
+                <a:cs typeface="Arial" panose="020B0604020202020204" pitchFamily="34" charset="0"/>
+              </a:rPr>
+              <a:t>}</a:t>
+            </a:r>
+          </a:p>
+          <a:p>
+            <a:r>
+              <a:rPr lang="nb-NO" dirty="0">
+                <a:latin typeface="Arial" panose="020B0604020202020204" pitchFamily="34" charset="0"/>
+                <a:cs typeface="Arial" panose="020B0604020202020204" pitchFamily="34" charset="0"/>
+              </a:rPr>
+              <a:t>POST method with json «</a:t>
             </a:r>
             <a:r>
               <a:rPr lang="nb-NO">
                 <a:latin typeface="Arial" panose="020B0604020202020204" pitchFamily="34" charset="0"/>
                 <a:cs typeface="Arial" panose="020B0604020202020204" pitchFamily="34" charset="0"/>
               </a:rPr>
-              <a:t>current ones (note: you can also send an «update_lifetime» boolean to force updating or not updating lifetime currency)</a:t>
-            </a:r>
-            <a:endParaRPr lang="nb-NO" dirty="0">
-              <a:latin typeface="Arial" panose="020B0604020202020204" pitchFamily="34" charset="0"/>
-              <a:cs typeface="Arial" panose="020B0604020202020204" pitchFamily="34" charset="0"/>
-            </a:endParaRPr>
+              <a:t>name», «image», and «available» </a:t>
+            </a:r>
+            <a:r>
+              <a:rPr lang="nb-NO" dirty="0">
+                <a:latin typeface="Arial" panose="020B0604020202020204" pitchFamily="34" charset="0"/>
+                <a:cs typeface="Arial" panose="020B0604020202020204" pitchFamily="34" charset="0"/>
+              </a:rPr>
+              <a:t>will create a species</a:t>
+            </a:r>
+          </a:p>
+          <a:p>
+            <a:r>
+              <a:rPr lang="nb-NO" dirty="0">
+                <a:latin typeface="Arial" panose="020B0604020202020204" pitchFamily="34" charset="0"/>
+                <a:cs typeface="Arial" panose="020B0604020202020204" pitchFamily="34" charset="0"/>
+              </a:rPr>
+              <a:t>PATCH method with the param «species_id» flips the value of the available variable</a:t>
+            </a:r>
           </a:p>
         </p:txBody>
       </p:sp>
     </p:spTree>
     <p:extLst>
       <p:ext uri="{BB962C8B-B14F-4D97-AF65-F5344CB8AC3E}">
-        <p14:creationId xmlns:p14="http://schemas.microsoft.com/office/powerpoint/2010/main" val="1802617112"/>
+        <p14:creationId xmlns:p14="http://schemas.microsoft.com/office/powerpoint/2010/main" val="2134680363"/>
       </p:ext>
     </p:extLst>
   </p:cSld>
@@ -6972,7 +6813,7 @@
                 <a:latin typeface="Arial" panose="020B0604020202020204" pitchFamily="34" charset="0"/>
                 <a:cs typeface="Arial" panose="020B0604020202020204" pitchFamily="34" charset="0"/>
               </a:rPr>
-              <a:t>/missions</a:t>
+              <a:t>/aliens</a:t>
             </a:r>
           </a:p>
         </p:txBody>
@@ -6987,10 +6828,15 @@
             <p:ph idx="1"/>
           </p:nvPr>
         </p:nvSpPr>
-        <p:spPr/>
+        <p:spPr>
+          <a:xfrm>
+            <a:off x="838200" y="1331650"/>
+            <a:ext cx="10515600" cy="5433134"/>
+          </a:xfrm>
+        </p:spPr>
         <p:txBody>
           <a:bodyPr>
-            <a:normAutofit/>
+            <a:normAutofit fontScale="47500" lnSpcReduction="20000"/>
           </a:bodyPr>
           <a:lstStyle/>
           <a:p>
@@ -6999,25 +6845,216 @@
                 <a:latin typeface="Arial" panose="020B0604020202020204" pitchFamily="34" charset="0"/>
                 <a:cs typeface="Arial" panose="020B0604020202020204" pitchFamily="34" charset="0"/>
               </a:rPr>
-              <a:t>GET method with params «user_id» returns mission_type, mission_current, mission_total</a:t>
-            </a:r>
-          </a:p>
-          <a:p>
-            <a:r>
-              <a:rPr lang="nb-NO" dirty="0">
-                <a:latin typeface="Arial" panose="020B0604020202020204" pitchFamily="34" charset="0"/>
-                <a:cs typeface="Arial" panose="020B0604020202020204" pitchFamily="34" charset="0"/>
-              </a:rPr>
-              <a:t>POST method with params «user_id» increases mission_current by 1</a:t>
-            </a:r>
-          </a:p>
-          <a:p>
-            <a:r>
-              <a:rPr lang="nb-NO" dirty="0">
-                <a:latin typeface="Arial" panose="020B0604020202020204" pitchFamily="34" charset="0"/>
-                <a:cs typeface="Arial" panose="020B0604020202020204" pitchFamily="34" charset="0"/>
-              </a:rPr>
-              <a:t>PATCH with params «user_id» will set mission_current and mission_total to -1, then begins a 10 minute timer to get a new mission</a:t>
+              <a:t>GET method with params «user_id» will return json that contains each Alien and its variables as well as </a:t>
+            </a:r>
+            <a:r>
+              <a:rPr lang="nb-NO">
+                <a:latin typeface="Arial" panose="020B0604020202020204" pitchFamily="34" charset="0"/>
+                <a:cs typeface="Arial" panose="020B0604020202020204" pitchFamily="34" charset="0"/>
+              </a:rPr>
+              <a:t>the image and name variables that come </a:t>
+            </a:r>
+            <a:r>
+              <a:rPr lang="nb-NO" dirty="0">
+                <a:latin typeface="Arial" panose="020B0604020202020204" pitchFamily="34" charset="0"/>
+                <a:cs typeface="Arial" panose="020B0604020202020204" pitchFamily="34" charset="0"/>
+              </a:rPr>
+              <a:t>from its parent, for example:</a:t>
+            </a:r>
+          </a:p>
+          <a:p>
+            <a:pPr marL="0" indent="0">
+              <a:buNone/>
+            </a:pPr>
+            <a:r>
+              <a:rPr lang="nb-NO" dirty="0">
+                <a:latin typeface="Arial" panose="020B0604020202020204" pitchFamily="34" charset="0"/>
+                <a:cs typeface="Arial" panose="020B0604020202020204" pitchFamily="34" charset="0"/>
+              </a:rPr>
+              <a:t>{</a:t>
+            </a:r>
+          </a:p>
+          <a:p>
+            <a:pPr marL="0" indent="0">
+              <a:buNone/>
+            </a:pPr>
+            <a:r>
+              <a:rPr lang="nb-NO" dirty="0">
+                <a:latin typeface="Arial" panose="020B0604020202020204" pitchFamily="34" charset="0"/>
+                <a:cs typeface="Arial" panose="020B0604020202020204" pitchFamily="34" charset="0"/>
+              </a:rPr>
+              <a:t>«result:»</a:t>
+            </a:r>
+          </a:p>
+          <a:p>
+            <a:pPr marL="0" indent="0">
+              <a:buNone/>
+            </a:pPr>
+            <a:r>
+              <a:rPr lang="nb-NO" dirty="0">
+                <a:latin typeface="Arial" panose="020B0604020202020204" pitchFamily="34" charset="0"/>
+                <a:cs typeface="Arial" panose="020B0604020202020204" pitchFamily="34" charset="0"/>
+              </a:rPr>
+              <a:t>	[</a:t>
+            </a:r>
+          </a:p>
+          <a:p>
+            <a:pPr marL="0" indent="0">
+              <a:buNone/>
+            </a:pPr>
+            <a:r>
+              <a:rPr lang="nb-NO" dirty="0">
+                <a:latin typeface="Arial" panose="020B0604020202020204" pitchFamily="34" charset="0"/>
+                <a:cs typeface="Arial" panose="020B0604020202020204" pitchFamily="34" charset="0"/>
+              </a:rPr>
+              <a:t>		{</a:t>
+            </a:r>
+          </a:p>
+          <a:p>
+            <a:pPr marL="0" indent="0">
+              <a:buNone/>
+            </a:pPr>
+            <a:r>
+              <a:rPr lang="nb-NO" dirty="0">
+                <a:latin typeface="Arial" panose="020B0604020202020204" pitchFamily="34" charset="0"/>
+                <a:cs typeface="Arial" panose="020B0604020202020204" pitchFamily="34" charset="0"/>
+              </a:rPr>
+              <a:t>			«id»: «342»,</a:t>
+            </a:r>
+          </a:p>
+          <a:p>
+            <a:pPr marL="0" indent="0">
+              <a:buNone/>
+            </a:pPr>
+            <a:r>
+              <a:rPr lang="nb-NO" dirty="0">
+                <a:latin typeface="Arial" panose="020B0604020202020204" pitchFamily="34" charset="0"/>
+                <a:cs typeface="Arial" panose="020B0604020202020204" pitchFamily="34" charset="0"/>
+              </a:rPr>
+              <a:t>			«species_id»: «0»,</a:t>
+            </a:r>
+          </a:p>
+          <a:p>
+            <a:pPr marL="0" indent="0">
+              <a:buNone/>
+            </a:pPr>
+            <a:r>
+              <a:rPr lang="nb-NO" dirty="0">
+                <a:latin typeface="Arial" panose="020B0604020202020204" pitchFamily="34" charset="0"/>
+                <a:cs typeface="Arial" panose="020B0604020202020204" pitchFamily="34" charset="0"/>
+              </a:rPr>
+              <a:t>			«image»: «images/gleebnorb.png»,</a:t>
+            </a:r>
+          </a:p>
+          <a:p>
+            <a:pPr marL="0" indent="0">
+              <a:buNone/>
+            </a:pPr>
+            <a:r>
+              <a:rPr lang="nb-NO" dirty="0">
+                <a:latin typeface="Arial" panose="020B0604020202020204" pitchFamily="34" charset="0"/>
+                <a:cs typeface="Arial" panose="020B0604020202020204" pitchFamily="34" charset="0"/>
+              </a:rPr>
+              <a:t>			«name»: «Timmy»</a:t>
+            </a:r>
+          </a:p>
+          <a:p>
+            <a:pPr marL="0" indent="0">
+              <a:buNone/>
+            </a:pPr>
+            <a:r>
+              <a:rPr lang="nb-NO" dirty="0">
+                <a:latin typeface="Arial" panose="020B0604020202020204" pitchFamily="34" charset="0"/>
+                <a:cs typeface="Arial" panose="020B0604020202020204" pitchFamily="34" charset="0"/>
+              </a:rPr>
+              <a:t>			«species_name»: «Gleebnorb»</a:t>
+            </a:r>
+          </a:p>
+          <a:p>
+            <a:pPr marL="0" indent="0">
+              <a:buNone/>
+            </a:pPr>
+            <a:r>
+              <a:rPr lang="nb-NO" dirty="0">
+                <a:latin typeface="Arial" panose="020B0604020202020204" pitchFamily="34" charset="0"/>
+                <a:cs typeface="Arial" panose="020B0604020202020204" pitchFamily="34" charset="0"/>
+              </a:rPr>
+              <a:t>			...</a:t>
+            </a:r>
+          </a:p>
+          <a:p>
+            <a:pPr marL="0" indent="0">
+              <a:buNone/>
+            </a:pPr>
+            <a:r>
+              <a:rPr lang="nb-NO" dirty="0">
+                <a:latin typeface="Arial" panose="020B0604020202020204" pitchFamily="34" charset="0"/>
+                <a:cs typeface="Arial" panose="020B0604020202020204" pitchFamily="34" charset="0"/>
+              </a:rPr>
+              <a:t>		},</a:t>
+            </a:r>
+          </a:p>
+          <a:p>
+            <a:pPr marL="0" indent="0">
+              <a:buNone/>
+            </a:pPr>
+            <a:r>
+              <a:rPr lang="nb-NO" dirty="0">
+                <a:latin typeface="Arial" panose="020B0604020202020204" pitchFamily="34" charset="0"/>
+                <a:cs typeface="Arial" panose="020B0604020202020204" pitchFamily="34" charset="0"/>
+              </a:rPr>
+              <a:t>		...</a:t>
+            </a:r>
+          </a:p>
+          <a:p>
+            <a:pPr marL="0" indent="0">
+              <a:buNone/>
+            </a:pPr>
+            <a:r>
+              <a:rPr lang="nb-NO" dirty="0">
+                <a:latin typeface="Arial" panose="020B0604020202020204" pitchFamily="34" charset="0"/>
+                <a:cs typeface="Arial" panose="020B0604020202020204" pitchFamily="34" charset="0"/>
+              </a:rPr>
+              <a:t>	]</a:t>
+            </a:r>
+          </a:p>
+          <a:p>
+            <a:pPr marL="0" indent="0">
+              <a:buNone/>
+            </a:pPr>
+            <a:r>
+              <a:rPr lang="nb-NO" dirty="0">
+                <a:latin typeface="Arial" panose="020B0604020202020204" pitchFamily="34" charset="0"/>
+                <a:cs typeface="Arial" panose="020B0604020202020204" pitchFamily="34" charset="0"/>
+              </a:rPr>
+              <a:t>}</a:t>
+            </a:r>
+          </a:p>
+          <a:p>
+            <a:r>
+              <a:rPr lang="nb-NO" dirty="0">
+                <a:latin typeface="Arial" panose="020B0604020202020204" pitchFamily="34" charset="0"/>
+                <a:cs typeface="Arial" panose="020B0604020202020204" pitchFamily="34" charset="0"/>
+              </a:rPr>
+              <a:t>POST method with json «user_id», «species_id», «x», «y», and «name» adds a new item to a user’s list of PlanetItems, returning the new «id» and «image»</a:t>
+            </a:r>
+          </a:p>
+          <a:p>
+            <a:r>
+              <a:rPr lang="nb-NO" dirty="0">
+                <a:latin typeface="Arial" panose="020B0604020202020204" pitchFamily="34" charset="0"/>
+                <a:cs typeface="Arial" panose="020B0604020202020204" pitchFamily="34" charset="0"/>
+              </a:rPr>
+              <a:t>PATCH method with json «alien_id», «x», and «y» updates the x and y vars of an alien</a:t>
+            </a:r>
+          </a:p>
+          <a:p>
+            <a:r>
+              <a:rPr lang="nb-NO" dirty="0">
+                <a:latin typeface="Arial" panose="020B0604020202020204" pitchFamily="34" charset="0"/>
+                <a:cs typeface="Arial" panose="020B0604020202020204" pitchFamily="34" charset="0"/>
+              </a:rPr>
+              <a:t>DELETE method with params «alien_id» will remove that item from the database</a:t>
             </a:r>
           </a:p>
         </p:txBody>
@@ -7025,7 +7062,7 @@
     </p:spTree>
     <p:extLst>
       <p:ext uri="{BB962C8B-B14F-4D97-AF65-F5344CB8AC3E}">
-        <p14:creationId xmlns:p14="http://schemas.microsoft.com/office/powerpoint/2010/main" val="3689206682"/>
+        <p14:creationId xmlns:p14="http://schemas.microsoft.com/office/powerpoint/2010/main" val="3064423067"/>
       </p:ext>
     </p:extLst>
   </p:cSld>
@@ -7077,7 +7114,7 @@
                 <a:latin typeface="Arial" panose="020B0604020202020204" pitchFamily="34" charset="0"/>
                 <a:cs typeface="Arial" panose="020B0604020202020204" pitchFamily="34" charset="0"/>
               </a:rPr>
-              <a:t>/status</a:t>
+              <a:t>/items</a:t>
             </a:r>
           </a:p>
         </p:txBody>
@@ -7092,10 +7129,15 @@
             <p:ph idx="1"/>
           </p:nvPr>
         </p:nvSpPr>
-        <p:spPr/>
+        <p:spPr>
+          <a:xfrm>
+            <a:off x="838200" y="1331650"/>
+            <a:ext cx="10515600" cy="5433134"/>
+          </a:xfrm>
+        </p:spPr>
         <p:txBody>
           <a:bodyPr>
-            <a:normAutofit/>
+            <a:normAutofit fontScale="47500" lnSpcReduction="20000"/>
           </a:bodyPr>
           <a:lstStyle/>
           <a:p>
@@ -7104,16 +7146,202 @@
                 <a:latin typeface="Arial" panose="020B0604020202020204" pitchFamily="34" charset="0"/>
                 <a:cs typeface="Arial" panose="020B0604020202020204" pitchFamily="34" charset="0"/>
               </a:rPr>
-              <a:t>GET method returns «event» and «news» from the server status</a:t>
-            </a:r>
-          </a:p>
-          <a:p>
-            <a:r>
-              <a:rPr lang="nb-NO" dirty="0">
-                <a:latin typeface="Arial" panose="020B0604020202020204" pitchFamily="34" charset="0"/>
-                <a:cs typeface="Arial" panose="020B0604020202020204" pitchFamily="34" charset="0"/>
-              </a:rPr>
-              <a:t>PATCH with json including «event» and «news» to update the server status – leave a param null to not update it</a:t>
+              <a:t>GET method with params «user_id» will return json that contains each PlanetItem and its variables as well as the image variable that comes from its parent, for example:</a:t>
+            </a:r>
+          </a:p>
+          <a:p>
+            <a:pPr marL="0" indent="0">
+              <a:buNone/>
+            </a:pPr>
+            <a:r>
+              <a:rPr lang="nb-NO" dirty="0">
+                <a:latin typeface="Arial" panose="020B0604020202020204" pitchFamily="34" charset="0"/>
+                <a:cs typeface="Arial" panose="020B0604020202020204" pitchFamily="34" charset="0"/>
+              </a:rPr>
+              <a:t>{</a:t>
+            </a:r>
+          </a:p>
+          <a:p>
+            <a:pPr marL="0" indent="0">
+              <a:buNone/>
+            </a:pPr>
+            <a:r>
+              <a:rPr lang="nb-NO" dirty="0">
+                <a:latin typeface="Arial" panose="020B0604020202020204" pitchFamily="34" charset="0"/>
+                <a:cs typeface="Arial" panose="020B0604020202020204" pitchFamily="34" charset="0"/>
+              </a:rPr>
+              <a:t>«result:»</a:t>
+            </a:r>
+          </a:p>
+          <a:p>
+            <a:pPr marL="0" indent="0">
+              <a:buNone/>
+            </a:pPr>
+            <a:r>
+              <a:rPr lang="nb-NO" dirty="0">
+                <a:latin typeface="Arial" panose="020B0604020202020204" pitchFamily="34" charset="0"/>
+                <a:cs typeface="Arial" panose="020B0604020202020204" pitchFamily="34" charset="0"/>
+              </a:rPr>
+              <a:t>	[</a:t>
+            </a:r>
+          </a:p>
+          <a:p>
+            <a:pPr marL="0" indent="0">
+              <a:buNone/>
+            </a:pPr>
+            <a:r>
+              <a:rPr lang="nb-NO" dirty="0">
+                <a:latin typeface="Arial" panose="020B0604020202020204" pitchFamily="34" charset="0"/>
+                <a:cs typeface="Arial" panose="020B0604020202020204" pitchFamily="34" charset="0"/>
+              </a:rPr>
+              <a:t>		{</a:t>
+            </a:r>
+          </a:p>
+          <a:p>
+            <a:pPr marL="0" indent="0">
+              <a:buNone/>
+            </a:pPr>
+            <a:r>
+              <a:rPr lang="nb-NO" dirty="0">
+                <a:latin typeface="Arial" panose="020B0604020202020204" pitchFamily="34" charset="0"/>
+                <a:cs typeface="Arial" panose="020B0604020202020204" pitchFamily="34" charset="0"/>
+              </a:rPr>
+              <a:t>			«id»: «342»,</a:t>
+            </a:r>
+          </a:p>
+          <a:p>
+            <a:pPr marL="0" indent="0">
+              <a:buNone/>
+            </a:pPr>
+            <a:r>
+              <a:rPr lang="nb-NO" dirty="0">
+                <a:latin typeface="Arial" panose="020B0604020202020204" pitchFamily="34" charset="0"/>
+                <a:cs typeface="Arial" panose="020B0604020202020204" pitchFamily="34" charset="0"/>
+              </a:rPr>
+              <a:t>			«catalog_parent_id»: «0»,</a:t>
+            </a:r>
+          </a:p>
+          <a:p>
+            <a:pPr marL="0" indent="0">
+              <a:buNone/>
+            </a:pPr>
+            <a:r>
+              <a:rPr lang="nb-NO" dirty="0">
+                <a:latin typeface="Arial" panose="020B0604020202020204" pitchFamily="34" charset="0"/>
+                <a:cs typeface="Arial" panose="020B0604020202020204" pitchFamily="34" charset="0"/>
+              </a:rPr>
+              <a:t>			«image»: «images/statue.png»,</a:t>
+            </a:r>
+          </a:p>
+          <a:p>
+            <a:pPr marL="0" indent="0">
+              <a:buNone/>
+            </a:pPr>
+            <a:r>
+              <a:rPr lang="nb-NO" dirty="0">
+                <a:latin typeface="Arial" panose="020B0604020202020204" pitchFamily="34" charset="0"/>
+                <a:cs typeface="Arial" panose="020B0604020202020204" pitchFamily="34" charset="0"/>
+              </a:rPr>
+              <a:t>			«x»: «40»</a:t>
+            </a:r>
+          </a:p>
+          <a:p>
+            <a:pPr marL="0" indent="0">
+              <a:buNone/>
+            </a:pPr>
+            <a:r>
+              <a:rPr lang="nb-NO" dirty="0">
+                <a:latin typeface="Arial" panose="020B0604020202020204" pitchFamily="34" charset="0"/>
+                <a:cs typeface="Arial" panose="020B0604020202020204" pitchFamily="34" charset="0"/>
+              </a:rPr>
+              <a:t>			«y»: «80»</a:t>
+            </a:r>
+          </a:p>
+          <a:p>
+            <a:pPr marL="0" indent="0">
+              <a:buNone/>
+            </a:pPr>
+            <a:r>
+              <a:rPr lang="nb-NO" dirty="0">
+                <a:latin typeface="Arial" panose="020B0604020202020204" pitchFamily="34" charset="0"/>
+                <a:cs typeface="Arial" panose="020B0604020202020204" pitchFamily="34" charset="0"/>
+              </a:rPr>
+              <a:t>			...</a:t>
+            </a:r>
+          </a:p>
+          <a:p>
+            <a:pPr marL="0" indent="0">
+              <a:buNone/>
+            </a:pPr>
+            <a:r>
+              <a:rPr lang="nb-NO" dirty="0">
+                <a:latin typeface="Arial" panose="020B0604020202020204" pitchFamily="34" charset="0"/>
+                <a:cs typeface="Arial" panose="020B0604020202020204" pitchFamily="34" charset="0"/>
+              </a:rPr>
+              <a:t>		},</a:t>
+            </a:r>
+          </a:p>
+          <a:p>
+            <a:pPr marL="0" indent="0">
+              <a:buNone/>
+            </a:pPr>
+            <a:r>
+              <a:rPr lang="nb-NO" dirty="0">
+                <a:latin typeface="Arial" panose="020B0604020202020204" pitchFamily="34" charset="0"/>
+                <a:cs typeface="Arial" panose="020B0604020202020204" pitchFamily="34" charset="0"/>
+              </a:rPr>
+              <a:t>		...</a:t>
+            </a:r>
+          </a:p>
+          <a:p>
+            <a:pPr marL="0" indent="0">
+              <a:buNone/>
+            </a:pPr>
+            <a:r>
+              <a:rPr lang="nb-NO" dirty="0">
+                <a:latin typeface="Arial" panose="020B0604020202020204" pitchFamily="34" charset="0"/>
+                <a:cs typeface="Arial" panose="020B0604020202020204" pitchFamily="34" charset="0"/>
+              </a:rPr>
+              <a:t>	]</a:t>
+            </a:r>
+          </a:p>
+          <a:p>
+            <a:pPr marL="0" indent="0">
+              <a:buNone/>
+            </a:pPr>
+            <a:r>
+              <a:rPr lang="nb-NO" dirty="0">
+                <a:latin typeface="Arial" panose="020B0604020202020204" pitchFamily="34" charset="0"/>
+                <a:cs typeface="Arial" panose="020B0604020202020204" pitchFamily="34" charset="0"/>
+              </a:rPr>
+              <a:t>}</a:t>
+            </a:r>
+          </a:p>
+          <a:p>
+            <a:r>
+              <a:rPr lang="nb-NO" dirty="0">
+                <a:latin typeface="Arial" panose="020B0604020202020204" pitchFamily="34" charset="0"/>
+                <a:cs typeface="Arial" panose="020B0604020202020204" pitchFamily="34" charset="0"/>
+              </a:rPr>
+              <a:t>POST method with json «user_id» «catalog_id», «x» and «y» adds a new item to a user’s list of PlanetItems, returning the new «id» and «image»</a:t>
+            </a:r>
+          </a:p>
+          <a:p>
+            <a:r>
+              <a:rPr lang="nb-NO" dirty="0">
+                <a:latin typeface="Arial" panose="020B0604020202020204" pitchFamily="34" charset="0"/>
+                <a:cs typeface="Arial" panose="020B0604020202020204" pitchFamily="34" charset="0"/>
+              </a:rPr>
+              <a:t>DELETE method with params «item_id» will remove that item from the database</a:t>
+            </a:r>
+          </a:p>
+          <a:p>
+            <a:r>
+              <a:rPr lang="nb-NO" dirty="0">
+                <a:latin typeface="Arial" panose="020B0604020202020204" pitchFamily="34" charset="0"/>
+                <a:cs typeface="Arial" panose="020B0604020202020204" pitchFamily="34" charset="0"/>
+              </a:rPr>
+              <a:t>PATCH method with json «item_id», «x» and «y» updates an item’s x and y position</a:t>
             </a:r>
           </a:p>
         </p:txBody>
@@ -7121,7 +7349,7 @@
     </p:spTree>
     <p:extLst>
       <p:ext uri="{BB962C8B-B14F-4D97-AF65-F5344CB8AC3E}">
-        <p14:creationId xmlns:p14="http://schemas.microsoft.com/office/powerpoint/2010/main" val="809141698"/>
+        <p14:creationId xmlns:p14="http://schemas.microsoft.com/office/powerpoint/2010/main" val="3976820580"/>
       </p:ext>
     </p:extLst>
   </p:cSld>
@@ -7366,6 +7594,601 @@
                 <a:latin typeface="Arial" panose="020B0604020202020204" pitchFamily="34" charset="0"/>
                 <a:cs typeface="Arial" panose="020B0604020202020204" pitchFamily="34" charset="0"/>
               </a:rPr>
+              <a:t>/</a:t>
+            </a:r>
+            <a:r>
+              <a:rPr lang="en-US" dirty="0" err="1">
+                <a:latin typeface="Arial" panose="020B0604020202020204" pitchFamily="34" charset="0"/>
+                <a:cs typeface="Arial" panose="020B0604020202020204" pitchFamily="34" charset="0"/>
+              </a:rPr>
+              <a:t>chatitems</a:t>
+            </a:r>
+            <a:endParaRPr lang="en-US" dirty="0">
+              <a:latin typeface="Arial" panose="020B0604020202020204" pitchFamily="34" charset="0"/>
+              <a:cs typeface="Arial" panose="020B0604020202020204" pitchFamily="34" charset="0"/>
+            </a:endParaRPr>
+          </a:p>
+        </p:txBody>
+      </p:sp>
+      <p:sp>
+        <p:nvSpPr>
+          <p:cNvPr id="3" name="Content Placeholder 2"/>
+          <p:cNvSpPr>
+            <a:spLocks noGrp="1"/>
+          </p:cNvSpPr>
+          <p:nvPr>
+            <p:ph idx="1"/>
+          </p:nvPr>
+        </p:nvSpPr>
+        <p:spPr>
+          <a:xfrm>
+            <a:off x="378069" y="1331650"/>
+            <a:ext cx="11579469" cy="5433134"/>
+          </a:xfrm>
+        </p:spPr>
+        <p:txBody>
+          <a:bodyPr>
+            <a:normAutofit fontScale="55000" lnSpcReduction="20000"/>
+          </a:bodyPr>
+          <a:lstStyle/>
+          <a:p>
+            <a:r>
+              <a:rPr lang="nb-NO" dirty="0">
+                <a:latin typeface="Arial" panose="020B0604020202020204" pitchFamily="34" charset="0"/>
+                <a:cs typeface="Arial" panose="020B0604020202020204" pitchFamily="34" charset="0"/>
+              </a:rPr>
+              <a:t>GET method with params «user_id» and «item_type» (where 0 is a color and 1 is an emoticon) will return json that contains each ChatItem the User owns with that itemType and its variables, for example:</a:t>
+            </a:r>
+          </a:p>
+          <a:p>
+            <a:pPr marL="0" indent="0">
+              <a:buNone/>
+            </a:pPr>
+            <a:r>
+              <a:rPr lang="nb-NO" dirty="0">
+                <a:latin typeface="Arial" panose="020B0604020202020204" pitchFamily="34" charset="0"/>
+                <a:cs typeface="Arial" panose="020B0604020202020204" pitchFamily="34" charset="0"/>
+              </a:rPr>
+              <a:t>{</a:t>
+            </a:r>
+          </a:p>
+          <a:p>
+            <a:pPr marL="0" indent="0">
+              <a:buNone/>
+            </a:pPr>
+            <a:r>
+              <a:rPr lang="nb-NO" dirty="0">
+                <a:latin typeface="Arial" panose="020B0604020202020204" pitchFamily="34" charset="0"/>
+                <a:cs typeface="Arial" panose="020B0604020202020204" pitchFamily="34" charset="0"/>
+              </a:rPr>
+              <a:t>«result:»</a:t>
+            </a:r>
+          </a:p>
+          <a:p>
+            <a:pPr marL="0" indent="0">
+              <a:buNone/>
+            </a:pPr>
+            <a:r>
+              <a:rPr lang="nb-NO" dirty="0">
+                <a:latin typeface="Arial" panose="020B0604020202020204" pitchFamily="34" charset="0"/>
+                <a:cs typeface="Arial" panose="020B0604020202020204" pitchFamily="34" charset="0"/>
+              </a:rPr>
+              <a:t>	[</a:t>
+            </a:r>
+          </a:p>
+          <a:p>
+            <a:pPr marL="0" indent="0">
+              <a:buNone/>
+            </a:pPr>
+            <a:r>
+              <a:rPr lang="nb-NO" dirty="0">
+                <a:latin typeface="Arial" panose="020B0604020202020204" pitchFamily="34" charset="0"/>
+                <a:cs typeface="Arial" panose="020B0604020202020204" pitchFamily="34" charset="0"/>
+              </a:rPr>
+              <a:t>		{</a:t>
+            </a:r>
+          </a:p>
+          <a:p>
+            <a:pPr marL="0" indent="0">
+              <a:buNone/>
+            </a:pPr>
+            <a:r>
+              <a:rPr lang="nb-NO" dirty="0">
+                <a:latin typeface="Arial" panose="020B0604020202020204" pitchFamily="34" charset="0"/>
+                <a:cs typeface="Arial" panose="020B0604020202020204" pitchFamily="34" charset="0"/>
+              </a:rPr>
+              <a:t>			«id»: «0»,</a:t>
+            </a:r>
+          </a:p>
+          <a:p>
+            <a:pPr marL="0" indent="0">
+              <a:buNone/>
+            </a:pPr>
+            <a:r>
+              <a:rPr lang="nb-NO" dirty="0">
+                <a:latin typeface="Arial" panose="020B0604020202020204" pitchFamily="34" charset="0"/>
+                <a:cs typeface="Arial" panose="020B0604020202020204" pitchFamily="34" charset="0"/>
+              </a:rPr>
+              <a:t>			«itemType»: «0»,</a:t>
+            </a:r>
+          </a:p>
+          <a:p>
+            <a:pPr marL="0" indent="0">
+              <a:buNone/>
+            </a:pPr>
+            <a:r>
+              <a:rPr lang="nb-NO" dirty="0">
+                <a:latin typeface="Arial" panose="020B0604020202020204" pitchFamily="34" charset="0"/>
+                <a:cs typeface="Arial" panose="020B0604020202020204" pitchFamily="34" charset="0"/>
+              </a:rPr>
+              <a:t>			«string»: «purple»,</a:t>
+            </a:r>
+          </a:p>
+          <a:p>
+            <a:pPr marL="0" indent="0">
+              <a:buNone/>
+            </a:pPr>
+            <a:r>
+              <a:rPr lang="nb-NO" dirty="0">
+                <a:latin typeface="Arial" panose="020B0604020202020204" pitchFamily="34" charset="0"/>
+                <a:cs typeface="Arial" panose="020B0604020202020204" pitchFamily="34" charset="0"/>
+              </a:rPr>
+              <a:t>			«cost1»: «40»,</a:t>
+            </a:r>
+          </a:p>
+          <a:p>
+            <a:pPr marL="0" indent="0">
+              <a:buNone/>
+            </a:pPr>
+            <a:r>
+              <a:rPr lang="nb-NO" dirty="0">
+                <a:latin typeface="Arial" panose="020B0604020202020204" pitchFamily="34" charset="0"/>
+                <a:cs typeface="Arial" panose="020B0604020202020204" pitchFamily="34" charset="0"/>
+              </a:rPr>
+              <a:t>			«cost2»: «5»</a:t>
+            </a:r>
+          </a:p>
+          <a:p>
+            <a:pPr marL="0" indent="0">
+              <a:buNone/>
+            </a:pPr>
+            <a:r>
+              <a:rPr lang="nb-NO" dirty="0">
+                <a:latin typeface="Arial" panose="020B0604020202020204" pitchFamily="34" charset="0"/>
+                <a:cs typeface="Arial" panose="020B0604020202020204" pitchFamily="34" charset="0"/>
+              </a:rPr>
+              <a:t>			...</a:t>
+            </a:r>
+          </a:p>
+          <a:p>
+            <a:pPr marL="0" indent="0">
+              <a:buNone/>
+            </a:pPr>
+            <a:r>
+              <a:rPr lang="nb-NO" dirty="0">
+                <a:latin typeface="Arial" panose="020B0604020202020204" pitchFamily="34" charset="0"/>
+                <a:cs typeface="Arial" panose="020B0604020202020204" pitchFamily="34" charset="0"/>
+              </a:rPr>
+              <a:t>		},</a:t>
+            </a:r>
+          </a:p>
+          <a:p>
+            <a:pPr marL="0" indent="0">
+              <a:buNone/>
+            </a:pPr>
+            <a:r>
+              <a:rPr lang="nb-NO" dirty="0">
+                <a:latin typeface="Arial" panose="020B0604020202020204" pitchFamily="34" charset="0"/>
+                <a:cs typeface="Arial" panose="020B0604020202020204" pitchFamily="34" charset="0"/>
+              </a:rPr>
+              <a:t>		...</a:t>
+            </a:r>
+          </a:p>
+          <a:p>
+            <a:pPr marL="0" indent="0">
+              <a:buNone/>
+            </a:pPr>
+            <a:r>
+              <a:rPr lang="nb-NO" dirty="0">
+                <a:latin typeface="Arial" panose="020B0604020202020204" pitchFamily="34" charset="0"/>
+                <a:cs typeface="Arial" panose="020B0604020202020204" pitchFamily="34" charset="0"/>
+              </a:rPr>
+              <a:t>	]</a:t>
+            </a:r>
+          </a:p>
+          <a:p>
+            <a:pPr marL="0" indent="0">
+              <a:buNone/>
+            </a:pPr>
+            <a:r>
+              <a:rPr lang="nb-NO" dirty="0">
+                <a:latin typeface="Arial" panose="020B0604020202020204" pitchFamily="34" charset="0"/>
+                <a:cs typeface="Arial" panose="020B0604020202020204" pitchFamily="34" charset="0"/>
+              </a:rPr>
+              <a:t>}</a:t>
+            </a:r>
+          </a:p>
+          <a:p>
+            <a:r>
+              <a:rPr lang="nb-NO" dirty="0">
+                <a:latin typeface="Arial" panose="020B0604020202020204" pitchFamily="34" charset="0"/>
+                <a:cs typeface="Arial" panose="020B0604020202020204" pitchFamily="34" charset="0"/>
+              </a:rPr>
+              <a:t>GET method with only «user_id» param returns every ChatItem with an «owned» t/f value based on whether or not the user owns it</a:t>
+            </a:r>
+          </a:p>
+          <a:p>
+            <a:r>
+              <a:rPr lang="nb-NO" dirty="0">
+                <a:latin typeface="Arial" panose="020B0604020202020204" pitchFamily="34" charset="0"/>
+                <a:cs typeface="Arial" panose="020B0604020202020204" pitchFamily="34" charset="0"/>
+              </a:rPr>
+              <a:t>POST method with json including «item_type», «string», «cost1», «cost2», and «cost3» to create that ChatItem</a:t>
+            </a:r>
+          </a:p>
+          <a:p>
+            <a:r>
+              <a:rPr lang="nb-NO" dirty="0">
+                <a:latin typeface="Arial" panose="020B0604020202020204" pitchFamily="34" charset="0"/>
+                <a:cs typeface="Arial" panose="020B0604020202020204" pitchFamily="34" charset="0"/>
+              </a:rPr>
+              <a:t>PATCH method with json including «user_id» and «chat_item_id» to add that ChatItem to the User</a:t>
+            </a:r>
+          </a:p>
+        </p:txBody>
+      </p:sp>
+    </p:spTree>
+    <p:extLst>
+      <p:ext uri="{BB962C8B-B14F-4D97-AF65-F5344CB8AC3E}">
+        <p14:creationId xmlns:p14="http://schemas.microsoft.com/office/powerpoint/2010/main" val="1642849653"/>
+      </p:ext>
+    </p:extLst>
+  </p:cSld>
+  <p:clrMapOvr>
+    <a:masterClrMapping/>
+  </p:clrMapOvr>
+</p:sld>
+</file>
+
+<file path=ppt/slides/slide31.xml><?xml version="1.0" encoding="utf-8"?>
+<p:sld xmlns:a="http://schemas.openxmlformats.org/drawingml/2006/main" xmlns:r="http://schemas.openxmlformats.org/officeDocument/2006/relationships" xmlns:p="http://schemas.openxmlformats.org/presentationml/2006/main">
+  <p:cSld>
+    <p:spTree>
+      <p:nvGrpSpPr>
+        <p:cNvPr id="1" name=""/>
+        <p:cNvGrpSpPr/>
+        <p:nvPr/>
+      </p:nvGrpSpPr>
+      <p:grpSpPr>
+        <a:xfrm>
+          <a:off x="0" y="0"/>
+          <a:ext cx="0" cy="0"/>
+          <a:chOff x="0" y="0"/>
+          <a:chExt cx="0" cy="0"/>
+        </a:xfrm>
+      </p:grpSpPr>
+      <p:sp>
+        <p:nvSpPr>
+          <p:cNvPr id="2" name="Title 1"/>
+          <p:cNvSpPr>
+            <a:spLocks noGrp="1"/>
+          </p:cNvSpPr>
+          <p:nvPr>
+            <p:ph type="title"/>
+          </p:nvPr>
+        </p:nvSpPr>
+        <p:spPr>
+          <a:xfrm>
+            <a:off x="838200" y="365125"/>
+            <a:ext cx="10515600" cy="1325563"/>
+          </a:xfrm>
+        </p:spPr>
+        <p:txBody>
+          <a:bodyPr/>
+          <a:lstStyle/>
+          <a:p>
+            <a:r>
+              <a:rPr lang="en-US" dirty="0">
+                <a:latin typeface="Arial" panose="020B0604020202020204" pitchFamily="34" charset="0"/>
+                <a:cs typeface="Arial" panose="020B0604020202020204" pitchFamily="34" charset="0"/>
+              </a:rPr>
+              <a:t>/currency</a:t>
+            </a:r>
+          </a:p>
+        </p:txBody>
+      </p:sp>
+      <p:sp>
+        <p:nvSpPr>
+          <p:cNvPr id="3" name="Content Placeholder 2"/>
+          <p:cNvSpPr>
+            <a:spLocks noGrp="1"/>
+          </p:cNvSpPr>
+          <p:nvPr>
+            <p:ph idx="1"/>
+          </p:nvPr>
+        </p:nvSpPr>
+        <p:spPr/>
+        <p:txBody>
+          <a:bodyPr>
+            <a:normAutofit/>
+          </a:bodyPr>
+          <a:lstStyle/>
+          <a:p>
+            <a:r>
+              <a:rPr lang="nb-NO" dirty="0">
+                <a:latin typeface="Arial" panose="020B0604020202020204" pitchFamily="34" charset="0"/>
+                <a:cs typeface="Arial" panose="020B0604020202020204" pitchFamily="34" charset="0"/>
+              </a:rPr>
+              <a:t>GET method with params «user_id» returns cur1-3, vou2-3, lifetime_cur1-3</a:t>
+            </a:r>
+          </a:p>
+          <a:p>
+            <a:r>
+              <a:rPr lang="nb-NO" dirty="0">
+                <a:latin typeface="Arial" panose="020B0604020202020204" pitchFamily="34" charset="0"/>
+                <a:cs typeface="Arial" panose="020B0604020202020204" pitchFamily="34" charset="0"/>
+              </a:rPr>
+              <a:t>PATCH with json including «user_id», «cur1», «cur2», «cur3», «vou2» and «vou3» add these curs and vous to the User’s currency – if they’re positive increments both the current and lifetime currencies, if they’re negative only decreases the current ones (note: you can also send an «update_lifetime» boolean to force updating or not updating lifetime currency)</a:t>
+            </a:r>
+          </a:p>
+        </p:txBody>
+      </p:sp>
+    </p:spTree>
+    <p:extLst>
+      <p:ext uri="{BB962C8B-B14F-4D97-AF65-F5344CB8AC3E}">
+        <p14:creationId xmlns:p14="http://schemas.microsoft.com/office/powerpoint/2010/main" val="1802617112"/>
+      </p:ext>
+    </p:extLst>
+  </p:cSld>
+  <p:clrMapOvr>
+    <a:masterClrMapping/>
+  </p:clrMapOvr>
+</p:sld>
+</file>
+
+<file path=ppt/slides/slide32.xml><?xml version="1.0" encoding="utf-8"?>
+<p:sld xmlns:a="http://schemas.openxmlformats.org/drawingml/2006/main" xmlns:r="http://schemas.openxmlformats.org/officeDocument/2006/relationships" xmlns:p="http://schemas.openxmlformats.org/presentationml/2006/main">
+  <p:cSld>
+    <p:spTree>
+      <p:nvGrpSpPr>
+        <p:cNvPr id="1" name=""/>
+        <p:cNvGrpSpPr/>
+        <p:nvPr/>
+      </p:nvGrpSpPr>
+      <p:grpSpPr>
+        <a:xfrm>
+          <a:off x="0" y="0"/>
+          <a:ext cx="0" cy="0"/>
+          <a:chOff x="0" y="0"/>
+          <a:chExt cx="0" cy="0"/>
+        </a:xfrm>
+      </p:grpSpPr>
+      <p:sp>
+        <p:nvSpPr>
+          <p:cNvPr id="2" name="Title 1"/>
+          <p:cNvSpPr>
+            <a:spLocks noGrp="1"/>
+          </p:cNvSpPr>
+          <p:nvPr>
+            <p:ph type="title"/>
+          </p:nvPr>
+        </p:nvSpPr>
+        <p:spPr>
+          <a:xfrm>
+            <a:off x="838200" y="365125"/>
+            <a:ext cx="10515600" cy="1325563"/>
+          </a:xfrm>
+        </p:spPr>
+        <p:txBody>
+          <a:bodyPr/>
+          <a:lstStyle/>
+          <a:p>
+            <a:r>
+              <a:rPr lang="en-US" dirty="0">
+                <a:latin typeface="Arial" panose="020B0604020202020204" pitchFamily="34" charset="0"/>
+                <a:cs typeface="Arial" panose="020B0604020202020204" pitchFamily="34" charset="0"/>
+              </a:rPr>
+              <a:t>/missions</a:t>
+            </a:r>
+          </a:p>
+        </p:txBody>
+      </p:sp>
+      <p:sp>
+        <p:nvSpPr>
+          <p:cNvPr id="3" name="Content Placeholder 2"/>
+          <p:cNvSpPr>
+            <a:spLocks noGrp="1"/>
+          </p:cNvSpPr>
+          <p:nvPr>
+            <p:ph idx="1"/>
+          </p:nvPr>
+        </p:nvSpPr>
+        <p:spPr/>
+        <p:txBody>
+          <a:bodyPr>
+            <a:normAutofit/>
+          </a:bodyPr>
+          <a:lstStyle/>
+          <a:p>
+            <a:r>
+              <a:rPr lang="nb-NO" dirty="0">
+                <a:latin typeface="Arial" panose="020B0604020202020204" pitchFamily="34" charset="0"/>
+                <a:cs typeface="Arial" panose="020B0604020202020204" pitchFamily="34" charset="0"/>
+              </a:rPr>
+              <a:t>GET method with params «user_id» returns mission_type, mission_current, mission_total</a:t>
+            </a:r>
+          </a:p>
+          <a:p>
+            <a:r>
+              <a:rPr lang="nb-NO" dirty="0">
+                <a:latin typeface="Arial" panose="020B0604020202020204" pitchFamily="34" charset="0"/>
+                <a:cs typeface="Arial" panose="020B0604020202020204" pitchFamily="34" charset="0"/>
+              </a:rPr>
+              <a:t>POST method with params «user_id» increases mission_current by 1</a:t>
+            </a:r>
+          </a:p>
+          <a:p>
+            <a:r>
+              <a:rPr lang="nb-NO" dirty="0">
+                <a:latin typeface="Arial" panose="020B0604020202020204" pitchFamily="34" charset="0"/>
+                <a:cs typeface="Arial" panose="020B0604020202020204" pitchFamily="34" charset="0"/>
+              </a:rPr>
+              <a:t>PATCH with params «user_id» will set mission_current and mission_total to -1, then begins a 10 minute timer to get a new mission</a:t>
+            </a:r>
+          </a:p>
+        </p:txBody>
+      </p:sp>
+    </p:spTree>
+    <p:extLst>
+      <p:ext uri="{BB962C8B-B14F-4D97-AF65-F5344CB8AC3E}">
+        <p14:creationId xmlns:p14="http://schemas.microsoft.com/office/powerpoint/2010/main" val="3689206682"/>
+      </p:ext>
+    </p:extLst>
+  </p:cSld>
+  <p:clrMapOvr>
+    <a:masterClrMapping/>
+  </p:clrMapOvr>
+</p:sld>
+</file>
+
+<file path=ppt/slides/slide33.xml><?xml version="1.0" encoding="utf-8"?>
+<p:sld xmlns:a="http://schemas.openxmlformats.org/drawingml/2006/main" xmlns:r="http://schemas.openxmlformats.org/officeDocument/2006/relationships" xmlns:p="http://schemas.openxmlformats.org/presentationml/2006/main">
+  <p:cSld>
+    <p:spTree>
+      <p:nvGrpSpPr>
+        <p:cNvPr id="1" name=""/>
+        <p:cNvGrpSpPr/>
+        <p:nvPr/>
+      </p:nvGrpSpPr>
+      <p:grpSpPr>
+        <a:xfrm>
+          <a:off x="0" y="0"/>
+          <a:ext cx="0" cy="0"/>
+          <a:chOff x="0" y="0"/>
+          <a:chExt cx="0" cy="0"/>
+        </a:xfrm>
+      </p:grpSpPr>
+      <p:sp>
+        <p:nvSpPr>
+          <p:cNvPr id="2" name="Title 1"/>
+          <p:cNvSpPr>
+            <a:spLocks noGrp="1"/>
+          </p:cNvSpPr>
+          <p:nvPr>
+            <p:ph type="title"/>
+          </p:nvPr>
+        </p:nvSpPr>
+        <p:spPr>
+          <a:xfrm>
+            <a:off x="838200" y="365125"/>
+            <a:ext cx="10515600" cy="1325563"/>
+          </a:xfrm>
+        </p:spPr>
+        <p:txBody>
+          <a:bodyPr/>
+          <a:lstStyle/>
+          <a:p>
+            <a:r>
+              <a:rPr lang="en-US" dirty="0">
+                <a:latin typeface="Arial" panose="020B0604020202020204" pitchFamily="34" charset="0"/>
+                <a:cs typeface="Arial" panose="020B0604020202020204" pitchFamily="34" charset="0"/>
+              </a:rPr>
+              <a:t>/status</a:t>
+            </a:r>
+          </a:p>
+        </p:txBody>
+      </p:sp>
+      <p:sp>
+        <p:nvSpPr>
+          <p:cNvPr id="3" name="Content Placeholder 2"/>
+          <p:cNvSpPr>
+            <a:spLocks noGrp="1"/>
+          </p:cNvSpPr>
+          <p:nvPr>
+            <p:ph idx="1"/>
+          </p:nvPr>
+        </p:nvSpPr>
+        <p:spPr/>
+        <p:txBody>
+          <a:bodyPr>
+            <a:normAutofit/>
+          </a:bodyPr>
+          <a:lstStyle/>
+          <a:p>
+            <a:r>
+              <a:rPr lang="nb-NO" dirty="0">
+                <a:latin typeface="Arial" panose="020B0604020202020204" pitchFamily="34" charset="0"/>
+                <a:cs typeface="Arial" panose="020B0604020202020204" pitchFamily="34" charset="0"/>
+              </a:rPr>
+              <a:t>GET method returns «event» and «news» from the server status</a:t>
+            </a:r>
+          </a:p>
+          <a:p>
+            <a:r>
+              <a:rPr lang="nb-NO" dirty="0">
+                <a:latin typeface="Arial" panose="020B0604020202020204" pitchFamily="34" charset="0"/>
+                <a:cs typeface="Arial" panose="020B0604020202020204" pitchFamily="34" charset="0"/>
+              </a:rPr>
+              <a:t>PATCH with json including «event» and «news» to update the server status – leave a param null to not update it</a:t>
+            </a:r>
+          </a:p>
+        </p:txBody>
+      </p:sp>
+    </p:spTree>
+    <p:extLst>
+      <p:ext uri="{BB962C8B-B14F-4D97-AF65-F5344CB8AC3E}">
+        <p14:creationId xmlns:p14="http://schemas.microsoft.com/office/powerpoint/2010/main" val="809141698"/>
+      </p:ext>
+    </p:extLst>
+  </p:cSld>
+  <p:clrMapOvr>
+    <a:masterClrMapping/>
+  </p:clrMapOvr>
+</p:sld>
+</file>
+
+<file path=ppt/slides/slide34.xml><?xml version="1.0" encoding="utf-8"?>
+<p:sld xmlns:a="http://schemas.openxmlformats.org/drawingml/2006/main" xmlns:r="http://schemas.openxmlformats.org/officeDocument/2006/relationships" xmlns:p="http://schemas.openxmlformats.org/presentationml/2006/main">
+  <p:cSld>
+    <p:spTree>
+      <p:nvGrpSpPr>
+        <p:cNvPr id="1" name=""/>
+        <p:cNvGrpSpPr/>
+        <p:nvPr/>
+      </p:nvGrpSpPr>
+      <p:grpSpPr>
+        <a:xfrm>
+          <a:off x="0" y="0"/>
+          <a:ext cx="0" cy="0"/>
+          <a:chOff x="0" y="0"/>
+          <a:chExt cx="0" cy="0"/>
+        </a:xfrm>
+      </p:grpSpPr>
+      <p:sp>
+        <p:nvSpPr>
+          <p:cNvPr id="2" name="Title 1"/>
+          <p:cNvSpPr>
+            <a:spLocks noGrp="1"/>
+          </p:cNvSpPr>
+          <p:nvPr>
+            <p:ph type="title"/>
+          </p:nvPr>
+        </p:nvSpPr>
+        <p:spPr>
+          <a:xfrm>
+            <a:off x="838200" y="365125"/>
+            <a:ext cx="10515600" cy="1325563"/>
+          </a:xfrm>
+        </p:spPr>
+        <p:txBody>
+          <a:bodyPr/>
+          <a:lstStyle/>
+          <a:p>
+            <a:r>
+              <a:rPr lang="en-US" dirty="0">
+                <a:latin typeface="Arial" panose="020B0604020202020204" pitchFamily="34" charset="0"/>
+                <a:cs typeface="Arial" panose="020B0604020202020204" pitchFamily="34" charset="0"/>
+              </a:rPr>
               <a:t>/files</a:t>
             </a:r>
           </a:p>
@@ -7978,7 +8801,7 @@
         </p:nvSpPr>
         <p:spPr>
           <a:xfrm>
-            <a:off x="838200" y="365125"/>
+            <a:off x="838200" y="0"/>
             <a:ext cx="10515600" cy="1325563"/>
           </a:xfrm>
         </p:spPr>
@@ -8008,13 +8831,13 @@
         </p:nvSpPr>
         <p:spPr>
           <a:xfrm>
-            <a:off x="838200" y="1397978"/>
-            <a:ext cx="10515600" cy="5389684"/>
+            <a:off x="597877" y="1081454"/>
+            <a:ext cx="10755923" cy="5776546"/>
           </a:xfrm>
         </p:spPr>
         <p:txBody>
           <a:bodyPr>
-            <a:normAutofit fontScale="47500" lnSpcReduction="20000"/>
+            <a:normAutofit fontScale="40000" lnSpcReduction="20000"/>
           </a:bodyPr>
           <a:lstStyle/>
           <a:p>
@@ -8140,6 +8963,33 @@
                 <a:latin typeface="Arial" panose="020B0604020202020204" pitchFamily="34" charset="0"/>
                 <a:cs typeface="Arial" panose="020B0604020202020204" pitchFamily="34" charset="0"/>
               </a:rPr>
+              <a:t>bio: String(256)</a:t>
+            </a:r>
+          </a:p>
+          <a:p>
+            <a:r>
+              <a:rPr lang="nb-NO" dirty="0">
+                <a:latin typeface="Arial" panose="020B0604020202020204" pitchFamily="34" charset="0"/>
+                <a:cs typeface="Arial" panose="020B0604020202020204" pitchFamily="34" charset="0"/>
+              </a:rPr>
+              <a:t>planet_desc: String(256)</a:t>
+            </a:r>
+          </a:p>
+          <a:p>
+            <a:r>
+              <a:rPr lang="nb-NO" dirty="0">
+                <a:latin typeface="Arial" panose="020B0604020202020204" pitchFamily="34" charset="0"/>
+                <a:cs typeface="Arial" panose="020B0604020202020204" pitchFamily="34" charset="0"/>
+              </a:rPr>
+              <a:t>theme: String(128)</a:t>
+            </a:r>
+          </a:p>
+          <a:p>
+            <a:r>
+              <a:rPr lang="nb-NO" dirty="0">
+                <a:latin typeface="Arial" panose="020B0604020202020204" pitchFamily="34" charset="0"/>
+                <a:cs typeface="Arial" panose="020B0604020202020204" pitchFamily="34" charset="0"/>
+              </a:rPr>
               <a:t>planet: a one-to-one relationship between User and Planet, giving owner variable to Planet</a:t>
             </a:r>
           </a:p>
@@ -8150,6 +9000,15 @@
                 <a:cs typeface="Arial" panose="020B0604020202020204" pitchFamily="34" charset="0"/>
               </a:rPr>
               <a:t>planet_items: a one-to-many relationship between User and PlanetItems, giving owner variable to PlanetItem</a:t>
+            </a:r>
+          </a:p>
+          <a:p>
+            <a:r>
+              <a:rPr lang="nb-NO" dirty="0">
+                <a:latin typeface="Arial" panose="020B0604020202020204" pitchFamily="34" charset="0"/>
+                <a:cs typeface="Arial" panose="020B0604020202020204" pitchFamily="34" charset="0"/>
+              </a:rPr>
+              <a:t>aliens: a one-to-many relationship between User and Aliens, giving owner variable to Alien</a:t>
             </a:r>
           </a:p>
           <a:p>

</xml_diff>

<commit_message>
Revert "Fixed backend bugs, added aliens, rockets, and user info"
This reverts commit 669a06f357fbbdafbfcf50668433925fe10a56d1.
</commit_message>
<xml_diff>
--- a/iu-spec-backend.pptx
+++ b/iu-spec-backend.pptx
@@ -18,27 +18,23 @@
     <p:sldId id="267" r:id="rId12"/>
     <p:sldId id="266" r:id="rId13"/>
     <p:sldId id="268" r:id="rId14"/>
-    <p:sldId id="288" r:id="rId15"/>
-    <p:sldId id="289" r:id="rId16"/>
-    <p:sldId id="286" r:id="rId17"/>
-    <p:sldId id="285" r:id="rId18"/>
-    <p:sldId id="269" r:id="rId19"/>
-    <p:sldId id="270" r:id="rId20"/>
-    <p:sldId id="271" r:id="rId21"/>
-    <p:sldId id="277" r:id="rId22"/>
-    <p:sldId id="279" r:id="rId23"/>
-    <p:sldId id="272" r:id="rId24"/>
-    <p:sldId id="273" r:id="rId25"/>
-    <p:sldId id="274" r:id="rId26"/>
-    <p:sldId id="275" r:id="rId27"/>
-    <p:sldId id="290" r:id="rId28"/>
-    <p:sldId id="291" r:id="rId29"/>
-    <p:sldId id="276" r:id="rId30"/>
-    <p:sldId id="287" r:id="rId31"/>
-    <p:sldId id="278" r:id="rId32"/>
-    <p:sldId id="281" r:id="rId33"/>
-    <p:sldId id="280" r:id="rId34"/>
-    <p:sldId id="284" r:id="rId35"/>
+    <p:sldId id="286" r:id="rId15"/>
+    <p:sldId id="285" r:id="rId16"/>
+    <p:sldId id="269" r:id="rId17"/>
+    <p:sldId id="270" r:id="rId18"/>
+    <p:sldId id="271" r:id="rId19"/>
+    <p:sldId id="277" r:id="rId20"/>
+    <p:sldId id="279" r:id="rId21"/>
+    <p:sldId id="272" r:id="rId22"/>
+    <p:sldId id="273" r:id="rId23"/>
+    <p:sldId id="274" r:id="rId24"/>
+    <p:sldId id="275" r:id="rId25"/>
+    <p:sldId id="276" r:id="rId26"/>
+    <p:sldId id="287" r:id="rId27"/>
+    <p:sldId id="278" r:id="rId28"/>
+    <p:sldId id="281" r:id="rId29"/>
+    <p:sldId id="280" r:id="rId30"/>
+    <p:sldId id="284" r:id="rId31"/>
   </p:sldIdLst>
   <p:sldSz cx="12192000" cy="6858000"/>
   <p:notesSz cx="6858000" cy="9144000"/>
@@ -292,7 +288,7 @@
           <a:p>
             <a:fld id="{CB54544B-930A-4C71-864D-1F69A4B5B49D}" type="datetimeFigureOut">
               <a:rPr lang="en-US" smtClean="0"/>
-              <a:t>8/16/2018</a:t>
+              <a:t>8/6/2018</a:t>
             </a:fld>
             <a:endParaRPr lang="en-US"/>
           </a:p>
@@ -490,7 +486,7 @@
           <a:p>
             <a:fld id="{CB54544B-930A-4C71-864D-1F69A4B5B49D}" type="datetimeFigureOut">
               <a:rPr lang="en-US" smtClean="0"/>
-              <a:t>8/16/2018</a:t>
+              <a:t>8/6/2018</a:t>
             </a:fld>
             <a:endParaRPr lang="en-US"/>
           </a:p>
@@ -698,7 +694,7 @@
           <a:p>
             <a:fld id="{CB54544B-930A-4C71-864D-1F69A4B5B49D}" type="datetimeFigureOut">
               <a:rPr lang="en-US" smtClean="0"/>
-              <a:t>8/16/2018</a:t>
+              <a:t>8/6/2018</a:t>
             </a:fld>
             <a:endParaRPr lang="en-US"/>
           </a:p>
@@ -896,7 +892,7 @@
           <a:p>
             <a:fld id="{CB54544B-930A-4C71-864D-1F69A4B5B49D}" type="datetimeFigureOut">
               <a:rPr lang="en-US" smtClean="0"/>
-              <a:t>8/16/2018</a:t>
+              <a:t>8/6/2018</a:t>
             </a:fld>
             <a:endParaRPr lang="en-US"/>
           </a:p>
@@ -1171,7 +1167,7 @@
           <a:p>
             <a:fld id="{CB54544B-930A-4C71-864D-1F69A4B5B49D}" type="datetimeFigureOut">
               <a:rPr lang="en-US" smtClean="0"/>
-              <a:t>8/16/2018</a:t>
+              <a:t>8/6/2018</a:t>
             </a:fld>
             <a:endParaRPr lang="en-US"/>
           </a:p>
@@ -1436,7 +1432,7 @@
           <a:p>
             <a:fld id="{CB54544B-930A-4C71-864D-1F69A4B5B49D}" type="datetimeFigureOut">
               <a:rPr lang="en-US" smtClean="0"/>
-              <a:t>8/16/2018</a:t>
+              <a:t>8/6/2018</a:t>
             </a:fld>
             <a:endParaRPr lang="en-US"/>
           </a:p>
@@ -1848,7 +1844,7 @@
           <a:p>
             <a:fld id="{CB54544B-930A-4C71-864D-1F69A4B5B49D}" type="datetimeFigureOut">
               <a:rPr lang="en-US" smtClean="0"/>
-              <a:t>8/16/2018</a:t>
+              <a:t>8/6/2018</a:t>
             </a:fld>
             <a:endParaRPr lang="en-US"/>
           </a:p>
@@ -1989,7 +1985,7 @@
           <a:p>
             <a:fld id="{CB54544B-930A-4C71-864D-1F69A4B5B49D}" type="datetimeFigureOut">
               <a:rPr lang="en-US" smtClean="0"/>
-              <a:t>8/16/2018</a:t>
+              <a:t>8/6/2018</a:t>
             </a:fld>
             <a:endParaRPr lang="en-US"/>
           </a:p>
@@ -2102,7 +2098,7 @@
           <a:p>
             <a:fld id="{CB54544B-930A-4C71-864D-1F69A4B5B49D}" type="datetimeFigureOut">
               <a:rPr lang="en-US" smtClean="0"/>
-              <a:t>8/16/2018</a:t>
+              <a:t>8/6/2018</a:t>
             </a:fld>
             <a:endParaRPr lang="en-US"/>
           </a:p>
@@ -2413,7 +2409,7 @@
           <a:p>
             <a:fld id="{CB54544B-930A-4C71-864D-1F69A4B5B49D}" type="datetimeFigureOut">
               <a:rPr lang="en-US" smtClean="0"/>
-              <a:t>8/16/2018</a:t>
+              <a:t>8/6/2018</a:t>
             </a:fld>
             <a:endParaRPr lang="en-US"/>
           </a:p>
@@ -2701,7 +2697,7 @@
           <a:p>
             <a:fld id="{CB54544B-930A-4C71-864D-1F69A4B5B49D}" type="datetimeFigureOut">
               <a:rPr lang="en-US" smtClean="0"/>
-              <a:t>8/16/2018</a:t>
+              <a:t>8/6/2018</a:t>
             </a:fld>
             <a:endParaRPr lang="en-US"/>
           </a:p>
@@ -2942,7 +2938,7 @@
           <a:p>
             <a:fld id="{CB54544B-930A-4C71-864D-1F69A4B5B49D}" type="datetimeFigureOut">
               <a:rPr lang="en-US" smtClean="0"/>
-              <a:t>8/16/2018</a:t>
+              <a:t>8/6/2018</a:t>
             </a:fld>
             <a:endParaRPr lang="en-US"/>
           </a:p>
@@ -3859,6 +3855,12 @@
               <a:t>surface: String(128)</a:t>
             </a:r>
           </a:p>
+          <a:p>
+            <a:endParaRPr lang="nb-NO" dirty="0">
+              <a:latin typeface="Arial" panose="020B0604020202020204" pitchFamily="34" charset="0"/>
+              <a:cs typeface="Arial" panose="020B0604020202020204" pitchFamily="34" charset="0"/>
+            </a:endParaRPr>
+          </a:p>
         </p:txBody>
       </p:sp>
     </p:spTree>
@@ -4064,7 +4066,7 @@
                 <a:latin typeface="Arial" panose="020B0604020202020204" pitchFamily="34" charset="0"/>
                 <a:cs typeface="Arial" panose="020B0604020202020204" pitchFamily="34" charset="0"/>
               </a:rPr>
-              <a:t>AlienSpecies</a:t>
+              <a:t>PlanetItem</a:t>
             </a:r>
             <a:endParaRPr lang="en-US" dirty="0">
               <a:latin typeface="Arial" panose="020B0604020202020204" pitchFamily="34" charset="0"/>
@@ -4095,34 +4097,34 @@
                 <a:latin typeface="Arial" panose="020B0604020202020204" pitchFamily="34" charset="0"/>
                 <a:cs typeface="Arial" panose="020B0604020202020204" pitchFamily="34" charset="0"/>
               </a:rPr>
-              <a:t>name: String(64), index = True, unique = True </a:t>
-            </a:r>
-          </a:p>
-          <a:p>
-            <a:r>
-              <a:rPr lang="nb-NO" dirty="0">
-                <a:latin typeface="Arial" panose="020B0604020202020204" pitchFamily="34" charset="0"/>
-                <a:cs typeface="Arial" panose="020B0604020202020204" pitchFamily="34" charset="0"/>
-              </a:rPr>
-              <a:t>image: String(128)</a:t>
-            </a:r>
-          </a:p>
-          <a:p>
-            <a:r>
-              <a:rPr lang="nb-NO" dirty="0">
-                <a:latin typeface="Arial" panose="020B0604020202020204" pitchFamily="34" charset="0"/>
-                <a:cs typeface="Arial" panose="020B0604020202020204" pitchFamily="34" charset="0"/>
-              </a:rPr>
-              <a:t>available: Boolean</a:t>
-            </a:r>
-          </a:p>
-          <a:p>
-            <a:r>
-              <a:rPr lang="nb-NO" dirty="0">
-                <a:latin typeface="Arial" panose="020B0604020202020204" pitchFamily="34" charset="0"/>
-                <a:cs typeface="Arial" panose="020B0604020202020204" pitchFamily="34" charset="0"/>
-              </a:rPr>
-              <a:t>aliens: a one-to-many relationship between AlienSpecies and Aliens, giving species variable to PlanetItem</a:t>
+              <a:t>owner_id: links to User from User-PlanetItem relation</a:t>
+            </a:r>
+          </a:p>
+          <a:p>
+            <a:r>
+              <a:rPr lang="nb-NO" dirty="0">
+                <a:latin typeface="Arial" panose="020B0604020202020204" pitchFamily="34" charset="0"/>
+                <a:cs typeface="Arial" panose="020B0604020202020204" pitchFamily="34" charset="0"/>
+              </a:rPr>
+              <a:t>catalog_owner_id: links to CatalogItem from CatalogItem-PlanetItem relation</a:t>
+            </a:r>
+          </a:p>
+          <a:p>
+            <a:r>
+              <a:rPr lang="nb-NO" dirty="0">
+                <a:latin typeface="Arial" panose="020B0604020202020204" pitchFamily="34" charset="0"/>
+                <a:cs typeface="Arial" panose="020B0604020202020204" pitchFamily="34" charset="0"/>
+              </a:rPr>
+              <a:t>x: Integer</a:t>
+            </a:r>
+          </a:p>
+          <a:p>
+            <a:r>
+              <a:rPr lang="nb-NO" dirty="0">
+                <a:latin typeface="Arial" panose="020B0604020202020204" pitchFamily="34" charset="0"/>
+                <a:cs typeface="Arial" panose="020B0604020202020204" pitchFamily="34" charset="0"/>
+              </a:rPr>
+              <a:t>y: Integer</a:t>
             </a:r>
           </a:p>
           <a:p>
@@ -4131,18 +4133,12 @@
               <a:cs typeface="Arial" panose="020B0604020202020204" pitchFamily="34" charset="0"/>
             </a:endParaRPr>
           </a:p>
-          <a:p>
-            <a:endParaRPr lang="nb-NO" dirty="0">
-              <a:latin typeface="Arial" panose="020B0604020202020204" pitchFamily="34" charset="0"/>
-              <a:cs typeface="Arial" panose="020B0604020202020204" pitchFamily="34" charset="0"/>
-            </a:endParaRPr>
-          </a:p>
         </p:txBody>
       </p:sp>
     </p:spTree>
     <p:extLst>
       <p:ext uri="{BB962C8B-B14F-4D97-AF65-F5344CB8AC3E}">
-        <p14:creationId xmlns:p14="http://schemas.microsoft.com/office/powerpoint/2010/main" val="3290516661"/>
+        <p14:creationId xmlns:p14="http://schemas.microsoft.com/office/powerpoint/2010/main" val="412844008"/>
       </p:ext>
     </p:extLst>
   </p:cSld>
@@ -4190,12 +4186,16 @@
           <a:lstStyle/>
           <a:p>
             <a:r>
-              <a:rPr lang="en-US" dirty="0">
-                <a:latin typeface="Arial" panose="020B0604020202020204" pitchFamily="34" charset="0"/>
-                <a:cs typeface="Arial" panose="020B0604020202020204" pitchFamily="34" charset="0"/>
-              </a:rPr>
-              <a:t>Alien</a:t>
-            </a:r>
+              <a:rPr lang="en-US" dirty="0" err="1">
+                <a:latin typeface="Arial" panose="020B0604020202020204" pitchFamily="34" charset="0"/>
+                <a:cs typeface="Arial" panose="020B0604020202020204" pitchFamily="34" charset="0"/>
+              </a:rPr>
+              <a:t>ChatItem</a:t>
+            </a:r>
+            <a:endParaRPr lang="en-US" dirty="0">
+              <a:latin typeface="Arial" panose="020B0604020202020204" pitchFamily="34" charset="0"/>
+              <a:cs typeface="Arial" panose="020B0604020202020204" pitchFamily="34" charset="0"/>
+            </a:endParaRPr>
           </a:p>
         </p:txBody>
       </p:sp>
@@ -4221,51 +4221,39 @@
                 <a:latin typeface="Arial" panose="020B0604020202020204" pitchFamily="34" charset="0"/>
                 <a:cs typeface="Arial" panose="020B0604020202020204" pitchFamily="34" charset="0"/>
               </a:rPr>
-              <a:t>name: String(64), index = True, unique = True </a:t>
-            </a:r>
-          </a:p>
-          <a:p>
-            <a:r>
-              <a:rPr lang="nb-NO" dirty="0">
-                <a:latin typeface="Arial" panose="020B0604020202020204" pitchFamily="34" charset="0"/>
-                <a:cs typeface="Arial" panose="020B0604020202020204" pitchFamily="34" charset="0"/>
-              </a:rPr>
-              <a:t>x: Integer</a:t>
-            </a:r>
-          </a:p>
-          <a:p>
-            <a:r>
-              <a:rPr lang="nb-NO" dirty="0">
-                <a:latin typeface="Arial" panose="020B0604020202020204" pitchFamily="34" charset="0"/>
-                <a:cs typeface="Arial" panose="020B0604020202020204" pitchFamily="34" charset="0"/>
-              </a:rPr>
-              <a:t>y: Integer</a:t>
-            </a:r>
-          </a:p>
-          <a:p>
-            <a:r>
-              <a:rPr lang="nb-NO" dirty="0">
-                <a:latin typeface="Arial" panose="020B0604020202020204" pitchFamily="34" charset="0"/>
-                <a:cs typeface="Arial" panose="020B0604020202020204" pitchFamily="34" charset="0"/>
-              </a:rPr>
-              <a:t>species: links to AlienSpecies from Alien-AlienSpecies relation</a:t>
-            </a:r>
-          </a:p>
-          <a:p>
-            <a:r>
-              <a:rPr lang="nb-NO" dirty="0">
-                <a:latin typeface="Arial" panose="020B0604020202020204" pitchFamily="34" charset="0"/>
-                <a:cs typeface="Arial" panose="020B0604020202020204" pitchFamily="34" charset="0"/>
-              </a:rPr>
-              <a:t>owner: links to User from Alien-User relation</a:t>
-            </a:r>
+              <a:t>itemType: Integer</a:t>
+            </a:r>
+          </a:p>
+          <a:p>
+            <a:r>
+              <a:rPr lang="nb-NO" dirty="0">
+                <a:latin typeface="Arial" panose="020B0604020202020204" pitchFamily="34" charset="0"/>
+                <a:cs typeface="Arial" panose="020B0604020202020204" pitchFamily="34" charset="0"/>
+              </a:rPr>
+              <a:t>string: String(16)</a:t>
+            </a:r>
+          </a:p>
+          <a:p>
+            <a:r>
+              <a:rPr lang="nb-NO" dirty="0">
+                <a:latin typeface="Arial" panose="020B0604020202020204" pitchFamily="34" charset="0"/>
+                <a:cs typeface="Arial" panose="020B0604020202020204" pitchFamily="34" charset="0"/>
+              </a:rPr>
+              <a:t>cost1, cost2, cost3 are all Integers</a:t>
+            </a:r>
+          </a:p>
+          <a:p>
+            <a:endParaRPr lang="nb-NO" dirty="0">
+              <a:latin typeface="Arial" panose="020B0604020202020204" pitchFamily="34" charset="0"/>
+              <a:cs typeface="Arial" panose="020B0604020202020204" pitchFamily="34" charset="0"/>
+            </a:endParaRPr>
           </a:p>
         </p:txBody>
       </p:sp>
     </p:spTree>
     <p:extLst>
       <p:ext uri="{BB962C8B-B14F-4D97-AF65-F5344CB8AC3E}">
-        <p14:creationId xmlns:p14="http://schemas.microsoft.com/office/powerpoint/2010/main" val="1735612626"/>
+        <p14:creationId xmlns:p14="http://schemas.microsoft.com/office/powerpoint/2010/main" val="1099134368"/>
       </p:ext>
     </p:extLst>
   </p:cSld>
@@ -4313,16 +4301,12 @@
           <a:lstStyle/>
           <a:p>
             <a:r>
-              <a:rPr lang="en-US" dirty="0" err="1">
-                <a:latin typeface="Arial" panose="020B0604020202020204" pitchFamily="34" charset="0"/>
-                <a:cs typeface="Arial" panose="020B0604020202020204" pitchFamily="34" charset="0"/>
-              </a:rPr>
-              <a:t>PlanetItem</a:t>
-            </a:r>
-            <a:endParaRPr lang="en-US" dirty="0">
-              <a:latin typeface="Arial" panose="020B0604020202020204" pitchFamily="34" charset="0"/>
-              <a:cs typeface="Arial" panose="020B0604020202020204" pitchFamily="34" charset="0"/>
-            </a:endParaRPr>
+              <a:rPr lang="en-US" dirty="0">
+                <a:latin typeface="Arial" panose="020B0604020202020204" pitchFamily="34" charset="0"/>
+                <a:cs typeface="Arial" panose="020B0604020202020204" pitchFamily="34" charset="0"/>
+              </a:rPr>
+              <a:t>Status</a:t>
+            </a:r>
           </a:p>
         </p:txBody>
       </p:sp>
@@ -4348,57 +4332,24 @@
                 <a:latin typeface="Arial" panose="020B0604020202020204" pitchFamily="34" charset="0"/>
                 <a:cs typeface="Arial" panose="020B0604020202020204" pitchFamily="34" charset="0"/>
               </a:rPr>
-              <a:t>owner_id: links to User from User-PlanetItem relation</a:t>
-            </a:r>
-          </a:p>
-          <a:p>
-            <a:r>
-              <a:rPr lang="nb-NO" dirty="0">
-                <a:latin typeface="Arial" panose="020B0604020202020204" pitchFamily="34" charset="0"/>
-                <a:cs typeface="Arial" panose="020B0604020202020204" pitchFamily="34" charset="0"/>
-              </a:rPr>
-              <a:t>catalog_owner_id: links to CatalogItem from CatalogItem-PlanetItem relation</a:t>
-            </a:r>
-          </a:p>
-          <a:p>
-            <a:r>
-              <a:rPr lang="nb-NO" dirty="0">
-                <a:latin typeface="Arial" panose="020B0604020202020204" pitchFamily="34" charset="0"/>
-                <a:cs typeface="Arial" panose="020B0604020202020204" pitchFamily="34" charset="0"/>
-              </a:rPr>
-              <a:t>x: Integer</a:t>
-            </a:r>
-          </a:p>
-          <a:p>
-            <a:r>
-              <a:rPr lang="nb-NO" dirty="0">
-                <a:latin typeface="Arial" panose="020B0604020202020204" pitchFamily="34" charset="0"/>
-                <a:cs typeface="Arial" panose="020B0604020202020204" pitchFamily="34" charset="0"/>
-              </a:rPr>
-              <a:t>y: Integer</a:t>
-            </a:r>
-          </a:p>
-          <a:p>
-            <a:r>
-              <a:rPr lang="nb-NO" dirty="0">
-                <a:latin typeface="Arial" panose="020B0604020202020204" pitchFamily="34" charset="0"/>
-                <a:cs typeface="Arial" panose="020B0604020202020204" pitchFamily="34" charset="0"/>
-              </a:rPr>
-              <a:t>isRocket: boolean</a:t>
-            </a:r>
-          </a:p>
-          <a:p>
-            <a:endParaRPr lang="nb-NO" dirty="0">
-              <a:latin typeface="Arial" panose="020B0604020202020204" pitchFamily="34" charset="0"/>
-              <a:cs typeface="Arial" panose="020B0604020202020204" pitchFamily="34" charset="0"/>
-            </a:endParaRPr>
+              <a:t>event: Boolean that keeps track of whether or not an event is taking place</a:t>
+            </a:r>
+          </a:p>
+          <a:p>
+            <a:r>
+              <a:rPr lang="nb-NO" dirty="0">
+                <a:latin typeface="Arial" panose="020B0604020202020204" pitchFamily="34" charset="0"/>
+                <a:cs typeface="Arial" panose="020B0604020202020204" pitchFamily="34" charset="0"/>
+              </a:rPr>
+              <a:t>news: String(256) that displays on login</a:t>
+            </a:r>
           </a:p>
         </p:txBody>
       </p:sp>
     </p:spTree>
     <p:extLst>
       <p:ext uri="{BB962C8B-B14F-4D97-AF65-F5344CB8AC3E}">
-        <p14:creationId xmlns:p14="http://schemas.microsoft.com/office/powerpoint/2010/main" val="412844008"/>
+        <p14:creationId xmlns:p14="http://schemas.microsoft.com/office/powerpoint/2010/main" val="2941787461"/>
       </p:ext>
     </p:extLst>
   </p:cSld>
@@ -4437,7 +4388,7 @@
         </p:nvSpPr>
         <p:spPr>
           <a:xfrm>
-            <a:off x="838200" y="365125"/>
+            <a:off x="900087" y="1734160"/>
             <a:ext cx="10515600" cy="1325563"/>
           </a:xfrm>
         </p:spPr>
@@ -4445,12 +4396,13 @@
           <a:bodyPr/>
           <a:lstStyle/>
           <a:p>
-            <a:r>
-              <a:rPr lang="en-US" dirty="0" err="1">
-                <a:latin typeface="Arial" panose="020B0604020202020204" pitchFamily="34" charset="0"/>
-                <a:cs typeface="Arial" panose="020B0604020202020204" pitchFamily="34" charset="0"/>
-              </a:rPr>
-              <a:t>ChatItem</a:t>
+            <a:pPr algn="ctr"/>
+            <a:r>
+              <a:rPr lang="en-US" sz="8000" dirty="0">
+                <a:latin typeface="Arial" panose="020B0604020202020204" pitchFamily="34" charset="0"/>
+                <a:cs typeface="Arial" panose="020B0604020202020204" pitchFamily="34" charset="0"/>
+              </a:rPr>
+              <a:t>HTTP Methods</a:t>
             </a:r>
             <a:endParaRPr lang="en-US" dirty="0">
               <a:latin typeface="Arial" panose="020B0604020202020204" pitchFamily="34" charset="0"/>
@@ -4461,7 +4413,13 @@
       </p:sp>
       <p:sp>
         <p:nvSpPr>
-          <p:cNvPr id="3" name="Content Placeholder 2"/>
+          <p:cNvPr id="3" name="Content Placeholder 2">
+            <a:extLst>
+              <a:ext uri="{FF2B5EF4-FFF2-40B4-BE49-F238E27FC236}">
+                <a16:creationId xmlns:a16="http://schemas.microsoft.com/office/drawing/2014/main" id="{BE3FB728-F36C-4A19-84C0-7B717486095B}"/>
+              </a:ext>
+            </a:extLst>
+          </p:cNvPr>
           <p:cNvSpPr>
             <a:spLocks noGrp="1"/>
           </p:cNvSpPr>
@@ -4469,51 +4427,50 @@
             <p:ph idx="1"/>
           </p:nvPr>
         </p:nvSpPr>
-        <p:spPr/>
+        <p:spPr>
+          <a:xfrm>
+            <a:off x="838200" y="3798277"/>
+            <a:ext cx="10515600" cy="2378686"/>
+          </a:xfrm>
+        </p:spPr>
         <p:txBody>
           <a:bodyPr>
             <a:normAutofit/>
           </a:bodyPr>
           <a:lstStyle/>
           <a:p>
-            <a:r>
-              <a:rPr lang="nb-NO" dirty="0">
-                <a:latin typeface="Arial" panose="020B0604020202020204" pitchFamily="34" charset="0"/>
-                <a:cs typeface="Arial" panose="020B0604020202020204" pitchFamily="34" charset="0"/>
-              </a:rPr>
-              <a:t>itemType: Integer</a:t>
-            </a:r>
-          </a:p>
-          <a:p>
-            <a:r>
-              <a:rPr lang="nb-NO" dirty="0">
-                <a:latin typeface="Arial" panose="020B0604020202020204" pitchFamily="34" charset="0"/>
-                <a:cs typeface="Arial" panose="020B0604020202020204" pitchFamily="34" charset="0"/>
-              </a:rPr>
-              <a:t>string: String(16)</a:t>
-            </a:r>
-          </a:p>
-          <a:p>
-            <a:r>
-              <a:rPr lang="nb-NO" dirty="0">
-                <a:latin typeface="Arial" panose="020B0604020202020204" pitchFamily="34" charset="0"/>
-                <a:cs typeface="Arial" panose="020B0604020202020204" pitchFamily="34" charset="0"/>
-              </a:rPr>
-              <a:t>cost1, cost2, cost3 are all Integers</a:t>
-            </a:r>
-          </a:p>
-          <a:p>
-            <a:endParaRPr lang="nb-NO" dirty="0">
-              <a:latin typeface="Arial" panose="020B0604020202020204" pitchFamily="34" charset="0"/>
-              <a:cs typeface="Arial" panose="020B0604020202020204" pitchFamily="34" charset="0"/>
-            </a:endParaRPr>
+            <a:pPr marL="0" indent="0" algn="ctr">
+              <a:buNone/>
+            </a:pPr>
+            <a:r>
+              <a:rPr lang="nb-NO" dirty="0">
+                <a:latin typeface="Arial" panose="020B0604020202020204" pitchFamily="34" charset="0"/>
+                <a:cs typeface="Arial" panose="020B0604020202020204" pitchFamily="34" charset="0"/>
+              </a:rPr>
+              <a:t>Small note: if an HTTP method requires JSON data to be passed in, a request should have a Content-Type: application/json header. See </a:t>
+            </a:r>
+            <a:r>
+              <a:rPr lang="nb-NO" dirty="0">
+                <a:latin typeface="Arial" panose="020B0604020202020204" pitchFamily="34" charset="0"/>
+                <a:cs typeface="Arial" panose="020B0604020202020204" pitchFamily="34" charset="0"/>
+                <a:hlinkClick r:id="rId2"/>
+              </a:rPr>
+              <a:t>https://stackoverflow.com/questions/44959749/fetch-with-headers</a:t>
+            </a:r>
+            <a:r>
+              <a:rPr lang="nb-NO" dirty="0">
+                <a:latin typeface="Arial" panose="020B0604020202020204" pitchFamily="34" charset="0"/>
+                <a:cs typeface="Arial" panose="020B0604020202020204" pitchFamily="34" charset="0"/>
+              </a:rPr>
+              <a:t> for an example.</a:t>
+            </a:r>
           </a:p>
         </p:txBody>
       </p:sp>
     </p:spTree>
     <p:extLst>
       <p:ext uri="{BB962C8B-B14F-4D97-AF65-F5344CB8AC3E}">
-        <p14:creationId xmlns:p14="http://schemas.microsoft.com/office/powerpoint/2010/main" val="1099134368"/>
+        <p14:creationId xmlns:p14="http://schemas.microsoft.com/office/powerpoint/2010/main" val="4062299613"/>
       </p:ext>
     </p:extLst>
   </p:cSld>
@@ -4565,7 +4522,7 @@
                 <a:latin typeface="Arial" panose="020B0604020202020204" pitchFamily="34" charset="0"/>
                 <a:cs typeface="Arial" panose="020B0604020202020204" pitchFamily="34" charset="0"/>
               </a:rPr>
-              <a:t>Status</a:t>
+              <a:t>/login</a:t>
             </a:r>
           </a:p>
         </p:txBody>
@@ -4592,24 +4549,39 @@
                 <a:latin typeface="Arial" panose="020B0604020202020204" pitchFamily="34" charset="0"/>
                 <a:cs typeface="Arial" panose="020B0604020202020204" pitchFamily="34" charset="0"/>
               </a:rPr>
-              <a:t>event: Boolean that keeps track of whether or not an event is taking place</a:t>
-            </a:r>
-          </a:p>
-          <a:p>
-            <a:r>
-              <a:rPr lang="nb-NO" dirty="0">
-                <a:latin typeface="Arial" panose="020B0604020202020204" pitchFamily="34" charset="0"/>
-                <a:cs typeface="Arial" panose="020B0604020202020204" pitchFamily="34" charset="0"/>
-              </a:rPr>
-              <a:t>news: String(256) that displays on login</a:t>
-            </a:r>
+              <a:t>POST json w/ "username", "password_hash", "email" to users and the user will be added to the database, returns json with «status»: «ok» or «error», and «user_id» if successful</a:t>
+            </a:r>
+          </a:p>
+          <a:p>
+            <a:r>
+              <a:rPr lang="nb-NO" dirty="0">
+                <a:latin typeface="Arial" panose="020B0604020202020204" pitchFamily="34" charset="0"/>
+                <a:cs typeface="Arial" panose="020B0604020202020204" pitchFamily="34" charset="0"/>
+              </a:rPr>
+              <a:t>GET method w/ params «username» and «password_hash» will return «status»: «ok» or «error» based on whether or not the login attempt was successful, and «user_id» if successful</a:t>
+            </a:r>
+          </a:p>
+          <a:p>
+            <a:r>
+              <a:rPr lang="nb-NO" dirty="0">
+                <a:latin typeface="Arial" panose="020B0604020202020204" pitchFamily="34" charset="0"/>
+                <a:cs typeface="Arial" panose="020B0604020202020204" pitchFamily="34" charset="0"/>
+              </a:rPr>
+              <a:t>DELETE method w/ params «username» will logout the current user, returning «status»: «ok» or «error»</a:t>
+            </a:r>
+          </a:p>
+          <a:p>
+            <a:endParaRPr lang="nb-NO" dirty="0">
+              <a:latin typeface="Arial" panose="020B0604020202020204" pitchFamily="34" charset="0"/>
+              <a:cs typeface="Arial" panose="020B0604020202020204" pitchFamily="34" charset="0"/>
+            </a:endParaRPr>
           </a:p>
         </p:txBody>
       </p:sp>
     </p:spTree>
     <p:extLst>
       <p:ext uri="{BB962C8B-B14F-4D97-AF65-F5344CB8AC3E}">
-        <p14:creationId xmlns:p14="http://schemas.microsoft.com/office/powerpoint/2010/main" val="2941787461"/>
+        <p14:creationId xmlns:p14="http://schemas.microsoft.com/office/powerpoint/2010/main" val="199329726"/>
       </p:ext>
     </p:extLst>
   </p:cSld>
@@ -4648,7 +4620,7 @@
         </p:nvSpPr>
         <p:spPr>
           <a:xfrm>
-            <a:off x="900087" y="1734160"/>
+            <a:off x="838200" y="365125"/>
             <a:ext cx="10515600" cy="1325563"/>
           </a:xfrm>
         </p:spPr>
@@ -4656,81 +4628,77 @@
           <a:bodyPr/>
           <a:lstStyle/>
           <a:p>
-            <a:pPr algn="ctr"/>
-            <a:r>
-              <a:rPr lang="en-US" sz="8000" dirty="0">
-                <a:latin typeface="Arial" panose="020B0604020202020204" pitchFamily="34" charset="0"/>
-                <a:cs typeface="Arial" panose="020B0604020202020204" pitchFamily="34" charset="0"/>
-              </a:rPr>
-              <a:t>HTTP Methods</a:t>
-            </a:r>
-            <a:endParaRPr lang="en-US" dirty="0">
+            <a:r>
+              <a:rPr lang="en-US" dirty="0">
+                <a:latin typeface="Arial" panose="020B0604020202020204" pitchFamily="34" charset="0"/>
+                <a:cs typeface="Arial" panose="020B0604020202020204" pitchFamily="34" charset="0"/>
+              </a:rPr>
+              <a:t>/users</a:t>
+            </a:r>
+          </a:p>
+        </p:txBody>
+      </p:sp>
+      <p:sp>
+        <p:nvSpPr>
+          <p:cNvPr id="3" name="Content Placeholder 2"/>
+          <p:cNvSpPr>
+            <a:spLocks noGrp="1"/>
+          </p:cNvSpPr>
+          <p:nvPr>
+            <p:ph idx="1"/>
+          </p:nvPr>
+        </p:nvSpPr>
+        <p:spPr/>
+        <p:txBody>
+          <a:bodyPr>
+            <a:normAutofit/>
+          </a:bodyPr>
+          <a:lstStyle/>
+          <a:p>
+            <a:r>
+              <a:rPr lang="nb-NO" dirty="0">
+                <a:latin typeface="Arial" panose="020B0604020202020204" pitchFamily="34" charset="0"/>
+                <a:cs typeface="Arial" panose="020B0604020202020204" pitchFamily="34" charset="0"/>
+              </a:rPr>
+              <a:t>GET method w/ params «user_id» and returns json of username, email, name, login_days, last_login, planet_id, chat_color, and alien</a:t>
+            </a:r>
+          </a:p>
+          <a:p>
+            <a:r>
+              <a:rPr lang="nb-NO" dirty="0">
+                <a:latin typeface="Arial" panose="020B0604020202020204" pitchFamily="34" charset="0"/>
+                <a:cs typeface="Arial" panose="020B0604020202020204" pitchFamily="34" charset="0"/>
+              </a:rPr>
+              <a:t>PATCH method w/ params «user_id» and nothing else will update last_login, and if the new last_login is on a different day, increases login_days by 1 and returns json with «new_day»: true, otherwise returns «new_day»: false, and regardless also returns login_days</a:t>
+            </a:r>
+          </a:p>
+          <a:p>
+            <a:r>
+              <a:rPr lang="nb-NO" dirty="0">
+                <a:latin typeface="Arial" panose="020B0604020202020204" pitchFamily="34" charset="0"/>
+                <a:cs typeface="Arial" panose="020B0604020202020204" pitchFamily="34" charset="0"/>
+              </a:rPr>
+              <a:t>PATCH method w/ params «user_id» and «chat_color» or «alien» or «rocket» will update that value</a:t>
+            </a:r>
+          </a:p>
+          <a:p>
+            <a:endParaRPr lang="nb-NO" dirty="0">
               <a:latin typeface="Arial" panose="020B0604020202020204" pitchFamily="34" charset="0"/>
               <a:cs typeface="Arial" panose="020B0604020202020204" pitchFamily="34" charset="0"/>
             </a:endParaRPr>
           </a:p>
-        </p:txBody>
-      </p:sp>
-      <p:sp>
-        <p:nvSpPr>
-          <p:cNvPr id="3" name="Content Placeholder 2">
-            <a:extLst>
-              <a:ext uri="{FF2B5EF4-FFF2-40B4-BE49-F238E27FC236}">
-                <a16:creationId xmlns:a16="http://schemas.microsoft.com/office/drawing/2014/main" id="{BE3FB728-F36C-4A19-84C0-7B717486095B}"/>
-              </a:ext>
-            </a:extLst>
-          </p:cNvPr>
-          <p:cNvSpPr>
-            <a:spLocks noGrp="1"/>
-          </p:cNvSpPr>
-          <p:nvPr>
-            <p:ph idx="1"/>
-          </p:nvPr>
-        </p:nvSpPr>
-        <p:spPr>
-          <a:xfrm>
-            <a:off x="838200" y="3798277"/>
-            <a:ext cx="10515600" cy="2378686"/>
-          </a:xfrm>
-        </p:spPr>
-        <p:txBody>
-          <a:bodyPr>
-            <a:normAutofit/>
-          </a:bodyPr>
-          <a:lstStyle/>
-          <a:p>
-            <a:pPr marL="0" indent="0" algn="ctr">
-              <a:buNone/>
-            </a:pPr>
-            <a:r>
-              <a:rPr lang="nb-NO" dirty="0">
-                <a:latin typeface="Arial" panose="020B0604020202020204" pitchFamily="34" charset="0"/>
-                <a:cs typeface="Arial" panose="020B0604020202020204" pitchFamily="34" charset="0"/>
-              </a:rPr>
-              <a:t>Small note: if an HTTP method requires JSON data to be passed in, a request should have a Content-Type: application/json header. See </a:t>
-            </a:r>
-            <a:r>
-              <a:rPr lang="nb-NO" dirty="0">
-                <a:latin typeface="Arial" panose="020B0604020202020204" pitchFamily="34" charset="0"/>
-                <a:cs typeface="Arial" panose="020B0604020202020204" pitchFamily="34" charset="0"/>
-                <a:hlinkClick r:id="rId2"/>
-              </a:rPr>
-              <a:t>https://stackoverflow.com/questions/44959749/fetch-with-headers</a:t>
-            </a:r>
-            <a:r>
-              <a:rPr lang="nb-NO" dirty="0">
-                <a:latin typeface="Arial" panose="020B0604020202020204" pitchFamily="34" charset="0"/>
-                <a:cs typeface="Arial" panose="020B0604020202020204" pitchFamily="34" charset="0"/>
-              </a:rPr>
-              <a:t> for an example.</a:t>
-            </a:r>
+          <a:p>
+            <a:endParaRPr lang="nb-NO" dirty="0">
+              <a:latin typeface="Arial" panose="020B0604020202020204" pitchFamily="34" charset="0"/>
+              <a:cs typeface="Arial" panose="020B0604020202020204" pitchFamily="34" charset="0"/>
+            </a:endParaRPr>
           </a:p>
         </p:txBody>
       </p:sp>
     </p:spTree>
     <p:extLst>
       <p:ext uri="{BB962C8B-B14F-4D97-AF65-F5344CB8AC3E}">
-        <p14:creationId xmlns:p14="http://schemas.microsoft.com/office/powerpoint/2010/main" val="4062299613"/>
+        <p14:creationId xmlns:p14="http://schemas.microsoft.com/office/powerpoint/2010/main" val="696820992"/>
       </p:ext>
     </p:extLst>
   </p:cSld>
@@ -5053,7 +5021,7 @@
                 <a:latin typeface="Arial" panose="020B0604020202020204" pitchFamily="34" charset="0"/>
                 <a:cs typeface="Arial" panose="020B0604020202020204" pitchFamily="34" charset="0"/>
               </a:rPr>
-              <a:t>/login</a:t>
+              <a:t>/visitors</a:t>
             </a:r>
           </a:p>
         </p:txBody>
@@ -5071,7 +5039,7 @@
         <p:spPr/>
         <p:txBody>
           <a:bodyPr>
-            <a:normAutofit/>
+            <a:normAutofit fontScale="55000" lnSpcReduction="20000"/>
           </a:bodyPr>
           <a:lstStyle/>
           <a:p>
@@ -5080,28 +5048,163 @@
                 <a:latin typeface="Arial" panose="020B0604020202020204" pitchFamily="34" charset="0"/>
                 <a:cs typeface="Arial" panose="020B0604020202020204" pitchFamily="34" charset="0"/>
               </a:rPr>
-              <a:t>POST json w/ "username", "password_hash", "email" to users and the user will be added to the database, returns json with «status»: «ok» or «error», and «user_id» if successful</a:t>
-            </a:r>
-          </a:p>
-          <a:p>
-            <a:r>
-              <a:rPr lang="nb-NO" dirty="0">
-                <a:latin typeface="Arial" panose="020B0604020202020204" pitchFamily="34" charset="0"/>
-                <a:cs typeface="Arial" panose="020B0604020202020204" pitchFamily="34" charset="0"/>
-              </a:rPr>
-              <a:t>GET method w/ params «username» and «password_hash» will return «status»: «ok» or «error» based on whether or not the login attempt was successful, and «user_id» if successful</a:t>
-            </a:r>
-          </a:p>
-          <a:p>
-            <a:r>
-              <a:rPr lang="nb-NO" dirty="0">
-                <a:latin typeface="Arial" panose="020B0604020202020204" pitchFamily="34" charset="0"/>
-                <a:cs typeface="Arial" panose="020B0604020202020204" pitchFamily="34" charset="0"/>
-              </a:rPr>
-              <a:t>DELETE method w/ params «username» will logout the current user, returning «status»: «ok» or «error»</a:t>
-            </a:r>
-          </a:p>
-          <a:p>
+              <a:t>POST method w/ params «visitor_id» and «visited_id» adds a relationship between the Users</a:t>
+            </a:r>
+          </a:p>
+          <a:p>
+            <a:r>
+              <a:rPr lang="nb-NO" dirty="0">
+                <a:latin typeface="Arial" panose="020B0604020202020204" pitchFamily="34" charset="0"/>
+                <a:cs typeface="Arial" panose="020B0604020202020204" pitchFamily="34" charset="0"/>
+              </a:rPr>
+              <a:t>GET method w/ params «user_id» returns json that contains each user_id they’ve visited</a:t>
+            </a:r>
+          </a:p>
+          <a:p>
+            <a:r>
+              <a:rPr lang="nb-NO" dirty="0">
+                <a:latin typeface="Arial" panose="020B0604020202020204" pitchFamily="34" charset="0"/>
+                <a:cs typeface="Arial" panose="020B0604020202020204" pitchFamily="34" charset="0"/>
+              </a:rPr>
+              <a:t>DELETE method w/ params «user_id» takes note that that user has updated their planet, and removes all relationships where visited is the user</a:t>
+            </a:r>
+          </a:p>
+          <a:p>
+            <a:pPr marL="0" indent="0">
+              <a:buNone/>
+            </a:pPr>
+            <a:r>
+              <a:rPr lang="nb-NO" dirty="0">
+                <a:latin typeface="Arial" panose="020B0604020202020204" pitchFamily="34" charset="0"/>
+                <a:cs typeface="Arial" panose="020B0604020202020204" pitchFamily="34" charset="0"/>
+              </a:rPr>
+              <a:t>{</a:t>
+            </a:r>
+          </a:p>
+          <a:p>
+            <a:pPr marL="0" indent="0">
+              <a:buNone/>
+            </a:pPr>
+            <a:r>
+              <a:rPr lang="nb-NO" dirty="0">
+                <a:latin typeface="Arial" panose="020B0604020202020204" pitchFamily="34" charset="0"/>
+                <a:cs typeface="Arial" panose="020B0604020202020204" pitchFamily="34" charset="0"/>
+              </a:rPr>
+              <a:t>«results»:</a:t>
+            </a:r>
+          </a:p>
+          <a:p>
+            <a:pPr marL="0" indent="0">
+              <a:buNone/>
+            </a:pPr>
+            <a:r>
+              <a:rPr lang="nb-NO" dirty="0">
+                <a:latin typeface="Arial" panose="020B0604020202020204" pitchFamily="34" charset="0"/>
+                <a:cs typeface="Arial" panose="020B0604020202020204" pitchFamily="34" charset="0"/>
+              </a:rPr>
+              <a:t>	[</a:t>
+            </a:r>
+          </a:p>
+          <a:p>
+            <a:pPr marL="0" indent="0">
+              <a:buNone/>
+            </a:pPr>
+            <a:r>
+              <a:rPr lang="nb-NO" dirty="0">
+                <a:latin typeface="Arial" panose="020B0604020202020204" pitchFamily="34" charset="0"/>
+                <a:cs typeface="Arial" panose="020B0604020202020204" pitchFamily="34" charset="0"/>
+              </a:rPr>
+              <a:t>		{</a:t>
+            </a:r>
+          </a:p>
+          <a:p>
+            <a:pPr marL="0" indent="0">
+              <a:buNone/>
+            </a:pPr>
+            <a:r>
+              <a:rPr lang="nb-NO" dirty="0">
+                <a:latin typeface="Arial" panose="020B0604020202020204" pitchFamily="34" charset="0"/>
+                <a:cs typeface="Arial" panose="020B0604020202020204" pitchFamily="34" charset="0"/>
+              </a:rPr>
+              <a:t>			«id»: 9</a:t>
+            </a:r>
+          </a:p>
+          <a:p>
+            <a:pPr marL="0" indent="0">
+              <a:buNone/>
+            </a:pPr>
+            <a:r>
+              <a:rPr lang="nb-NO" dirty="0">
+                <a:latin typeface="Arial" panose="020B0604020202020204" pitchFamily="34" charset="0"/>
+                <a:cs typeface="Arial" panose="020B0604020202020204" pitchFamily="34" charset="0"/>
+              </a:rPr>
+              <a:t>		},</a:t>
+            </a:r>
+          </a:p>
+          <a:p>
+            <a:pPr marL="0" indent="0">
+              <a:buNone/>
+            </a:pPr>
+            <a:r>
+              <a:rPr lang="nb-NO" dirty="0">
+                <a:latin typeface="Arial" panose="020B0604020202020204" pitchFamily="34" charset="0"/>
+                <a:cs typeface="Arial" panose="020B0604020202020204" pitchFamily="34" charset="0"/>
+              </a:rPr>
+              <a:t>		{</a:t>
+            </a:r>
+          </a:p>
+          <a:p>
+            <a:pPr marL="0" indent="0">
+              <a:buNone/>
+            </a:pPr>
+            <a:r>
+              <a:rPr lang="nb-NO" dirty="0">
+                <a:latin typeface="Arial" panose="020B0604020202020204" pitchFamily="34" charset="0"/>
+                <a:cs typeface="Arial" panose="020B0604020202020204" pitchFamily="34" charset="0"/>
+              </a:rPr>
+              <a:t>			«id»: 10</a:t>
+            </a:r>
+          </a:p>
+          <a:p>
+            <a:pPr marL="0" indent="0">
+              <a:buNone/>
+            </a:pPr>
+            <a:r>
+              <a:rPr lang="nb-NO" dirty="0">
+                <a:latin typeface="Arial" panose="020B0604020202020204" pitchFamily="34" charset="0"/>
+                <a:cs typeface="Arial" panose="020B0604020202020204" pitchFamily="34" charset="0"/>
+              </a:rPr>
+              <a:t>		}</a:t>
+            </a:r>
+          </a:p>
+          <a:p>
+            <a:pPr marL="0" indent="0">
+              <a:buNone/>
+            </a:pPr>
+            <a:r>
+              <a:rPr lang="nb-NO" dirty="0">
+                <a:latin typeface="Arial" panose="020B0604020202020204" pitchFamily="34" charset="0"/>
+                <a:cs typeface="Arial" panose="020B0604020202020204" pitchFamily="34" charset="0"/>
+              </a:rPr>
+              <a:t>	]</a:t>
+            </a:r>
+          </a:p>
+          <a:p>
+            <a:pPr marL="0" indent="0">
+              <a:buNone/>
+            </a:pPr>
+            <a:r>
+              <a:rPr lang="nb-NO" dirty="0">
+                <a:latin typeface="Arial" panose="020B0604020202020204" pitchFamily="34" charset="0"/>
+                <a:cs typeface="Arial" panose="020B0604020202020204" pitchFamily="34" charset="0"/>
+              </a:rPr>
+              <a:t>}</a:t>
+            </a:r>
+          </a:p>
+          <a:p>
+            <a:pPr marL="0" indent="0">
+              <a:buNone/>
+            </a:pPr>
             <a:endParaRPr lang="nb-NO" dirty="0">
               <a:latin typeface="Arial" panose="020B0604020202020204" pitchFamily="34" charset="0"/>
               <a:cs typeface="Arial" panose="020B0604020202020204" pitchFamily="34" charset="0"/>
@@ -5112,7 +5215,7 @@
     </p:spTree>
     <p:extLst>
       <p:ext uri="{BB962C8B-B14F-4D97-AF65-F5344CB8AC3E}">
-        <p14:creationId xmlns:p14="http://schemas.microsoft.com/office/powerpoint/2010/main" val="199329726"/>
+        <p14:creationId xmlns:p14="http://schemas.microsoft.com/office/powerpoint/2010/main" val="1092747602"/>
       </p:ext>
     </p:extLst>
   </p:cSld>
@@ -5164,7 +5267,7 @@
                 <a:latin typeface="Arial" panose="020B0604020202020204" pitchFamily="34" charset="0"/>
                 <a:cs typeface="Arial" panose="020B0604020202020204" pitchFamily="34" charset="0"/>
               </a:rPr>
-              <a:t>/users</a:t>
+              <a:t>/galaxies</a:t>
             </a:r>
           </a:p>
         </p:txBody>
@@ -5182,7 +5285,7 @@
         <p:spPr/>
         <p:txBody>
           <a:bodyPr>
-            <a:normAutofit/>
+            <a:normAutofit fontScale="55000" lnSpcReduction="20000"/>
           </a:bodyPr>
           <a:lstStyle/>
           <a:p>
@@ -5191,45 +5294,168 @@
                 <a:latin typeface="Arial" panose="020B0604020202020204" pitchFamily="34" charset="0"/>
                 <a:cs typeface="Arial" panose="020B0604020202020204" pitchFamily="34" charset="0"/>
               </a:rPr>
-              <a:t>GET method w/ params «user_id» and returns json of username, email, name, login_days, last_login, planet_id, chat_color, and alien</a:t>
-            </a:r>
-          </a:p>
-          <a:p>
-            <a:r>
-              <a:rPr lang="nb-NO" dirty="0">
-                <a:latin typeface="Arial" panose="020B0604020202020204" pitchFamily="34" charset="0"/>
-                <a:cs typeface="Arial" panose="020B0604020202020204" pitchFamily="34" charset="0"/>
-              </a:rPr>
-              <a:t>PATCH method w/ params «user_id» and nothing else will update last_login, and if the new last_login is on a different day, increases login_days by 1 and returns json with «new_day»: true, otherwise returns «new_day»: false, and regardless also returns login_days</a:t>
-            </a:r>
-          </a:p>
-          <a:p>
-            <a:r>
-              <a:rPr lang="nb-NO" dirty="0">
-                <a:latin typeface="Arial" panose="020B0604020202020204" pitchFamily="34" charset="0"/>
-                <a:cs typeface="Arial" panose="020B0604020202020204" pitchFamily="34" charset="0"/>
-              </a:rPr>
-              <a:t>PATCH method w/ params «user_id» and «chat_color» or «alien» or «rocket» will update that value</a:t>
-            </a:r>
-          </a:p>
-          <a:p>
-            <a:endParaRPr lang="nb-NO" dirty="0">
-              <a:latin typeface="Arial" panose="020B0604020202020204" pitchFamily="34" charset="0"/>
-              <a:cs typeface="Arial" panose="020B0604020202020204" pitchFamily="34" charset="0"/>
-            </a:endParaRPr>
-          </a:p>
-          <a:p>
-            <a:endParaRPr lang="nb-NO" dirty="0">
-              <a:latin typeface="Arial" panose="020B0604020202020204" pitchFamily="34" charset="0"/>
-              <a:cs typeface="Arial" panose="020B0604020202020204" pitchFamily="34" charset="0"/>
-            </a:endParaRPr>
+              <a:t>GET method will return json that contains each Galaxy and its variables, for example:</a:t>
+            </a:r>
+          </a:p>
+          <a:p>
+            <a:pPr marL="0" indent="0">
+              <a:buNone/>
+            </a:pPr>
+            <a:r>
+              <a:rPr lang="nb-NO" dirty="0">
+                <a:latin typeface="Arial" panose="020B0604020202020204" pitchFamily="34" charset="0"/>
+                <a:cs typeface="Arial" panose="020B0604020202020204" pitchFamily="34" charset="0"/>
+              </a:rPr>
+              <a:t>{</a:t>
+            </a:r>
+          </a:p>
+          <a:p>
+            <a:pPr marL="0" indent="0">
+              <a:buNone/>
+            </a:pPr>
+            <a:r>
+              <a:rPr lang="nb-NO" dirty="0">
+                <a:latin typeface="Arial" panose="020B0604020202020204" pitchFamily="34" charset="0"/>
+                <a:cs typeface="Arial" panose="020B0604020202020204" pitchFamily="34" charset="0"/>
+              </a:rPr>
+              <a:t>«results»:</a:t>
+            </a:r>
+          </a:p>
+          <a:p>
+            <a:pPr marL="0" indent="0">
+              <a:buNone/>
+            </a:pPr>
+            <a:r>
+              <a:rPr lang="nb-NO" dirty="0">
+                <a:latin typeface="Arial" panose="020B0604020202020204" pitchFamily="34" charset="0"/>
+                <a:cs typeface="Arial" panose="020B0604020202020204" pitchFamily="34" charset="0"/>
+              </a:rPr>
+              <a:t>	[,</a:t>
+            </a:r>
+          </a:p>
+          <a:p>
+            <a:pPr marL="0" indent="0">
+              <a:buNone/>
+            </a:pPr>
+            <a:r>
+              <a:rPr lang="nb-NO" dirty="0">
+                <a:latin typeface="Arial" panose="020B0604020202020204" pitchFamily="34" charset="0"/>
+                <a:cs typeface="Arial" panose="020B0604020202020204" pitchFamily="34" charset="0"/>
+              </a:rPr>
+              <a:t>		{</a:t>
+            </a:r>
+          </a:p>
+          <a:p>
+            <a:pPr marL="0" indent="0">
+              <a:buNone/>
+            </a:pPr>
+            <a:r>
+              <a:rPr lang="nb-NO" dirty="0">
+                <a:latin typeface="Arial" panose="020B0604020202020204" pitchFamily="34" charset="0"/>
+                <a:cs typeface="Arial" panose="020B0604020202020204" pitchFamily="34" charset="0"/>
+              </a:rPr>
+              <a:t>			«id»: «0»,</a:t>
+            </a:r>
+          </a:p>
+          <a:p>
+            <a:pPr marL="0" indent="0">
+              <a:buNone/>
+            </a:pPr>
+            <a:r>
+              <a:rPr lang="nb-NO" dirty="0">
+                <a:latin typeface="Arial" panose="020B0604020202020204" pitchFamily="34" charset="0"/>
+                <a:cs typeface="Arial" panose="020B0604020202020204" pitchFamily="34" charset="0"/>
+              </a:rPr>
+              <a:t>			«name»: «Build-It-Yourself Galaxy»,</a:t>
+            </a:r>
+          </a:p>
+          <a:p>
+            <a:pPr marL="0" indent="0">
+              <a:buNone/>
+            </a:pPr>
+            <a:r>
+              <a:rPr lang="nb-NO" dirty="0">
+                <a:latin typeface="Arial" panose="020B0604020202020204" pitchFamily="34" charset="0"/>
+                <a:cs typeface="Arial" panose="020B0604020202020204" pitchFamily="34" charset="0"/>
+              </a:rPr>
+              <a:t>			«description»: «Where way cool inventors dwell.»,</a:t>
+            </a:r>
+          </a:p>
+          <a:p>
+            <a:pPr marL="0" indent="0">
+              <a:buNone/>
+            </a:pPr>
+            <a:r>
+              <a:rPr lang="nb-NO" dirty="0">
+                <a:latin typeface="Arial" panose="020B0604020202020204" pitchFamily="34" charset="0"/>
+                <a:cs typeface="Arial" panose="020B0604020202020204" pitchFamily="34" charset="0"/>
+              </a:rPr>
+              <a:t>			...</a:t>
+            </a:r>
+          </a:p>
+          <a:p>
+            <a:pPr marL="0" indent="0">
+              <a:buNone/>
+            </a:pPr>
+            <a:r>
+              <a:rPr lang="nb-NO" dirty="0">
+                <a:latin typeface="Arial" panose="020B0604020202020204" pitchFamily="34" charset="0"/>
+                <a:cs typeface="Arial" panose="020B0604020202020204" pitchFamily="34" charset="0"/>
+              </a:rPr>
+              <a:t>		},</a:t>
+            </a:r>
+          </a:p>
+          <a:p>
+            <a:pPr marL="0" indent="0">
+              <a:buNone/>
+            </a:pPr>
+            <a:r>
+              <a:rPr lang="nb-NO" dirty="0">
+                <a:latin typeface="Arial" panose="020B0604020202020204" pitchFamily="34" charset="0"/>
+                <a:cs typeface="Arial" panose="020B0604020202020204" pitchFamily="34" charset="0"/>
+              </a:rPr>
+              <a:t>		...</a:t>
+            </a:r>
+          </a:p>
+          <a:p>
+            <a:pPr marL="0" indent="0">
+              <a:buNone/>
+            </a:pPr>
+            <a:r>
+              <a:rPr lang="nb-NO" dirty="0">
+                <a:latin typeface="Arial" panose="020B0604020202020204" pitchFamily="34" charset="0"/>
+                <a:cs typeface="Arial" panose="020B0604020202020204" pitchFamily="34" charset="0"/>
+              </a:rPr>
+              <a:t>	]</a:t>
+            </a:r>
+          </a:p>
+          <a:p>
+            <a:pPr marL="0" indent="0">
+              <a:buNone/>
+            </a:pPr>
+            <a:r>
+              <a:rPr lang="nb-NO" dirty="0">
+                <a:latin typeface="Arial" panose="020B0604020202020204" pitchFamily="34" charset="0"/>
+                <a:cs typeface="Arial" panose="020B0604020202020204" pitchFamily="34" charset="0"/>
+              </a:rPr>
+              <a:t>}</a:t>
+            </a:r>
+          </a:p>
+          <a:p>
+            <a:r>
+              <a:rPr lang="nb-NO" dirty="0">
+                <a:latin typeface="Arial" panose="020B0604020202020204" pitchFamily="34" charset="0"/>
+                <a:cs typeface="Arial" panose="020B0604020202020204" pitchFamily="34" charset="0"/>
+              </a:rPr>
+              <a:t>POST method with json «name», «description», «x», «y», and «image» will create a galaxy</a:t>
+            </a:r>
           </a:p>
         </p:txBody>
       </p:sp>
     </p:spTree>
     <p:extLst>
       <p:ext uri="{BB962C8B-B14F-4D97-AF65-F5344CB8AC3E}">
-        <p14:creationId xmlns:p14="http://schemas.microsoft.com/office/powerpoint/2010/main" val="696820992"/>
+        <p14:creationId xmlns:p14="http://schemas.microsoft.com/office/powerpoint/2010/main" val="1557958327"/>
       </p:ext>
     </p:extLst>
   </p:cSld>
@@ -5281,7 +5507,7 @@
                 <a:latin typeface="Arial" panose="020B0604020202020204" pitchFamily="34" charset="0"/>
                 <a:cs typeface="Arial" panose="020B0604020202020204" pitchFamily="34" charset="0"/>
               </a:rPr>
-              <a:t>/visitors</a:t>
+              <a:t>/systems</a:t>
             </a:r>
           </a:p>
         </p:txBody>
@@ -5308,25 +5534,7 @@
                 <a:latin typeface="Arial" panose="020B0604020202020204" pitchFamily="34" charset="0"/>
                 <a:cs typeface="Arial" panose="020B0604020202020204" pitchFamily="34" charset="0"/>
               </a:rPr>
-              <a:t>POST method w/ params «visitor_id» and «visited_id» adds a relationship between the Users</a:t>
-            </a:r>
-          </a:p>
-          <a:p>
-            <a:r>
-              <a:rPr lang="nb-NO" dirty="0">
-                <a:latin typeface="Arial" panose="020B0604020202020204" pitchFamily="34" charset="0"/>
-                <a:cs typeface="Arial" panose="020B0604020202020204" pitchFamily="34" charset="0"/>
-              </a:rPr>
-              <a:t>GET method w/ params «user_id» returns json that contains each user_id they’ve visited</a:t>
-            </a:r>
-          </a:p>
-          <a:p>
-            <a:r>
-              <a:rPr lang="nb-NO" dirty="0">
-                <a:latin typeface="Arial" panose="020B0604020202020204" pitchFamily="34" charset="0"/>
-                <a:cs typeface="Arial" panose="020B0604020202020204" pitchFamily="34" charset="0"/>
-              </a:rPr>
-              <a:t>DELETE method w/ params «user_id» takes note that that user has updated their planet, and removes all relationships where visited is the user</a:t>
+              <a:t>GET method with params «galaxy_id» will return json that contains each System and its variables, for example:</a:t>
             </a:r>
           </a:p>
           <a:p>
@@ -5386,7 +5594,43 @@
                 <a:latin typeface="Arial" panose="020B0604020202020204" pitchFamily="34" charset="0"/>
                 <a:cs typeface="Arial" panose="020B0604020202020204" pitchFamily="34" charset="0"/>
               </a:rPr>
-              <a:t>			«id»: 9</a:t>
+              <a:t>			«id»: «0»,</a:t>
+            </a:r>
+          </a:p>
+          <a:p>
+            <a:pPr marL="0" indent="0">
+              <a:buNone/>
+            </a:pPr>
+            <a:r>
+              <a:rPr lang="nb-NO" dirty="0">
+                <a:latin typeface="Arial" panose="020B0604020202020204" pitchFamily="34" charset="0"/>
+                <a:cs typeface="Arial" panose="020B0604020202020204" pitchFamily="34" charset="0"/>
+              </a:rPr>
+              <a:t>			«name»: «Solaris»,</a:t>
+            </a:r>
+          </a:p>
+          <a:p>
+            <a:pPr marL="0" indent="0">
+              <a:buNone/>
+            </a:pPr>
+            <a:r>
+              <a:rPr lang="nb-NO" dirty="0">
+                <a:latin typeface="Arial" panose="020B0604020202020204" pitchFamily="34" charset="0"/>
+                <a:cs typeface="Arial" panose="020B0604020202020204" pitchFamily="34" charset="0"/>
+              </a:rPr>
+              <a:t>			«quadrant»: «4»,</a:t>
+            </a:r>
+          </a:p>
+          <a:p>
+            <a:pPr marL="0" indent="0">
+              <a:buNone/>
+            </a:pPr>
+            <a:r>
+              <a:rPr lang="nb-NO" dirty="0">
+                <a:latin typeface="Arial" panose="020B0604020202020204" pitchFamily="34" charset="0"/>
+                <a:cs typeface="Arial" panose="020B0604020202020204" pitchFamily="34" charset="0"/>
+              </a:rPr>
+              <a:t>			...</a:t>
             </a:r>
           </a:p>
           <a:p>
@@ -5410,31 +5654,7 @@
                 <a:latin typeface="Arial" panose="020B0604020202020204" pitchFamily="34" charset="0"/>
                 <a:cs typeface="Arial" panose="020B0604020202020204" pitchFamily="34" charset="0"/>
               </a:rPr>
-              <a:t>		{</a:t>
-            </a:r>
-          </a:p>
-          <a:p>
-            <a:pPr marL="0" indent="0">
-              <a:buNone/>
-            </a:pPr>
-            <a:r>
-              <a:rPr lang="nb-NO" dirty="0">
-                <a:latin typeface="Arial" panose="020B0604020202020204" pitchFamily="34" charset="0"/>
-                <a:cs typeface="Arial" panose="020B0604020202020204" pitchFamily="34" charset="0"/>
-              </a:rPr>
-              <a:t>			«id»: 10</a:t>
-            </a:r>
-          </a:p>
-          <a:p>
-            <a:pPr marL="0" indent="0">
-              <a:buNone/>
-            </a:pPr>
-            <a:r>
-              <a:rPr lang="nb-NO" dirty="0">
-                <a:latin typeface="Arial" panose="020B0604020202020204" pitchFamily="34" charset="0"/>
-                <a:cs typeface="Arial" panose="020B0604020202020204" pitchFamily="34" charset="0"/>
-              </a:rPr>
-              <a:t>		}</a:t>
+              <a:t>		...</a:t>
             </a:r>
           </a:p>
           <a:p>
@@ -5462,9 +5682,24 @@
             </a:r>
           </a:p>
           <a:p>
-            <a:pPr marL="0" indent="0">
-              <a:buNone/>
-            </a:pPr>
+            <a:r>
+              <a:rPr lang="nb-NO" dirty="0">
+                <a:latin typeface="Arial" panose="020B0604020202020204" pitchFamily="34" charset="0"/>
+                <a:cs typeface="Arial" panose="020B0604020202020204" pitchFamily="34" charset="0"/>
+              </a:rPr>
+              <a:t>GET method with params «system_id» will return json with information on just that system and its variables</a:t>
+            </a:r>
+          </a:p>
+          <a:p>
+            <a:r>
+              <a:rPr lang="nb-NO" dirty="0">
+                <a:latin typeface="Arial" panose="020B0604020202020204" pitchFamily="34" charset="0"/>
+                <a:cs typeface="Arial" panose="020B0604020202020204" pitchFamily="34" charset="0"/>
+              </a:rPr>
+              <a:t>POST method with json «galaxy_id», «name», «quadrant», «x», «y», and «image» will create a system</a:t>
+            </a:r>
+          </a:p>
+          <a:p>
             <a:endParaRPr lang="nb-NO" dirty="0">
               <a:latin typeface="Arial" panose="020B0604020202020204" pitchFamily="34" charset="0"/>
               <a:cs typeface="Arial" panose="020B0604020202020204" pitchFamily="34" charset="0"/>
@@ -5475,7 +5710,7 @@
     </p:spTree>
     <p:extLst>
       <p:ext uri="{BB962C8B-B14F-4D97-AF65-F5344CB8AC3E}">
-        <p14:creationId xmlns:p14="http://schemas.microsoft.com/office/powerpoint/2010/main" val="1092747602"/>
+        <p14:creationId xmlns:p14="http://schemas.microsoft.com/office/powerpoint/2010/main" val="254303226"/>
       </p:ext>
     </p:extLst>
   </p:cSld>
@@ -5527,7 +5762,7 @@
                 <a:latin typeface="Arial" panose="020B0604020202020204" pitchFamily="34" charset="0"/>
                 <a:cs typeface="Arial" panose="020B0604020202020204" pitchFamily="34" charset="0"/>
               </a:rPr>
-              <a:t>/galaxies</a:t>
+              <a:t>/planets</a:t>
             </a:r>
           </a:p>
         </p:txBody>
@@ -5542,10 +5777,15 @@
             <p:ph idx="1"/>
           </p:nvPr>
         </p:nvSpPr>
-        <p:spPr/>
+        <p:spPr>
+          <a:xfrm>
+            <a:off x="838200" y="1825625"/>
+            <a:ext cx="10515600" cy="4610686"/>
+          </a:xfrm>
+        </p:spPr>
         <p:txBody>
           <a:bodyPr>
-            <a:normAutofit fontScale="55000" lnSpcReduction="20000"/>
+            <a:normAutofit fontScale="47500" lnSpcReduction="20000"/>
           </a:bodyPr>
           <a:lstStyle/>
           <a:p>
@@ -5554,7 +5794,7 @@
                 <a:latin typeface="Arial" panose="020B0604020202020204" pitchFamily="34" charset="0"/>
                 <a:cs typeface="Arial" panose="020B0604020202020204" pitchFamily="34" charset="0"/>
               </a:rPr>
-              <a:t>GET method will return json that contains each Galaxy and its variables, for example:</a:t>
+              <a:t>GET method with params «system_id» will return json that contains each Planet’s variables, for example:</a:t>
             </a:r>
           </a:p>
           <a:p>
@@ -5590,7 +5830,7 @@
                 <a:latin typeface="Arial" panose="020B0604020202020204" pitchFamily="34" charset="0"/>
                 <a:cs typeface="Arial" panose="020B0604020202020204" pitchFamily="34" charset="0"/>
               </a:rPr>
-              <a:t>	[,</a:t>
+              <a:t>	[</a:t>
             </a:r>
           </a:p>
           <a:p>
@@ -5626,19 +5866,19 @@
                 <a:latin typeface="Arial" panose="020B0604020202020204" pitchFamily="34" charset="0"/>
                 <a:cs typeface="Arial" panose="020B0604020202020204" pitchFamily="34" charset="0"/>
               </a:rPr>
-              <a:t>			«name»: «Build-It-Yourself Galaxy»,</a:t>
-            </a:r>
-          </a:p>
-          <a:p>
-            <a:pPr marL="0" indent="0">
-              <a:buNone/>
-            </a:pPr>
-            <a:r>
-              <a:rPr lang="nb-NO" dirty="0">
-                <a:latin typeface="Arial" panose="020B0604020202020204" pitchFamily="34" charset="0"/>
-                <a:cs typeface="Arial" panose="020B0604020202020204" pitchFamily="34" charset="0"/>
-              </a:rPr>
-              <a:t>			«description»: «Where way cool inventors dwell.»,</a:t>
+              <a:t>			«owner_id»: «6»,</a:t>
+            </a:r>
+          </a:p>
+          <a:p>
+            <a:pPr marL="0" indent="0">
+              <a:buNone/>
+            </a:pPr>
+            <a:r>
+              <a:rPr lang="nb-NO" dirty="0">
+                <a:latin typeface="Arial" panose="020B0604020202020204" pitchFamily="34" charset="0"/>
+                <a:cs typeface="Arial" panose="020B0604020202020204" pitchFamily="34" charset="0"/>
+              </a:rPr>
+              <a:t>			«order»: «0»,</a:t>
             </a:r>
           </a:p>
           <a:p>
@@ -5707,15 +5947,39 @@
                 <a:latin typeface="Arial" panose="020B0604020202020204" pitchFamily="34" charset="0"/>
                 <a:cs typeface="Arial" panose="020B0604020202020204" pitchFamily="34" charset="0"/>
               </a:rPr>
-              <a:t>POST method with json «name», «description», «x», «y», and «image» will create a galaxy</a:t>
-            </a:r>
+              <a:t>GET method with params «user_id» or «planet_id» will return json that contains the Planet’s variables</a:t>
+            </a:r>
+          </a:p>
+          <a:p>
+            <a:r>
+              <a:rPr lang="nb-NO" dirty="0">
+                <a:latin typeface="Arial" panose="020B0604020202020204" pitchFamily="34" charset="0"/>
+                <a:cs typeface="Arial" panose="020B0604020202020204" pitchFamily="34" charset="0"/>
+              </a:rPr>
+              <a:t>PATCH method with json «planet_id», «name», and «user_id» will set the planet’s owner_id to that user_id and rename it in the db. If the user already has a planet, unlinks the old one and removes its name. If the planet already has an owner or the db call fails for some reason, returns json with «status»: «error», otherwise sends «status»: «ok»</a:t>
+            </a:r>
+          </a:p>
+          <a:p>
+            <a:r>
+              <a:rPr lang="nb-NO" dirty="0">
+                <a:latin typeface="Arial" panose="020B0604020202020204" pitchFamily="34" charset="0"/>
+                <a:cs typeface="Arial" panose="020B0604020202020204" pitchFamily="34" charset="0"/>
+              </a:rPr>
+              <a:t>POST method with json «system_id», «order», «size», «surface», and «image» will create a planet</a:t>
+            </a:r>
+          </a:p>
+          <a:p>
+            <a:endParaRPr lang="nb-NO" dirty="0">
+              <a:latin typeface="Arial" panose="020B0604020202020204" pitchFamily="34" charset="0"/>
+              <a:cs typeface="Arial" panose="020B0604020202020204" pitchFamily="34" charset="0"/>
+            </a:endParaRPr>
           </a:p>
         </p:txBody>
       </p:sp>
     </p:spTree>
     <p:extLst>
       <p:ext uri="{BB962C8B-B14F-4D97-AF65-F5344CB8AC3E}">
-        <p14:creationId xmlns:p14="http://schemas.microsoft.com/office/powerpoint/2010/main" val="1557958327"/>
+        <p14:creationId xmlns:p14="http://schemas.microsoft.com/office/powerpoint/2010/main" val="4061486045"/>
       </p:ext>
     </p:extLst>
   </p:cSld>
@@ -5767,7 +6031,7 @@
                 <a:latin typeface="Arial" panose="020B0604020202020204" pitchFamily="34" charset="0"/>
                 <a:cs typeface="Arial" panose="020B0604020202020204" pitchFamily="34" charset="0"/>
               </a:rPr>
-              <a:t>/systems</a:t>
+              <a:t>/catalog</a:t>
             </a:r>
           </a:p>
         </p:txBody>
@@ -5785,7 +6049,7 @@
         <p:spPr/>
         <p:txBody>
           <a:bodyPr>
-            <a:normAutofit fontScale="55000" lnSpcReduction="20000"/>
+            <a:normAutofit fontScale="47500" lnSpcReduction="20000"/>
           </a:bodyPr>
           <a:lstStyle/>
           <a:p>
@@ -5794,7 +6058,7 @@
                 <a:latin typeface="Arial" panose="020B0604020202020204" pitchFamily="34" charset="0"/>
                 <a:cs typeface="Arial" panose="020B0604020202020204" pitchFamily="34" charset="0"/>
               </a:rPr>
-              <a:t>GET method with params «galaxy_id» will return json that contains each System and its variables, for example:</a:t>
+              <a:t>GET method with specified «catalog_id» returns the specified CatalogItem’s variables, the method without any params returns json that contains each CatalogItem there is and their variables, for example:</a:t>
             </a:r>
           </a:p>
           <a:p>
@@ -5866,19 +6130,19 @@
                 <a:latin typeface="Arial" panose="020B0604020202020204" pitchFamily="34" charset="0"/>
                 <a:cs typeface="Arial" panose="020B0604020202020204" pitchFamily="34" charset="0"/>
               </a:rPr>
-              <a:t>			«name»: «Solaris»,</a:t>
-            </a:r>
-          </a:p>
-          <a:p>
-            <a:pPr marL="0" indent="0">
-              <a:buNone/>
-            </a:pPr>
-            <a:r>
-              <a:rPr lang="nb-NO" dirty="0">
-                <a:latin typeface="Arial" panose="020B0604020202020204" pitchFamily="34" charset="0"/>
-                <a:cs typeface="Arial" panose="020B0604020202020204" pitchFamily="34" charset="0"/>
-              </a:rPr>
-              <a:t>			«quadrant»: «4»,</a:t>
+              <a:t>			«image»: «images/statue.png»,</a:t>
+            </a:r>
+          </a:p>
+          <a:p>
+            <a:pPr marL="0" indent="0">
+              <a:buNone/>
+            </a:pPr>
+            <a:r>
+              <a:rPr lang="nb-NO" dirty="0">
+                <a:latin typeface="Arial" panose="020B0604020202020204" pitchFamily="34" charset="0"/>
+                <a:cs typeface="Arial" panose="020B0604020202020204" pitchFamily="34" charset="0"/>
+              </a:rPr>
+              <a:t>			«available»: «true»,</a:t>
             </a:r>
           </a:p>
           <a:p>
@@ -5947,30 +6211,24 @@
                 <a:latin typeface="Arial" panose="020B0604020202020204" pitchFamily="34" charset="0"/>
                 <a:cs typeface="Arial" panose="020B0604020202020204" pitchFamily="34" charset="0"/>
               </a:rPr>
-              <a:t>GET method with params «system_id» will return json with information on just that system and its variables</a:t>
-            </a:r>
-          </a:p>
-          <a:p>
-            <a:r>
-              <a:rPr lang="nb-NO" dirty="0">
-                <a:latin typeface="Arial" panose="020B0604020202020204" pitchFamily="34" charset="0"/>
-                <a:cs typeface="Arial" panose="020B0604020202020204" pitchFamily="34" charset="0"/>
-              </a:rPr>
-              <a:t>POST method with json «galaxy_id», «name», «quadrant», «x», «y», and «image» will create a system</a:t>
-            </a:r>
-          </a:p>
-          <a:p>
-            <a:endParaRPr lang="nb-NO" dirty="0">
-              <a:latin typeface="Arial" panose="020B0604020202020204" pitchFamily="34" charset="0"/>
-              <a:cs typeface="Arial" panose="020B0604020202020204" pitchFamily="34" charset="0"/>
-            </a:endParaRPr>
+              <a:t>POST method with json «name», «image», «event_specific», «available», «cost1», «cost2», and «cost3» will create a planet</a:t>
+            </a:r>
+          </a:p>
+          <a:p>
+            <a:r>
+              <a:rPr lang="nb-NO" dirty="0">
+                <a:latin typeface="Arial" panose="020B0604020202020204" pitchFamily="34" charset="0"/>
+                <a:cs typeface="Arial" panose="020B0604020202020204" pitchFamily="34" charset="0"/>
+              </a:rPr>
+              <a:t>PATCH method with the param «catalog_id» flips the value of the available variable</a:t>
+            </a:r>
           </a:p>
         </p:txBody>
       </p:sp>
     </p:spTree>
     <p:extLst>
       <p:ext uri="{BB962C8B-B14F-4D97-AF65-F5344CB8AC3E}">
-        <p14:creationId xmlns:p14="http://schemas.microsoft.com/office/powerpoint/2010/main" val="254303226"/>
+        <p14:creationId xmlns:p14="http://schemas.microsoft.com/office/powerpoint/2010/main" val="4128414604"/>
       </p:ext>
     </p:extLst>
   </p:cSld>
@@ -6022,7 +6280,7 @@
                 <a:latin typeface="Arial" panose="020B0604020202020204" pitchFamily="34" charset="0"/>
                 <a:cs typeface="Arial" panose="020B0604020202020204" pitchFamily="34" charset="0"/>
               </a:rPr>
-              <a:t>/planets</a:t>
+              <a:t>/items</a:t>
             </a:r>
           </a:p>
         </p:txBody>
@@ -6039,13 +6297,13 @@
         </p:nvSpPr>
         <p:spPr>
           <a:xfrm>
-            <a:off x="439615" y="1424354"/>
-            <a:ext cx="11570677" cy="5275384"/>
+            <a:off x="838200" y="1331650"/>
+            <a:ext cx="10515600" cy="5433134"/>
           </a:xfrm>
         </p:spPr>
         <p:txBody>
           <a:bodyPr>
-            <a:normAutofit fontScale="55000" lnSpcReduction="20000"/>
+            <a:normAutofit fontScale="47500" lnSpcReduction="20000"/>
           </a:bodyPr>
           <a:lstStyle/>
           <a:p>
@@ -6054,7 +6312,7 @@
                 <a:latin typeface="Arial" panose="020B0604020202020204" pitchFamily="34" charset="0"/>
                 <a:cs typeface="Arial" panose="020B0604020202020204" pitchFamily="34" charset="0"/>
               </a:rPr>
-              <a:t>GET method with params «system_id» will return json that contains each Planet’s variables, for example:</a:t>
+              <a:t>GET method with params «user_id» will return json that contains each PlanetItem and its variables as well as the image variable that comes from its parent, for example:</a:t>
             </a:r>
           </a:p>
           <a:p>
@@ -6078,7 +6336,7 @@
                 <a:latin typeface="Arial" panose="020B0604020202020204" pitchFamily="34" charset="0"/>
                 <a:cs typeface="Arial" panose="020B0604020202020204" pitchFamily="34" charset="0"/>
               </a:rPr>
-              <a:t>«results»:</a:t>
+              <a:t>«result:»</a:t>
             </a:r>
           </a:p>
           <a:p>
@@ -6114,31 +6372,55 @@
                 <a:latin typeface="Arial" panose="020B0604020202020204" pitchFamily="34" charset="0"/>
                 <a:cs typeface="Arial" panose="020B0604020202020204" pitchFamily="34" charset="0"/>
               </a:rPr>
-              <a:t>			«id»: «0»,</a:t>
-            </a:r>
-          </a:p>
-          <a:p>
-            <a:pPr marL="0" indent="0">
-              <a:buNone/>
-            </a:pPr>
-            <a:r>
-              <a:rPr lang="nb-NO" dirty="0">
-                <a:latin typeface="Arial" panose="020B0604020202020204" pitchFamily="34" charset="0"/>
-                <a:cs typeface="Arial" panose="020B0604020202020204" pitchFamily="34" charset="0"/>
-              </a:rPr>
-              <a:t>			«owner_id»: «6»,</a:t>
-            </a:r>
-          </a:p>
-          <a:p>
-            <a:pPr marL="0" indent="0">
-              <a:buNone/>
-            </a:pPr>
-            <a:r>
-              <a:rPr lang="nb-NO" dirty="0">
-                <a:latin typeface="Arial" panose="020B0604020202020204" pitchFamily="34" charset="0"/>
-                <a:cs typeface="Arial" panose="020B0604020202020204" pitchFamily="34" charset="0"/>
-              </a:rPr>
-              <a:t>			«order»: «0»,</a:t>
+              <a:t>			«id»: «342»,</a:t>
+            </a:r>
+          </a:p>
+          <a:p>
+            <a:pPr marL="0" indent="0">
+              <a:buNone/>
+            </a:pPr>
+            <a:r>
+              <a:rPr lang="nb-NO" dirty="0">
+                <a:latin typeface="Arial" panose="020B0604020202020204" pitchFamily="34" charset="0"/>
+                <a:cs typeface="Arial" panose="020B0604020202020204" pitchFamily="34" charset="0"/>
+              </a:rPr>
+              <a:t>			«catalog_parent_id»: «0»,</a:t>
+            </a:r>
+          </a:p>
+          <a:p>
+            <a:pPr marL="0" indent="0">
+              <a:buNone/>
+            </a:pPr>
+            <a:r>
+              <a:rPr lang="nb-NO" dirty="0">
+                <a:latin typeface="Arial" panose="020B0604020202020204" pitchFamily="34" charset="0"/>
+                <a:cs typeface="Arial" panose="020B0604020202020204" pitchFamily="34" charset="0"/>
+              </a:rPr>
+              <a:t>			«image»: «images/statue.png»,</a:t>
+            </a:r>
+          </a:p>
+          <a:p>
+            <a:pPr marL="0" indent="0">
+              <a:buNone/>
+            </a:pPr>
+            <a:r>
+              <a:rPr lang="nb-NO" dirty="0">
+                <a:latin typeface="Arial" panose="020B0604020202020204" pitchFamily="34" charset="0"/>
+                <a:cs typeface="Arial" panose="020B0604020202020204" pitchFamily="34" charset="0"/>
+              </a:rPr>
+              <a:t>			«x»: «40»</a:t>
+            </a:r>
+          </a:p>
+          <a:p>
+            <a:pPr marL="0" indent="0">
+              <a:buNone/>
+            </a:pPr>
+            <a:r>
+              <a:rPr lang="nb-NO" dirty="0">
+                <a:latin typeface="Arial" panose="020B0604020202020204" pitchFamily="34" charset="0"/>
+                <a:cs typeface="Arial" panose="020B0604020202020204" pitchFamily="34" charset="0"/>
+              </a:rPr>
+              <a:t>			«y»: «80»</a:t>
             </a:r>
           </a:p>
           <a:p>
@@ -6207,49 +6489,33 @@
                 <a:latin typeface="Arial" panose="020B0604020202020204" pitchFamily="34" charset="0"/>
                 <a:cs typeface="Arial" panose="020B0604020202020204" pitchFamily="34" charset="0"/>
               </a:rPr>
-              <a:t>GET method with params «user_id» or «planet_id» will return json that contains the Planet’s variables</a:t>
-            </a:r>
-          </a:p>
-          <a:p>
-            <a:r>
-              <a:rPr lang="nb-NO" dirty="0">
-                <a:latin typeface="Arial" panose="020B0604020202020204" pitchFamily="34" charset="0"/>
-                <a:cs typeface="Arial" panose="020B0604020202020204" pitchFamily="34" charset="0"/>
-              </a:rPr>
-              <a:t>PATCH method with json «planet_id», «name», and «user_id» will set the planet’s owner_id to that user_id and rename it in the db. If the user already has a planet, unlinks the old one and removes its name. If the planet already has an owner or the db call fails for some reason, returns json with «status»: «error», otherwise sends «status»: «ok»</a:t>
-            </a:r>
-          </a:p>
-          <a:p>
-            <a:pPr lvl="1"/>
-            <a:r>
-              <a:rPr lang="nb-NO" dirty="0">
-                <a:latin typeface="Arial" panose="020B0604020202020204" pitchFamily="34" charset="0"/>
-                <a:cs typeface="Arial" panose="020B0604020202020204" pitchFamily="34" charset="0"/>
-              </a:rPr>
-              <a:t>You can also patch with json «surface», «image», «song», and/or «description» alongside «planet_id» to change those variables</a:t>
-            </a:r>
-          </a:p>
-          <a:p>
-            <a:r>
-              <a:rPr lang="nb-NO" dirty="0">
-                <a:latin typeface="Arial" panose="020B0604020202020204" pitchFamily="34" charset="0"/>
-                <a:cs typeface="Arial" panose="020B0604020202020204" pitchFamily="34" charset="0"/>
-              </a:rPr>
-              <a:t>POST method with json «system_id», «order», «size», «surface», and «image» will create a planet</a:t>
-            </a:r>
-          </a:p>
-          <a:p>
-            <a:endParaRPr lang="nb-NO" dirty="0">
-              <a:latin typeface="Arial" panose="020B0604020202020204" pitchFamily="34" charset="0"/>
-              <a:cs typeface="Arial" panose="020B0604020202020204" pitchFamily="34" charset="0"/>
-            </a:endParaRPr>
+              <a:t>POST method with json «user_id» «catalog_id», «x» and «y» adds a new item to a user’s list of PlanetItems, returning the new «id» and «image»</a:t>
+            </a:r>
+          </a:p>
+          <a:p>
+            <a:r>
+              <a:rPr lang="nb-NO" dirty="0">
+                <a:latin typeface="Arial" panose="020B0604020202020204" pitchFamily="34" charset="0"/>
+                <a:cs typeface="Arial" panose="020B0604020202020204" pitchFamily="34" charset="0"/>
+              </a:rPr>
+              <a:t>DELETE method with params «item_id» will remove that item from the database</a:t>
+            </a:r>
+          </a:p>
+          <a:p>
+            <a:r>
+              <a:rPr lang="nb-NO" dirty="0">
+                <a:latin typeface="Arial" panose="020B0604020202020204" pitchFamily="34" charset="0"/>
+                <a:cs typeface="Arial" panose="020B0604020202020204" pitchFamily="34" charset="0"/>
+              </a:rPr>
+              <a:t>PATCH method with json «item_id», «x» and «y» updates an item’s x and y position</a:t>
+            </a:r>
           </a:p>
         </p:txBody>
       </p:sp>
     </p:spTree>
     <p:extLst>
       <p:ext uri="{BB962C8B-B14F-4D97-AF65-F5344CB8AC3E}">
-        <p14:creationId xmlns:p14="http://schemas.microsoft.com/office/powerpoint/2010/main" val="4061486045"/>
+        <p14:creationId xmlns:p14="http://schemas.microsoft.com/office/powerpoint/2010/main" val="3976820580"/>
       </p:ext>
     </p:extLst>
   </p:cSld>
@@ -6301,8 +6567,19 @@
                 <a:latin typeface="Arial" panose="020B0604020202020204" pitchFamily="34" charset="0"/>
                 <a:cs typeface="Arial" panose="020B0604020202020204" pitchFamily="34" charset="0"/>
               </a:rPr>
-              <a:t>/catalog</a:t>
-            </a:r>
+              <a:t>/</a:t>
+            </a:r>
+            <a:r>
+              <a:rPr lang="en-US" dirty="0" err="1">
+                <a:latin typeface="Arial" panose="020B0604020202020204" pitchFamily="34" charset="0"/>
+                <a:cs typeface="Arial" panose="020B0604020202020204" pitchFamily="34" charset="0"/>
+              </a:rPr>
+              <a:t>chatitems</a:t>
+            </a:r>
+            <a:endParaRPr lang="en-US" dirty="0">
+              <a:latin typeface="Arial" panose="020B0604020202020204" pitchFamily="34" charset="0"/>
+              <a:cs typeface="Arial" panose="020B0604020202020204" pitchFamily="34" charset="0"/>
+            </a:endParaRPr>
           </a:p>
         </p:txBody>
       </p:sp>
@@ -6316,10 +6593,15 @@
             <p:ph idx="1"/>
           </p:nvPr>
         </p:nvSpPr>
-        <p:spPr/>
+        <p:spPr>
+          <a:xfrm>
+            <a:off x="378069" y="1331650"/>
+            <a:ext cx="11579469" cy="5433134"/>
+          </a:xfrm>
+        </p:spPr>
         <p:txBody>
           <a:bodyPr>
-            <a:normAutofit fontScale="47500" lnSpcReduction="20000"/>
+            <a:normAutofit fontScale="55000" lnSpcReduction="20000"/>
           </a:bodyPr>
           <a:lstStyle/>
           <a:p>
@@ -6328,7 +6610,7 @@
                 <a:latin typeface="Arial" panose="020B0604020202020204" pitchFamily="34" charset="0"/>
                 <a:cs typeface="Arial" panose="020B0604020202020204" pitchFamily="34" charset="0"/>
               </a:rPr>
-              <a:t>GET method with specified «catalog_id» returns the specified CatalogItem’s variables, the method without any params returns json that contains each CatalogItem there is and their variables, for example:</a:t>
+              <a:t>GET method with params «user_id» and «item_type» (where 0 is a color and 1 is an emoticon) will return json that contains each ChatItem the User owns with that itemType and its variables, for example:</a:t>
             </a:r>
           </a:p>
           <a:p>
@@ -6352,7 +6634,7 @@
                 <a:latin typeface="Arial" panose="020B0604020202020204" pitchFamily="34" charset="0"/>
                 <a:cs typeface="Arial" panose="020B0604020202020204" pitchFamily="34" charset="0"/>
               </a:rPr>
-              <a:t>«results»:</a:t>
+              <a:t>«result:»</a:t>
             </a:r>
           </a:p>
           <a:p>
@@ -6400,19 +6682,43 @@
                 <a:latin typeface="Arial" panose="020B0604020202020204" pitchFamily="34" charset="0"/>
                 <a:cs typeface="Arial" panose="020B0604020202020204" pitchFamily="34" charset="0"/>
               </a:rPr>
-              <a:t>			«image»: «images/statue.png»,</a:t>
-            </a:r>
-          </a:p>
-          <a:p>
-            <a:pPr marL="0" indent="0">
-              <a:buNone/>
-            </a:pPr>
-            <a:r>
-              <a:rPr lang="nb-NO" dirty="0">
-                <a:latin typeface="Arial" panose="020B0604020202020204" pitchFamily="34" charset="0"/>
-                <a:cs typeface="Arial" panose="020B0604020202020204" pitchFamily="34" charset="0"/>
-              </a:rPr>
-              <a:t>			«available»: «true»,</a:t>
+              <a:t>			«itemType»: «0»,</a:t>
+            </a:r>
+          </a:p>
+          <a:p>
+            <a:pPr marL="0" indent="0">
+              <a:buNone/>
+            </a:pPr>
+            <a:r>
+              <a:rPr lang="nb-NO" dirty="0">
+                <a:latin typeface="Arial" panose="020B0604020202020204" pitchFamily="34" charset="0"/>
+                <a:cs typeface="Arial" panose="020B0604020202020204" pitchFamily="34" charset="0"/>
+              </a:rPr>
+              <a:t>			«string»: «purple»,</a:t>
+            </a:r>
+          </a:p>
+          <a:p>
+            <a:pPr marL="0" indent="0">
+              <a:buNone/>
+            </a:pPr>
+            <a:r>
+              <a:rPr lang="nb-NO" dirty="0">
+                <a:latin typeface="Arial" panose="020B0604020202020204" pitchFamily="34" charset="0"/>
+                <a:cs typeface="Arial" panose="020B0604020202020204" pitchFamily="34" charset="0"/>
+              </a:rPr>
+              <a:t>			«cost1»: «40»,</a:t>
+            </a:r>
+          </a:p>
+          <a:p>
+            <a:pPr marL="0" indent="0">
+              <a:buNone/>
+            </a:pPr>
+            <a:r>
+              <a:rPr lang="nb-NO" dirty="0">
+                <a:latin typeface="Arial" panose="020B0604020202020204" pitchFamily="34" charset="0"/>
+                <a:cs typeface="Arial" panose="020B0604020202020204" pitchFamily="34" charset="0"/>
+              </a:rPr>
+              <a:t>			«cost2»: «5»</a:t>
             </a:r>
           </a:p>
           <a:p>
@@ -6481,16 +6787,25 @@
                 <a:latin typeface="Arial" panose="020B0604020202020204" pitchFamily="34" charset="0"/>
                 <a:cs typeface="Arial" panose="020B0604020202020204" pitchFamily="34" charset="0"/>
               </a:rPr>
-              <a:t>POST method with json «name», «image», «event_specific», «available», «cost1», «cost2», and «cost3» will create a CatalogItem</a:t>
-            </a:r>
-          </a:p>
-          <a:p>
-            <a:r>
-              <a:rPr lang="nb-NO" dirty="0">
-                <a:latin typeface="Arial" panose="020B0604020202020204" pitchFamily="34" charset="0"/>
-                <a:cs typeface="Arial" panose="020B0604020202020204" pitchFamily="34" charset="0"/>
-              </a:rPr>
-              <a:t>PATCH method with the param «catalog_id» flips the value of the available variable</a:t>
+              <a:t>GET method with only «user_id» param returns every ChatItem with an «owned» t/f value based on whether or not the user owns it</a:t>
+            </a:r>
+          </a:p>
+          <a:p>
+            <a:r>
+              <a:rPr lang="nb-NO" dirty="0">
+                <a:latin typeface="Arial" panose="020B0604020202020204" pitchFamily="34" charset="0"/>
+                <a:cs typeface="Arial" panose="020B0604020202020204" pitchFamily="34" charset="0"/>
+              </a:rPr>
+              <a:t>POST method with json including «item_type», «string», «cost1», «cost2», and «cost3» to create that ChatItem</a:t>
+            </a:r>
+          </a:p>
+          <a:p>
+            <a:r>
+              <a:rPr lang="nb-NO" dirty="0">
+                <a:latin typeface="Arial" panose="020B0604020202020204" pitchFamily="34" charset="0"/>
+                <a:cs typeface="Arial" panose="020B0604020202020204" pitchFamily="34" charset="0"/>
+              </a:rPr>
+              <a:t>PATCH method with json including «user_id» and «chat_item_id» to add that ChatItem to the User</a:t>
             </a:r>
           </a:p>
         </p:txBody>
@@ -6498,7 +6813,7 @@
     </p:spTree>
     <p:extLst>
       <p:ext uri="{BB962C8B-B14F-4D97-AF65-F5344CB8AC3E}">
-        <p14:creationId xmlns:p14="http://schemas.microsoft.com/office/powerpoint/2010/main" val="4128414604"/>
+        <p14:creationId xmlns:p14="http://schemas.microsoft.com/office/powerpoint/2010/main" val="1642849653"/>
       </p:ext>
     </p:extLst>
   </p:cSld>
@@ -6550,7 +6865,7 @@
                 <a:latin typeface="Arial" panose="020B0604020202020204" pitchFamily="34" charset="0"/>
                 <a:cs typeface="Arial" panose="020B0604020202020204" pitchFamily="34" charset="0"/>
               </a:rPr>
-              <a:t>/species</a:t>
+              <a:t>/currency</a:t>
             </a:r>
           </a:p>
         </p:txBody>
@@ -6568,7 +6883,7 @@
         <p:spPr/>
         <p:txBody>
           <a:bodyPr>
-            <a:normAutofit fontScale="47500" lnSpcReduction="20000"/>
+            <a:normAutofit/>
           </a:bodyPr>
           <a:lstStyle/>
           <a:p>
@@ -6577,191 +6892,35 @@
                 <a:latin typeface="Arial" panose="020B0604020202020204" pitchFamily="34" charset="0"/>
                 <a:cs typeface="Arial" panose="020B0604020202020204" pitchFamily="34" charset="0"/>
               </a:rPr>
-              <a:t>GET method with specified «species_id» returns the specified AlienSpecies’s variables, the method without any params returns json that contains each AlienSpecies there is and their variables, for example:</a:t>
-            </a:r>
-          </a:p>
-          <a:p>
-            <a:pPr marL="0" indent="0">
-              <a:buNone/>
-            </a:pPr>
-            <a:r>
-              <a:rPr lang="nb-NO" dirty="0">
-                <a:latin typeface="Arial" panose="020B0604020202020204" pitchFamily="34" charset="0"/>
-                <a:cs typeface="Arial" panose="020B0604020202020204" pitchFamily="34" charset="0"/>
-              </a:rPr>
-              <a:t>{</a:t>
-            </a:r>
-          </a:p>
-          <a:p>
-            <a:pPr marL="0" indent="0">
-              <a:buNone/>
-            </a:pPr>
-            <a:r>
-              <a:rPr lang="nb-NO" dirty="0">
-                <a:latin typeface="Arial" panose="020B0604020202020204" pitchFamily="34" charset="0"/>
-                <a:cs typeface="Arial" panose="020B0604020202020204" pitchFamily="34" charset="0"/>
-              </a:rPr>
-              <a:t>«results»:</a:t>
-            </a:r>
-          </a:p>
-          <a:p>
-            <a:pPr marL="0" indent="0">
-              <a:buNone/>
-            </a:pPr>
-            <a:r>
-              <a:rPr lang="nb-NO" dirty="0">
-                <a:latin typeface="Arial" panose="020B0604020202020204" pitchFamily="34" charset="0"/>
-                <a:cs typeface="Arial" panose="020B0604020202020204" pitchFamily="34" charset="0"/>
-              </a:rPr>
-              <a:t>	[</a:t>
-            </a:r>
-          </a:p>
-          <a:p>
-            <a:pPr marL="0" indent="0">
-              <a:buNone/>
-            </a:pPr>
-            <a:r>
-              <a:rPr lang="nb-NO" dirty="0">
-                <a:latin typeface="Arial" panose="020B0604020202020204" pitchFamily="34" charset="0"/>
-                <a:cs typeface="Arial" panose="020B0604020202020204" pitchFamily="34" charset="0"/>
-              </a:rPr>
-              <a:t>		{</a:t>
-            </a:r>
-          </a:p>
-          <a:p>
-            <a:pPr marL="0" indent="0">
-              <a:buNone/>
-            </a:pPr>
-            <a:r>
-              <a:rPr lang="nb-NO" dirty="0">
-                <a:latin typeface="Arial" panose="020B0604020202020204" pitchFamily="34" charset="0"/>
-                <a:cs typeface="Arial" panose="020B0604020202020204" pitchFamily="34" charset="0"/>
-              </a:rPr>
-              <a:t>			«id»: «0»,</a:t>
-            </a:r>
-          </a:p>
-          <a:p>
-            <a:pPr marL="0" indent="0">
-              <a:buNone/>
-            </a:pPr>
-            <a:r>
-              <a:rPr lang="nb-NO" dirty="0">
-                <a:latin typeface="Arial" panose="020B0604020202020204" pitchFamily="34" charset="0"/>
-                <a:cs typeface="Arial" panose="020B0604020202020204" pitchFamily="34" charset="0"/>
-              </a:rPr>
-              <a:t>			«image»: «images/gleebnorb.png»,</a:t>
-            </a:r>
-          </a:p>
-          <a:p>
-            <a:pPr marL="0" indent="0">
-              <a:buNone/>
-            </a:pPr>
-            <a:r>
-              <a:rPr lang="nb-NO" dirty="0">
-                <a:latin typeface="Arial" panose="020B0604020202020204" pitchFamily="34" charset="0"/>
-                <a:cs typeface="Arial" panose="020B0604020202020204" pitchFamily="34" charset="0"/>
-              </a:rPr>
-              <a:t>			«name»: «Gleebnorb»,</a:t>
-            </a:r>
-          </a:p>
-          <a:p>
-            <a:pPr marL="0" indent="0">
-              <a:buNone/>
-            </a:pPr>
-            <a:r>
-              <a:rPr lang="nb-NO" dirty="0">
-                <a:latin typeface="Arial" panose="020B0604020202020204" pitchFamily="34" charset="0"/>
-                <a:cs typeface="Arial" panose="020B0604020202020204" pitchFamily="34" charset="0"/>
-              </a:rPr>
-              <a:t>			...</a:t>
-            </a:r>
-          </a:p>
-          <a:p>
-            <a:pPr marL="0" indent="0">
-              <a:buNone/>
-            </a:pPr>
-            <a:r>
-              <a:rPr lang="nb-NO" dirty="0">
-                <a:latin typeface="Arial" panose="020B0604020202020204" pitchFamily="34" charset="0"/>
-                <a:cs typeface="Arial" panose="020B0604020202020204" pitchFamily="34" charset="0"/>
-              </a:rPr>
-              <a:t>		},</a:t>
-            </a:r>
-          </a:p>
-          <a:p>
-            <a:pPr marL="0" indent="0">
-              <a:buNone/>
-            </a:pPr>
-            <a:r>
-              <a:rPr lang="nb-NO" dirty="0">
-                <a:latin typeface="Arial" panose="020B0604020202020204" pitchFamily="34" charset="0"/>
-                <a:cs typeface="Arial" panose="020B0604020202020204" pitchFamily="34" charset="0"/>
-              </a:rPr>
-              <a:t>		...</a:t>
-            </a:r>
-          </a:p>
-          <a:p>
-            <a:pPr marL="0" indent="0">
-              <a:buNone/>
-            </a:pPr>
-            <a:r>
-              <a:rPr lang="nb-NO" dirty="0">
-                <a:latin typeface="Arial" panose="020B0604020202020204" pitchFamily="34" charset="0"/>
-                <a:cs typeface="Arial" panose="020B0604020202020204" pitchFamily="34" charset="0"/>
-              </a:rPr>
-              <a:t>	]</a:t>
-            </a:r>
-          </a:p>
-          <a:p>
-            <a:pPr marL="0" indent="0">
-              <a:buNone/>
-            </a:pPr>
-            <a:r>
-              <a:rPr lang="nb-NO" dirty="0">
-                <a:latin typeface="Arial" panose="020B0604020202020204" pitchFamily="34" charset="0"/>
-                <a:cs typeface="Arial" panose="020B0604020202020204" pitchFamily="34" charset="0"/>
-              </a:rPr>
-              <a:t>}</a:t>
-            </a:r>
-          </a:p>
-          <a:p>
-            <a:r>
-              <a:rPr lang="nb-NO" dirty="0">
-                <a:latin typeface="Arial" panose="020B0604020202020204" pitchFamily="34" charset="0"/>
-                <a:cs typeface="Arial" panose="020B0604020202020204" pitchFamily="34" charset="0"/>
-              </a:rPr>
-              <a:t>POST method with json «</a:t>
+              <a:t>GET method with params «user_id» returns cur1-3, vou2-3, lifetime_cur1-3</a:t>
+            </a:r>
+          </a:p>
+          <a:p>
+            <a:r>
+              <a:rPr lang="nb-NO" dirty="0">
+                <a:latin typeface="Arial" panose="020B0604020202020204" pitchFamily="34" charset="0"/>
+                <a:cs typeface="Arial" panose="020B0604020202020204" pitchFamily="34" charset="0"/>
+              </a:rPr>
+              <a:t>PATCH with json including «user_id», «cur1», «cur2», «cur3», «vou2» and «vou3» add these curs and vous to the User’s currency – if they’re positive increments both the current and lifetime currencies, if they’re negative only decreases the </a:t>
             </a:r>
             <a:r>
               <a:rPr lang="nb-NO">
                 <a:latin typeface="Arial" panose="020B0604020202020204" pitchFamily="34" charset="0"/>
                 <a:cs typeface="Arial" panose="020B0604020202020204" pitchFamily="34" charset="0"/>
               </a:rPr>
-              <a:t>name», «image», and «available» </a:t>
-            </a:r>
-            <a:r>
-              <a:rPr lang="nb-NO" dirty="0">
-                <a:latin typeface="Arial" panose="020B0604020202020204" pitchFamily="34" charset="0"/>
-                <a:cs typeface="Arial" panose="020B0604020202020204" pitchFamily="34" charset="0"/>
-              </a:rPr>
-              <a:t>will create a species</a:t>
-            </a:r>
-          </a:p>
-          <a:p>
-            <a:r>
-              <a:rPr lang="nb-NO" dirty="0">
-                <a:latin typeface="Arial" panose="020B0604020202020204" pitchFamily="34" charset="0"/>
-                <a:cs typeface="Arial" panose="020B0604020202020204" pitchFamily="34" charset="0"/>
-              </a:rPr>
-              <a:t>PATCH method with the param «species_id» flips the value of the available variable</a:t>
-            </a:r>
+              <a:t>current ones (note: you can also send an «update_lifetime» boolean to force updating or not updating lifetime currency)</a:t>
+            </a:r>
+            <a:endParaRPr lang="nb-NO" dirty="0">
+              <a:latin typeface="Arial" panose="020B0604020202020204" pitchFamily="34" charset="0"/>
+              <a:cs typeface="Arial" panose="020B0604020202020204" pitchFamily="34" charset="0"/>
+            </a:endParaRPr>
           </a:p>
         </p:txBody>
       </p:sp>
     </p:spTree>
     <p:extLst>
       <p:ext uri="{BB962C8B-B14F-4D97-AF65-F5344CB8AC3E}">
-        <p14:creationId xmlns:p14="http://schemas.microsoft.com/office/powerpoint/2010/main" val="2134680363"/>
+        <p14:creationId xmlns:p14="http://schemas.microsoft.com/office/powerpoint/2010/main" val="1802617112"/>
       </p:ext>
     </p:extLst>
   </p:cSld>
@@ -6813,7 +6972,7 @@
                 <a:latin typeface="Arial" panose="020B0604020202020204" pitchFamily="34" charset="0"/>
                 <a:cs typeface="Arial" panose="020B0604020202020204" pitchFamily="34" charset="0"/>
               </a:rPr>
-              <a:t>/aliens</a:t>
+              <a:t>/missions</a:t>
             </a:r>
           </a:p>
         </p:txBody>
@@ -6828,15 +6987,10 @@
             <p:ph idx="1"/>
           </p:nvPr>
         </p:nvSpPr>
-        <p:spPr>
-          <a:xfrm>
-            <a:off x="838200" y="1331650"/>
-            <a:ext cx="10515600" cy="5433134"/>
-          </a:xfrm>
-        </p:spPr>
+        <p:spPr/>
         <p:txBody>
           <a:bodyPr>
-            <a:normAutofit fontScale="47500" lnSpcReduction="20000"/>
+            <a:normAutofit/>
           </a:bodyPr>
           <a:lstStyle/>
           <a:p>
@@ -6845,216 +6999,25 @@
                 <a:latin typeface="Arial" panose="020B0604020202020204" pitchFamily="34" charset="0"/>
                 <a:cs typeface="Arial" panose="020B0604020202020204" pitchFamily="34" charset="0"/>
               </a:rPr>
-              <a:t>GET method with params «user_id» will return json that contains each Alien and its variables as well as </a:t>
-            </a:r>
-            <a:r>
-              <a:rPr lang="nb-NO">
-                <a:latin typeface="Arial" panose="020B0604020202020204" pitchFamily="34" charset="0"/>
-                <a:cs typeface="Arial" panose="020B0604020202020204" pitchFamily="34" charset="0"/>
-              </a:rPr>
-              <a:t>the image and name variables that come </a:t>
-            </a:r>
-            <a:r>
-              <a:rPr lang="nb-NO" dirty="0">
-                <a:latin typeface="Arial" panose="020B0604020202020204" pitchFamily="34" charset="0"/>
-                <a:cs typeface="Arial" panose="020B0604020202020204" pitchFamily="34" charset="0"/>
-              </a:rPr>
-              <a:t>from its parent, for example:</a:t>
-            </a:r>
-          </a:p>
-          <a:p>
-            <a:pPr marL="0" indent="0">
-              <a:buNone/>
-            </a:pPr>
-            <a:r>
-              <a:rPr lang="nb-NO" dirty="0">
-                <a:latin typeface="Arial" panose="020B0604020202020204" pitchFamily="34" charset="0"/>
-                <a:cs typeface="Arial" panose="020B0604020202020204" pitchFamily="34" charset="0"/>
-              </a:rPr>
-              <a:t>{</a:t>
-            </a:r>
-          </a:p>
-          <a:p>
-            <a:pPr marL="0" indent="0">
-              <a:buNone/>
-            </a:pPr>
-            <a:r>
-              <a:rPr lang="nb-NO" dirty="0">
-                <a:latin typeface="Arial" panose="020B0604020202020204" pitchFamily="34" charset="0"/>
-                <a:cs typeface="Arial" panose="020B0604020202020204" pitchFamily="34" charset="0"/>
-              </a:rPr>
-              <a:t>«result:»</a:t>
-            </a:r>
-          </a:p>
-          <a:p>
-            <a:pPr marL="0" indent="0">
-              <a:buNone/>
-            </a:pPr>
-            <a:r>
-              <a:rPr lang="nb-NO" dirty="0">
-                <a:latin typeface="Arial" panose="020B0604020202020204" pitchFamily="34" charset="0"/>
-                <a:cs typeface="Arial" panose="020B0604020202020204" pitchFamily="34" charset="0"/>
-              </a:rPr>
-              <a:t>	[</a:t>
-            </a:r>
-          </a:p>
-          <a:p>
-            <a:pPr marL="0" indent="0">
-              <a:buNone/>
-            </a:pPr>
-            <a:r>
-              <a:rPr lang="nb-NO" dirty="0">
-                <a:latin typeface="Arial" panose="020B0604020202020204" pitchFamily="34" charset="0"/>
-                <a:cs typeface="Arial" panose="020B0604020202020204" pitchFamily="34" charset="0"/>
-              </a:rPr>
-              <a:t>		{</a:t>
-            </a:r>
-          </a:p>
-          <a:p>
-            <a:pPr marL="0" indent="0">
-              <a:buNone/>
-            </a:pPr>
-            <a:r>
-              <a:rPr lang="nb-NO" dirty="0">
-                <a:latin typeface="Arial" panose="020B0604020202020204" pitchFamily="34" charset="0"/>
-                <a:cs typeface="Arial" panose="020B0604020202020204" pitchFamily="34" charset="0"/>
-              </a:rPr>
-              <a:t>			«id»: «342»,</a:t>
-            </a:r>
-          </a:p>
-          <a:p>
-            <a:pPr marL="0" indent="0">
-              <a:buNone/>
-            </a:pPr>
-            <a:r>
-              <a:rPr lang="nb-NO" dirty="0">
-                <a:latin typeface="Arial" panose="020B0604020202020204" pitchFamily="34" charset="0"/>
-                <a:cs typeface="Arial" panose="020B0604020202020204" pitchFamily="34" charset="0"/>
-              </a:rPr>
-              <a:t>			«species_id»: «0»,</a:t>
-            </a:r>
-          </a:p>
-          <a:p>
-            <a:pPr marL="0" indent="0">
-              <a:buNone/>
-            </a:pPr>
-            <a:r>
-              <a:rPr lang="nb-NO" dirty="0">
-                <a:latin typeface="Arial" panose="020B0604020202020204" pitchFamily="34" charset="0"/>
-                <a:cs typeface="Arial" panose="020B0604020202020204" pitchFamily="34" charset="0"/>
-              </a:rPr>
-              <a:t>			«image»: «images/gleebnorb.png»,</a:t>
-            </a:r>
-          </a:p>
-          <a:p>
-            <a:pPr marL="0" indent="0">
-              <a:buNone/>
-            </a:pPr>
-            <a:r>
-              <a:rPr lang="nb-NO" dirty="0">
-                <a:latin typeface="Arial" panose="020B0604020202020204" pitchFamily="34" charset="0"/>
-                <a:cs typeface="Arial" panose="020B0604020202020204" pitchFamily="34" charset="0"/>
-              </a:rPr>
-              <a:t>			«name»: «Timmy»</a:t>
-            </a:r>
-          </a:p>
-          <a:p>
-            <a:pPr marL="0" indent="0">
-              <a:buNone/>
-            </a:pPr>
-            <a:r>
-              <a:rPr lang="nb-NO" dirty="0">
-                <a:latin typeface="Arial" panose="020B0604020202020204" pitchFamily="34" charset="0"/>
-                <a:cs typeface="Arial" panose="020B0604020202020204" pitchFamily="34" charset="0"/>
-              </a:rPr>
-              <a:t>			«species_name»: «Gleebnorb»</a:t>
-            </a:r>
-          </a:p>
-          <a:p>
-            <a:pPr marL="0" indent="0">
-              <a:buNone/>
-            </a:pPr>
-            <a:r>
-              <a:rPr lang="nb-NO" dirty="0">
-                <a:latin typeface="Arial" panose="020B0604020202020204" pitchFamily="34" charset="0"/>
-                <a:cs typeface="Arial" panose="020B0604020202020204" pitchFamily="34" charset="0"/>
-              </a:rPr>
-              <a:t>			...</a:t>
-            </a:r>
-          </a:p>
-          <a:p>
-            <a:pPr marL="0" indent="0">
-              <a:buNone/>
-            </a:pPr>
-            <a:r>
-              <a:rPr lang="nb-NO" dirty="0">
-                <a:latin typeface="Arial" panose="020B0604020202020204" pitchFamily="34" charset="0"/>
-                <a:cs typeface="Arial" panose="020B0604020202020204" pitchFamily="34" charset="0"/>
-              </a:rPr>
-              <a:t>		},</a:t>
-            </a:r>
-          </a:p>
-          <a:p>
-            <a:pPr marL="0" indent="0">
-              <a:buNone/>
-            </a:pPr>
-            <a:r>
-              <a:rPr lang="nb-NO" dirty="0">
-                <a:latin typeface="Arial" panose="020B0604020202020204" pitchFamily="34" charset="0"/>
-                <a:cs typeface="Arial" panose="020B0604020202020204" pitchFamily="34" charset="0"/>
-              </a:rPr>
-              <a:t>		...</a:t>
-            </a:r>
-          </a:p>
-          <a:p>
-            <a:pPr marL="0" indent="0">
-              <a:buNone/>
-            </a:pPr>
-            <a:r>
-              <a:rPr lang="nb-NO" dirty="0">
-                <a:latin typeface="Arial" panose="020B0604020202020204" pitchFamily="34" charset="0"/>
-                <a:cs typeface="Arial" panose="020B0604020202020204" pitchFamily="34" charset="0"/>
-              </a:rPr>
-              <a:t>	]</a:t>
-            </a:r>
-          </a:p>
-          <a:p>
-            <a:pPr marL="0" indent="0">
-              <a:buNone/>
-            </a:pPr>
-            <a:r>
-              <a:rPr lang="nb-NO" dirty="0">
-                <a:latin typeface="Arial" panose="020B0604020202020204" pitchFamily="34" charset="0"/>
-                <a:cs typeface="Arial" panose="020B0604020202020204" pitchFamily="34" charset="0"/>
-              </a:rPr>
-              <a:t>}</a:t>
-            </a:r>
-          </a:p>
-          <a:p>
-            <a:r>
-              <a:rPr lang="nb-NO" dirty="0">
-                <a:latin typeface="Arial" panose="020B0604020202020204" pitchFamily="34" charset="0"/>
-                <a:cs typeface="Arial" panose="020B0604020202020204" pitchFamily="34" charset="0"/>
-              </a:rPr>
-              <a:t>POST method with json «user_id», «species_id», «x», «y», and «name» adds a new item to a user’s list of PlanetItems, returning the new «id» and «image»</a:t>
-            </a:r>
-          </a:p>
-          <a:p>
-            <a:r>
-              <a:rPr lang="nb-NO" dirty="0">
-                <a:latin typeface="Arial" panose="020B0604020202020204" pitchFamily="34" charset="0"/>
-                <a:cs typeface="Arial" panose="020B0604020202020204" pitchFamily="34" charset="0"/>
-              </a:rPr>
-              <a:t>PATCH method with json «alien_id», «x», and «y» updates the x and y vars of an alien</a:t>
-            </a:r>
-          </a:p>
-          <a:p>
-            <a:r>
-              <a:rPr lang="nb-NO" dirty="0">
-                <a:latin typeface="Arial" panose="020B0604020202020204" pitchFamily="34" charset="0"/>
-                <a:cs typeface="Arial" panose="020B0604020202020204" pitchFamily="34" charset="0"/>
-              </a:rPr>
-              <a:t>DELETE method with params «alien_id» will remove that item from the database</a:t>
+              <a:t>GET method with params «user_id» returns mission_type, mission_current, mission_total</a:t>
+            </a:r>
+          </a:p>
+          <a:p>
+            <a:r>
+              <a:rPr lang="nb-NO" dirty="0">
+                <a:latin typeface="Arial" panose="020B0604020202020204" pitchFamily="34" charset="0"/>
+                <a:cs typeface="Arial" panose="020B0604020202020204" pitchFamily="34" charset="0"/>
+              </a:rPr>
+              <a:t>POST method with params «user_id» increases mission_current by 1</a:t>
+            </a:r>
+          </a:p>
+          <a:p>
+            <a:r>
+              <a:rPr lang="nb-NO" dirty="0">
+                <a:latin typeface="Arial" panose="020B0604020202020204" pitchFamily="34" charset="0"/>
+                <a:cs typeface="Arial" panose="020B0604020202020204" pitchFamily="34" charset="0"/>
+              </a:rPr>
+              <a:t>PATCH with params «user_id» will set mission_current and mission_total to -1, then begins a 10 minute timer to get a new mission</a:t>
             </a:r>
           </a:p>
         </p:txBody>
@@ -7062,7 +7025,7 @@
     </p:spTree>
     <p:extLst>
       <p:ext uri="{BB962C8B-B14F-4D97-AF65-F5344CB8AC3E}">
-        <p14:creationId xmlns:p14="http://schemas.microsoft.com/office/powerpoint/2010/main" val="3064423067"/>
+        <p14:creationId xmlns:p14="http://schemas.microsoft.com/office/powerpoint/2010/main" val="3689206682"/>
       </p:ext>
     </p:extLst>
   </p:cSld>
@@ -7114,7 +7077,7 @@
                 <a:latin typeface="Arial" panose="020B0604020202020204" pitchFamily="34" charset="0"/>
                 <a:cs typeface="Arial" panose="020B0604020202020204" pitchFamily="34" charset="0"/>
               </a:rPr>
-              <a:t>/items</a:t>
+              <a:t>/status</a:t>
             </a:r>
           </a:p>
         </p:txBody>
@@ -7129,15 +7092,10 @@
             <p:ph idx="1"/>
           </p:nvPr>
         </p:nvSpPr>
-        <p:spPr>
-          <a:xfrm>
-            <a:off x="838200" y="1331650"/>
-            <a:ext cx="10515600" cy="5433134"/>
-          </a:xfrm>
-        </p:spPr>
+        <p:spPr/>
         <p:txBody>
           <a:bodyPr>
-            <a:normAutofit fontScale="47500" lnSpcReduction="20000"/>
+            <a:normAutofit/>
           </a:bodyPr>
           <a:lstStyle/>
           <a:p>
@@ -7146,202 +7104,16 @@
                 <a:latin typeface="Arial" panose="020B0604020202020204" pitchFamily="34" charset="0"/>
                 <a:cs typeface="Arial" panose="020B0604020202020204" pitchFamily="34" charset="0"/>
               </a:rPr>
-              <a:t>GET method with params «user_id» will return json that contains each PlanetItem and its variables as well as the image variable that comes from its parent, for example:</a:t>
-            </a:r>
-          </a:p>
-          <a:p>
-            <a:pPr marL="0" indent="0">
-              <a:buNone/>
-            </a:pPr>
-            <a:r>
-              <a:rPr lang="nb-NO" dirty="0">
-                <a:latin typeface="Arial" panose="020B0604020202020204" pitchFamily="34" charset="0"/>
-                <a:cs typeface="Arial" panose="020B0604020202020204" pitchFamily="34" charset="0"/>
-              </a:rPr>
-              <a:t>{</a:t>
-            </a:r>
-          </a:p>
-          <a:p>
-            <a:pPr marL="0" indent="0">
-              <a:buNone/>
-            </a:pPr>
-            <a:r>
-              <a:rPr lang="nb-NO" dirty="0">
-                <a:latin typeface="Arial" panose="020B0604020202020204" pitchFamily="34" charset="0"/>
-                <a:cs typeface="Arial" panose="020B0604020202020204" pitchFamily="34" charset="0"/>
-              </a:rPr>
-              <a:t>«result:»</a:t>
-            </a:r>
-          </a:p>
-          <a:p>
-            <a:pPr marL="0" indent="0">
-              <a:buNone/>
-            </a:pPr>
-            <a:r>
-              <a:rPr lang="nb-NO" dirty="0">
-                <a:latin typeface="Arial" panose="020B0604020202020204" pitchFamily="34" charset="0"/>
-                <a:cs typeface="Arial" panose="020B0604020202020204" pitchFamily="34" charset="0"/>
-              </a:rPr>
-              <a:t>	[</a:t>
-            </a:r>
-          </a:p>
-          <a:p>
-            <a:pPr marL="0" indent="0">
-              <a:buNone/>
-            </a:pPr>
-            <a:r>
-              <a:rPr lang="nb-NO" dirty="0">
-                <a:latin typeface="Arial" panose="020B0604020202020204" pitchFamily="34" charset="0"/>
-                <a:cs typeface="Arial" panose="020B0604020202020204" pitchFamily="34" charset="0"/>
-              </a:rPr>
-              <a:t>		{</a:t>
-            </a:r>
-          </a:p>
-          <a:p>
-            <a:pPr marL="0" indent="0">
-              <a:buNone/>
-            </a:pPr>
-            <a:r>
-              <a:rPr lang="nb-NO" dirty="0">
-                <a:latin typeface="Arial" panose="020B0604020202020204" pitchFamily="34" charset="0"/>
-                <a:cs typeface="Arial" panose="020B0604020202020204" pitchFamily="34" charset="0"/>
-              </a:rPr>
-              <a:t>			«id»: «342»,</a:t>
-            </a:r>
-          </a:p>
-          <a:p>
-            <a:pPr marL="0" indent="0">
-              <a:buNone/>
-            </a:pPr>
-            <a:r>
-              <a:rPr lang="nb-NO" dirty="0">
-                <a:latin typeface="Arial" panose="020B0604020202020204" pitchFamily="34" charset="0"/>
-                <a:cs typeface="Arial" panose="020B0604020202020204" pitchFamily="34" charset="0"/>
-              </a:rPr>
-              <a:t>			«catalog_parent_id»: «0»,</a:t>
-            </a:r>
-          </a:p>
-          <a:p>
-            <a:pPr marL="0" indent="0">
-              <a:buNone/>
-            </a:pPr>
-            <a:r>
-              <a:rPr lang="nb-NO" dirty="0">
-                <a:latin typeface="Arial" panose="020B0604020202020204" pitchFamily="34" charset="0"/>
-                <a:cs typeface="Arial" panose="020B0604020202020204" pitchFamily="34" charset="0"/>
-              </a:rPr>
-              <a:t>			«image»: «images/statue.png»,</a:t>
-            </a:r>
-          </a:p>
-          <a:p>
-            <a:pPr marL="0" indent="0">
-              <a:buNone/>
-            </a:pPr>
-            <a:r>
-              <a:rPr lang="nb-NO" dirty="0">
-                <a:latin typeface="Arial" panose="020B0604020202020204" pitchFamily="34" charset="0"/>
-                <a:cs typeface="Arial" panose="020B0604020202020204" pitchFamily="34" charset="0"/>
-              </a:rPr>
-              <a:t>			«x»: «40»</a:t>
-            </a:r>
-          </a:p>
-          <a:p>
-            <a:pPr marL="0" indent="0">
-              <a:buNone/>
-            </a:pPr>
-            <a:r>
-              <a:rPr lang="nb-NO" dirty="0">
-                <a:latin typeface="Arial" panose="020B0604020202020204" pitchFamily="34" charset="0"/>
-                <a:cs typeface="Arial" panose="020B0604020202020204" pitchFamily="34" charset="0"/>
-              </a:rPr>
-              <a:t>			«y»: «80»</a:t>
-            </a:r>
-          </a:p>
-          <a:p>
-            <a:pPr marL="0" indent="0">
-              <a:buNone/>
-            </a:pPr>
-            <a:r>
-              <a:rPr lang="nb-NO" dirty="0">
-                <a:latin typeface="Arial" panose="020B0604020202020204" pitchFamily="34" charset="0"/>
-                <a:cs typeface="Arial" panose="020B0604020202020204" pitchFamily="34" charset="0"/>
-              </a:rPr>
-              <a:t>			...</a:t>
-            </a:r>
-          </a:p>
-          <a:p>
-            <a:pPr marL="0" indent="0">
-              <a:buNone/>
-            </a:pPr>
-            <a:r>
-              <a:rPr lang="nb-NO" dirty="0">
-                <a:latin typeface="Arial" panose="020B0604020202020204" pitchFamily="34" charset="0"/>
-                <a:cs typeface="Arial" panose="020B0604020202020204" pitchFamily="34" charset="0"/>
-              </a:rPr>
-              <a:t>		},</a:t>
-            </a:r>
-          </a:p>
-          <a:p>
-            <a:pPr marL="0" indent="0">
-              <a:buNone/>
-            </a:pPr>
-            <a:r>
-              <a:rPr lang="nb-NO" dirty="0">
-                <a:latin typeface="Arial" panose="020B0604020202020204" pitchFamily="34" charset="0"/>
-                <a:cs typeface="Arial" panose="020B0604020202020204" pitchFamily="34" charset="0"/>
-              </a:rPr>
-              <a:t>		...</a:t>
-            </a:r>
-          </a:p>
-          <a:p>
-            <a:pPr marL="0" indent="0">
-              <a:buNone/>
-            </a:pPr>
-            <a:r>
-              <a:rPr lang="nb-NO" dirty="0">
-                <a:latin typeface="Arial" panose="020B0604020202020204" pitchFamily="34" charset="0"/>
-                <a:cs typeface="Arial" panose="020B0604020202020204" pitchFamily="34" charset="0"/>
-              </a:rPr>
-              <a:t>	]</a:t>
-            </a:r>
-          </a:p>
-          <a:p>
-            <a:pPr marL="0" indent="0">
-              <a:buNone/>
-            </a:pPr>
-            <a:r>
-              <a:rPr lang="nb-NO" dirty="0">
-                <a:latin typeface="Arial" panose="020B0604020202020204" pitchFamily="34" charset="0"/>
-                <a:cs typeface="Arial" panose="020B0604020202020204" pitchFamily="34" charset="0"/>
-              </a:rPr>
-              <a:t>}</a:t>
-            </a:r>
-          </a:p>
-          <a:p>
-            <a:r>
-              <a:rPr lang="nb-NO" dirty="0">
-                <a:latin typeface="Arial" panose="020B0604020202020204" pitchFamily="34" charset="0"/>
-                <a:cs typeface="Arial" panose="020B0604020202020204" pitchFamily="34" charset="0"/>
-              </a:rPr>
-              <a:t>POST method with json «user_id» «catalog_id», «x» and «y» adds a new item to a user’s list of PlanetItems, returning the new «id» and «image»</a:t>
-            </a:r>
-          </a:p>
-          <a:p>
-            <a:r>
-              <a:rPr lang="nb-NO" dirty="0">
-                <a:latin typeface="Arial" panose="020B0604020202020204" pitchFamily="34" charset="0"/>
-                <a:cs typeface="Arial" panose="020B0604020202020204" pitchFamily="34" charset="0"/>
-              </a:rPr>
-              <a:t>DELETE method with params «item_id» will remove that item from the database</a:t>
-            </a:r>
-          </a:p>
-          <a:p>
-            <a:r>
-              <a:rPr lang="nb-NO" dirty="0">
-                <a:latin typeface="Arial" panose="020B0604020202020204" pitchFamily="34" charset="0"/>
-                <a:cs typeface="Arial" panose="020B0604020202020204" pitchFamily="34" charset="0"/>
-              </a:rPr>
-              <a:t>PATCH method with json «item_id», «x» and «y» updates an item’s x and y position</a:t>
+              <a:t>GET method returns «event» and «news» from the server status</a:t>
+            </a:r>
+          </a:p>
+          <a:p>
+            <a:r>
+              <a:rPr lang="nb-NO" dirty="0">
+                <a:latin typeface="Arial" panose="020B0604020202020204" pitchFamily="34" charset="0"/>
+                <a:cs typeface="Arial" panose="020B0604020202020204" pitchFamily="34" charset="0"/>
+              </a:rPr>
+              <a:t>PATCH with json including «event» and «news» to update the server status – leave a param null to not update it</a:t>
             </a:r>
           </a:p>
         </p:txBody>
@@ -7349,7 +7121,7 @@
     </p:spTree>
     <p:extLst>
       <p:ext uri="{BB962C8B-B14F-4D97-AF65-F5344CB8AC3E}">
-        <p14:creationId xmlns:p14="http://schemas.microsoft.com/office/powerpoint/2010/main" val="3976820580"/>
+        <p14:creationId xmlns:p14="http://schemas.microsoft.com/office/powerpoint/2010/main" val="809141698"/>
       </p:ext>
     </p:extLst>
   </p:cSld>
@@ -7594,601 +7366,6 @@
                 <a:latin typeface="Arial" panose="020B0604020202020204" pitchFamily="34" charset="0"/>
                 <a:cs typeface="Arial" panose="020B0604020202020204" pitchFamily="34" charset="0"/>
               </a:rPr>
-              <a:t>/</a:t>
-            </a:r>
-            <a:r>
-              <a:rPr lang="en-US" dirty="0" err="1">
-                <a:latin typeface="Arial" panose="020B0604020202020204" pitchFamily="34" charset="0"/>
-                <a:cs typeface="Arial" panose="020B0604020202020204" pitchFamily="34" charset="0"/>
-              </a:rPr>
-              <a:t>chatitems</a:t>
-            </a:r>
-            <a:endParaRPr lang="en-US" dirty="0">
-              <a:latin typeface="Arial" panose="020B0604020202020204" pitchFamily="34" charset="0"/>
-              <a:cs typeface="Arial" panose="020B0604020202020204" pitchFamily="34" charset="0"/>
-            </a:endParaRPr>
-          </a:p>
-        </p:txBody>
-      </p:sp>
-      <p:sp>
-        <p:nvSpPr>
-          <p:cNvPr id="3" name="Content Placeholder 2"/>
-          <p:cNvSpPr>
-            <a:spLocks noGrp="1"/>
-          </p:cNvSpPr>
-          <p:nvPr>
-            <p:ph idx="1"/>
-          </p:nvPr>
-        </p:nvSpPr>
-        <p:spPr>
-          <a:xfrm>
-            <a:off x="378069" y="1331650"/>
-            <a:ext cx="11579469" cy="5433134"/>
-          </a:xfrm>
-        </p:spPr>
-        <p:txBody>
-          <a:bodyPr>
-            <a:normAutofit fontScale="55000" lnSpcReduction="20000"/>
-          </a:bodyPr>
-          <a:lstStyle/>
-          <a:p>
-            <a:r>
-              <a:rPr lang="nb-NO" dirty="0">
-                <a:latin typeface="Arial" panose="020B0604020202020204" pitchFamily="34" charset="0"/>
-                <a:cs typeface="Arial" panose="020B0604020202020204" pitchFamily="34" charset="0"/>
-              </a:rPr>
-              <a:t>GET method with params «user_id» and «item_type» (where 0 is a color and 1 is an emoticon) will return json that contains each ChatItem the User owns with that itemType and its variables, for example:</a:t>
-            </a:r>
-          </a:p>
-          <a:p>
-            <a:pPr marL="0" indent="0">
-              <a:buNone/>
-            </a:pPr>
-            <a:r>
-              <a:rPr lang="nb-NO" dirty="0">
-                <a:latin typeface="Arial" panose="020B0604020202020204" pitchFamily="34" charset="0"/>
-                <a:cs typeface="Arial" panose="020B0604020202020204" pitchFamily="34" charset="0"/>
-              </a:rPr>
-              <a:t>{</a:t>
-            </a:r>
-          </a:p>
-          <a:p>
-            <a:pPr marL="0" indent="0">
-              <a:buNone/>
-            </a:pPr>
-            <a:r>
-              <a:rPr lang="nb-NO" dirty="0">
-                <a:latin typeface="Arial" panose="020B0604020202020204" pitchFamily="34" charset="0"/>
-                <a:cs typeface="Arial" panose="020B0604020202020204" pitchFamily="34" charset="0"/>
-              </a:rPr>
-              <a:t>«result:»</a:t>
-            </a:r>
-          </a:p>
-          <a:p>
-            <a:pPr marL="0" indent="0">
-              <a:buNone/>
-            </a:pPr>
-            <a:r>
-              <a:rPr lang="nb-NO" dirty="0">
-                <a:latin typeface="Arial" panose="020B0604020202020204" pitchFamily="34" charset="0"/>
-                <a:cs typeface="Arial" panose="020B0604020202020204" pitchFamily="34" charset="0"/>
-              </a:rPr>
-              <a:t>	[</a:t>
-            </a:r>
-          </a:p>
-          <a:p>
-            <a:pPr marL="0" indent="0">
-              <a:buNone/>
-            </a:pPr>
-            <a:r>
-              <a:rPr lang="nb-NO" dirty="0">
-                <a:latin typeface="Arial" panose="020B0604020202020204" pitchFamily="34" charset="0"/>
-                <a:cs typeface="Arial" panose="020B0604020202020204" pitchFamily="34" charset="0"/>
-              </a:rPr>
-              <a:t>		{</a:t>
-            </a:r>
-          </a:p>
-          <a:p>
-            <a:pPr marL="0" indent="0">
-              <a:buNone/>
-            </a:pPr>
-            <a:r>
-              <a:rPr lang="nb-NO" dirty="0">
-                <a:latin typeface="Arial" panose="020B0604020202020204" pitchFamily="34" charset="0"/>
-                <a:cs typeface="Arial" panose="020B0604020202020204" pitchFamily="34" charset="0"/>
-              </a:rPr>
-              <a:t>			«id»: «0»,</a:t>
-            </a:r>
-          </a:p>
-          <a:p>
-            <a:pPr marL="0" indent="0">
-              <a:buNone/>
-            </a:pPr>
-            <a:r>
-              <a:rPr lang="nb-NO" dirty="0">
-                <a:latin typeface="Arial" panose="020B0604020202020204" pitchFamily="34" charset="0"/>
-                <a:cs typeface="Arial" panose="020B0604020202020204" pitchFamily="34" charset="0"/>
-              </a:rPr>
-              <a:t>			«itemType»: «0»,</a:t>
-            </a:r>
-          </a:p>
-          <a:p>
-            <a:pPr marL="0" indent="0">
-              <a:buNone/>
-            </a:pPr>
-            <a:r>
-              <a:rPr lang="nb-NO" dirty="0">
-                <a:latin typeface="Arial" panose="020B0604020202020204" pitchFamily="34" charset="0"/>
-                <a:cs typeface="Arial" panose="020B0604020202020204" pitchFamily="34" charset="0"/>
-              </a:rPr>
-              <a:t>			«string»: «purple»,</a:t>
-            </a:r>
-          </a:p>
-          <a:p>
-            <a:pPr marL="0" indent="0">
-              <a:buNone/>
-            </a:pPr>
-            <a:r>
-              <a:rPr lang="nb-NO" dirty="0">
-                <a:latin typeface="Arial" panose="020B0604020202020204" pitchFamily="34" charset="0"/>
-                <a:cs typeface="Arial" panose="020B0604020202020204" pitchFamily="34" charset="0"/>
-              </a:rPr>
-              <a:t>			«cost1»: «40»,</a:t>
-            </a:r>
-          </a:p>
-          <a:p>
-            <a:pPr marL="0" indent="0">
-              <a:buNone/>
-            </a:pPr>
-            <a:r>
-              <a:rPr lang="nb-NO" dirty="0">
-                <a:latin typeface="Arial" panose="020B0604020202020204" pitchFamily="34" charset="0"/>
-                <a:cs typeface="Arial" panose="020B0604020202020204" pitchFamily="34" charset="0"/>
-              </a:rPr>
-              <a:t>			«cost2»: «5»</a:t>
-            </a:r>
-          </a:p>
-          <a:p>
-            <a:pPr marL="0" indent="0">
-              <a:buNone/>
-            </a:pPr>
-            <a:r>
-              <a:rPr lang="nb-NO" dirty="0">
-                <a:latin typeface="Arial" panose="020B0604020202020204" pitchFamily="34" charset="0"/>
-                <a:cs typeface="Arial" panose="020B0604020202020204" pitchFamily="34" charset="0"/>
-              </a:rPr>
-              <a:t>			...</a:t>
-            </a:r>
-          </a:p>
-          <a:p>
-            <a:pPr marL="0" indent="0">
-              <a:buNone/>
-            </a:pPr>
-            <a:r>
-              <a:rPr lang="nb-NO" dirty="0">
-                <a:latin typeface="Arial" panose="020B0604020202020204" pitchFamily="34" charset="0"/>
-                <a:cs typeface="Arial" panose="020B0604020202020204" pitchFamily="34" charset="0"/>
-              </a:rPr>
-              <a:t>		},</a:t>
-            </a:r>
-          </a:p>
-          <a:p>
-            <a:pPr marL="0" indent="0">
-              <a:buNone/>
-            </a:pPr>
-            <a:r>
-              <a:rPr lang="nb-NO" dirty="0">
-                <a:latin typeface="Arial" panose="020B0604020202020204" pitchFamily="34" charset="0"/>
-                <a:cs typeface="Arial" panose="020B0604020202020204" pitchFamily="34" charset="0"/>
-              </a:rPr>
-              <a:t>		...</a:t>
-            </a:r>
-          </a:p>
-          <a:p>
-            <a:pPr marL="0" indent="0">
-              <a:buNone/>
-            </a:pPr>
-            <a:r>
-              <a:rPr lang="nb-NO" dirty="0">
-                <a:latin typeface="Arial" panose="020B0604020202020204" pitchFamily="34" charset="0"/>
-                <a:cs typeface="Arial" panose="020B0604020202020204" pitchFamily="34" charset="0"/>
-              </a:rPr>
-              <a:t>	]</a:t>
-            </a:r>
-          </a:p>
-          <a:p>
-            <a:pPr marL="0" indent="0">
-              <a:buNone/>
-            </a:pPr>
-            <a:r>
-              <a:rPr lang="nb-NO" dirty="0">
-                <a:latin typeface="Arial" panose="020B0604020202020204" pitchFamily="34" charset="0"/>
-                <a:cs typeface="Arial" panose="020B0604020202020204" pitchFamily="34" charset="0"/>
-              </a:rPr>
-              <a:t>}</a:t>
-            </a:r>
-          </a:p>
-          <a:p>
-            <a:r>
-              <a:rPr lang="nb-NO" dirty="0">
-                <a:latin typeface="Arial" panose="020B0604020202020204" pitchFamily="34" charset="0"/>
-                <a:cs typeface="Arial" panose="020B0604020202020204" pitchFamily="34" charset="0"/>
-              </a:rPr>
-              <a:t>GET method with only «user_id» param returns every ChatItem with an «owned» t/f value based on whether or not the user owns it</a:t>
-            </a:r>
-          </a:p>
-          <a:p>
-            <a:r>
-              <a:rPr lang="nb-NO" dirty="0">
-                <a:latin typeface="Arial" panose="020B0604020202020204" pitchFamily="34" charset="0"/>
-                <a:cs typeface="Arial" panose="020B0604020202020204" pitchFamily="34" charset="0"/>
-              </a:rPr>
-              <a:t>POST method with json including «item_type», «string», «cost1», «cost2», and «cost3» to create that ChatItem</a:t>
-            </a:r>
-          </a:p>
-          <a:p>
-            <a:r>
-              <a:rPr lang="nb-NO" dirty="0">
-                <a:latin typeface="Arial" panose="020B0604020202020204" pitchFamily="34" charset="0"/>
-                <a:cs typeface="Arial" panose="020B0604020202020204" pitchFamily="34" charset="0"/>
-              </a:rPr>
-              <a:t>PATCH method with json including «user_id» and «chat_item_id» to add that ChatItem to the User</a:t>
-            </a:r>
-          </a:p>
-        </p:txBody>
-      </p:sp>
-    </p:spTree>
-    <p:extLst>
-      <p:ext uri="{BB962C8B-B14F-4D97-AF65-F5344CB8AC3E}">
-        <p14:creationId xmlns:p14="http://schemas.microsoft.com/office/powerpoint/2010/main" val="1642849653"/>
-      </p:ext>
-    </p:extLst>
-  </p:cSld>
-  <p:clrMapOvr>
-    <a:masterClrMapping/>
-  </p:clrMapOvr>
-</p:sld>
-</file>
-
-<file path=ppt/slides/slide31.xml><?xml version="1.0" encoding="utf-8"?>
-<p:sld xmlns:a="http://schemas.openxmlformats.org/drawingml/2006/main" xmlns:r="http://schemas.openxmlformats.org/officeDocument/2006/relationships" xmlns:p="http://schemas.openxmlformats.org/presentationml/2006/main">
-  <p:cSld>
-    <p:spTree>
-      <p:nvGrpSpPr>
-        <p:cNvPr id="1" name=""/>
-        <p:cNvGrpSpPr/>
-        <p:nvPr/>
-      </p:nvGrpSpPr>
-      <p:grpSpPr>
-        <a:xfrm>
-          <a:off x="0" y="0"/>
-          <a:ext cx="0" cy="0"/>
-          <a:chOff x="0" y="0"/>
-          <a:chExt cx="0" cy="0"/>
-        </a:xfrm>
-      </p:grpSpPr>
-      <p:sp>
-        <p:nvSpPr>
-          <p:cNvPr id="2" name="Title 1"/>
-          <p:cNvSpPr>
-            <a:spLocks noGrp="1"/>
-          </p:cNvSpPr>
-          <p:nvPr>
-            <p:ph type="title"/>
-          </p:nvPr>
-        </p:nvSpPr>
-        <p:spPr>
-          <a:xfrm>
-            <a:off x="838200" y="365125"/>
-            <a:ext cx="10515600" cy="1325563"/>
-          </a:xfrm>
-        </p:spPr>
-        <p:txBody>
-          <a:bodyPr/>
-          <a:lstStyle/>
-          <a:p>
-            <a:r>
-              <a:rPr lang="en-US" dirty="0">
-                <a:latin typeface="Arial" panose="020B0604020202020204" pitchFamily="34" charset="0"/>
-                <a:cs typeface="Arial" panose="020B0604020202020204" pitchFamily="34" charset="0"/>
-              </a:rPr>
-              <a:t>/currency</a:t>
-            </a:r>
-          </a:p>
-        </p:txBody>
-      </p:sp>
-      <p:sp>
-        <p:nvSpPr>
-          <p:cNvPr id="3" name="Content Placeholder 2"/>
-          <p:cNvSpPr>
-            <a:spLocks noGrp="1"/>
-          </p:cNvSpPr>
-          <p:nvPr>
-            <p:ph idx="1"/>
-          </p:nvPr>
-        </p:nvSpPr>
-        <p:spPr/>
-        <p:txBody>
-          <a:bodyPr>
-            <a:normAutofit/>
-          </a:bodyPr>
-          <a:lstStyle/>
-          <a:p>
-            <a:r>
-              <a:rPr lang="nb-NO" dirty="0">
-                <a:latin typeface="Arial" panose="020B0604020202020204" pitchFamily="34" charset="0"/>
-                <a:cs typeface="Arial" panose="020B0604020202020204" pitchFamily="34" charset="0"/>
-              </a:rPr>
-              <a:t>GET method with params «user_id» returns cur1-3, vou2-3, lifetime_cur1-3</a:t>
-            </a:r>
-          </a:p>
-          <a:p>
-            <a:r>
-              <a:rPr lang="nb-NO" dirty="0">
-                <a:latin typeface="Arial" panose="020B0604020202020204" pitchFamily="34" charset="0"/>
-                <a:cs typeface="Arial" panose="020B0604020202020204" pitchFamily="34" charset="0"/>
-              </a:rPr>
-              <a:t>PATCH with json including «user_id», «cur1», «cur2», «cur3», «vou2» and «vou3» add these curs and vous to the User’s currency – if they’re positive increments both the current and lifetime currencies, if they’re negative only decreases the current ones (note: you can also send an «update_lifetime» boolean to force updating or not updating lifetime currency)</a:t>
-            </a:r>
-          </a:p>
-        </p:txBody>
-      </p:sp>
-    </p:spTree>
-    <p:extLst>
-      <p:ext uri="{BB962C8B-B14F-4D97-AF65-F5344CB8AC3E}">
-        <p14:creationId xmlns:p14="http://schemas.microsoft.com/office/powerpoint/2010/main" val="1802617112"/>
-      </p:ext>
-    </p:extLst>
-  </p:cSld>
-  <p:clrMapOvr>
-    <a:masterClrMapping/>
-  </p:clrMapOvr>
-</p:sld>
-</file>
-
-<file path=ppt/slides/slide32.xml><?xml version="1.0" encoding="utf-8"?>
-<p:sld xmlns:a="http://schemas.openxmlformats.org/drawingml/2006/main" xmlns:r="http://schemas.openxmlformats.org/officeDocument/2006/relationships" xmlns:p="http://schemas.openxmlformats.org/presentationml/2006/main">
-  <p:cSld>
-    <p:spTree>
-      <p:nvGrpSpPr>
-        <p:cNvPr id="1" name=""/>
-        <p:cNvGrpSpPr/>
-        <p:nvPr/>
-      </p:nvGrpSpPr>
-      <p:grpSpPr>
-        <a:xfrm>
-          <a:off x="0" y="0"/>
-          <a:ext cx="0" cy="0"/>
-          <a:chOff x="0" y="0"/>
-          <a:chExt cx="0" cy="0"/>
-        </a:xfrm>
-      </p:grpSpPr>
-      <p:sp>
-        <p:nvSpPr>
-          <p:cNvPr id="2" name="Title 1"/>
-          <p:cNvSpPr>
-            <a:spLocks noGrp="1"/>
-          </p:cNvSpPr>
-          <p:nvPr>
-            <p:ph type="title"/>
-          </p:nvPr>
-        </p:nvSpPr>
-        <p:spPr>
-          <a:xfrm>
-            <a:off x="838200" y="365125"/>
-            <a:ext cx="10515600" cy="1325563"/>
-          </a:xfrm>
-        </p:spPr>
-        <p:txBody>
-          <a:bodyPr/>
-          <a:lstStyle/>
-          <a:p>
-            <a:r>
-              <a:rPr lang="en-US" dirty="0">
-                <a:latin typeface="Arial" panose="020B0604020202020204" pitchFamily="34" charset="0"/>
-                <a:cs typeface="Arial" panose="020B0604020202020204" pitchFamily="34" charset="0"/>
-              </a:rPr>
-              <a:t>/missions</a:t>
-            </a:r>
-          </a:p>
-        </p:txBody>
-      </p:sp>
-      <p:sp>
-        <p:nvSpPr>
-          <p:cNvPr id="3" name="Content Placeholder 2"/>
-          <p:cNvSpPr>
-            <a:spLocks noGrp="1"/>
-          </p:cNvSpPr>
-          <p:nvPr>
-            <p:ph idx="1"/>
-          </p:nvPr>
-        </p:nvSpPr>
-        <p:spPr/>
-        <p:txBody>
-          <a:bodyPr>
-            <a:normAutofit/>
-          </a:bodyPr>
-          <a:lstStyle/>
-          <a:p>
-            <a:r>
-              <a:rPr lang="nb-NO" dirty="0">
-                <a:latin typeface="Arial" panose="020B0604020202020204" pitchFamily="34" charset="0"/>
-                <a:cs typeface="Arial" panose="020B0604020202020204" pitchFamily="34" charset="0"/>
-              </a:rPr>
-              <a:t>GET method with params «user_id» returns mission_type, mission_current, mission_total</a:t>
-            </a:r>
-          </a:p>
-          <a:p>
-            <a:r>
-              <a:rPr lang="nb-NO" dirty="0">
-                <a:latin typeface="Arial" panose="020B0604020202020204" pitchFamily="34" charset="0"/>
-                <a:cs typeface="Arial" panose="020B0604020202020204" pitchFamily="34" charset="0"/>
-              </a:rPr>
-              <a:t>POST method with params «user_id» increases mission_current by 1</a:t>
-            </a:r>
-          </a:p>
-          <a:p>
-            <a:r>
-              <a:rPr lang="nb-NO" dirty="0">
-                <a:latin typeface="Arial" panose="020B0604020202020204" pitchFamily="34" charset="0"/>
-                <a:cs typeface="Arial" panose="020B0604020202020204" pitchFamily="34" charset="0"/>
-              </a:rPr>
-              <a:t>PATCH with params «user_id» will set mission_current and mission_total to -1, then begins a 10 minute timer to get a new mission</a:t>
-            </a:r>
-          </a:p>
-        </p:txBody>
-      </p:sp>
-    </p:spTree>
-    <p:extLst>
-      <p:ext uri="{BB962C8B-B14F-4D97-AF65-F5344CB8AC3E}">
-        <p14:creationId xmlns:p14="http://schemas.microsoft.com/office/powerpoint/2010/main" val="3689206682"/>
-      </p:ext>
-    </p:extLst>
-  </p:cSld>
-  <p:clrMapOvr>
-    <a:masterClrMapping/>
-  </p:clrMapOvr>
-</p:sld>
-</file>
-
-<file path=ppt/slides/slide33.xml><?xml version="1.0" encoding="utf-8"?>
-<p:sld xmlns:a="http://schemas.openxmlformats.org/drawingml/2006/main" xmlns:r="http://schemas.openxmlformats.org/officeDocument/2006/relationships" xmlns:p="http://schemas.openxmlformats.org/presentationml/2006/main">
-  <p:cSld>
-    <p:spTree>
-      <p:nvGrpSpPr>
-        <p:cNvPr id="1" name=""/>
-        <p:cNvGrpSpPr/>
-        <p:nvPr/>
-      </p:nvGrpSpPr>
-      <p:grpSpPr>
-        <a:xfrm>
-          <a:off x="0" y="0"/>
-          <a:ext cx="0" cy="0"/>
-          <a:chOff x="0" y="0"/>
-          <a:chExt cx="0" cy="0"/>
-        </a:xfrm>
-      </p:grpSpPr>
-      <p:sp>
-        <p:nvSpPr>
-          <p:cNvPr id="2" name="Title 1"/>
-          <p:cNvSpPr>
-            <a:spLocks noGrp="1"/>
-          </p:cNvSpPr>
-          <p:nvPr>
-            <p:ph type="title"/>
-          </p:nvPr>
-        </p:nvSpPr>
-        <p:spPr>
-          <a:xfrm>
-            <a:off x="838200" y="365125"/>
-            <a:ext cx="10515600" cy="1325563"/>
-          </a:xfrm>
-        </p:spPr>
-        <p:txBody>
-          <a:bodyPr/>
-          <a:lstStyle/>
-          <a:p>
-            <a:r>
-              <a:rPr lang="en-US" dirty="0">
-                <a:latin typeface="Arial" panose="020B0604020202020204" pitchFamily="34" charset="0"/>
-                <a:cs typeface="Arial" panose="020B0604020202020204" pitchFamily="34" charset="0"/>
-              </a:rPr>
-              <a:t>/status</a:t>
-            </a:r>
-          </a:p>
-        </p:txBody>
-      </p:sp>
-      <p:sp>
-        <p:nvSpPr>
-          <p:cNvPr id="3" name="Content Placeholder 2"/>
-          <p:cNvSpPr>
-            <a:spLocks noGrp="1"/>
-          </p:cNvSpPr>
-          <p:nvPr>
-            <p:ph idx="1"/>
-          </p:nvPr>
-        </p:nvSpPr>
-        <p:spPr/>
-        <p:txBody>
-          <a:bodyPr>
-            <a:normAutofit/>
-          </a:bodyPr>
-          <a:lstStyle/>
-          <a:p>
-            <a:r>
-              <a:rPr lang="nb-NO" dirty="0">
-                <a:latin typeface="Arial" panose="020B0604020202020204" pitchFamily="34" charset="0"/>
-                <a:cs typeface="Arial" panose="020B0604020202020204" pitchFamily="34" charset="0"/>
-              </a:rPr>
-              <a:t>GET method returns «event» and «news» from the server status</a:t>
-            </a:r>
-          </a:p>
-          <a:p>
-            <a:r>
-              <a:rPr lang="nb-NO" dirty="0">
-                <a:latin typeface="Arial" panose="020B0604020202020204" pitchFamily="34" charset="0"/>
-                <a:cs typeface="Arial" panose="020B0604020202020204" pitchFamily="34" charset="0"/>
-              </a:rPr>
-              <a:t>PATCH with json including «event» and «news» to update the server status – leave a param null to not update it</a:t>
-            </a:r>
-          </a:p>
-        </p:txBody>
-      </p:sp>
-    </p:spTree>
-    <p:extLst>
-      <p:ext uri="{BB962C8B-B14F-4D97-AF65-F5344CB8AC3E}">
-        <p14:creationId xmlns:p14="http://schemas.microsoft.com/office/powerpoint/2010/main" val="809141698"/>
-      </p:ext>
-    </p:extLst>
-  </p:cSld>
-  <p:clrMapOvr>
-    <a:masterClrMapping/>
-  </p:clrMapOvr>
-</p:sld>
-</file>
-
-<file path=ppt/slides/slide34.xml><?xml version="1.0" encoding="utf-8"?>
-<p:sld xmlns:a="http://schemas.openxmlformats.org/drawingml/2006/main" xmlns:r="http://schemas.openxmlformats.org/officeDocument/2006/relationships" xmlns:p="http://schemas.openxmlformats.org/presentationml/2006/main">
-  <p:cSld>
-    <p:spTree>
-      <p:nvGrpSpPr>
-        <p:cNvPr id="1" name=""/>
-        <p:cNvGrpSpPr/>
-        <p:nvPr/>
-      </p:nvGrpSpPr>
-      <p:grpSpPr>
-        <a:xfrm>
-          <a:off x="0" y="0"/>
-          <a:ext cx="0" cy="0"/>
-          <a:chOff x="0" y="0"/>
-          <a:chExt cx="0" cy="0"/>
-        </a:xfrm>
-      </p:grpSpPr>
-      <p:sp>
-        <p:nvSpPr>
-          <p:cNvPr id="2" name="Title 1"/>
-          <p:cNvSpPr>
-            <a:spLocks noGrp="1"/>
-          </p:cNvSpPr>
-          <p:nvPr>
-            <p:ph type="title"/>
-          </p:nvPr>
-        </p:nvSpPr>
-        <p:spPr>
-          <a:xfrm>
-            <a:off x="838200" y="365125"/>
-            <a:ext cx="10515600" cy="1325563"/>
-          </a:xfrm>
-        </p:spPr>
-        <p:txBody>
-          <a:bodyPr/>
-          <a:lstStyle/>
-          <a:p>
-            <a:r>
-              <a:rPr lang="en-US" dirty="0">
-                <a:latin typeface="Arial" panose="020B0604020202020204" pitchFamily="34" charset="0"/>
-                <a:cs typeface="Arial" panose="020B0604020202020204" pitchFamily="34" charset="0"/>
-              </a:rPr>
               <a:t>/files</a:t>
             </a:r>
           </a:p>
@@ -8801,7 +7978,7 @@
         </p:nvSpPr>
         <p:spPr>
           <a:xfrm>
-            <a:off x="838200" y="0"/>
+            <a:off x="838200" y="365125"/>
             <a:ext cx="10515600" cy="1325563"/>
           </a:xfrm>
         </p:spPr>
@@ -8831,13 +8008,13 @@
         </p:nvSpPr>
         <p:spPr>
           <a:xfrm>
-            <a:off x="597877" y="1081454"/>
-            <a:ext cx="10755923" cy="5776546"/>
+            <a:off x="838200" y="1397978"/>
+            <a:ext cx="10515600" cy="5389684"/>
           </a:xfrm>
         </p:spPr>
         <p:txBody>
           <a:bodyPr>
-            <a:normAutofit fontScale="40000" lnSpcReduction="20000"/>
+            <a:normAutofit fontScale="47500" lnSpcReduction="20000"/>
           </a:bodyPr>
           <a:lstStyle/>
           <a:p>
@@ -8963,33 +8140,6 @@
                 <a:latin typeface="Arial" panose="020B0604020202020204" pitchFamily="34" charset="0"/>
                 <a:cs typeface="Arial" panose="020B0604020202020204" pitchFamily="34" charset="0"/>
               </a:rPr>
-              <a:t>bio: String(256)</a:t>
-            </a:r>
-          </a:p>
-          <a:p>
-            <a:r>
-              <a:rPr lang="nb-NO" dirty="0">
-                <a:latin typeface="Arial" panose="020B0604020202020204" pitchFamily="34" charset="0"/>
-                <a:cs typeface="Arial" panose="020B0604020202020204" pitchFamily="34" charset="0"/>
-              </a:rPr>
-              <a:t>planet_desc: String(256)</a:t>
-            </a:r>
-          </a:p>
-          <a:p>
-            <a:r>
-              <a:rPr lang="nb-NO" dirty="0">
-                <a:latin typeface="Arial" panose="020B0604020202020204" pitchFamily="34" charset="0"/>
-                <a:cs typeface="Arial" panose="020B0604020202020204" pitchFamily="34" charset="0"/>
-              </a:rPr>
-              <a:t>theme: String(128)</a:t>
-            </a:r>
-          </a:p>
-          <a:p>
-            <a:r>
-              <a:rPr lang="nb-NO" dirty="0">
-                <a:latin typeface="Arial" panose="020B0604020202020204" pitchFamily="34" charset="0"/>
-                <a:cs typeface="Arial" panose="020B0604020202020204" pitchFamily="34" charset="0"/>
-              </a:rPr>
               <a:t>planet: a one-to-one relationship between User and Planet, giving owner variable to Planet</a:t>
             </a:r>
           </a:p>
@@ -9000,15 +8150,6 @@
                 <a:cs typeface="Arial" panose="020B0604020202020204" pitchFamily="34" charset="0"/>
               </a:rPr>
               <a:t>planet_items: a one-to-many relationship between User and PlanetItems, giving owner variable to PlanetItem</a:t>
-            </a:r>
-          </a:p>
-          <a:p>
-            <a:r>
-              <a:rPr lang="nb-NO" dirty="0">
-                <a:latin typeface="Arial" panose="020B0604020202020204" pitchFamily="34" charset="0"/>
-                <a:cs typeface="Arial" panose="020B0604020202020204" pitchFamily="34" charset="0"/>
-              </a:rPr>
-              <a:t>aliens: a one-to-many relationship between User and Aliens, giving owner variable to Alien</a:t>
             </a:r>
           </a:p>
           <a:p>

</xml_diff>

<commit_message>
Fully updated and ironed out backend
</commit_message>
<xml_diff>
--- a/iu-spec-backend.pptx
+++ b/iu-spec-backend.pptx
@@ -288,7 +288,7 @@
           <a:p>
             <a:fld id="{CB54544B-930A-4C71-864D-1F69A4B5B49D}" type="datetimeFigureOut">
               <a:rPr lang="en-US" smtClean="0"/>
-              <a:t>8/6/2018</a:t>
+              <a:t>8/17/2018</a:t>
             </a:fld>
             <a:endParaRPr lang="en-US"/>
           </a:p>
@@ -486,7 +486,7 @@
           <a:p>
             <a:fld id="{CB54544B-930A-4C71-864D-1F69A4B5B49D}" type="datetimeFigureOut">
               <a:rPr lang="en-US" smtClean="0"/>
-              <a:t>8/6/2018</a:t>
+              <a:t>8/17/2018</a:t>
             </a:fld>
             <a:endParaRPr lang="en-US"/>
           </a:p>
@@ -694,7 +694,7 @@
           <a:p>
             <a:fld id="{CB54544B-930A-4C71-864D-1F69A4B5B49D}" type="datetimeFigureOut">
               <a:rPr lang="en-US" smtClean="0"/>
-              <a:t>8/6/2018</a:t>
+              <a:t>8/17/2018</a:t>
             </a:fld>
             <a:endParaRPr lang="en-US"/>
           </a:p>
@@ -892,7 +892,7 @@
           <a:p>
             <a:fld id="{CB54544B-930A-4C71-864D-1F69A4B5B49D}" type="datetimeFigureOut">
               <a:rPr lang="en-US" smtClean="0"/>
-              <a:t>8/6/2018</a:t>
+              <a:t>8/17/2018</a:t>
             </a:fld>
             <a:endParaRPr lang="en-US"/>
           </a:p>
@@ -1167,7 +1167,7 @@
           <a:p>
             <a:fld id="{CB54544B-930A-4C71-864D-1F69A4B5B49D}" type="datetimeFigureOut">
               <a:rPr lang="en-US" smtClean="0"/>
-              <a:t>8/6/2018</a:t>
+              <a:t>8/17/2018</a:t>
             </a:fld>
             <a:endParaRPr lang="en-US"/>
           </a:p>
@@ -1432,7 +1432,7 @@
           <a:p>
             <a:fld id="{CB54544B-930A-4C71-864D-1F69A4B5B49D}" type="datetimeFigureOut">
               <a:rPr lang="en-US" smtClean="0"/>
-              <a:t>8/6/2018</a:t>
+              <a:t>8/17/2018</a:t>
             </a:fld>
             <a:endParaRPr lang="en-US"/>
           </a:p>
@@ -1844,7 +1844,7 @@
           <a:p>
             <a:fld id="{CB54544B-930A-4C71-864D-1F69A4B5B49D}" type="datetimeFigureOut">
               <a:rPr lang="en-US" smtClean="0"/>
-              <a:t>8/6/2018</a:t>
+              <a:t>8/17/2018</a:t>
             </a:fld>
             <a:endParaRPr lang="en-US"/>
           </a:p>
@@ -1985,7 +1985,7 @@
           <a:p>
             <a:fld id="{CB54544B-930A-4C71-864D-1F69A4B5B49D}" type="datetimeFigureOut">
               <a:rPr lang="en-US" smtClean="0"/>
-              <a:t>8/6/2018</a:t>
+              <a:t>8/17/2018</a:t>
             </a:fld>
             <a:endParaRPr lang="en-US"/>
           </a:p>
@@ -2098,7 +2098,7 @@
           <a:p>
             <a:fld id="{CB54544B-930A-4C71-864D-1F69A4B5B49D}" type="datetimeFigureOut">
               <a:rPr lang="en-US" smtClean="0"/>
-              <a:t>8/6/2018</a:t>
+              <a:t>8/17/2018</a:t>
             </a:fld>
             <a:endParaRPr lang="en-US"/>
           </a:p>
@@ -2409,7 +2409,7 @@
           <a:p>
             <a:fld id="{CB54544B-930A-4C71-864D-1F69A4B5B49D}" type="datetimeFigureOut">
               <a:rPr lang="en-US" smtClean="0"/>
-              <a:t>8/6/2018</a:t>
+              <a:t>8/17/2018</a:t>
             </a:fld>
             <a:endParaRPr lang="en-US"/>
           </a:p>
@@ -2697,7 +2697,7 @@
           <a:p>
             <a:fld id="{CB54544B-930A-4C71-864D-1F69A4B5B49D}" type="datetimeFigureOut">
               <a:rPr lang="en-US" smtClean="0"/>
-              <a:t>8/6/2018</a:t>
+              <a:t>8/17/2018</a:t>
             </a:fld>
             <a:endParaRPr lang="en-US"/>
           </a:p>
@@ -2938,7 +2938,7 @@
           <a:p>
             <a:fld id="{CB54544B-930A-4C71-864D-1F69A4B5B49D}" type="datetimeFigureOut">
               <a:rPr lang="en-US" smtClean="0"/>
-              <a:t>8/6/2018</a:t>
+              <a:t>8/17/2018</a:t>
             </a:fld>
             <a:endParaRPr lang="en-US"/>
           </a:p>
@@ -3967,7 +3967,7 @@
                 <a:latin typeface="Arial" panose="020B0604020202020204" pitchFamily="34" charset="0"/>
                 <a:cs typeface="Arial" panose="020B0604020202020204" pitchFamily="34" charset="0"/>
               </a:rPr>
-              <a:t>image: String(128)</a:t>
+              <a:t>image: String(128) (should be the full URL)</a:t>
             </a:r>
           </a:p>
           <a:p>
@@ -4660,7 +4660,7 @@
                 <a:latin typeface="Arial" panose="020B0604020202020204" pitchFamily="34" charset="0"/>
                 <a:cs typeface="Arial" panose="020B0604020202020204" pitchFamily="34" charset="0"/>
               </a:rPr>
-              <a:t>GET method w/ params «user_id» and returns json of username, email, name, login_days, last_login, planet_id, chat_color, and alien</a:t>
+              <a:t>GET method w/ params «user_id» returns json of username, email, name, login_days, last_login, planet_id, chat_color, and alien</a:t>
             </a:r>
           </a:p>
           <a:p>
@@ -6489,7 +6489,7 @@
                 <a:latin typeface="Arial" panose="020B0604020202020204" pitchFamily="34" charset="0"/>
                 <a:cs typeface="Arial" panose="020B0604020202020204" pitchFamily="34" charset="0"/>
               </a:rPr>
-              <a:t>POST method with json «user_id» «catalog_id», «x» and «y» adds a new item to a user’s list of PlanetItems, returning the new «id» and «image»</a:t>
+              <a:t>POST method with json «user_id» «catalog_id», «x» and «y» adds a new item to a user’s list of PlanetItems, returning the new «id», «image», and «is_rocket»</a:t>
             </a:r>
           </a:p>
           <a:p>
@@ -7978,7 +7978,7 @@
         </p:nvSpPr>
         <p:spPr>
           <a:xfrm>
-            <a:off x="838200" y="365125"/>
+            <a:off x="838200" y="87922"/>
             <a:ext cx="10515600" cy="1325563"/>
           </a:xfrm>
         </p:spPr>
@@ -8008,13 +8008,13 @@
         </p:nvSpPr>
         <p:spPr>
           <a:xfrm>
-            <a:off x="838200" y="1397978"/>
-            <a:ext cx="10515600" cy="5389684"/>
+            <a:off x="838200" y="1248508"/>
+            <a:ext cx="10515600" cy="5539154"/>
           </a:xfrm>
         </p:spPr>
         <p:txBody>
           <a:bodyPr>
-            <a:normAutofit fontScale="47500" lnSpcReduction="20000"/>
+            <a:normAutofit fontScale="40000" lnSpcReduction="20000"/>
           </a:bodyPr>
           <a:lstStyle/>
           <a:p>
@@ -8133,6 +8133,37 @@
               </a:rPr>
               <a:t>rocket: String(128)</a:t>
             </a:r>
+          </a:p>
+          <a:p>
+            <a:r>
+              <a:rPr lang="nb-NO" dirty="0">
+                <a:latin typeface="Arial" panose="020B0604020202020204" pitchFamily="34" charset="0"/>
+                <a:cs typeface="Arial" panose="020B0604020202020204" pitchFamily="34" charset="0"/>
+              </a:rPr>
+              <a:t>bio: String(256)</a:t>
+            </a:r>
+          </a:p>
+          <a:p>
+            <a:r>
+              <a:rPr lang="nb-NO" dirty="0">
+                <a:latin typeface="Arial" panose="020B0604020202020204" pitchFamily="34" charset="0"/>
+                <a:cs typeface="Arial" panose="020B0604020202020204" pitchFamily="34" charset="0"/>
+              </a:rPr>
+              <a:t>planet_desc: String(256)</a:t>
+            </a:r>
+          </a:p>
+          <a:p>
+            <a:r>
+              <a:rPr lang="nb-NO">
+                <a:latin typeface="Arial" panose="020B0604020202020204" pitchFamily="34" charset="0"/>
+                <a:cs typeface="Arial" panose="020B0604020202020204" pitchFamily="34" charset="0"/>
+              </a:rPr>
+              <a:t>theme: String(128) NOTE: It was my intention to put theme and planet_desc as Planet variables, but flask-migrate prohibited me for some reason</a:t>
+            </a:r>
+            <a:endParaRPr lang="nb-NO" dirty="0">
+              <a:latin typeface="Arial" panose="020B0604020202020204" pitchFamily="34" charset="0"/>
+              <a:cs typeface="Arial" panose="020B0604020202020204" pitchFamily="34" charset="0"/>
+            </a:endParaRPr>
           </a:p>
           <a:p>
             <a:r>

</xml_diff>

<commit_message>
Added Projects, Updated Images
</commit_message>
<xml_diff>
--- a/iu-spec-backend.pptx
+++ b/iu-spec-backend.pptx
@@ -21,20 +21,22 @@
     <p:sldId id="286" r:id="rId15"/>
     <p:sldId id="285" r:id="rId16"/>
     <p:sldId id="269" r:id="rId17"/>
-    <p:sldId id="270" r:id="rId18"/>
-    <p:sldId id="271" r:id="rId19"/>
-    <p:sldId id="277" r:id="rId20"/>
-    <p:sldId id="279" r:id="rId21"/>
-    <p:sldId id="272" r:id="rId22"/>
-    <p:sldId id="273" r:id="rId23"/>
-    <p:sldId id="274" r:id="rId24"/>
-    <p:sldId id="275" r:id="rId25"/>
-    <p:sldId id="276" r:id="rId26"/>
-    <p:sldId id="287" r:id="rId27"/>
-    <p:sldId id="278" r:id="rId28"/>
-    <p:sldId id="281" r:id="rId29"/>
-    <p:sldId id="280" r:id="rId30"/>
-    <p:sldId id="284" r:id="rId31"/>
+    <p:sldId id="288" r:id="rId18"/>
+    <p:sldId id="270" r:id="rId19"/>
+    <p:sldId id="271" r:id="rId20"/>
+    <p:sldId id="277" r:id="rId21"/>
+    <p:sldId id="279" r:id="rId22"/>
+    <p:sldId id="272" r:id="rId23"/>
+    <p:sldId id="273" r:id="rId24"/>
+    <p:sldId id="274" r:id="rId25"/>
+    <p:sldId id="275" r:id="rId26"/>
+    <p:sldId id="276" r:id="rId27"/>
+    <p:sldId id="289" r:id="rId28"/>
+    <p:sldId id="287" r:id="rId29"/>
+    <p:sldId id="278" r:id="rId30"/>
+    <p:sldId id="281" r:id="rId31"/>
+    <p:sldId id="280" r:id="rId32"/>
+    <p:sldId id="284" r:id="rId33"/>
   </p:sldIdLst>
   <p:sldSz cx="12192000" cy="6858000"/>
   <p:notesSz cx="6858000" cy="9144000"/>
@@ -288,7 +290,7 @@
           <a:p>
             <a:fld id="{CB54544B-930A-4C71-864D-1F69A4B5B49D}" type="datetimeFigureOut">
               <a:rPr lang="en-US" smtClean="0"/>
-              <a:t>8/17/2018</a:t>
+              <a:t>8/20/2018</a:t>
             </a:fld>
             <a:endParaRPr lang="en-US"/>
           </a:p>
@@ -486,7 +488,7 @@
           <a:p>
             <a:fld id="{CB54544B-930A-4C71-864D-1F69A4B5B49D}" type="datetimeFigureOut">
               <a:rPr lang="en-US" smtClean="0"/>
-              <a:t>8/17/2018</a:t>
+              <a:t>8/20/2018</a:t>
             </a:fld>
             <a:endParaRPr lang="en-US"/>
           </a:p>
@@ -694,7 +696,7 @@
           <a:p>
             <a:fld id="{CB54544B-930A-4C71-864D-1F69A4B5B49D}" type="datetimeFigureOut">
               <a:rPr lang="en-US" smtClean="0"/>
-              <a:t>8/17/2018</a:t>
+              <a:t>8/20/2018</a:t>
             </a:fld>
             <a:endParaRPr lang="en-US"/>
           </a:p>
@@ -892,7 +894,7 @@
           <a:p>
             <a:fld id="{CB54544B-930A-4C71-864D-1F69A4B5B49D}" type="datetimeFigureOut">
               <a:rPr lang="en-US" smtClean="0"/>
-              <a:t>8/17/2018</a:t>
+              <a:t>8/20/2018</a:t>
             </a:fld>
             <a:endParaRPr lang="en-US"/>
           </a:p>
@@ -1167,7 +1169,7 @@
           <a:p>
             <a:fld id="{CB54544B-930A-4C71-864D-1F69A4B5B49D}" type="datetimeFigureOut">
               <a:rPr lang="en-US" smtClean="0"/>
-              <a:t>8/17/2018</a:t>
+              <a:t>8/20/2018</a:t>
             </a:fld>
             <a:endParaRPr lang="en-US"/>
           </a:p>
@@ -1432,7 +1434,7 @@
           <a:p>
             <a:fld id="{CB54544B-930A-4C71-864D-1F69A4B5B49D}" type="datetimeFigureOut">
               <a:rPr lang="en-US" smtClean="0"/>
-              <a:t>8/17/2018</a:t>
+              <a:t>8/20/2018</a:t>
             </a:fld>
             <a:endParaRPr lang="en-US"/>
           </a:p>
@@ -1844,7 +1846,7 @@
           <a:p>
             <a:fld id="{CB54544B-930A-4C71-864D-1F69A4B5B49D}" type="datetimeFigureOut">
               <a:rPr lang="en-US" smtClean="0"/>
-              <a:t>8/17/2018</a:t>
+              <a:t>8/20/2018</a:t>
             </a:fld>
             <a:endParaRPr lang="en-US"/>
           </a:p>
@@ -1985,7 +1987,7 @@
           <a:p>
             <a:fld id="{CB54544B-930A-4C71-864D-1F69A4B5B49D}" type="datetimeFigureOut">
               <a:rPr lang="en-US" smtClean="0"/>
-              <a:t>8/17/2018</a:t>
+              <a:t>8/20/2018</a:t>
             </a:fld>
             <a:endParaRPr lang="en-US"/>
           </a:p>
@@ -2098,7 +2100,7 @@
           <a:p>
             <a:fld id="{CB54544B-930A-4C71-864D-1F69A4B5B49D}" type="datetimeFigureOut">
               <a:rPr lang="en-US" smtClean="0"/>
-              <a:t>8/17/2018</a:t>
+              <a:t>8/20/2018</a:t>
             </a:fld>
             <a:endParaRPr lang="en-US"/>
           </a:p>
@@ -2409,7 +2411,7 @@
           <a:p>
             <a:fld id="{CB54544B-930A-4C71-864D-1F69A4B5B49D}" type="datetimeFigureOut">
               <a:rPr lang="en-US" smtClean="0"/>
-              <a:t>8/17/2018</a:t>
+              <a:t>8/20/2018</a:t>
             </a:fld>
             <a:endParaRPr lang="en-US"/>
           </a:p>
@@ -2697,7 +2699,7 @@
           <a:p>
             <a:fld id="{CB54544B-930A-4C71-864D-1F69A4B5B49D}" type="datetimeFigureOut">
               <a:rPr lang="en-US" smtClean="0"/>
-              <a:t>8/17/2018</a:t>
+              <a:t>8/20/2018</a:t>
             </a:fld>
             <a:endParaRPr lang="en-US"/>
           </a:p>
@@ -2938,7 +2940,7 @@
           <a:p>
             <a:fld id="{CB54544B-930A-4C71-864D-1F69A4B5B49D}" type="datetimeFigureOut">
               <a:rPr lang="en-US" smtClean="0"/>
-              <a:t>8/17/2018</a:t>
+              <a:t>8/20/2018</a:t>
             </a:fld>
             <a:endParaRPr lang="en-US"/>
           </a:p>
@@ -4388,7 +4390,7 @@
         </p:nvSpPr>
         <p:spPr>
           <a:xfrm>
-            <a:off x="900087" y="1734160"/>
+            <a:off x="838200" y="365125"/>
             <a:ext cx="10515600" cy="1325563"/>
           </a:xfrm>
         </p:spPr>
@@ -4396,30 +4398,19 @@
           <a:bodyPr/>
           <a:lstStyle/>
           <a:p>
-            <a:pPr algn="ctr"/>
-            <a:r>
-              <a:rPr lang="en-US" sz="8000" dirty="0">
-                <a:latin typeface="Arial" panose="020B0604020202020204" pitchFamily="34" charset="0"/>
-                <a:cs typeface="Arial" panose="020B0604020202020204" pitchFamily="34" charset="0"/>
-              </a:rPr>
-              <a:t>HTTP Methods</a:t>
-            </a:r>
-            <a:endParaRPr lang="en-US" dirty="0">
-              <a:latin typeface="Arial" panose="020B0604020202020204" pitchFamily="34" charset="0"/>
-              <a:cs typeface="Arial" panose="020B0604020202020204" pitchFamily="34" charset="0"/>
-            </a:endParaRPr>
-          </a:p>
-        </p:txBody>
-      </p:sp>
-      <p:sp>
-        <p:nvSpPr>
-          <p:cNvPr id="3" name="Content Placeholder 2">
-            <a:extLst>
-              <a:ext uri="{FF2B5EF4-FFF2-40B4-BE49-F238E27FC236}">
-                <a16:creationId xmlns:a16="http://schemas.microsoft.com/office/drawing/2014/main" id="{BE3FB728-F36C-4A19-84C0-7B717486095B}"/>
-              </a:ext>
-            </a:extLst>
-          </p:cNvPr>
+            <a:r>
+              <a:rPr lang="en-US" dirty="0">
+                <a:latin typeface="Arial" panose="020B0604020202020204" pitchFamily="34" charset="0"/>
+                <a:cs typeface="Arial" panose="020B0604020202020204" pitchFamily="34" charset="0"/>
+              </a:rPr>
+              <a:t>Project</a:t>
+            </a:r>
+          </a:p>
+        </p:txBody>
+      </p:sp>
+      <p:sp>
+        <p:nvSpPr>
+          <p:cNvPr id="3" name="Content Placeholder 2"/>
           <p:cNvSpPr>
             <a:spLocks noGrp="1"/>
           </p:cNvSpPr>
@@ -4427,42 +4418,46 @@
             <p:ph idx="1"/>
           </p:nvPr>
         </p:nvSpPr>
-        <p:spPr>
-          <a:xfrm>
-            <a:off x="838200" y="3798277"/>
-            <a:ext cx="10515600" cy="2378686"/>
-          </a:xfrm>
-        </p:spPr>
+        <p:spPr/>
         <p:txBody>
           <a:bodyPr>
             <a:normAutofit/>
           </a:bodyPr>
           <a:lstStyle/>
           <a:p>
-            <a:pPr marL="0" indent="0" algn="ctr">
-              <a:buNone/>
-            </a:pPr>
-            <a:r>
-              <a:rPr lang="nb-NO" dirty="0">
-                <a:latin typeface="Arial" panose="020B0604020202020204" pitchFamily="34" charset="0"/>
-                <a:cs typeface="Arial" panose="020B0604020202020204" pitchFamily="34" charset="0"/>
-              </a:rPr>
-              <a:t>Small note: if an HTTP method requires JSON data to be passed in, a request should have a Content-Type: application/json header. See </a:t>
-            </a:r>
-            <a:r>
-              <a:rPr lang="nb-NO" dirty="0">
-                <a:latin typeface="Arial" panose="020B0604020202020204" pitchFamily="34" charset="0"/>
-                <a:cs typeface="Arial" panose="020B0604020202020204" pitchFamily="34" charset="0"/>
-                <a:hlinkClick r:id="rId2"/>
-              </a:rPr>
-              <a:t>https://stackoverflow.com/questions/44959749/fetch-with-headers</a:t>
-            </a:r>
-            <a:r>
-              <a:rPr lang="nb-NO" dirty="0">
-                <a:latin typeface="Arial" panose="020B0604020202020204" pitchFamily="34" charset="0"/>
-                <a:cs typeface="Arial" panose="020B0604020202020204" pitchFamily="34" charset="0"/>
-              </a:rPr>
-              <a:t> for an example.</a:t>
+            <a:r>
+              <a:rPr lang="nb-NO" dirty="0">
+                <a:latin typeface="Arial" panose="020B0604020202020204" pitchFamily="34" charset="0"/>
+                <a:cs typeface="Arial" panose="020B0604020202020204" pitchFamily="34" charset="0"/>
+              </a:rPr>
+              <a:t>owner_id: links to User from User-Project relation</a:t>
+            </a:r>
+          </a:p>
+          <a:p>
+            <a:r>
+              <a:rPr lang="nb-NO" dirty="0">
+                <a:latin typeface="Arial" panose="020B0604020202020204" pitchFamily="34" charset="0"/>
+                <a:cs typeface="Arial" panose="020B0604020202020204" pitchFamily="34" charset="0"/>
+              </a:rPr>
+              <a:t>name: String(32)</a:t>
+            </a:r>
+          </a:p>
+          <a:p>
+            <a:r>
+              <a:rPr lang="nb-NO" dirty="0">
+                <a:latin typeface="Arial" panose="020B0604020202020204" pitchFamily="34" charset="0"/>
+                <a:cs typeface="Arial" panose="020B0604020202020204" pitchFamily="34" charset="0"/>
+              </a:rPr>
+              <a:t>desc: String(128)</a:t>
+            </a:r>
+          </a:p>
+          <a:p>
+            <a:r>
+              <a:rPr lang="nb-NO" dirty="0">
+                <a:latin typeface="Arial" panose="020B0604020202020204" pitchFamily="34" charset="0"/>
+                <a:cs typeface="Arial" panose="020B0604020202020204" pitchFamily="34" charset="0"/>
+              </a:rPr>
+              <a:t>file: String(128)</a:t>
             </a:r>
           </a:p>
         </p:txBody>
@@ -4470,7 +4465,7 @@
     </p:spTree>
     <p:extLst>
       <p:ext uri="{BB962C8B-B14F-4D97-AF65-F5344CB8AC3E}">
-        <p14:creationId xmlns:p14="http://schemas.microsoft.com/office/powerpoint/2010/main" val="4062299613"/>
+        <p14:creationId xmlns:p14="http://schemas.microsoft.com/office/powerpoint/2010/main" val="637115189"/>
       </p:ext>
     </p:extLst>
   </p:cSld>
@@ -4509,7 +4504,7 @@
         </p:nvSpPr>
         <p:spPr>
           <a:xfrm>
-            <a:off x="838200" y="365125"/>
+            <a:off x="900087" y="1734160"/>
             <a:ext cx="10515600" cy="1325563"/>
           </a:xfrm>
         </p:spPr>
@@ -4517,19 +4512,30 @@
           <a:bodyPr/>
           <a:lstStyle/>
           <a:p>
-            <a:r>
-              <a:rPr lang="en-US" dirty="0">
-                <a:latin typeface="Arial" panose="020B0604020202020204" pitchFamily="34" charset="0"/>
-                <a:cs typeface="Arial" panose="020B0604020202020204" pitchFamily="34" charset="0"/>
-              </a:rPr>
-              <a:t>/login</a:t>
-            </a:r>
-          </a:p>
-        </p:txBody>
-      </p:sp>
-      <p:sp>
-        <p:nvSpPr>
-          <p:cNvPr id="3" name="Content Placeholder 2"/>
+            <a:pPr algn="ctr"/>
+            <a:r>
+              <a:rPr lang="en-US" sz="8000" dirty="0">
+                <a:latin typeface="Arial" panose="020B0604020202020204" pitchFamily="34" charset="0"/>
+                <a:cs typeface="Arial" panose="020B0604020202020204" pitchFamily="34" charset="0"/>
+              </a:rPr>
+              <a:t>HTTP Methods</a:t>
+            </a:r>
+            <a:endParaRPr lang="en-US" dirty="0">
+              <a:latin typeface="Arial" panose="020B0604020202020204" pitchFamily="34" charset="0"/>
+              <a:cs typeface="Arial" panose="020B0604020202020204" pitchFamily="34" charset="0"/>
+            </a:endParaRPr>
+          </a:p>
+        </p:txBody>
+      </p:sp>
+      <p:sp>
+        <p:nvSpPr>
+          <p:cNvPr id="3" name="Content Placeholder 2">
+            <a:extLst>
+              <a:ext uri="{FF2B5EF4-FFF2-40B4-BE49-F238E27FC236}">
+                <a16:creationId xmlns:a16="http://schemas.microsoft.com/office/drawing/2014/main" id="{BE3FB728-F36C-4A19-84C0-7B717486095B}"/>
+              </a:ext>
+            </a:extLst>
+          </p:cNvPr>
           <p:cNvSpPr>
             <a:spLocks noGrp="1"/>
           </p:cNvSpPr>
@@ -4537,51 +4543,50 @@
             <p:ph idx="1"/>
           </p:nvPr>
         </p:nvSpPr>
-        <p:spPr/>
+        <p:spPr>
+          <a:xfrm>
+            <a:off x="838200" y="3798277"/>
+            <a:ext cx="10515600" cy="2378686"/>
+          </a:xfrm>
+        </p:spPr>
         <p:txBody>
           <a:bodyPr>
             <a:normAutofit/>
           </a:bodyPr>
           <a:lstStyle/>
           <a:p>
-            <a:r>
-              <a:rPr lang="nb-NO" dirty="0">
-                <a:latin typeface="Arial" panose="020B0604020202020204" pitchFamily="34" charset="0"/>
-                <a:cs typeface="Arial" panose="020B0604020202020204" pitchFamily="34" charset="0"/>
-              </a:rPr>
-              <a:t>POST json w/ "username", "password_hash", "email" to users and the user will be added to the database, returns json with «status»: «ok» or «error», and «user_id» if successful</a:t>
-            </a:r>
-          </a:p>
-          <a:p>
-            <a:r>
-              <a:rPr lang="nb-NO" dirty="0">
-                <a:latin typeface="Arial" panose="020B0604020202020204" pitchFamily="34" charset="0"/>
-                <a:cs typeface="Arial" panose="020B0604020202020204" pitchFamily="34" charset="0"/>
-              </a:rPr>
-              <a:t>GET method w/ params «username» and «password_hash» will return «status»: «ok» or «error» based on whether or not the login attempt was successful, and «user_id» if successful</a:t>
-            </a:r>
-          </a:p>
-          <a:p>
-            <a:r>
-              <a:rPr lang="nb-NO" dirty="0">
-                <a:latin typeface="Arial" panose="020B0604020202020204" pitchFamily="34" charset="0"/>
-                <a:cs typeface="Arial" panose="020B0604020202020204" pitchFamily="34" charset="0"/>
-              </a:rPr>
-              <a:t>DELETE method w/ params «username» will logout the current user, returning «status»: «ok» or «error»</a:t>
-            </a:r>
-          </a:p>
-          <a:p>
-            <a:endParaRPr lang="nb-NO" dirty="0">
-              <a:latin typeface="Arial" panose="020B0604020202020204" pitchFamily="34" charset="0"/>
-              <a:cs typeface="Arial" panose="020B0604020202020204" pitchFamily="34" charset="0"/>
-            </a:endParaRPr>
+            <a:pPr marL="0" indent="0" algn="ctr">
+              <a:buNone/>
+            </a:pPr>
+            <a:r>
+              <a:rPr lang="nb-NO" dirty="0">
+                <a:latin typeface="Arial" panose="020B0604020202020204" pitchFamily="34" charset="0"/>
+                <a:cs typeface="Arial" panose="020B0604020202020204" pitchFamily="34" charset="0"/>
+              </a:rPr>
+              <a:t>Small note: if an HTTP method requires JSON data to be passed in, a request should have a Content-Type: application/json header. See </a:t>
+            </a:r>
+            <a:r>
+              <a:rPr lang="nb-NO" dirty="0">
+                <a:latin typeface="Arial" panose="020B0604020202020204" pitchFamily="34" charset="0"/>
+                <a:cs typeface="Arial" panose="020B0604020202020204" pitchFamily="34" charset="0"/>
+                <a:hlinkClick r:id="rId2"/>
+              </a:rPr>
+              <a:t>https://stackoverflow.com/questions/44959749/fetch-with-headers</a:t>
+            </a:r>
+            <a:r>
+              <a:rPr lang="nb-NO" dirty="0">
+                <a:latin typeface="Arial" panose="020B0604020202020204" pitchFamily="34" charset="0"/>
+                <a:cs typeface="Arial" panose="020B0604020202020204" pitchFamily="34" charset="0"/>
+              </a:rPr>
+              <a:t> for an example.</a:t>
+            </a:r>
           </a:p>
         </p:txBody>
       </p:sp>
     </p:spTree>
     <p:extLst>
       <p:ext uri="{BB962C8B-B14F-4D97-AF65-F5344CB8AC3E}">
-        <p14:creationId xmlns:p14="http://schemas.microsoft.com/office/powerpoint/2010/main" val="199329726"/>
+        <p14:creationId xmlns:p14="http://schemas.microsoft.com/office/powerpoint/2010/main" val="4062299613"/>
       </p:ext>
     </p:extLst>
   </p:cSld>
@@ -4633,7 +4638,7 @@
                 <a:latin typeface="Arial" panose="020B0604020202020204" pitchFamily="34" charset="0"/>
                 <a:cs typeface="Arial" panose="020B0604020202020204" pitchFamily="34" charset="0"/>
               </a:rPr>
-              <a:t>/users</a:t>
+              <a:t>/login</a:t>
             </a:r>
           </a:p>
         </p:txBody>
@@ -4660,25 +4665,25 @@
                 <a:latin typeface="Arial" panose="020B0604020202020204" pitchFamily="34" charset="0"/>
                 <a:cs typeface="Arial" panose="020B0604020202020204" pitchFamily="34" charset="0"/>
               </a:rPr>
-              <a:t>GET method w/ params «user_id» returns json of username, email, name, login_days, last_login, planet_id, chat_color, and alien</a:t>
-            </a:r>
-          </a:p>
-          <a:p>
-            <a:r>
-              <a:rPr lang="nb-NO" dirty="0">
-                <a:latin typeface="Arial" panose="020B0604020202020204" pitchFamily="34" charset="0"/>
-                <a:cs typeface="Arial" panose="020B0604020202020204" pitchFamily="34" charset="0"/>
-              </a:rPr>
-              <a:t>PATCH method w/ params «user_id» and nothing else will update last_login, and if the new last_login is on a different day, increases login_days by 1 and returns json with «new_day»: true, otherwise returns «new_day»: false, and regardless also returns login_days</a:t>
-            </a:r>
-          </a:p>
-          <a:p>
-            <a:r>
-              <a:rPr lang="nb-NO" dirty="0">
-                <a:latin typeface="Arial" panose="020B0604020202020204" pitchFamily="34" charset="0"/>
-                <a:cs typeface="Arial" panose="020B0604020202020204" pitchFamily="34" charset="0"/>
-              </a:rPr>
-              <a:t>PATCH method w/ params «user_id» and «chat_color» or «alien» or «rocket» will update that value</a:t>
+              <a:t>POST json w/ "username", "password_hash", "email" to users and the user will be added to the database, returns json with «status»: «ok» or «error», and «user_id» if successful</a:t>
+            </a:r>
+          </a:p>
+          <a:p>
+            <a:r>
+              <a:rPr lang="nb-NO" dirty="0">
+                <a:latin typeface="Arial" panose="020B0604020202020204" pitchFamily="34" charset="0"/>
+                <a:cs typeface="Arial" panose="020B0604020202020204" pitchFamily="34" charset="0"/>
+              </a:rPr>
+              <a:t>GET method w/ params «username» and «password_hash» will return «status»: «ok» or «error» based on whether or not the login attempt was successful, and «user_id» if successful</a:t>
+            </a:r>
+          </a:p>
+          <a:p>
+            <a:r>
+              <a:rPr lang="nb-NO" dirty="0">
+                <a:latin typeface="Arial" panose="020B0604020202020204" pitchFamily="34" charset="0"/>
+                <a:cs typeface="Arial" panose="020B0604020202020204" pitchFamily="34" charset="0"/>
+              </a:rPr>
+              <a:t>DELETE method w/ params «username» will logout the current user, returning «status»: «ok» or «error»</a:t>
             </a:r>
           </a:p>
           <a:p>
@@ -4687,18 +4692,12 @@
               <a:cs typeface="Arial" panose="020B0604020202020204" pitchFamily="34" charset="0"/>
             </a:endParaRPr>
           </a:p>
-          <a:p>
-            <a:endParaRPr lang="nb-NO" dirty="0">
-              <a:latin typeface="Arial" panose="020B0604020202020204" pitchFamily="34" charset="0"/>
-              <a:cs typeface="Arial" panose="020B0604020202020204" pitchFamily="34" charset="0"/>
-            </a:endParaRPr>
-          </a:p>
         </p:txBody>
       </p:sp>
     </p:spTree>
     <p:extLst>
       <p:ext uri="{BB962C8B-B14F-4D97-AF65-F5344CB8AC3E}">
-        <p14:creationId xmlns:p14="http://schemas.microsoft.com/office/powerpoint/2010/main" val="696820992"/>
+        <p14:creationId xmlns:p14="http://schemas.microsoft.com/office/powerpoint/2010/main" val="199329726"/>
       </p:ext>
     </p:extLst>
   </p:cSld>
@@ -5021,7 +5020,7 @@
                 <a:latin typeface="Arial" panose="020B0604020202020204" pitchFamily="34" charset="0"/>
                 <a:cs typeface="Arial" panose="020B0604020202020204" pitchFamily="34" charset="0"/>
               </a:rPr>
-              <a:t>/visitors</a:t>
+              <a:t>/users</a:t>
             </a:r>
           </a:p>
         </p:txBody>
@@ -5039,7 +5038,7 @@
         <p:spPr/>
         <p:txBody>
           <a:bodyPr>
-            <a:normAutofit fontScale="55000" lnSpcReduction="20000"/>
+            <a:normAutofit lnSpcReduction="10000"/>
           </a:bodyPr>
           <a:lstStyle/>
           <a:p>
@@ -5048,174 +5047,45 @@
                 <a:latin typeface="Arial" panose="020B0604020202020204" pitchFamily="34" charset="0"/>
                 <a:cs typeface="Arial" panose="020B0604020202020204" pitchFamily="34" charset="0"/>
               </a:rPr>
-              <a:t>POST method w/ params «visitor_id» and «visited_id» adds a relationship between the Users</a:t>
-            </a:r>
-          </a:p>
-          <a:p>
-            <a:r>
-              <a:rPr lang="nb-NO" dirty="0">
-                <a:latin typeface="Arial" panose="020B0604020202020204" pitchFamily="34" charset="0"/>
-                <a:cs typeface="Arial" panose="020B0604020202020204" pitchFamily="34" charset="0"/>
-              </a:rPr>
-              <a:t>GET method w/ params «user_id» returns json that contains each user_id they’ve visited</a:t>
-            </a:r>
-          </a:p>
-          <a:p>
-            <a:r>
-              <a:rPr lang="nb-NO" dirty="0">
-                <a:latin typeface="Arial" panose="020B0604020202020204" pitchFamily="34" charset="0"/>
-                <a:cs typeface="Arial" panose="020B0604020202020204" pitchFamily="34" charset="0"/>
-              </a:rPr>
-              <a:t>DELETE method w/ params «user_id» takes note that that user has updated their planet, and removes all relationships where visited is the user</a:t>
-            </a:r>
-          </a:p>
-          <a:p>
-            <a:pPr marL="0" indent="0">
-              <a:buNone/>
-            </a:pPr>
-            <a:r>
-              <a:rPr lang="nb-NO" dirty="0">
-                <a:latin typeface="Arial" panose="020B0604020202020204" pitchFamily="34" charset="0"/>
-                <a:cs typeface="Arial" panose="020B0604020202020204" pitchFamily="34" charset="0"/>
-              </a:rPr>
-              <a:t>{</a:t>
-            </a:r>
-          </a:p>
-          <a:p>
-            <a:pPr marL="0" indent="0">
-              <a:buNone/>
-            </a:pPr>
-            <a:r>
-              <a:rPr lang="nb-NO" dirty="0">
-                <a:latin typeface="Arial" panose="020B0604020202020204" pitchFamily="34" charset="0"/>
-                <a:cs typeface="Arial" panose="020B0604020202020204" pitchFamily="34" charset="0"/>
-              </a:rPr>
-              <a:t>«results»:</a:t>
-            </a:r>
-          </a:p>
-          <a:p>
-            <a:pPr marL="0" indent="0">
-              <a:buNone/>
-            </a:pPr>
-            <a:r>
-              <a:rPr lang="nb-NO" dirty="0">
-                <a:latin typeface="Arial" panose="020B0604020202020204" pitchFamily="34" charset="0"/>
-                <a:cs typeface="Arial" panose="020B0604020202020204" pitchFamily="34" charset="0"/>
-              </a:rPr>
-              <a:t>	[</a:t>
-            </a:r>
-          </a:p>
-          <a:p>
-            <a:pPr marL="0" indent="0">
-              <a:buNone/>
-            </a:pPr>
-            <a:r>
-              <a:rPr lang="nb-NO" dirty="0">
-                <a:latin typeface="Arial" panose="020B0604020202020204" pitchFamily="34" charset="0"/>
-                <a:cs typeface="Arial" panose="020B0604020202020204" pitchFamily="34" charset="0"/>
-              </a:rPr>
-              <a:t>		{</a:t>
-            </a:r>
-          </a:p>
-          <a:p>
-            <a:pPr marL="0" indent="0">
-              <a:buNone/>
-            </a:pPr>
-            <a:r>
-              <a:rPr lang="nb-NO" dirty="0">
-                <a:latin typeface="Arial" panose="020B0604020202020204" pitchFamily="34" charset="0"/>
-                <a:cs typeface="Arial" panose="020B0604020202020204" pitchFamily="34" charset="0"/>
-              </a:rPr>
-              <a:t>			«id»: 9</a:t>
-            </a:r>
-          </a:p>
-          <a:p>
-            <a:pPr marL="0" indent="0">
-              <a:buNone/>
-            </a:pPr>
-            <a:r>
-              <a:rPr lang="nb-NO" dirty="0">
-                <a:latin typeface="Arial" panose="020B0604020202020204" pitchFamily="34" charset="0"/>
-                <a:cs typeface="Arial" panose="020B0604020202020204" pitchFamily="34" charset="0"/>
-              </a:rPr>
-              <a:t>		},</a:t>
-            </a:r>
-          </a:p>
-          <a:p>
-            <a:pPr marL="0" indent="0">
-              <a:buNone/>
-            </a:pPr>
-            <a:r>
-              <a:rPr lang="nb-NO" dirty="0">
-                <a:latin typeface="Arial" panose="020B0604020202020204" pitchFamily="34" charset="0"/>
-                <a:cs typeface="Arial" panose="020B0604020202020204" pitchFamily="34" charset="0"/>
-              </a:rPr>
-              <a:t>		{</a:t>
-            </a:r>
-          </a:p>
-          <a:p>
-            <a:pPr marL="0" indent="0">
-              <a:buNone/>
-            </a:pPr>
-            <a:r>
-              <a:rPr lang="nb-NO" dirty="0">
-                <a:latin typeface="Arial" panose="020B0604020202020204" pitchFamily="34" charset="0"/>
-                <a:cs typeface="Arial" panose="020B0604020202020204" pitchFamily="34" charset="0"/>
-              </a:rPr>
-              <a:t>			«id»: 10</a:t>
-            </a:r>
-          </a:p>
-          <a:p>
-            <a:pPr marL="0" indent="0">
-              <a:buNone/>
-            </a:pPr>
-            <a:r>
-              <a:rPr lang="nb-NO" dirty="0">
-                <a:latin typeface="Arial" panose="020B0604020202020204" pitchFamily="34" charset="0"/>
-                <a:cs typeface="Arial" panose="020B0604020202020204" pitchFamily="34" charset="0"/>
-              </a:rPr>
-              <a:t>		}</a:t>
-            </a:r>
-          </a:p>
-          <a:p>
-            <a:pPr marL="0" indent="0">
-              <a:buNone/>
-            </a:pPr>
-            <a:r>
-              <a:rPr lang="nb-NO" dirty="0">
-                <a:latin typeface="Arial" panose="020B0604020202020204" pitchFamily="34" charset="0"/>
-                <a:cs typeface="Arial" panose="020B0604020202020204" pitchFamily="34" charset="0"/>
-              </a:rPr>
-              <a:t>	]</a:t>
-            </a:r>
-          </a:p>
-          <a:p>
-            <a:pPr marL="0" indent="0">
-              <a:buNone/>
-            </a:pPr>
-            <a:r>
-              <a:rPr lang="nb-NO" dirty="0">
-                <a:latin typeface="Arial" panose="020B0604020202020204" pitchFamily="34" charset="0"/>
-                <a:cs typeface="Arial" panose="020B0604020202020204" pitchFamily="34" charset="0"/>
-              </a:rPr>
-              <a:t>}</a:t>
-            </a:r>
-          </a:p>
-          <a:p>
-            <a:pPr marL="0" indent="0">
-              <a:buNone/>
-            </a:pPr>
+              <a:t>GET method w/ params «user_id» returns json of username, email, name, login_days, last_login, planet_id, chat_color, alien, rocket, bio, planet_desc, theme</a:t>
+            </a:r>
+          </a:p>
+          <a:p>
+            <a:r>
+              <a:rPr lang="nb-NO" dirty="0">
+                <a:latin typeface="Arial" panose="020B0604020202020204" pitchFamily="34" charset="0"/>
+                <a:cs typeface="Arial" panose="020B0604020202020204" pitchFamily="34" charset="0"/>
+              </a:rPr>
+              <a:t>PATCH method w/ params «user_id» and nothing else will update last_login, and if the new last_login is on a different day, increases login_days by 1 and returns json with «new_day»: true, otherwise returns «new_day»: false, and regardless also returns login_days</a:t>
+            </a:r>
+          </a:p>
+          <a:p>
+            <a:r>
+              <a:rPr lang="nb-NO" dirty="0">
+                <a:latin typeface="Arial" panose="020B0604020202020204" pitchFamily="34" charset="0"/>
+                <a:cs typeface="Arial" panose="020B0604020202020204" pitchFamily="34" charset="0"/>
+              </a:rPr>
+              <a:t>PATCH method w/ params «user_id» and «chat_color» or «alien» or «rocket» or «bio» or «planet_desc» or «theme» will update that value</a:t>
+            </a:r>
+          </a:p>
+          <a:p>
             <a:endParaRPr lang="nb-NO" dirty="0">
               <a:latin typeface="Arial" panose="020B0604020202020204" pitchFamily="34" charset="0"/>
               <a:cs typeface="Arial" panose="020B0604020202020204" pitchFamily="34" charset="0"/>
             </a:endParaRPr>
           </a:p>
+          <a:p>
+            <a:endParaRPr lang="nb-NO" dirty="0">
+              <a:latin typeface="Arial" panose="020B0604020202020204" pitchFamily="34" charset="0"/>
+              <a:cs typeface="Arial" panose="020B0604020202020204" pitchFamily="34" charset="0"/>
+            </a:endParaRPr>
+          </a:p>
         </p:txBody>
       </p:sp>
     </p:spTree>
     <p:extLst>
       <p:ext uri="{BB962C8B-B14F-4D97-AF65-F5344CB8AC3E}">
-        <p14:creationId xmlns:p14="http://schemas.microsoft.com/office/powerpoint/2010/main" val="1092747602"/>
+        <p14:creationId xmlns:p14="http://schemas.microsoft.com/office/powerpoint/2010/main" val="696820992"/>
       </p:ext>
     </p:extLst>
   </p:cSld>
@@ -5267,7 +5137,7 @@
                 <a:latin typeface="Arial" panose="020B0604020202020204" pitchFamily="34" charset="0"/>
                 <a:cs typeface="Arial" panose="020B0604020202020204" pitchFamily="34" charset="0"/>
               </a:rPr>
-              <a:t>/galaxies</a:t>
+              <a:t>/visitors</a:t>
             </a:r>
           </a:p>
         </p:txBody>
@@ -5294,7 +5164,25 @@
                 <a:latin typeface="Arial" panose="020B0604020202020204" pitchFamily="34" charset="0"/>
                 <a:cs typeface="Arial" panose="020B0604020202020204" pitchFamily="34" charset="0"/>
               </a:rPr>
-              <a:t>GET method will return json that contains each Galaxy and its variables, for example:</a:t>
+              <a:t>POST method w/ params «visitor_id» and «visited_id» adds a relationship between the Users</a:t>
+            </a:r>
+          </a:p>
+          <a:p>
+            <a:r>
+              <a:rPr lang="nb-NO" dirty="0">
+                <a:latin typeface="Arial" panose="020B0604020202020204" pitchFamily="34" charset="0"/>
+                <a:cs typeface="Arial" panose="020B0604020202020204" pitchFamily="34" charset="0"/>
+              </a:rPr>
+              <a:t>GET method w/ params «user_id» returns json that contains each user_id they’ve visited</a:t>
+            </a:r>
+          </a:p>
+          <a:p>
+            <a:r>
+              <a:rPr lang="nb-NO" dirty="0">
+                <a:latin typeface="Arial" panose="020B0604020202020204" pitchFamily="34" charset="0"/>
+                <a:cs typeface="Arial" panose="020B0604020202020204" pitchFamily="34" charset="0"/>
+              </a:rPr>
+              <a:t>DELETE method w/ params «user_id» takes note that that user has updated their planet, and removes all relationships where visited is the user</a:t>
             </a:r>
           </a:p>
           <a:p>
@@ -5330,7 +5218,7 @@
                 <a:latin typeface="Arial" panose="020B0604020202020204" pitchFamily="34" charset="0"/>
                 <a:cs typeface="Arial" panose="020B0604020202020204" pitchFamily="34" charset="0"/>
               </a:rPr>
-              <a:t>	[,</a:t>
+              <a:t>	[</a:t>
             </a:r>
           </a:p>
           <a:p>
@@ -5354,43 +5242,7 @@
                 <a:latin typeface="Arial" panose="020B0604020202020204" pitchFamily="34" charset="0"/>
                 <a:cs typeface="Arial" panose="020B0604020202020204" pitchFamily="34" charset="0"/>
               </a:rPr>
-              <a:t>			«id»: «0»,</a:t>
-            </a:r>
-          </a:p>
-          <a:p>
-            <a:pPr marL="0" indent="0">
-              <a:buNone/>
-            </a:pPr>
-            <a:r>
-              <a:rPr lang="nb-NO" dirty="0">
-                <a:latin typeface="Arial" panose="020B0604020202020204" pitchFamily="34" charset="0"/>
-                <a:cs typeface="Arial" panose="020B0604020202020204" pitchFamily="34" charset="0"/>
-              </a:rPr>
-              <a:t>			«name»: «Build-It-Yourself Galaxy»,</a:t>
-            </a:r>
-          </a:p>
-          <a:p>
-            <a:pPr marL="0" indent="0">
-              <a:buNone/>
-            </a:pPr>
-            <a:r>
-              <a:rPr lang="nb-NO" dirty="0">
-                <a:latin typeface="Arial" panose="020B0604020202020204" pitchFamily="34" charset="0"/>
-                <a:cs typeface="Arial" panose="020B0604020202020204" pitchFamily="34" charset="0"/>
-              </a:rPr>
-              <a:t>			«description»: «Where way cool inventors dwell.»,</a:t>
-            </a:r>
-          </a:p>
-          <a:p>
-            <a:pPr marL="0" indent="0">
-              <a:buNone/>
-            </a:pPr>
-            <a:r>
-              <a:rPr lang="nb-NO" dirty="0">
-                <a:latin typeface="Arial" panose="020B0604020202020204" pitchFamily="34" charset="0"/>
-                <a:cs typeface="Arial" panose="020B0604020202020204" pitchFamily="34" charset="0"/>
-              </a:rPr>
-              <a:t>			...</a:t>
+              <a:t>			«id»: 9</a:t>
             </a:r>
           </a:p>
           <a:p>
@@ -5414,7 +5266,31 @@
                 <a:latin typeface="Arial" panose="020B0604020202020204" pitchFamily="34" charset="0"/>
                 <a:cs typeface="Arial" panose="020B0604020202020204" pitchFamily="34" charset="0"/>
               </a:rPr>
-              <a:t>		...</a:t>
+              <a:t>		{</a:t>
+            </a:r>
+          </a:p>
+          <a:p>
+            <a:pPr marL="0" indent="0">
+              <a:buNone/>
+            </a:pPr>
+            <a:r>
+              <a:rPr lang="nb-NO" dirty="0">
+                <a:latin typeface="Arial" panose="020B0604020202020204" pitchFamily="34" charset="0"/>
+                <a:cs typeface="Arial" panose="020B0604020202020204" pitchFamily="34" charset="0"/>
+              </a:rPr>
+              <a:t>			«id»: 10</a:t>
+            </a:r>
+          </a:p>
+          <a:p>
+            <a:pPr marL="0" indent="0">
+              <a:buNone/>
+            </a:pPr>
+            <a:r>
+              <a:rPr lang="nb-NO" dirty="0">
+                <a:latin typeface="Arial" panose="020B0604020202020204" pitchFamily="34" charset="0"/>
+                <a:cs typeface="Arial" panose="020B0604020202020204" pitchFamily="34" charset="0"/>
+              </a:rPr>
+              <a:t>		}</a:t>
             </a:r>
           </a:p>
           <a:p>
@@ -5442,20 +5318,20 @@
             </a:r>
           </a:p>
           <a:p>
-            <a:r>
-              <a:rPr lang="nb-NO" dirty="0">
-                <a:latin typeface="Arial" panose="020B0604020202020204" pitchFamily="34" charset="0"/>
-                <a:cs typeface="Arial" panose="020B0604020202020204" pitchFamily="34" charset="0"/>
-              </a:rPr>
-              <a:t>POST method with json «name», «description», «x», «y», and «image» will create a galaxy</a:t>
-            </a:r>
+            <a:pPr marL="0" indent="0">
+              <a:buNone/>
+            </a:pPr>
+            <a:endParaRPr lang="nb-NO" dirty="0">
+              <a:latin typeface="Arial" panose="020B0604020202020204" pitchFamily="34" charset="0"/>
+              <a:cs typeface="Arial" panose="020B0604020202020204" pitchFamily="34" charset="0"/>
+            </a:endParaRPr>
           </a:p>
         </p:txBody>
       </p:sp>
     </p:spTree>
     <p:extLst>
       <p:ext uri="{BB962C8B-B14F-4D97-AF65-F5344CB8AC3E}">
-        <p14:creationId xmlns:p14="http://schemas.microsoft.com/office/powerpoint/2010/main" val="1557958327"/>
+        <p14:creationId xmlns:p14="http://schemas.microsoft.com/office/powerpoint/2010/main" val="1092747602"/>
       </p:ext>
     </p:extLst>
   </p:cSld>
@@ -5507,7 +5383,7 @@
                 <a:latin typeface="Arial" panose="020B0604020202020204" pitchFamily="34" charset="0"/>
                 <a:cs typeface="Arial" panose="020B0604020202020204" pitchFamily="34" charset="0"/>
               </a:rPr>
-              <a:t>/systems</a:t>
+              <a:t>/galaxies</a:t>
             </a:r>
           </a:p>
         </p:txBody>
@@ -5534,7 +5410,7 @@
                 <a:latin typeface="Arial" panose="020B0604020202020204" pitchFamily="34" charset="0"/>
                 <a:cs typeface="Arial" panose="020B0604020202020204" pitchFamily="34" charset="0"/>
               </a:rPr>
-              <a:t>GET method with params «galaxy_id» will return json that contains each System and its variables, for example:</a:t>
+              <a:t>GET method will return json that contains each Galaxy and its variables, for example:</a:t>
             </a:r>
           </a:p>
           <a:p>
@@ -5570,7 +5446,7 @@
                 <a:latin typeface="Arial" panose="020B0604020202020204" pitchFamily="34" charset="0"/>
                 <a:cs typeface="Arial" panose="020B0604020202020204" pitchFamily="34" charset="0"/>
               </a:rPr>
-              <a:t>	[</a:t>
+              <a:t>	[,</a:t>
             </a:r>
           </a:p>
           <a:p>
@@ -5606,19 +5482,19 @@
                 <a:latin typeface="Arial" panose="020B0604020202020204" pitchFamily="34" charset="0"/>
                 <a:cs typeface="Arial" panose="020B0604020202020204" pitchFamily="34" charset="0"/>
               </a:rPr>
-              <a:t>			«name»: «Solaris»,</a:t>
-            </a:r>
-          </a:p>
-          <a:p>
-            <a:pPr marL="0" indent="0">
-              <a:buNone/>
-            </a:pPr>
-            <a:r>
-              <a:rPr lang="nb-NO" dirty="0">
-                <a:latin typeface="Arial" panose="020B0604020202020204" pitchFamily="34" charset="0"/>
-                <a:cs typeface="Arial" panose="020B0604020202020204" pitchFamily="34" charset="0"/>
-              </a:rPr>
-              <a:t>			«quadrant»: «4»,</a:t>
+              <a:t>			«name»: «Build-It-Yourself Galaxy»,</a:t>
+            </a:r>
+          </a:p>
+          <a:p>
+            <a:pPr marL="0" indent="0">
+              <a:buNone/>
+            </a:pPr>
+            <a:r>
+              <a:rPr lang="nb-NO" dirty="0">
+                <a:latin typeface="Arial" panose="020B0604020202020204" pitchFamily="34" charset="0"/>
+                <a:cs typeface="Arial" panose="020B0604020202020204" pitchFamily="34" charset="0"/>
+              </a:rPr>
+              <a:t>			«description»: «Where way cool inventors dwell.»,</a:t>
             </a:r>
           </a:p>
           <a:p>
@@ -5687,30 +5563,15 @@
                 <a:latin typeface="Arial" panose="020B0604020202020204" pitchFamily="34" charset="0"/>
                 <a:cs typeface="Arial" panose="020B0604020202020204" pitchFamily="34" charset="0"/>
               </a:rPr>
-              <a:t>GET method with params «system_id» will return json with information on just that system and its variables</a:t>
-            </a:r>
-          </a:p>
-          <a:p>
-            <a:r>
-              <a:rPr lang="nb-NO" dirty="0">
-                <a:latin typeface="Arial" panose="020B0604020202020204" pitchFamily="34" charset="0"/>
-                <a:cs typeface="Arial" panose="020B0604020202020204" pitchFamily="34" charset="0"/>
-              </a:rPr>
-              <a:t>POST method with json «galaxy_id», «name», «quadrant», «x», «y», and «image» will create a system</a:t>
-            </a:r>
-          </a:p>
-          <a:p>
-            <a:endParaRPr lang="nb-NO" dirty="0">
-              <a:latin typeface="Arial" panose="020B0604020202020204" pitchFamily="34" charset="0"/>
-              <a:cs typeface="Arial" panose="020B0604020202020204" pitchFamily="34" charset="0"/>
-            </a:endParaRPr>
+              <a:t>POST method with json «name», «description», «x», «y», and «image» will create a galaxy</a:t>
+            </a:r>
           </a:p>
         </p:txBody>
       </p:sp>
     </p:spTree>
     <p:extLst>
       <p:ext uri="{BB962C8B-B14F-4D97-AF65-F5344CB8AC3E}">
-        <p14:creationId xmlns:p14="http://schemas.microsoft.com/office/powerpoint/2010/main" val="254303226"/>
+        <p14:creationId xmlns:p14="http://schemas.microsoft.com/office/powerpoint/2010/main" val="1557958327"/>
       </p:ext>
     </p:extLst>
   </p:cSld>
@@ -5762,7 +5623,7 @@
                 <a:latin typeface="Arial" panose="020B0604020202020204" pitchFamily="34" charset="0"/>
                 <a:cs typeface="Arial" panose="020B0604020202020204" pitchFamily="34" charset="0"/>
               </a:rPr>
-              <a:t>/planets</a:t>
+              <a:t>/systems</a:t>
             </a:r>
           </a:p>
         </p:txBody>
@@ -5777,15 +5638,10 @@
             <p:ph idx="1"/>
           </p:nvPr>
         </p:nvSpPr>
-        <p:spPr>
-          <a:xfrm>
-            <a:off x="838200" y="1825625"/>
-            <a:ext cx="10515600" cy="4610686"/>
-          </a:xfrm>
-        </p:spPr>
+        <p:spPr/>
         <p:txBody>
           <a:bodyPr>
-            <a:normAutofit fontScale="47500" lnSpcReduction="20000"/>
+            <a:normAutofit fontScale="55000" lnSpcReduction="20000"/>
           </a:bodyPr>
           <a:lstStyle/>
           <a:p>
@@ -5794,7 +5650,7 @@
                 <a:latin typeface="Arial" panose="020B0604020202020204" pitchFamily="34" charset="0"/>
                 <a:cs typeface="Arial" panose="020B0604020202020204" pitchFamily="34" charset="0"/>
               </a:rPr>
-              <a:t>GET method with params «system_id» will return json that contains each Planet’s variables, for example:</a:t>
+              <a:t>GET method with params «galaxy_id» will return json that contains each System and its variables, for example:</a:t>
             </a:r>
           </a:p>
           <a:p>
@@ -5866,19 +5722,19 @@
                 <a:latin typeface="Arial" panose="020B0604020202020204" pitchFamily="34" charset="0"/>
                 <a:cs typeface="Arial" panose="020B0604020202020204" pitchFamily="34" charset="0"/>
               </a:rPr>
-              <a:t>			«owner_id»: «6»,</a:t>
-            </a:r>
-          </a:p>
-          <a:p>
-            <a:pPr marL="0" indent="0">
-              <a:buNone/>
-            </a:pPr>
-            <a:r>
-              <a:rPr lang="nb-NO" dirty="0">
-                <a:latin typeface="Arial" panose="020B0604020202020204" pitchFamily="34" charset="0"/>
-                <a:cs typeface="Arial" panose="020B0604020202020204" pitchFamily="34" charset="0"/>
-              </a:rPr>
-              <a:t>			«order»: «0»,</a:t>
+              <a:t>			«name»: «Solaris»,</a:t>
+            </a:r>
+          </a:p>
+          <a:p>
+            <a:pPr marL="0" indent="0">
+              <a:buNone/>
+            </a:pPr>
+            <a:r>
+              <a:rPr lang="nb-NO" dirty="0">
+                <a:latin typeface="Arial" panose="020B0604020202020204" pitchFamily="34" charset="0"/>
+                <a:cs typeface="Arial" panose="020B0604020202020204" pitchFamily="34" charset="0"/>
+              </a:rPr>
+              <a:t>			«quadrant»: «4»,</a:t>
             </a:r>
           </a:p>
           <a:p>
@@ -5947,25 +5803,16 @@
                 <a:latin typeface="Arial" panose="020B0604020202020204" pitchFamily="34" charset="0"/>
                 <a:cs typeface="Arial" panose="020B0604020202020204" pitchFamily="34" charset="0"/>
               </a:rPr>
-              <a:t>GET method with params «user_id» or «planet_id» will return json that contains the Planet’s variables</a:t>
-            </a:r>
-          </a:p>
-          <a:p>
-            <a:r>
-              <a:rPr lang="nb-NO" dirty="0">
-                <a:latin typeface="Arial" panose="020B0604020202020204" pitchFamily="34" charset="0"/>
-                <a:cs typeface="Arial" panose="020B0604020202020204" pitchFamily="34" charset="0"/>
-              </a:rPr>
-              <a:t>PATCH method with json «planet_id», «name», and «user_id» will set the planet’s owner_id to that user_id and rename it in the db. If the user already has a planet, unlinks the old one and removes its name. If the planet already has an owner or the db call fails for some reason, returns json with «status»: «error», otherwise sends «status»: «ok»</a:t>
-            </a:r>
-          </a:p>
-          <a:p>
-            <a:r>
-              <a:rPr lang="nb-NO" dirty="0">
-                <a:latin typeface="Arial" panose="020B0604020202020204" pitchFamily="34" charset="0"/>
-                <a:cs typeface="Arial" panose="020B0604020202020204" pitchFamily="34" charset="0"/>
-              </a:rPr>
-              <a:t>POST method with json «system_id», «order», «size», «surface», and «image» will create a planet</a:t>
+              <a:t>GET method with params «system_id» will return json with information on just that system and its variables</a:t>
+            </a:r>
+          </a:p>
+          <a:p>
+            <a:r>
+              <a:rPr lang="nb-NO" dirty="0">
+                <a:latin typeface="Arial" panose="020B0604020202020204" pitchFamily="34" charset="0"/>
+                <a:cs typeface="Arial" panose="020B0604020202020204" pitchFamily="34" charset="0"/>
+              </a:rPr>
+              <a:t>POST method with json «galaxy_id», «name», «quadrant», «x», «y», and «image» will create a system</a:t>
             </a:r>
           </a:p>
           <a:p>
@@ -5979,7 +5826,7 @@
     </p:spTree>
     <p:extLst>
       <p:ext uri="{BB962C8B-B14F-4D97-AF65-F5344CB8AC3E}">
-        <p14:creationId xmlns:p14="http://schemas.microsoft.com/office/powerpoint/2010/main" val="4061486045"/>
+        <p14:creationId xmlns:p14="http://schemas.microsoft.com/office/powerpoint/2010/main" val="254303226"/>
       </p:ext>
     </p:extLst>
   </p:cSld>
@@ -6031,7 +5878,7 @@
                 <a:latin typeface="Arial" panose="020B0604020202020204" pitchFamily="34" charset="0"/>
                 <a:cs typeface="Arial" panose="020B0604020202020204" pitchFamily="34" charset="0"/>
               </a:rPr>
-              <a:t>/catalog</a:t>
+              <a:t>/planets</a:t>
             </a:r>
           </a:p>
         </p:txBody>
@@ -6046,7 +5893,12 @@
             <p:ph idx="1"/>
           </p:nvPr>
         </p:nvSpPr>
-        <p:spPr/>
+        <p:spPr>
+          <a:xfrm>
+            <a:off x="838200" y="1825625"/>
+            <a:ext cx="10515600" cy="4610686"/>
+          </a:xfrm>
+        </p:spPr>
         <p:txBody>
           <a:bodyPr>
             <a:normAutofit fontScale="47500" lnSpcReduction="20000"/>
@@ -6058,7 +5910,7 @@
                 <a:latin typeface="Arial" panose="020B0604020202020204" pitchFamily="34" charset="0"/>
                 <a:cs typeface="Arial" panose="020B0604020202020204" pitchFamily="34" charset="0"/>
               </a:rPr>
-              <a:t>GET method with specified «catalog_id» returns the specified CatalogItem’s variables, the method without any params returns json that contains each CatalogItem there is and their variables, for example:</a:t>
+              <a:t>GET method with params «system_id» will return json that contains each Planet’s variables, for example:</a:t>
             </a:r>
           </a:p>
           <a:p>
@@ -6130,19 +5982,19 @@
                 <a:latin typeface="Arial" panose="020B0604020202020204" pitchFamily="34" charset="0"/>
                 <a:cs typeface="Arial" panose="020B0604020202020204" pitchFamily="34" charset="0"/>
               </a:rPr>
-              <a:t>			«image»: «images/statue.png»,</a:t>
-            </a:r>
-          </a:p>
-          <a:p>
-            <a:pPr marL="0" indent="0">
-              <a:buNone/>
-            </a:pPr>
-            <a:r>
-              <a:rPr lang="nb-NO" dirty="0">
-                <a:latin typeface="Arial" panose="020B0604020202020204" pitchFamily="34" charset="0"/>
-                <a:cs typeface="Arial" panose="020B0604020202020204" pitchFamily="34" charset="0"/>
-              </a:rPr>
-              <a:t>			«available»: «true»,</a:t>
+              <a:t>			«owner_id»: «6»,</a:t>
+            </a:r>
+          </a:p>
+          <a:p>
+            <a:pPr marL="0" indent="0">
+              <a:buNone/>
+            </a:pPr>
+            <a:r>
+              <a:rPr lang="nb-NO" dirty="0">
+                <a:latin typeface="Arial" panose="020B0604020202020204" pitchFamily="34" charset="0"/>
+                <a:cs typeface="Arial" panose="020B0604020202020204" pitchFamily="34" charset="0"/>
+              </a:rPr>
+              <a:t>			«order»: «0»,</a:t>
             </a:r>
           </a:p>
           <a:p>
@@ -6211,24 +6063,39 @@
                 <a:latin typeface="Arial" panose="020B0604020202020204" pitchFamily="34" charset="0"/>
                 <a:cs typeface="Arial" panose="020B0604020202020204" pitchFamily="34" charset="0"/>
               </a:rPr>
-              <a:t>POST method with json «name», «image», «event_specific», «available», «cost1», «cost2», and «cost3» will create a planet</a:t>
-            </a:r>
-          </a:p>
-          <a:p>
-            <a:r>
-              <a:rPr lang="nb-NO" dirty="0">
-                <a:latin typeface="Arial" panose="020B0604020202020204" pitchFamily="34" charset="0"/>
-                <a:cs typeface="Arial" panose="020B0604020202020204" pitchFamily="34" charset="0"/>
-              </a:rPr>
-              <a:t>PATCH method with the param «catalog_id» flips the value of the available variable</a:t>
-            </a:r>
+              <a:t>GET method with params «user_id» or «planet_id» will return json that contains the Planet’s variables</a:t>
+            </a:r>
+          </a:p>
+          <a:p>
+            <a:r>
+              <a:rPr lang="nb-NO" dirty="0">
+                <a:latin typeface="Arial" panose="020B0604020202020204" pitchFamily="34" charset="0"/>
+                <a:cs typeface="Arial" panose="020B0604020202020204" pitchFamily="34" charset="0"/>
+              </a:rPr>
+              <a:t>PATCH method with json «planet_id», «name», and «user_id» will set the planet’s owner_id to that user_id and rename it in the db. If the user already has a planet, unlinks the old one and removes its name. If the planet already has an owner or the db call fails for some reason, returns json with «status»: «error», otherwise sends «status»: «ok»</a:t>
+            </a:r>
+          </a:p>
+          <a:p>
+            <a:r>
+              <a:rPr lang="nb-NO" dirty="0">
+                <a:latin typeface="Arial" panose="020B0604020202020204" pitchFamily="34" charset="0"/>
+                <a:cs typeface="Arial" panose="020B0604020202020204" pitchFamily="34" charset="0"/>
+              </a:rPr>
+              <a:t>POST method with json «system_id», «order», «size», «surface», and «image» will create a planet</a:t>
+            </a:r>
+          </a:p>
+          <a:p>
+            <a:endParaRPr lang="nb-NO" dirty="0">
+              <a:latin typeface="Arial" panose="020B0604020202020204" pitchFamily="34" charset="0"/>
+              <a:cs typeface="Arial" panose="020B0604020202020204" pitchFamily="34" charset="0"/>
+            </a:endParaRPr>
           </a:p>
         </p:txBody>
       </p:sp>
     </p:spTree>
     <p:extLst>
       <p:ext uri="{BB962C8B-B14F-4D97-AF65-F5344CB8AC3E}">
-        <p14:creationId xmlns:p14="http://schemas.microsoft.com/office/powerpoint/2010/main" val="4128414604"/>
+        <p14:creationId xmlns:p14="http://schemas.microsoft.com/office/powerpoint/2010/main" val="4061486045"/>
       </p:ext>
     </p:extLst>
   </p:cSld>
@@ -6280,7 +6147,7 @@
                 <a:latin typeface="Arial" panose="020B0604020202020204" pitchFamily="34" charset="0"/>
                 <a:cs typeface="Arial" panose="020B0604020202020204" pitchFamily="34" charset="0"/>
               </a:rPr>
-              <a:t>/items</a:t>
+              <a:t>/catalog</a:t>
             </a:r>
           </a:p>
         </p:txBody>
@@ -6295,12 +6162,7 @@
             <p:ph idx="1"/>
           </p:nvPr>
         </p:nvSpPr>
-        <p:spPr>
-          <a:xfrm>
-            <a:off x="838200" y="1331650"/>
-            <a:ext cx="10515600" cy="5433134"/>
-          </a:xfrm>
-        </p:spPr>
+        <p:spPr/>
         <p:txBody>
           <a:bodyPr>
             <a:normAutofit fontScale="47500" lnSpcReduction="20000"/>
@@ -6312,7 +6174,7 @@
                 <a:latin typeface="Arial" panose="020B0604020202020204" pitchFamily="34" charset="0"/>
                 <a:cs typeface="Arial" panose="020B0604020202020204" pitchFamily="34" charset="0"/>
               </a:rPr>
-              <a:t>GET method with params «user_id» will return json that contains each PlanetItem and its variables as well as the image variable that comes from its parent, for example:</a:t>
+              <a:t>GET method with specified «catalog_id» returns the specified CatalogItem’s variables, the method without any params returns json that contains each CatalogItem there is and their variables, for example:</a:t>
             </a:r>
           </a:p>
           <a:p>
@@ -6336,7 +6198,7 @@
                 <a:latin typeface="Arial" panose="020B0604020202020204" pitchFamily="34" charset="0"/>
                 <a:cs typeface="Arial" panose="020B0604020202020204" pitchFamily="34" charset="0"/>
               </a:rPr>
-              <a:t>«result:»</a:t>
+              <a:t>«results»:</a:t>
             </a:r>
           </a:p>
           <a:p>
@@ -6372,19 +6234,7 @@
                 <a:latin typeface="Arial" panose="020B0604020202020204" pitchFamily="34" charset="0"/>
                 <a:cs typeface="Arial" panose="020B0604020202020204" pitchFamily="34" charset="0"/>
               </a:rPr>
-              <a:t>			«id»: «342»,</a:t>
-            </a:r>
-          </a:p>
-          <a:p>
-            <a:pPr marL="0" indent="0">
-              <a:buNone/>
-            </a:pPr>
-            <a:r>
-              <a:rPr lang="nb-NO" dirty="0">
-                <a:latin typeface="Arial" panose="020B0604020202020204" pitchFamily="34" charset="0"/>
-                <a:cs typeface="Arial" panose="020B0604020202020204" pitchFamily="34" charset="0"/>
-              </a:rPr>
-              <a:t>			«catalog_parent_id»: «0»,</a:t>
+              <a:t>			«id»: «0»,</a:t>
             </a:r>
           </a:p>
           <a:p>
@@ -6408,19 +6258,7 @@
                 <a:latin typeface="Arial" panose="020B0604020202020204" pitchFamily="34" charset="0"/>
                 <a:cs typeface="Arial" panose="020B0604020202020204" pitchFamily="34" charset="0"/>
               </a:rPr>
-              <a:t>			«x»: «40»</a:t>
-            </a:r>
-          </a:p>
-          <a:p>
-            <a:pPr marL="0" indent="0">
-              <a:buNone/>
-            </a:pPr>
-            <a:r>
-              <a:rPr lang="nb-NO" dirty="0">
-                <a:latin typeface="Arial" panose="020B0604020202020204" pitchFamily="34" charset="0"/>
-                <a:cs typeface="Arial" panose="020B0604020202020204" pitchFamily="34" charset="0"/>
-              </a:rPr>
-              <a:t>			«y»: «80»</a:t>
+              <a:t>			«available»: «true»,</a:t>
             </a:r>
           </a:p>
           <a:p>
@@ -6489,25 +6327,16 @@
                 <a:latin typeface="Arial" panose="020B0604020202020204" pitchFamily="34" charset="0"/>
                 <a:cs typeface="Arial" panose="020B0604020202020204" pitchFamily="34" charset="0"/>
               </a:rPr>
-              <a:t>POST method with json «user_id» «catalog_id», «x» and «y» adds a new item to a user’s list of PlanetItems, returning the new «id», «image», and «is_rocket»</a:t>
-            </a:r>
-          </a:p>
-          <a:p>
-            <a:r>
-              <a:rPr lang="nb-NO" dirty="0">
-                <a:latin typeface="Arial" panose="020B0604020202020204" pitchFamily="34" charset="0"/>
-                <a:cs typeface="Arial" panose="020B0604020202020204" pitchFamily="34" charset="0"/>
-              </a:rPr>
-              <a:t>DELETE method with params «item_id» will remove that item from the database</a:t>
-            </a:r>
-          </a:p>
-          <a:p>
-            <a:r>
-              <a:rPr lang="nb-NO" dirty="0">
-                <a:latin typeface="Arial" panose="020B0604020202020204" pitchFamily="34" charset="0"/>
-                <a:cs typeface="Arial" panose="020B0604020202020204" pitchFamily="34" charset="0"/>
-              </a:rPr>
-              <a:t>PATCH method with json «item_id», «x» and «y» updates an item’s x and y position</a:t>
+              <a:t>POST method with json «name», «image», «event_specific», «available», «cost1», «cost2», and «cost3» will create a planet</a:t>
+            </a:r>
+          </a:p>
+          <a:p>
+            <a:r>
+              <a:rPr lang="nb-NO" dirty="0">
+                <a:latin typeface="Arial" panose="020B0604020202020204" pitchFamily="34" charset="0"/>
+                <a:cs typeface="Arial" panose="020B0604020202020204" pitchFamily="34" charset="0"/>
+              </a:rPr>
+              <a:t>PATCH method with the param «catalog_id» flips the value of the available variable</a:t>
             </a:r>
           </a:p>
         </p:txBody>
@@ -6515,7 +6344,7 @@
     </p:spTree>
     <p:extLst>
       <p:ext uri="{BB962C8B-B14F-4D97-AF65-F5344CB8AC3E}">
-        <p14:creationId xmlns:p14="http://schemas.microsoft.com/office/powerpoint/2010/main" val="3976820580"/>
+        <p14:creationId xmlns:p14="http://schemas.microsoft.com/office/powerpoint/2010/main" val="4128414604"/>
       </p:ext>
     </p:extLst>
   </p:cSld>
@@ -6567,19 +6396,8 @@
                 <a:latin typeface="Arial" panose="020B0604020202020204" pitchFamily="34" charset="0"/>
                 <a:cs typeface="Arial" panose="020B0604020202020204" pitchFamily="34" charset="0"/>
               </a:rPr>
-              <a:t>/</a:t>
-            </a:r>
-            <a:r>
-              <a:rPr lang="en-US" dirty="0" err="1">
-                <a:latin typeface="Arial" panose="020B0604020202020204" pitchFamily="34" charset="0"/>
-                <a:cs typeface="Arial" panose="020B0604020202020204" pitchFamily="34" charset="0"/>
-              </a:rPr>
-              <a:t>chatitems</a:t>
-            </a:r>
-            <a:endParaRPr lang="en-US" dirty="0">
-              <a:latin typeface="Arial" panose="020B0604020202020204" pitchFamily="34" charset="0"/>
-              <a:cs typeface="Arial" panose="020B0604020202020204" pitchFamily="34" charset="0"/>
-            </a:endParaRPr>
+              <a:t>/items</a:t>
+            </a:r>
           </a:p>
         </p:txBody>
       </p:sp>
@@ -6595,13 +6413,13 @@
         </p:nvSpPr>
         <p:spPr>
           <a:xfrm>
-            <a:off x="378069" y="1331650"/>
-            <a:ext cx="11579469" cy="5433134"/>
+            <a:off x="838200" y="1331650"/>
+            <a:ext cx="10515600" cy="5433134"/>
           </a:xfrm>
         </p:spPr>
         <p:txBody>
           <a:bodyPr>
-            <a:normAutofit fontScale="55000" lnSpcReduction="20000"/>
+            <a:normAutofit fontScale="47500" lnSpcReduction="20000"/>
           </a:bodyPr>
           <a:lstStyle/>
           <a:p>
@@ -6610,7 +6428,7 @@
                 <a:latin typeface="Arial" panose="020B0604020202020204" pitchFamily="34" charset="0"/>
                 <a:cs typeface="Arial" panose="020B0604020202020204" pitchFamily="34" charset="0"/>
               </a:rPr>
-              <a:t>GET method with params «user_id» and «item_type» (where 0 is a color and 1 is an emoticon) will return json that contains each ChatItem the User owns with that itemType and its variables, for example:</a:t>
+              <a:t>GET method with params «user_id» will return json that contains each PlanetItem and its variables as well as the image variable that comes from its parent, for example:</a:t>
             </a:r>
           </a:p>
           <a:p>
@@ -6670,55 +6488,55 @@
                 <a:latin typeface="Arial" panose="020B0604020202020204" pitchFamily="34" charset="0"/>
                 <a:cs typeface="Arial" panose="020B0604020202020204" pitchFamily="34" charset="0"/>
               </a:rPr>
-              <a:t>			«id»: «0»,</a:t>
-            </a:r>
-          </a:p>
-          <a:p>
-            <a:pPr marL="0" indent="0">
-              <a:buNone/>
-            </a:pPr>
-            <a:r>
-              <a:rPr lang="nb-NO" dirty="0">
-                <a:latin typeface="Arial" panose="020B0604020202020204" pitchFamily="34" charset="0"/>
-                <a:cs typeface="Arial" panose="020B0604020202020204" pitchFamily="34" charset="0"/>
-              </a:rPr>
-              <a:t>			«itemType»: «0»,</a:t>
-            </a:r>
-          </a:p>
-          <a:p>
-            <a:pPr marL="0" indent="0">
-              <a:buNone/>
-            </a:pPr>
-            <a:r>
-              <a:rPr lang="nb-NO" dirty="0">
-                <a:latin typeface="Arial" panose="020B0604020202020204" pitchFamily="34" charset="0"/>
-                <a:cs typeface="Arial" panose="020B0604020202020204" pitchFamily="34" charset="0"/>
-              </a:rPr>
-              <a:t>			«string»: «purple»,</a:t>
-            </a:r>
-          </a:p>
-          <a:p>
-            <a:pPr marL="0" indent="0">
-              <a:buNone/>
-            </a:pPr>
-            <a:r>
-              <a:rPr lang="nb-NO" dirty="0">
-                <a:latin typeface="Arial" panose="020B0604020202020204" pitchFamily="34" charset="0"/>
-                <a:cs typeface="Arial" panose="020B0604020202020204" pitchFamily="34" charset="0"/>
-              </a:rPr>
-              <a:t>			«cost1»: «40»,</a:t>
-            </a:r>
-          </a:p>
-          <a:p>
-            <a:pPr marL="0" indent="0">
-              <a:buNone/>
-            </a:pPr>
-            <a:r>
-              <a:rPr lang="nb-NO" dirty="0">
-                <a:latin typeface="Arial" panose="020B0604020202020204" pitchFamily="34" charset="0"/>
-                <a:cs typeface="Arial" panose="020B0604020202020204" pitchFamily="34" charset="0"/>
-              </a:rPr>
-              <a:t>			«cost2»: «5»</a:t>
+              <a:t>			«id»: «342»,</a:t>
+            </a:r>
+          </a:p>
+          <a:p>
+            <a:pPr marL="0" indent="0">
+              <a:buNone/>
+            </a:pPr>
+            <a:r>
+              <a:rPr lang="nb-NO" dirty="0">
+                <a:latin typeface="Arial" panose="020B0604020202020204" pitchFamily="34" charset="0"/>
+                <a:cs typeface="Arial" panose="020B0604020202020204" pitchFamily="34" charset="0"/>
+              </a:rPr>
+              <a:t>			«catalog_parent_id»: «0»,</a:t>
+            </a:r>
+          </a:p>
+          <a:p>
+            <a:pPr marL="0" indent="0">
+              <a:buNone/>
+            </a:pPr>
+            <a:r>
+              <a:rPr lang="nb-NO" dirty="0">
+                <a:latin typeface="Arial" panose="020B0604020202020204" pitchFamily="34" charset="0"/>
+                <a:cs typeface="Arial" panose="020B0604020202020204" pitchFamily="34" charset="0"/>
+              </a:rPr>
+              <a:t>			«image»: «images/statue.png»,</a:t>
+            </a:r>
+          </a:p>
+          <a:p>
+            <a:pPr marL="0" indent="0">
+              <a:buNone/>
+            </a:pPr>
+            <a:r>
+              <a:rPr lang="nb-NO" dirty="0">
+                <a:latin typeface="Arial" panose="020B0604020202020204" pitchFamily="34" charset="0"/>
+                <a:cs typeface="Arial" panose="020B0604020202020204" pitchFamily="34" charset="0"/>
+              </a:rPr>
+              <a:t>			«x»: «40»</a:t>
+            </a:r>
+          </a:p>
+          <a:p>
+            <a:pPr marL="0" indent="0">
+              <a:buNone/>
+            </a:pPr>
+            <a:r>
+              <a:rPr lang="nb-NO" dirty="0">
+                <a:latin typeface="Arial" panose="020B0604020202020204" pitchFamily="34" charset="0"/>
+                <a:cs typeface="Arial" panose="020B0604020202020204" pitchFamily="34" charset="0"/>
+              </a:rPr>
+              <a:t>			«y»: «80»</a:t>
             </a:r>
           </a:p>
           <a:p>
@@ -6787,25 +6605,25 @@
                 <a:latin typeface="Arial" panose="020B0604020202020204" pitchFamily="34" charset="0"/>
                 <a:cs typeface="Arial" panose="020B0604020202020204" pitchFamily="34" charset="0"/>
               </a:rPr>
-              <a:t>GET method with only «user_id» param returns every ChatItem with an «owned» t/f value based on whether or not the user owns it</a:t>
-            </a:r>
-          </a:p>
-          <a:p>
-            <a:r>
-              <a:rPr lang="nb-NO" dirty="0">
-                <a:latin typeface="Arial" panose="020B0604020202020204" pitchFamily="34" charset="0"/>
-                <a:cs typeface="Arial" panose="020B0604020202020204" pitchFamily="34" charset="0"/>
-              </a:rPr>
-              <a:t>POST method with json including «item_type», «string», «cost1», «cost2», and «cost3» to create that ChatItem</a:t>
-            </a:r>
-          </a:p>
-          <a:p>
-            <a:r>
-              <a:rPr lang="nb-NO" dirty="0">
-                <a:latin typeface="Arial" panose="020B0604020202020204" pitchFamily="34" charset="0"/>
-                <a:cs typeface="Arial" panose="020B0604020202020204" pitchFamily="34" charset="0"/>
-              </a:rPr>
-              <a:t>PATCH method with json including «user_id» and «chat_item_id» to add that ChatItem to the User</a:t>
+              <a:t>POST method with json «user_id» «catalog_id», «x» and «y» adds a new item to a user’s list of PlanetItems, returning the new «id», «image», and «is_rocket»</a:t>
+            </a:r>
+          </a:p>
+          <a:p>
+            <a:r>
+              <a:rPr lang="nb-NO" dirty="0">
+                <a:latin typeface="Arial" panose="020B0604020202020204" pitchFamily="34" charset="0"/>
+                <a:cs typeface="Arial" panose="020B0604020202020204" pitchFamily="34" charset="0"/>
+              </a:rPr>
+              <a:t>DELETE method with params «item_id» will remove that item from the database</a:t>
+            </a:r>
+          </a:p>
+          <a:p>
+            <a:r>
+              <a:rPr lang="nb-NO" dirty="0">
+                <a:latin typeface="Arial" panose="020B0604020202020204" pitchFamily="34" charset="0"/>
+                <a:cs typeface="Arial" panose="020B0604020202020204" pitchFamily="34" charset="0"/>
+              </a:rPr>
+              <a:t>PATCH method with json «item_id», «x» and «y» updates an item’s x and y position</a:t>
             </a:r>
           </a:p>
         </p:txBody>
@@ -6813,7 +6631,7 @@
     </p:spTree>
     <p:extLst>
       <p:ext uri="{BB962C8B-B14F-4D97-AF65-F5344CB8AC3E}">
-        <p14:creationId xmlns:p14="http://schemas.microsoft.com/office/powerpoint/2010/main" val="1642849653"/>
+        <p14:creationId xmlns:p14="http://schemas.microsoft.com/office/powerpoint/2010/main" val="3976820580"/>
       </p:ext>
     </p:extLst>
   </p:cSld>
@@ -6865,7 +6683,7 @@
                 <a:latin typeface="Arial" panose="020B0604020202020204" pitchFamily="34" charset="0"/>
                 <a:cs typeface="Arial" panose="020B0604020202020204" pitchFamily="34" charset="0"/>
               </a:rPr>
-              <a:t>/currency</a:t>
+              <a:t>/projects</a:t>
             </a:r>
           </a:p>
         </p:txBody>
@@ -6880,10 +6698,15 @@
             <p:ph idx="1"/>
           </p:nvPr>
         </p:nvSpPr>
-        <p:spPr/>
+        <p:spPr>
+          <a:xfrm>
+            <a:off x="838200" y="1331650"/>
+            <a:ext cx="10515600" cy="5433134"/>
+          </a:xfrm>
+        </p:spPr>
         <p:txBody>
           <a:bodyPr>
-            <a:normAutofit/>
+            <a:normAutofit fontScale="62500" lnSpcReduction="20000"/>
           </a:bodyPr>
           <a:lstStyle/>
           <a:p>
@@ -6892,35 +6715,186 @@
                 <a:latin typeface="Arial" panose="020B0604020202020204" pitchFamily="34" charset="0"/>
                 <a:cs typeface="Arial" panose="020B0604020202020204" pitchFamily="34" charset="0"/>
               </a:rPr>
-              <a:t>GET method with params «user_id» returns cur1-3, vou2-3, lifetime_cur1-3</a:t>
-            </a:r>
-          </a:p>
-          <a:p>
-            <a:r>
-              <a:rPr lang="nb-NO" dirty="0">
-                <a:latin typeface="Arial" panose="020B0604020202020204" pitchFamily="34" charset="0"/>
-                <a:cs typeface="Arial" panose="020B0604020202020204" pitchFamily="34" charset="0"/>
-              </a:rPr>
-              <a:t>PATCH with json including «user_id», «cur1», «cur2», «cur3», «vou2» and «vou3» add these curs and vous to the User’s currency – if they’re positive increments both the current and lifetime currencies, if they’re negative only decreases the </a:t>
-            </a:r>
-            <a:r>
-              <a:rPr lang="nb-NO">
-                <a:latin typeface="Arial" panose="020B0604020202020204" pitchFamily="34" charset="0"/>
-                <a:cs typeface="Arial" panose="020B0604020202020204" pitchFamily="34" charset="0"/>
-              </a:rPr>
-              <a:t>current ones (note: you can also send an «update_lifetime» boolean to force updating or not updating lifetime currency)</a:t>
-            </a:r>
-            <a:endParaRPr lang="nb-NO" dirty="0">
-              <a:latin typeface="Arial" panose="020B0604020202020204" pitchFamily="34" charset="0"/>
-              <a:cs typeface="Arial" panose="020B0604020202020204" pitchFamily="34" charset="0"/>
-            </a:endParaRPr>
+              <a:t>GET method with params «user_id» will return json that contains each Project and its variables</a:t>
+            </a:r>
+          </a:p>
+          <a:p>
+            <a:pPr marL="0" indent="0">
+              <a:buNone/>
+            </a:pPr>
+            <a:r>
+              <a:rPr lang="nb-NO" dirty="0">
+                <a:latin typeface="Arial" panose="020B0604020202020204" pitchFamily="34" charset="0"/>
+                <a:cs typeface="Arial" panose="020B0604020202020204" pitchFamily="34" charset="0"/>
+              </a:rPr>
+              <a:t>{</a:t>
+            </a:r>
+          </a:p>
+          <a:p>
+            <a:pPr marL="0" indent="0">
+              <a:buNone/>
+            </a:pPr>
+            <a:r>
+              <a:rPr lang="nb-NO" dirty="0">
+                <a:latin typeface="Arial" panose="020B0604020202020204" pitchFamily="34" charset="0"/>
+                <a:cs typeface="Arial" panose="020B0604020202020204" pitchFamily="34" charset="0"/>
+              </a:rPr>
+              <a:t>«result:»</a:t>
+            </a:r>
+          </a:p>
+          <a:p>
+            <a:pPr marL="0" indent="0">
+              <a:buNone/>
+            </a:pPr>
+            <a:r>
+              <a:rPr lang="nb-NO" dirty="0">
+                <a:latin typeface="Arial" panose="020B0604020202020204" pitchFamily="34" charset="0"/>
+                <a:cs typeface="Arial" panose="020B0604020202020204" pitchFamily="34" charset="0"/>
+              </a:rPr>
+              <a:t>	[</a:t>
+            </a:r>
+          </a:p>
+          <a:p>
+            <a:pPr marL="0" indent="0">
+              <a:buNone/>
+            </a:pPr>
+            <a:r>
+              <a:rPr lang="nb-NO" dirty="0">
+                <a:latin typeface="Arial" panose="020B0604020202020204" pitchFamily="34" charset="0"/>
+                <a:cs typeface="Arial" panose="020B0604020202020204" pitchFamily="34" charset="0"/>
+              </a:rPr>
+              <a:t>		{</a:t>
+            </a:r>
+          </a:p>
+          <a:p>
+            <a:pPr marL="0" indent="0">
+              <a:buNone/>
+            </a:pPr>
+            <a:r>
+              <a:rPr lang="nb-NO" dirty="0">
+                <a:latin typeface="Arial" panose="020B0604020202020204" pitchFamily="34" charset="0"/>
+                <a:cs typeface="Arial" panose="020B0604020202020204" pitchFamily="34" charset="0"/>
+              </a:rPr>
+              <a:t>			«id»: «342»,</a:t>
+            </a:r>
+          </a:p>
+          <a:p>
+            <a:pPr marL="0" indent="0">
+              <a:buNone/>
+            </a:pPr>
+            <a:r>
+              <a:rPr lang="nb-NO" dirty="0">
+                <a:latin typeface="Arial" panose="020B0604020202020204" pitchFamily="34" charset="0"/>
+                <a:cs typeface="Arial" panose="020B0604020202020204" pitchFamily="34" charset="0"/>
+              </a:rPr>
+              <a:t>			«name»: «Flying Machines»,</a:t>
+            </a:r>
+          </a:p>
+          <a:p>
+            <a:pPr marL="0" indent="0">
+              <a:buNone/>
+            </a:pPr>
+            <a:r>
+              <a:rPr lang="nb-NO" dirty="0">
+                <a:latin typeface="Arial" panose="020B0604020202020204" pitchFamily="34" charset="0"/>
+                <a:cs typeface="Arial" panose="020B0604020202020204" pitchFamily="34" charset="0"/>
+              </a:rPr>
+              <a:t>			«desc»: «Blah blah blah»,</a:t>
+            </a:r>
+          </a:p>
+          <a:p>
+            <a:pPr marL="0" indent="0">
+              <a:buNone/>
+            </a:pPr>
+            <a:r>
+              <a:rPr lang="nb-NO" dirty="0">
+                <a:latin typeface="Arial" panose="020B0604020202020204" pitchFamily="34" charset="0"/>
+                <a:cs typeface="Arial" panose="020B0604020202020204" pitchFamily="34" charset="0"/>
+              </a:rPr>
+              <a:t>			«file»: «localhost:5000/uploads/jh123.pdf»</a:t>
+            </a:r>
+          </a:p>
+          <a:p>
+            <a:pPr marL="0" indent="0">
+              <a:buNone/>
+            </a:pPr>
+            <a:r>
+              <a:rPr lang="nb-NO" dirty="0">
+                <a:latin typeface="Arial" panose="020B0604020202020204" pitchFamily="34" charset="0"/>
+                <a:cs typeface="Arial" panose="020B0604020202020204" pitchFamily="34" charset="0"/>
+              </a:rPr>
+              <a:t>		},</a:t>
+            </a:r>
+          </a:p>
+          <a:p>
+            <a:pPr marL="0" indent="0">
+              <a:buNone/>
+            </a:pPr>
+            <a:r>
+              <a:rPr lang="nb-NO" dirty="0">
+                <a:latin typeface="Arial" panose="020B0604020202020204" pitchFamily="34" charset="0"/>
+                <a:cs typeface="Arial" panose="020B0604020202020204" pitchFamily="34" charset="0"/>
+              </a:rPr>
+              <a:t>		...</a:t>
+            </a:r>
+          </a:p>
+          <a:p>
+            <a:pPr marL="0" indent="0">
+              <a:buNone/>
+            </a:pPr>
+            <a:r>
+              <a:rPr lang="nb-NO" dirty="0">
+                <a:latin typeface="Arial" panose="020B0604020202020204" pitchFamily="34" charset="0"/>
+                <a:cs typeface="Arial" panose="020B0604020202020204" pitchFamily="34" charset="0"/>
+              </a:rPr>
+              <a:t>	]</a:t>
+            </a:r>
+          </a:p>
+          <a:p>
+            <a:pPr marL="0" indent="0">
+              <a:buNone/>
+            </a:pPr>
+            <a:r>
+              <a:rPr lang="nb-NO" dirty="0">
+                <a:latin typeface="Arial" panose="020B0604020202020204" pitchFamily="34" charset="0"/>
+                <a:cs typeface="Arial" panose="020B0604020202020204" pitchFamily="34" charset="0"/>
+              </a:rPr>
+              <a:t>}</a:t>
+            </a:r>
+          </a:p>
+          <a:p>
+            <a:r>
+              <a:rPr lang="nb-NO" dirty="0">
+                <a:latin typeface="Arial" panose="020B0604020202020204" pitchFamily="34" charset="0"/>
+                <a:cs typeface="Arial" panose="020B0604020202020204" pitchFamily="34" charset="0"/>
+              </a:rPr>
+              <a:t>POST method with json «user_id», «name», «desc», and «file» will create a new Project and assign it to the User</a:t>
+            </a:r>
+          </a:p>
+          <a:p>
+            <a:r>
+              <a:rPr lang="nb-NO" dirty="0">
+                <a:latin typeface="Arial" panose="020B0604020202020204" pitchFamily="34" charset="0"/>
+                <a:cs typeface="Arial" panose="020B0604020202020204" pitchFamily="34" charset="0"/>
+              </a:rPr>
+              <a:t>DELETE method with params «project_id» will remove that item from the database</a:t>
+            </a:r>
+          </a:p>
+          <a:p>
+            <a:r>
+              <a:rPr lang="nb-NO" dirty="0">
+                <a:latin typeface="Arial" panose="020B0604020202020204" pitchFamily="34" charset="0"/>
+                <a:cs typeface="Arial" panose="020B0604020202020204" pitchFamily="34" charset="0"/>
+              </a:rPr>
+              <a:t>PATCH method with json «project_id», «name», «desc», and «file» updates a Project’s variables</a:t>
+            </a:r>
           </a:p>
         </p:txBody>
       </p:sp>
     </p:spTree>
     <p:extLst>
       <p:ext uri="{BB962C8B-B14F-4D97-AF65-F5344CB8AC3E}">
-        <p14:creationId xmlns:p14="http://schemas.microsoft.com/office/powerpoint/2010/main" val="1802617112"/>
+        <p14:creationId xmlns:p14="http://schemas.microsoft.com/office/powerpoint/2010/main" val="1806510865"/>
       </p:ext>
     </p:extLst>
   </p:cSld>
@@ -6972,8 +6946,19 @@
                 <a:latin typeface="Arial" panose="020B0604020202020204" pitchFamily="34" charset="0"/>
                 <a:cs typeface="Arial" panose="020B0604020202020204" pitchFamily="34" charset="0"/>
               </a:rPr>
-              <a:t>/missions</a:t>
-            </a:r>
+              <a:t>/</a:t>
+            </a:r>
+            <a:r>
+              <a:rPr lang="en-US" dirty="0" err="1">
+                <a:latin typeface="Arial" panose="020B0604020202020204" pitchFamily="34" charset="0"/>
+                <a:cs typeface="Arial" panose="020B0604020202020204" pitchFamily="34" charset="0"/>
+              </a:rPr>
+              <a:t>chatitems</a:t>
+            </a:r>
+            <a:endParaRPr lang="en-US" dirty="0">
+              <a:latin typeface="Arial" panose="020B0604020202020204" pitchFamily="34" charset="0"/>
+              <a:cs typeface="Arial" panose="020B0604020202020204" pitchFamily="34" charset="0"/>
+            </a:endParaRPr>
           </a:p>
         </p:txBody>
       </p:sp>
@@ -6987,10 +6972,15 @@
             <p:ph idx="1"/>
           </p:nvPr>
         </p:nvSpPr>
-        <p:spPr/>
+        <p:spPr>
+          <a:xfrm>
+            <a:off x="378069" y="1331650"/>
+            <a:ext cx="11579469" cy="5433134"/>
+          </a:xfrm>
+        </p:spPr>
         <p:txBody>
           <a:bodyPr>
-            <a:normAutofit/>
+            <a:normAutofit fontScale="55000" lnSpcReduction="20000"/>
           </a:bodyPr>
           <a:lstStyle/>
           <a:p>
@@ -6999,25 +6989,202 @@
                 <a:latin typeface="Arial" panose="020B0604020202020204" pitchFamily="34" charset="0"/>
                 <a:cs typeface="Arial" panose="020B0604020202020204" pitchFamily="34" charset="0"/>
               </a:rPr>
-              <a:t>GET method with params «user_id» returns mission_type, mission_current, mission_total</a:t>
-            </a:r>
-          </a:p>
-          <a:p>
-            <a:r>
-              <a:rPr lang="nb-NO" dirty="0">
-                <a:latin typeface="Arial" panose="020B0604020202020204" pitchFamily="34" charset="0"/>
-                <a:cs typeface="Arial" panose="020B0604020202020204" pitchFamily="34" charset="0"/>
-              </a:rPr>
-              <a:t>POST method with params «user_id» increases mission_current by 1</a:t>
-            </a:r>
-          </a:p>
-          <a:p>
-            <a:r>
-              <a:rPr lang="nb-NO" dirty="0">
-                <a:latin typeface="Arial" panose="020B0604020202020204" pitchFamily="34" charset="0"/>
-                <a:cs typeface="Arial" panose="020B0604020202020204" pitchFamily="34" charset="0"/>
-              </a:rPr>
-              <a:t>PATCH with params «user_id» will set mission_current and mission_total to -1, then begins a 10 minute timer to get a new mission</a:t>
+              <a:t>GET method with params «user_id» and «item_type» (where 0 is a color and 1 is an emoticon) will return json that contains each ChatItem the User owns with that itemType and its variables, for example:</a:t>
+            </a:r>
+          </a:p>
+          <a:p>
+            <a:pPr marL="0" indent="0">
+              <a:buNone/>
+            </a:pPr>
+            <a:r>
+              <a:rPr lang="nb-NO" dirty="0">
+                <a:latin typeface="Arial" panose="020B0604020202020204" pitchFamily="34" charset="0"/>
+                <a:cs typeface="Arial" panose="020B0604020202020204" pitchFamily="34" charset="0"/>
+              </a:rPr>
+              <a:t>{</a:t>
+            </a:r>
+          </a:p>
+          <a:p>
+            <a:pPr marL="0" indent="0">
+              <a:buNone/>
+            </a:pPr>
+            <a:r>
+              <a:rPr lang="nb-NO" dirty="0">
+                <a:latin typeface="Arial" panose="020B0604020202020204" pitchFamily="34" charset="0"/>
+                <a:cs typeface="Arial" panose="020B0604020202020204" pitchFamily="34" charset="0"/>
+              </a:rPr>
+              <a:t>«result:»</a:t>
+            </a:r>
+          </a:p>
+          <a:p>
+            <a:pPr marL="0" indent="0">
+              <a:buNone/>
+            </a:pPr>
+            <a:r>
+              <a:rPr lang="nb-NO" dirty="0">
+                <a:latin typeface="Arial" panose="020B0604020202020204" pitchFamily="34" charset="0"/>
+                <a:cs typeface="Arial" panose="020B0604020202020204" pitchFamily="34" charset="0"/>
+              </a:rPr>
+              <a:t>	[</a:t>
+            </a:r>
+          </a:p>
+          <a:p>
+            <a:pPr marL="0" indent="0">
+              <a:buNone/>
+            </a:pPr>
+            <a:r>
+              <a:rPr lang="nb-NO" dirty="0">
+                <a:latin typeface="Arial" panose="020B0604020202020204" pitchFamily="34" charset="0"/>
+                <a:cs typeface="Arial" panose="020B0604020202020204" pitchFamily="34" charset="0"/>
+              </a:rPr>
+              <a:t>		{</a:t>
+            </a:r>
+          </a:p>
+          <a:p>
+            <a:pPr marL="0" indent="0">
+              <a:buNone/>
+            </a:pPr>
+            <a:r>
+              <a:rPr lang="nb-NO" dirty="0">
+                <a:latin typeface="Arial" panose="020B0604020202020204" pitchFamily="34" charset="0"/>
+                <a:cs typeface="Arial" panose="020B0604020202020204" pitchFamily="34" charset="0"/>
+              </a:rPr>
+              <a:t>			«id»: «0»,</a:t>
+            </a:r>
+          </a:p>
+          <a:p>
+            <a:pPr marL="0" indent="0">
+              <a:buNone/>
+            </a:pPr>
+            <a:r>
+              <a:rPr lang="nb-NO" dirty="0">
+                <a:latin typeface="Arial" panose="020B0604020202020204" pitchFamily="34" charset="0"/>
+                <a:cs typeface="Arial" panose="020B0604020202020204" pitchFamily="34" charset="0"/>
+              </a:rPr>
+              <a:t>			«itemType»: «0»,</a:t>
+            </a:r>
+          </a:p>
+          <a:p>
+            <a:pPr marL="0" indent="0">
+              <a:buNone/>
+            </a:pPr>
+            <a:r>
+              <a:rPr lang="nb-NO" dirty="0">
+                <a:latin typeface="Arial" panose="020B0604020202020204" pitchFamily="34" charset="0"/>
+                <a:cs typeface="Arial" panose="020B0604020202020204" pitchFamily="34" charset="0"/>
+              </a:rPr>
+              <a:t>			«string»: «purple»,</a:t>
+            </a:r>
+          </a:p>
+          <a:p>
+            <a:pPr marL="0" indent="0">
+              <a:buNone/>
+            </a:pPr>
+            <a:r>
+              <a:rPr lang="nb-NO" dirty="0">
+                <a:latin typeface="Arial" panose="020B0604020202020204" pitchFamily="34" charset="0"/>
+                <a:cs typeface="Arial" panose="020B0604020202020204" pitchFamily="34" charset="0"/>
+              </a:rPr>
+              <a:t>			«cost1»: «40»,</a:t>
+            </a:r>
+          </a:p>
+          <a:p>
+            <a:pPr marL="0" indent="0">
+              <a:buNone/>
+            </a:pPr>
+            <a:r>
+              <a:rPr lang="nb-NO" dirty="0">
+                <a:latin typeface="Arial" panose="020B0604020202020204" pitchFamily="34" charset="0"/>
+                <a:cs typeface="Arial" panose="020B0604020202020204" pitchFamily="34" charset="0"/>
+              </a:rPr>
+              <a:t>			«cost2»: «5»</a:t>
+            </a:r>
+          </a:p>
+          <a:p>
+            <a:pPr marL="0" indent="0">
+              <a:buNone/>
+            </a:pPr>
+            <a:r>
+              <a:rPr lang="nb-NO" dirty="0">
+                <a:latin typeface="Arial" panose="020B0604020202020204" pitchFamily="34" charset="0"/>
+                <a:cs typeface="Arial" panose="020B0604020202020204" pitchFamily="34" charset="0"/>
+              </a:rPr>
+              <a:t>			...</a:t>
+            </a:r>
+          </a:p>
+          <a:p>
+            <a:pPr marL="0" indent="0">
+              <a:buNone/>
+            </a:pPr>
+            <a:r>
+              <a:rPr lang="nb-NO" dirty="0">
+                <a:latin typeface="Arial" panose="020B0604020202020204" pitchFamily="34" charset="0"/>
+                <a:cs typeface="Arial" panose="020B0604020202020204" pitchFamily="34" charset="0"/>
+              </a:rPr>
+              <a:t>		},</a:t>
+            </a:r>
+          </a:p>
+          <a:p>
+            <a:pPr marL="0" indent="0">
+              <a:buNone/>
+            </a:pPr>
+            <a:r>
+              <a:rPr lang="nb-NO" dirty="0">
+                <a:latin typeface="Arial" panose="020B0604020202020204" pitchFamily="34" charset="0"/>
+                <a:cs typeface="Arial" panose="020B0604020202020204" pitchFamily="34" charset="0"/>
+              </a:rPr>
+              <a:t>		...</a:t>
+            </a:r>
+          </a:p>
+          <a:p>
+            <a:pPr marL="0" indent="0">
+              <a:buNone/>
+            </a:pPr>
+            <a:r>
+              <a:rPr lang="nb-NO" dirty="0">
+                <a:latin typeface="Arial" panose="020B0604020202020204" pitchFamily="34" charset="0"/>
+                <a:cs typeface="Arial" panose="020B0604020202020204" pitchFamily="34" charset="0"/>
+              </a:rPr>
+              <a:t>	]</a:t>
+            </a:r>
+          </a:p>
+          <a:p>
+            <a:pPr marL="0" indent="0">
+              <a:buNone/>
+            </a:pPr>
+            <a:r>
+              <a:rPr lang="nb-NO" dirty="0">
+                <a:latin typeface="Arial" panose="020B0604020202020204" pitchFamily="34" charset="0"/>
+                <a:cs typeface="Arial" panose="020B0604020202020204" pitchFamily="34" charset="0"/>
+              </a:rPr>
+              <a:t>}</a:t>
+            </a:r>
+          </a:p>
+          <a:p>
+            <a:r>
+              <a:rPr lang="nb-NO" dirty="0">
+                <a:latin typeface="Arial" panose="020B0604020202020204" pitchFamily="34" charset="0"/>
+                <a:cs typeface="Arial" panose="020B0604020202020204" pitchFamily="34" charset="0"/>
+              </a:rPr>
+              <a:t>GET method with only «user_id» param returns every ChatItem with an «owned» t/f value based on whether or not the user owns it</a:t>
+            </a:r>
+          </a:p>
+          <a:p>
+            <a:r>
+              <a:rPr lang="nb-NO" dirty="0">
+                <a:latin typeface="Arial" panose="020B0604020202020204" pitchFamily="34" charset="0"/>
+                <a:cs typeface="Arial" panose="020B0604020202020204" pitchFamily="34" charset="0"/>
+              </a:rPr>
+              <a:t>POST method with json including «item_type», «string», «cost1», «cost2», and «cost3» to create that ChatItem</a:t>
+            </a:r>
+          </a:p>
+          <a:p>
+            <a:r>
+              <a:rPr lang="nb-NO" dirty="0">
+                <a:latin typeface="Arial" panose="020B0604020202020204" pitchFamily="34" charset="0"/>
+                <a:cs typeface="Arial" panose="020B0604020202020204" pitchFamily="34" charset="0"/>
+              </a:rPr>
+              <a:t>PATCH method with json including «user_id» and «chat_item_id» to add that ChatItem to the User</a:t>
             </a:r>
           </a:p>
         </p:txBody>
@@ -7025,7 +7192,7 @@
     </p:spTree>
     <p:extLst>
       <p:ext uri="{BB962C8B-B14F-4D97-AF65-F5344CB8AC3E}">
-        <p14:creationId xmlns:p14="http://schemas.microsoft.com/office/powerpoint/2010/main" val="3689206682"/>
+        <p14:creationId xmlns:p14="http://schemas.microsoft.com/office/powerpoint/2010/main" val="1642849653"/>
       </p:ext>
     </p:extLst>
   </p:cSld>
@@ -7077,7 +7244,7 @@
                 <a:latin typeface="Arial" panose="020B0604020202020204" pitchFamily="34" charset="0"/>
                 <a:cs typeface="Arial" panose="020B0604020202020204" pitchFamily="34" charset="0"/>
               </a:rPr>
-              <a:t>/status</a:t>
+              <a:t>/currency</a:t>
             </a:r>
           </a:p>
         </p:txBody>
@@ -7104,24 +7271,35 @@
                 <a:latin typeface="Arial" panose="020B0604020202020204" pitchFamily="34" charset="0"/>
                 <a:cs typeface="Arial" panose="020B0604020202020204" pitchFamily="34" charset="0"/>
               </a:rPr>
-              <a:t>GET method returns «event» and «news» from the server status</a:t>
-            </a:r>
-          </a:p>
-          <a:p>
-            <a:r>
-              <a:rPr lang="nb-NO" dirty="0">
-                <a:latin typeface="Arial" panose="020B0604020202020204" pitchFamily="34" charset="0"/>
-                <a:cs typeface="Arial" panose="020B0604020202020204" pitchFamily="34" charset="0"/>
-              </a:rPr>
-              <a:t>PATCH with json including «event» and «news» to update the server status – leave a param null to not update it</a:t>
-            </a:r>
+              <a:t>GET method with params «user_id» returns cur1-3, vou2-3, lifetime_cur1-3</a:t>
+            </a:r>
+          </a:p>
+          <a:p>
+            <a:r>
+              <a:rPr lang="nb-NO" dirty="0">
+                <a:latin typeface="Arial" panose="020B0604020202020204" pitchFamily="34" charset="0"/>
+                <a:cs typeface="Arial" panose="020B0604020202020204" pitchFamily="34" charset="0"/>
+              </a:rPr>
+              <a:t>PATCH with json including «user_id», «cur1», «cur2», «cur3», «vou2» and «vou3» add these curs and vous to the User’s currency – if they’re positive increments both the current and lifetime currencies, if they’re negative only decreases the </a:t>
+            </a:r>
+            <a:r>
+              <a:rPr lang="nb-NO">
+                <a:latin typeface="Arial" panose="020B0604020202020204" pitchFamily="34" charset="0"/>
+                <a:cs typeface="Arial" panose="020B0604020202020204" pitchFamily="34" charset="0"/>
+              </a:rPr>
+              <a:t>current ones (note: you can also send an «update_lifetime» boolean to force updating or not updating lifetime currency)</a:t>
+            </a:r>
+            <a:endParaRPr lang="nb-NO" dirty="0">
+              <a:latin typeface="Arial" panose="020B0604020202020204" pitchFamily="34" charset="0"/>
+              <a:cs typeface="Arial" panose="020B0604020202020204" pitchFamily="34" charset="0"/>
+            </a:endParaRPr>
           </a:p>
         </p:txBody>
       </p:sp>
     </p:spTree>
     <p:extLst>
       <p:ext uri="{BB962C8B-B14F-4D97-AF65-F5344CB8AC3E}">
-        <p14:creationId xmlns:p14="http://schemas.microsoft.com/office/powerpoint/2010/main" val="809141698"/>
+        <p14:creationId xmlns:p14="http://schemas.microsoft.com/office/powerpoint/2010/main" val="1802617112"/>
       </p:ext>
     </p:extLst>
   </p:cSld>
@@ -7366,6 +7544,207 @@
                 <a:latin typeface="Arial" panose="020B0604020202020204" pitchFamily="34" charset="0"/>
                 <a:cs typeface="Arial" panose="020B0604020202020204" pitchFamily="34" charset="0"/>
               </a:rPr>
+              <a:t>/missions</a:t>
+            </a:r>
+          </a:p>
+        </p:txBody>
+      </p:sp>
+      <p:sp>
+        <p:nvSpPr>
+          <p:cNvPr id="3" name="Content Placeholder 2"/>
+          <p:cNvSpPr>
+            <a:spLocks noGrp="1"/>
+          </p:cNvSpPr>
+          <p:nvPr>
+            <p:ph idx="1"/>
+          </p:nvPr>
+        </p:nvSpPr>
+        <p:spPr/>
+        <p:txBody>
+          <a:bodyPr>
+            <a:normAutofit/>
+          </a:bodyPr>
+          <a:lstStyle/>
+          <a:p>
+            <a:r>
+              <a:rPr lang="nb-NO" dirty="0">
+                <a:latin typeface="Arial" panose="020B0604020202020204" pitchFamily="34" charset="0"/>
+                <a:cs typeface="Arial" panose="020B0604020202020204" pitchFamily="34" charset="0"/>
+              </a:rPr>
+              <a:t>GET method with params «user_id» returns mission_type, mission_current, mission_total</a:t>
+            </a:r>
+          </a:p>
+          <a:p>
+            <a:r>
+              <a:rPr lang="nb-NO" dirty="0">
+                <a:latin typeface="Arial" panose="020B0604020202020204" pitchFamily="34" charset="0"/>
+                <a:cs typeface="Arial" panose="020B0604020202020204" pitchFamily="34" charset="0"/>
+              </a:rPr>
+              <a:t>POST method with params «user_id» increases mission_current by 1</a:t>
+            </a:r>
+          </a:p>
+          <a:p>
+            <a:r>
+              <a:rPr lang="nb-NO" dirty="0">
+                <a:latin typeface="Arial" panose="020B0604020202020204" pitchFamily="34" charset="0"/>
+                <a:cs typeface="Arial" panose="020B0604020202020204" pitchFamily="34" charset="0"/>
+              </a:rPr>
+              <a:t>PATCH with params «user_id» will set mission_current and mission_total to -1, then begins a 10 minute timer to get a new mission</a:t>
+            </a:r>
+          </a:p>
+        </p:txBody>
+      </p:sp>
+    </p:spTree>
+    <p:extLst>
+      <p:ext uri="{BB962C8B-B14F-4D97-AF65-F5344CB8AC3E}">
+        <p14:creationId xmlns:p14="http://schemas.microsoft.com/office/powerpoint/2010/main" val="3689206682"/>
+      </p:ext>
+    </p:extLst>
+  </p:cSld>
+  <p:clrMapOvr>
+    <a:masterClrMapping/>
+  </p:clrMapOvr>
+</p:sld>
+</file>
+
+<file path=ppt/slides/slide31.xml><?xml version="1.0" encoding="utf-8"?>
+<p:sld xmlns:a="http://schemas.openxmlformats.org/drawingml/2006/main" xmlns:r="http://schemas.openxmlformats.org/officeDocument/2006/relationships" xmlns:p="http://schemas.openxmlformats.org/presentationml/2006/main">
+  <p:cSld>
+    <p:spTree>
+      <p:nvGrpSpPr>
+        <p:cNvPr id="1" name=""/>
+        <p:cNvGrpSpPr/>
+        <p:nvPr/>
+      </p:nvGrpSpPr>
+      <p:grpSpPr>
+        <a:xfrm>
+          <a:off x="0" y="0"/>
+          <a:ext cx="0" cy="0"/>
+          <a:chOff x="0" y="0"/>
+          <a:chExt cx="0" cy="0"/>
+        </a:xfrm>
+      </p:grpSpPr>
+      <p:sp>
+        <p:nvSpPr>
+          <p:cNvPr id="2" name="Title 1"/>
+          <p:cNvSpPr>
+            <a:spLocks noGrp="1"/>
+          </p:cNvSpPr>
+          <p:nvPr>
+            <p:ph type="title"/>
+          </p:nvPr>
+        </p:nvSpPr>
+        <p:spPr>
+          <a:xfrm>
+            <a:off x="838200" y="365125"/>
+            <a:ext cx="10515600" cy="1325563"/>
+          </a:xfrm>
+        </p:spPr>
+        <p:txBody>
+          <a:bodyPr/>
+          <a:lstStyle/>
+          <a:p>
+            <a:r>
+              <a:rPr lang="en-US" dirty="0">
+                <a:latin typeface="Arial" panose="020B0604020202020204" pitchFamily="34" charset="0"/>
+                <a:cs typeface="Arial" panose="020B0604020202020204" pitchFamily="34" charset="0"/>
+              </a:rPr>
+              <a:t>/status</a:t>
+            </a:r>
+          </a:p>
+        </p:txBody>
+      </p:sp>
+      <p:sp>
+        <p:nvSpPr>
+          <p:cNvPr id="3" name="Content Placeholder 2"/>
+          <p:cNvSpPr>
+            <a:spLocks noGrp="1"/>
+          </p:cNvSpPr>
+          <p:nvPr>
+            <p:ph idx="1"/>
+          </p:nvPr>
+        </p:nvSpPr>
+        <p:spPr/>
+        <p:txBody>
+          <a:bodyPr>
+            <a:normAutofit/>
+          </a:bodyPr>
+          <a:lstStyle/>
+          <a:p>
+            <a:r>
+              <a:rPr lang="nb-NO" dirty="0">
+                <a:latin typeface="Arial" panose="020B0604020202020204" pitchFamily="34" charset="0"/>
+                <a:cs typeface="Arial" panose="020B0604020202020204" pitchFamily="34" charset="0"/>
+              </a:rPr>
+              <a:t>GET method returns «event» and «news» from the server status</a:t>
+            </a:r>
+          </a:p>
+          <a:p>
+            <a:r>
+              <a:rPr lang="nb-NO" dirty="0">
+                <a:latin typeface="Arial" panose="020B0604020202020204" pitchFamily="34" charset="0"/>
+                <a:cs typeface="Arial" panose="020B0604020202020204" pitchFamily="34" charset="0"/>
+              </a:rPr>
+              <a:t>PATCH with json including «event» and «news» to update the server status – leave a param null to not update it</a:t>
+            </a:r>
+          </a:p>
+        </p:txBody>
+      </p:sp>
+    </p:spTree>
+    <p:extLst>
+      <p:ext uri="{BB962C8B-B14F-4D97-AF65-F5344CB8AC3E}">
+        <p14:creationId xmlns:p14="http://schemas.microsoft.com/office/powerpoint/2010/main" val="809141698"/>
+      </p:ext>
+    </p:extLst>
+  </p:cSld>
+  <p:clrMapOvr>
+    <a:masterClrMapping/>
+  </p:clrMapOvr>
+</p:sld>
+</file>
+
+<file path=ppt/slides/slide32.xml><?xml version="1.0" encoding="utf-8"?>
+<p:sld xmlns:a="http://schemas.openxmlformats.org/drawingml/2006/main" xmlns:r="http://schemas.openxmlformats.org/officeDocument/2006/relationships" xmlns:p="http://schemas.openxmlformats.org/presentationml/2006/main">
+  <p:cSld>
+    <p:spTree>
+      <p:nvGrpSpPr>
+        <p:cNvPr id="1" name=""/>
+        <p:cNvGrpSpPr/>
+        <p:nvPr/>
+      </p:nvGrpSpPr>
+      <p:grpSpPr>
+        <a:xfrm>
+          <a:off x="0" y="0"/>
+          <a:ext cx="0" cy="0"/>
+          <a:chOff x="0" y="0"/>
+          <a:chExt cx="0" cy="0"/>
+        </a:xfrm>
+      </p:grpSpPr>
+      <p:sp>
+        <p:nvSpPr>
+          <p:cNvPr id="2" name="Title 1"/>
+          <p:cNvSpPr>
+            <a:spLocks noGrp="1"/>
+          </p:cNvSpPr>
+          <p:nvPr>
+            <p:ph type="title"/>
+          </p:nvPr>
+        </p:nvSpPr>
+        <p:spPr>
+          <a:xfrm>
+            <a:off x="838200" y="365125"/>
+            <a:ext cx="10515600" cy="1325563"/>
+          </a:xfrm>
+        </p:spPr>
+        <p:txBody>
+          <a:bodyPr/>
+          <a:lstStyle/>
+          <a:p>
+            <a:r>
+              <a:rPr lang="en-US" dirty="0">
+                <a:latin typeface="Arial" panose="020B0604020202020204" pitchFamily="34" charset="0"/>
+                <a:cs typeface="Arial" panose="020B0604020202020204" pitchFamily="34" charset="0"/>
+              </a:rPr>
               <a:t>/files</a:t>
             </a:r>
           </a:p>
@@ -8014,7 +8393,7 @@
         </p:spPr>
         <p:txBody>
           <a:bodyPr>
-            <a:normAutofit fontScale="40000" lnSpcReduction="20000"/>
+            <a:normAutofit fontScale="32500" lnSpcReduction="20000"/>
           </a:bodyPr>
           <a:lstStyle/>
           <a:p>
@@ -8154,34 +8533,71 @@
           </a:p>
           <a:p>
             <a:r>
+              <a:rPr lang="nb-NO" dirty="0">
+                <a:latin typeface="Arial" panose="020B0604020202020204" pitchFamily="34" charset="0"/>
+                <a:cs typeface="Arial" panose="020B0604020202020204" pitchFamily="34" charset="0"/>
+              </a:rPr>
+              <a:t>theme: String(128) NOTE: It was my intention to put theme and planet_desc as Planet variables, but flask-migrate prohibited me for some reason</a:t>
+            </a:r>
+          </a:p>
+          <a:p>
+            <a:r>
+              <a:rPr lang="nb-NO" dirty="0">
+                <a:latin typeface="Arial" panose="020B0604020202020204" pitchFamily="34" charset="0"/>
+                <a:cs typeface="Arial" panose="020B0604020202020204" pitchFamily="34" charset="0"/>
+              </a:rPr>
+              <a:t>planet: a one-to-one relationship between User and Planet, giving owner variable to Planet</a:t>
+            </a:r>
+          </a:p>
+          <a:p>
+            <a:r>
+              <a:rPr lang="nb-NO" dirty="0">
+                <a:latin typeface="Arial" panose="020B0604020202020204" pitchFamily="34" charset="0"/>
+                <a:cs typeface="Arial" panose="020B0604020202020204" pitchFamily="34" charset="0"/>
+              </a:rPr>
+              <a:t>planet_items: a one-to-many relationship between User and PlanetItems, giving owner variable to PlanetItem</a:t>
+            </a:r>
+          </a:p>
+          <a:p>
+            <a:r>
               <a:rPr lang="nb-NO">
                 <a:latin typeface="Arial" panose="020B0604020202020204" pitchFamily="34" charset="0"/>
                 <a:cs typeface="Arial" panose="020B0604020202020204" pitchFamily="34" charset="0"/>
               </a:rPr>
-              <a:t>theme: String(128) NOTE: It was my intention to put theme and planet_desc as Planet variables, but flask-migrate prohibited me for some reason</a:t>
+              <a:t>projects: </a:t>
+            </a:r>
+            <a:r>
+              <a:rPr lang="nb-NO" dirty="0">
+                <a:latin typeface="Arial" panose="020B0604020202020204" pitchFamily="34" charset="0"/>
+                <a:cs typeface="Arial" panose="020B0604020202020204" pitchFamily="34" charset="0"/>
+              </a:rPr>
+              <a:t>a one-to-many relationship between User </a:t>
+            </a:r>
+            <a:r>
+              <a:rPr lang="nb-NO">
+                <a:latin typeface="Arial" panose="020B0604020202020204" pitchFamily="34" charset="0"/>
+                <a:cs typeface="Arial" panose="020B0604020202020204" pitchFamily="34" charset="0"/>
+              </a:rPr>
+              <a:t>and Project, </a:t>
+            </a:r>
+            <a:r>
+              <a:rPr lang="nb-NO" dirty="0">
+                <a:latin typeface="Arial" panose="020B0604020202020204" pitchFamily="34" charset="0"/>
+                <a:cs typeface="Arial" panose="020B0604020202020204" pitchFamily="34" charset="0"/>
+              </a:rPr>
+              <a:t>giving owner variable </a:t>
+            </a:r>
+            <a:r>
+              <a:rPr lang="nb-NO">
+                <a:latin typeface="Arial" panose="020B0604020202020204" pitchFamily="34" charset="0"/>
+                <a:cs typeface="Arial" panose="020B0604020202020204" pitchFamily="34" charset="0"/>
+              </a:rPr>
+              <a:t>to Project</a:t>
             </a:r>
             <a:endParaRPr lang="nb-NO" dirty="0">
               <a:latin typeface="Arial" panose="020B0604020202020204" pitchFamily="34" charset="0"/>
               <a:cs typeface="Arial" panose="020B0604020202020204" pitchFamily="34" charset="0"/>
             </a:endParaRPr>
-          </a:p>
-          <a:p>
-            <a:r>
-              <a:rPr lang="nb-NO" dirty="0">
-                <a:latin typeface="Arial" panose="020B0604020202020204" pitchFamily="34" charset="0"/>
-                <a:cs typeface="Arial" panose="020B0604020202020204" pitchFamily="34" charset="0"/>
-              </a:rPr>
-              <a:t>planet: a one-to-one relationship between User and Planet, giving owner variable to Planet</a:t>
-            </a:r>
-          </a:p>
-          <a:p>
-            <a:r>
-              <a:rPr lang="nb-NO" dirty="0">
-                <a:latin typeface="Arial" panose="020B0604020202020204" pitchFamily="34" charset="0"/>
-                <a:cs typeface="Arial" panose="020B0604020202020204" pitchFamily="34" charset="0"/>
-              </a:rPr>
-              <a:t>planet_items: a one-to-many relationship between User and PlanetItems, giving owner variable to PlanetItem</a:t>
-            </a:r>
           </a:p>
           <a:p>
             <a:r>

</xml_diff>

<commit_message>
Aliens, for real this time
</commit_message>
<xml_diff>
--- a/iu-spec-backend.pptx
+++ b/iu-spec-backend.pptx
@@ -6880,15 +6880,6 @@
               <a:t>DELETE method with params «project_id» will remove that item from the database</a:t>
             </a:r>
           </a:p>
-          <a:p>
-            <a:r>
-              <a:rPr lang="nb-NO" dirty="0">
-                <a:latin typeface="Arial" panose="020B0604020202020204" pitchFamily="34" charset="0"/>
-                <a:cs typeface="Arial" panose="020B0604020202020204" pitchFamily="34" charset="0"/>
-              </a:rPr>
-              <a:t>PATCH method with json «project_id», «name», «desc», and «file» updates a Project’s variables</a:t>
-            </a:r>
-          </a:p>
         </p:txBody>
       </p:sp>
     </p:spTree>
@@ -8560,44 +8551,12 @@
           </a:p>
           <a:p>
             <a:r>
-              <a:rPr lang="nb-NO">
-                <a:latin typeface="Arial" panose="020B0604020202020204" pitchFamily="34" charset="0"/>
-                <a:cs typeface="Arial" panose="020B0604020202020204" pitchFamily="34" charset="0"/>
-              </a:rPr>
-              <a:t>projects: </a:t>
-            </a:r>
-            <a:r>
-              <a:rPr lang="nb-NO" dirty="0">
-                <a:latin typeface="Arial" panose="020B0604020202020204" pitchFamily="34" charset="0"/>
-                <a:cs typeface="Arial" panose="020B0604020202020204" pitchFamily="34" charset="0"/>
-              </a:rPr>
-              <a:t>a one-to-many relationship between User </a:t>
-            </a:r>
-            <a:r>
-              <a:rPr lang="nb-NO">
-                <a:latin typeface="Arial" panose="020B0604020202020204" pitchFamily="34" charset="0"/>
-                <a:cs typeface="Arial" panose="020B0604020202020204" pitchFamily="34" charset="0"/>
-              </a:rPr>
-              <a:t>and Project, </a:t>
-            </a:r>
-            <a:r>
-              <a:rPr lang="nb-NO" dirty="0">
-                <a:latin typeface="Arial" panose="020B0604020202020204" pitchFamily="34" charset="0"/>
-                <a:cs typeface="Arial" panose="020B0604020202020204" pitchFamily="34" charset="0"/>
-              </a:rPr>
-              <a:t>giving owner variable </a:t>
-            </a:r>
-            <a:r>
-              <a:rPr lang="nb-NO">
-                <a:latin typeface="Arial" panose="020B0604020202020204" pitchFamily="34" charset="0"/>
-                <a:cs typeface="Arial" panose="020B0604020202020204" pitchFamily="34" charset="0"/>
-              </a:rPr>
-              <a:t>to Project</a:t>
-            </a:r>
-            <a:endParaRPr lang="nb-NO" dirty="0">
-              <a:latin typeface="Arial" panose="020B0604020202020204" pitchFamily="34" charset="0"/>
-              <a:cs typeface="Arial" panose="020B0604020202020204" pitchFamily="34" charset="0"/>
-            </a:endParaRPr>
+              <a:rPr lang="nb-NO" dirty="0">
+                <a:latin typeface="Arial" panose="020B0604020202020204" pitchFamily="34" charset="0"/>
+                <a:cs typeface="Arial" panose="020B0604020202020204" pitchFamily="34" charset="0"/>
+              </a:rPr>
+              <a:t>projects: a one-to-many relationship between User and Project, giving owner variable to Project</a:t>
+            </a:r>
           </a:p>
           <a:p>
             <a:r>

</xml_diff>